<commit_message>
Updated an overall workflow, and added it to the documentation.
</commit_message>
<xml_diff>
--- a/doc/evm-eval-work-flow.pptx
+++ b/doc/evm-eval-work-flow.pptx
@@ -195,7 +195,7 @@
             <a:fld id="{1D635E4C-BAB0-4BAB-AAF7-4D9825D68060}" type="datetimeFigureOut">
               <a:rPr lang="en-US" smtClean="0"/>
               <a:pPr/>
-              <a:t>8/5/2014</a:t>
+              <a:t>8/8/2014</a:t>
             </a:fld>
             <a:endParaRPr lang="en-US"/>
           </a:p>
@@ -646,7 +646,7 @@
             <a:fld id="{3B56066F-CE6C-4B27-993A-2842BDE8189B}" type="datetime1">
               <a:rPr lang="en-US" smtClean="0"/>
               <a:pPr/>
-              <a:t>8/5/2014</a:t>
+              <a:t>8/8/2014</a:t>
             </a:fld>
             <a:endParaRPr lang="en-US"/>
           </a:p>
@@ -813,7 +813,7 @@
             <a:fld id="{61174E08-E9E9-4260-BC0A-45316FB7E636}" type="datetime1">
               <a:rPr lang="en-US" smtClean="0"/>
               <a:pPr/>
-              <a:t>8/5/2014</a:t>
+              <a:t>8/8/2014</a:t>
             </a:fld>
             <a:endParaRPr lang="en-US"/>
           </a:p>
@@ -990,7 +990,7 @@
             <a:fld id="{64C675E3-4156-4610-8C23-B8FBCA8F0F60}" type="datetime1">
               <a:rPr lang="en-US" smtClean="0"/>
               <a:pPr/>
-              <a:t>8/5/2014</a:t>
+              <a:t>8/8/2014</a:t>
             </a:fld>
             <a:endParaRPr lang="en-US"/>
           </a:p>
@@ -1157,7 +1157,7 @@
             <a:fld id="{119C4F61-BDF2-4F97-8BCC-87B3B636DDF2}" type="datetime1">
               <a:rPr lang="en-US" smtClean="0"/>
               <a:pPr/>
-              <a:t>8/5/2014</a:t>
+              <a:t>8/8/2014</a:t>
             </a:fld>
             <a:endParaRPr lang="en-US"/>
           </a:p>
@@ -1400,7 +1400,7 @@
             <a:fld id="{02F0C2A0-F4E4-41A2-82A2-5525FFA2797A}" type="datetime1">
               <a:rPr lang="en-US" smtClean="0"/>
               <a:pPr/>
-              <a:t>8/5/2014</a:t>
+              <a:t>8/8/2014</a:t>
             </a:fld>
             <a:endParaRPr lang="en-US"/>
           </a:p>
@@ -1685,7 +1685,7 @@
             <a:fld id="{19C68C49-B72E-4B6B-B516-758D46CA9D72}" type="datetime1">
               <a:rPr lang="en-US" smtClean="0"/>
               <a:pPr/>
-              <a:t>8/5/2014</a:t>
+              <a:t>8/8/2014</a:t>
             </a:fld>
             <a:endParaRPr lang="en-US"/>
           </a:p>
@@ -2104,7 +2104,7 @@
             <a:fld id="{1AC33444-61AF-4C04-94BE-279981869E66}" type="datetime1">
               <a:rPr lang="en-US" smtClean="0"/>
               <a:pPr/>
-              <a:t>8/5/2014</a:t>
+              <a:t>8/8/2014</a:t>
             </a:fld>
             <a:endParaRPr lang="en-US"/>
           </a:p>
@@ -2219,7 +2219,7 @@
             <a:fld id="{680EC325-BE6D-4D10-BEAB-D93726F5911A}" type="datetime1">
               <a:rPr lang="en-US" smtClean="0"/>
               <a:pPr/>
-              <a:t>8/5/2014</a:t>
+              <a:t>8/8/2014</a:t>
             </a:fld>
             <a:endParaRPr lang="en-US"/>
           </a:p>
@@ -2311,7 +2311,7 @@
             <a:fld id="{B1972600-64F6-4C1F-838C-01314CB42182}" type="datetime1">
               <a:rPr lang="en-US" smtClean="0"/>
               <a:pPr/>
-              <a:t>8/5/2014</a:t>
+              <a:t>8/8/2014</a:t>
             </a:fld>
             <a:endParaRPr lang="en-US"/>
           </a:p>
@@ -2585,7 +2585,7 @@
             <a:fld id="{EAB60A1F-67E6-47A6-8991-02AEC54F3211}" type="datetime1">
               <a:rPr lang="en-US" smtClean="0"/>
               <a:pPr/>
-              <a:t>8/5/2014</a:t>
+              <a:t>8/8/2014</a:t>
             </a:fld>
             <a:endParaRPr lang="en-US"/>
           </a:p>
@@ -2835,7 +2835,7 @@
             <a:fld id="{78DCC502-29AC-46C3-8325-CE3B184A6144}" type="datetime1">
               <a:rPr lang="en-US" smtClean="0"/>
               <a:pPr/>
-              <a:t>8/5/2014</a:t>
+              <a:t>8/8/2014</a:t>
             </a:fld>
             <a:endParaRPr lang="en-US"/>
           </a:p>
@@ -3045,7 +3045,7 @@
             <a:fld id="{3DFC592B-B14E-40A5-81F6-981F0BC4FA39}" type="datetime1">
               <a:rPr lang="en-US" smtClean="0"/>
               <a:pPr/>
-              <a:t>8/5/2014</a:t>
+              <a:t>8/8/2014</a:t>
             </a:fld>
             <a:endParaRPr lang="en-US"/>
           </a:p>
@@ -3481,7 +3481,19 @@
             <a:pPr lvl="1"/>
             <a:r>
               <a:rPr lang="en-US" dirty="0" smtClean="0"/>
-              <a:t>The evaluation file format (*.eme) is character-based, but the evaluator considers tokens</a:t>
+              <a:t>The evaluation file format (*.</a:t>
+            </a:r>
+            <a:r>
+              <a:rPr lang="en-US" dirty="0" err="1" smtClean="0"/>
+              <a:t>emdf</a:t>
+            </a:r>
+            <a:r>
+              <a:rPr lang="en-US" dirty="0" smtClean="0"/>
+              <a:t>) </a:t>
+            </a:r>
+            <a:r>
+              <a:rPr lang="en-US" dirty="0" smtClean="0"/>
+              <a:t>is character-based, but the evaluator considers tokens</a:t>
             </a:r>
             <a:endParaRPr lang="en-US" dirty="0"/>
           </a:p>
@@ -3491,6 +3503,1714 @@
               <a:rPr lang="en-US" dirty="0"/>
               <a:t>A token file is an intermediate file to be used in evaluation</a:t>
             </a:r>
+          </a:p>
+        </p:txBody>
+      </p:sp>
+      <p:sp>
+        <p:nvSpPr>
+          <p:cNvPr id="107" name="Slide Number Placeholder 106"/>
+          <p:cNvSpPr>
+            <a:spLocks noGrp="1"/>
+          </p:cNvSpPr>
+          <p:nvPr>
+            <p:ph type="sldNum" sz="quarter" idx="12"/>
+          </p:nvPr>
+        </p:nvSpPr>
+        <p:spPr>
+          <a:xfrm>
+            <a:off x="6553200" y="6484255"/>
+            <a:ext cx="2133600" cy="365125"/>
+          </a:xfrm>
+        </p:spPr>
+        <p:txBody>
+          <a:bodyPr/>
+          <a:lstStyle/>
+          <a:p>
+            <a:fld id="{B6F15528-21DE-4FAA-801E-634DDDAF4B2B}" type="slidenum">
+              <a:rPr lang="en-US" smtClean="0"/>
+              <a:pPr/>
+              <a:t>1</a:t>
+            </a:fld>
+            <a:endParaRPr lang="en-US" dirty="0"/>
+          </a:p>
+        </p:txBody>
+      </p:sp>
+      <p:grpSp>
+        <p:nvGrpSpPr>
+          <p:cNvPr id="9" name="Group 8"/>
+          <p:cNvGrpSpPr/>
+          <p:nvPr/>
+        </p:nvGrpSpPr>
+        <p:grpSpPr>
+          <a:xfrm>
+            <a:off x="273723" y="2522722"/>
+            <a:ext cx="8740570" cy="4083341"/>
+            <a:chOff x="273723" y="2522722"/>
+            <a:chExt cx="8740570" cy="4083341"/>
+          </a:xfrm>
+        </p:grpSpPr>
+        <p:sp>
+          <p:nvSpPr>
+            <p:cNvPr id="4" name="Smiley Face 3"/>
+            <p:cNvSpPr/>
+            <p:nvPr/>
+          </p:nvSpPr>
+          <p:spPr>
+            <a:xfrm>
+              <a:off x="671998" y="2856968"/>
+              <a:ext cx="381000" cy="381000"/>
+            </a:xfrm>
+            <a:prstGeom prst="smileyFace">
+              <a:avLst/>
+            </a:prstGeom>
+            <a:noFill/>
+            <a:ln>
+              <a:solidFill>
+                <a:schemeClr val="tx1"/>
+              </a:solidFill>
+            </a:ln>
+          </p:spPr>
+          <p:style>
+            <a:lnRef idx="2">
+              <a:schemeClr val="accent1">
+                <a:shade val="50000"/>
+              </a:schemeClr>
+            </a:lnRef>
+            <a:fillRef idx="1">
+              <a:schemeClr val="accent1"/>
+            </a:fillRef>
+            <a:effectRef idx="0">
+              <a:schemeClr val="accent1"/>
+            </a:effectRef>
+            <a:fontRef idx="minor">
+              <a:schemeClr val="lt1"/>
+            </a:fontRef>
+          </p:style>
+          <p:txBody>
+            <a:bodyPr rtlCol="0" anchor="ctr"/>
+            <a:lstStyle/>
+            <a:p>
+              <a:pPr algn="ctr"/>
+              <a:endParaRPr lang="en-US"/>
+            </a:p>
+          </p:txBody>
+        </p:sp>
+        <p:sp>
+          <p:nvSpPr>
+            <p:cNvPr id="5" name="TextBox 4"/>
+            <p:cNvSpPr txBox="1"/>
+            <p:nvPr/>
+          </p:nvSpPr>
+          <p:spPr>
+            <a:xfrm>
+              <a:off x="273723" y="3235545"/>
+              <a:ext cx="1152127" cy="584775"/>
+            </a:xfrm>
+            <a:prstGeom prst="rect">
+              <a:avLst/>
+            </a:prstGeom>
+            <a:noFill/>
+          </p:spPr>
+          <p:txBody>
+            <a:bodyPr wrap="square" rtlCol="0">
+              <a:spAutoFit/>
+            </a:bodyPr>
+            <a:lstStyle/>
+            <a:p>
+              <a:pPr algn="ctr"/>
+              <a:r>
+                <a:rPr lang="en-US" sz="1600" dirty="0" smtClean="0"/>
+                <a:t>Human annotators</a:t>
+              </a:r>
+              <a:endParaRPr lang="en-US" sz="1600" dirty="0"/>
+            </a:p>
+          </p:txBody>
+        </p:sp>
+        <p:sp>
+          <p:nvSpPr>
+            <p:cNvPr id="6" name="Flowchart: Document 5"/>
+            <p:cNvSpPr/>
+            <p:nvPr/>
+          </p:nvSpPr>
+          <p:spPr>
+            <a:xfrm>
+              <a:off x="2530332" y="2813034"/>
+              <a:ext cx="762000" cy="468868"/>
+            </a:xfrm>
+            <a:prstGeom prst="flowChartDocument">
+              <a:avLst/>
+            </a:prstGeom>
+            <a:solidFill>
+              <a:schemeClr val="accent3">
+                <a:lumMod val="40000"/>
+                <a:lumOff val="60000"/>
+              </a:schemeClr>
+            </a:solidFill>
+            <a:ln>
+              <a:solidFill>
+                <a:schemeClr val="tx1"/>
+              </a:solidFill>
+            </a:ln>
+          </p:spPr>
+          <p:style>
+            <a:lnRef idx="2">
+              <a:schemeClr val="accent1">
+                <a:shade val="50000"/>
+              </a:schemeClr>
+            </a:lnRef>
+            <a:fillRef idx="1">
+              <a:schemeClr val="accent1"/>
+            </a:fillRef>
+            <a:effectRef idx="0">
+              <a:schemeClr val="accent1"/>
+            </a:effectRef>
+            <a:fontRef idx="minor">
+              <a:schemeClr val="lt1"/>
+            </a:fontRef>
+          </p:style>
+          <p:txBody>
+            <a:bodyPr rtlCol="0" anchor="ctr"/>
+            <a:lstStyle/>
+            <a:p>
+              <a:pPr algn="ctr"/>
+              <a:endParaRPr lang="en-US"/>
+            </a:p>
+          </p:txBody>
+        </p:sp>
+        <p:sp>
+          <p:nvSpPr>
+            <p:cNvPr id="8" name="TextBox 7"/>
+            <p:cNvSpPr txBox="1"/>
+            <p:nvPr/>
+          </p:nvSpPr>
+          <p:spPr>
+            <a:xfrm>
+              <a:off x="2180210" y="3280260"/>
+              <a:ext cx="1485087" cy="584775"/>
+            </a:xfrm>
+            <a:prstGeom prst="rect">
+              <a:avLst/>
+            </a:prstGeom>
+            <a:noFill/>
+          </p:spPr>
+          <p:txBody>
+            <a:bodyPr wrap="none" rtlCol="0">
+              <a:spAutoFit/>
+            </a:bodyPr>
+            <a:lstStyle/>
+            <a:p>
+              <a:pPr algn="ctr"/>
+              <a:r>
+                <a:rPr lang="en-US" sz="1600" dirty="0" smtClean="0"/>
+                <a:t>Gold standard</a:t>
+              </a:r>
+            </a:p>
+            <a:p>
+              <a:pPr algn="ctr"/>
+              <a:r>
+                <a:rPr lang="en-US" sz="1600" dirty="0" smtClean="0"/>
+                <a:t>annotation files</a:t>
+              </a:r>
+              <a:endParaRPr lang="en-US" sz="1600" dirty="0"/>
+            </a:p>
+          </p:txBody>
+        </p:sp>
+        <p:cxnSp>
+          <p:nvCxnSpPr>
+            <p:cNvPr id="10" name="Straight Arrow Connector 9"/>
+            <p:cNvCxnSpPr>
+              <a:stCxn id="4" idx="6"/>
+              <a:endCxn id="53" idx="1"/>
+            </p:cNvCxnSpPr>
+            <p:nvPr/>
+          </p:nvCxnSpPr>
+          <p:spPr>
+            <a:xfrm>
+              <a:off x="1052998" y="3047468"/>
+              <a:ext cx="350650" cy="130"/>
+            </a:xfrm>
+            <a:prstGeom prst="straightConnector1">
+              <a:avLst/>
+            </a:prstGeom>
+            <a:ln w="12700">
+              <a:solidFill>
+                <a:schemeClr val="tx1"/>
+              </a:solidFill>
+              <a:tailEnd type="triangle"/>
+            </a:ln>
+          </p:spPr>
+          <p:style>
+            <a:lnRef idx="1">
+              <a:schemeClr val="accent1"/>
+            </a:lnRef>
+            <a:fillRef idx="0">
+              <a:schemeClr val="accent1"/>
+            </a:fillRef>
+            <a:effectRef idx="0">
+              <a:schemeClr val="accent1"/>
+            </a:effectRef>
+            <a:fontRef idx="minor">
+              <a:schemeClr val="tx1"/>
+            </a:fontRef>
+          </p:style>
+        </p:cxnSp>
+        <p:cxnSp>
+          <p:nvCxnSpPr>
+            <p:cNvPr id="12" name="Straight Arrow Connector 11"/>
+            <p:cNvCxnSpPr>
+              <a:stCxn id="53" idx="3"/>
+              <a:endCxn id="6" idx="1"/>
+            </p:cNvCxnSpPr>
+            <p:nvPr/>
+          </p:nvCxnSpPr>
+          <p:spPr>
+            <a:xfrm flipV="1">
+              <a:off x="2111649" y="3047468"/>
+              <a:ext cx="418683" cy="130"/>
+            </a:xfrm>
+            <a:prstGeom prst="straightConnector1">
+              <a:avLst/>
+            </a:prstGeom>
+            <a:ln w="12700">
+              <a:solidFill>
+                <a:schemeClr val="tx1"/>
+              </a:solidFill>
+              <a:tailEnd type="triangle"/>
+            </a:ln>
+          </p:spPr>
+          <p:style>
+            <a:lnRef idx="1">
+              <a:schemeClr val="accent1"/>
+            </a:lnRef>
+            <a:fillRef idx="0">
+              <a:schemeClr val="accent1"/>
+            </a:fillRef>
+            <a:effectRef idx="0">
+              <a:schemeClr val="accent1"/>
+            </a:effectRef>
+            <a:fontRef idx="minor">
+              <a:schemeClr val="tx1"/>
+            </a:fontRef>
+          </p:style>
+        </p:cxnSp>
+        <p:sp>
+          <p:nvSpPr>
+            <p:cNvPr id="20" name="TextBox 19"/>
+            <p:cNvSpPr txBox="1"/>
+            <p:nvPr/>
+          </p:nvSpPr>
+          <p:spPr>
+            <a:xfrm>
+              <a:off x="381735" y="4672881"/>
+              <a:ext cx="907749" cy="338554"/>
+            </a:xfrm>
+            <a:prstGeom prst="rect">
+              <a:avLst/>
+            </a:prstGeom>
+            <a:noFill/>
+          </p:spPr>
+          <p:txBody>
+            <a:bodyPr wrap="none" rtlCol="0">
+              <a:spAutoFit/>
+            </a:bodyPr>
+            <a:lstStyle/>
+            <a:p>
+              <a:pPr algn="ctr"/>
+              <a:r>
+                <a:rPr lang="en-US" sz="1600" dirty="0" smtClean="0"/>
+                <a:t>Text files</a:t>
+              </a:r>
+              <a:endParaRPr lang="en-US" sz="1600" dirty="0"/>
+            </a:p>
+          </p:txBody>
+        </p:sp>
+        <p:sp>
+          <p:nvSpPr>
+            <p:cNvPr id="21" name="TextBox 20"/>
+            <p:cNvSpPr txBox="1"/>
+            <p:nvPr/>
+          </p:nvSpPr>
+          <p:spPr>
+            <a:xfrm>
+              <a:off x="703556" y="3913311"/>
+              <a:ext cx="952120" cy="307777"/>
+            </a:xfrm>
+            <a:prstGeom prst="rect">
+              <a:avLst/>
+            </a:prstGeom>
+            <a:noFill/>
+          </p:spPr>
+          <p:txBody>
+            <a:bodyPr wrap="none" rtlCol="0">
+              <a:spAutoFit/>
+            </a:bodyPr>
+            <a:lstStyle/>
+            <a:p>
+              <a:pPr algn="ctr"/>
+              <a:r>
+                <a:rPr lang="en-US" sz="1400" i="1" dirty="0" smtClean="0"/>
+                <a:t>sample.txt</a:t>
+              </a:r>
+              <a:endParaRPr lang="en-US" sz="1400" i="1" dirty="0"/>
+            </a:p>
+          </p:txBody>
+        </p:sp>
+        <p:sp>
+          <p:nvSpPr>
+            <p:cNvPr id="23" name="Flowchart: Document 22"/>
+            <p:cNvSpPr/>
+            <p:nvPr/>
+          </p:nvSpPr>
+          <p:spPr>
+            <a:xfrm>
+              <a:off x="425388" y="4185084"/>
+              <a:ext cx="762000" cy="468868"/>
+            </a:xfrm>
+            <a:prstGeom prst="flowChartDocument">
+              <a:avLst/>
+            </a:prstGeom>
+            <a:solidFill>
+              <a:schemeClr val="bg1">
+                <a:lumMod val="75000"/>
+              </a:schemeClr>
+            </a:solidFill>
+            <a:ln>
+              <a:solidFill>
+                <a:schemeClr val="tx1"/>
+              </a:solidFill>
+            </a:ln>
+          </p:spPr>
+          <p:style>
+            <a:lnRef idx="2">
+              <a:schemeClr val="accent1">
+                <a:shade val="50000"/>
+              </a:schemeClr>
+            </a:lnRef>
+            <a:fillRef idx="1">
+              <a:schemeClr val="accent1"/>
+            </a:fillRef>
+            <a:effectRef idx="0">
+              <a:schemeClr val="accent1"/>
+            </a:effectRef>
+            <a:fontRef idx="minor">
+              <a:schemeClr val="lt1"/>
+            </a:fontRef>
+          </p:style>
+          <p:txBody>
+            <a:bodyPr rtlCol="0" anchor="ctr"/>
+            <a:lstStyle/>
+            <a:p>
+              <a:pPr algn="ctr"/>
+              <a:endParaRPr lang="en-US"/>
+            </a:p>
+          </p:txBody>
+        </p:sp>
+        <p:sp>
+          <p:nvSpPr>
+            <p:cNvPr id="41" name="Flowchart: Document 40"/>
+            <p:cNvSpPr/>
+            <p:nvPr/>
+          </p:nvSpPr>
+          <p:spPr>
+            <a:xfrm>
+              <a:off x="5692536" y="2813164"/>
+              <a:ext cx="762000" cy="468868"/>
+            </a:xfrm>
+            <a:prstGeom prst="flowChartDocument">
+              <a:avLst/>
+            </a:prstGeom>
+            <a:solidFill>
+              <a:schemeClr val="accent3">
+                <a:lumMod val="40000"/>
+                <a:lumOff val="60000"/>
+              </a:schemeClr>
+            </a:solidFill>
+            <a:ln>
+              <a:solidFill>
+                <a:schemeClr val="tx1"/>
+              </a:solidFill>
+            </a:ln>
+          </p:spPr>
+          <p:style>
+            <a:lnRef idx="2">
+              <a:schemeClr val="accent1">
+                <a:shade val="50000"/>
+              </a:schemeClr>
+            </a:lnRef>
+            <a:fillRef idx="1">
+              <a:schemeClr val="accent1"/>
+            </a:fillRef>
+            <a:effectRef idx="0">
+              <a:schemeClr val="accent1"/>
+            </a:effectRef>
+            <a:fontRef idx="minor">
+              <a:schemeClr val="lt1"/>
+            </a:fontRef>
+          </p:style>
+          <p:txBody>
+            <a:bodyPr rtlCol="0" anchor="ctr"/>
+            <a:lstStyle/>
+            <a:p>
+              <a:pPr algn="ctr"/>
+              <a:endParaRPr lang="en-US"/>
+            </a:p>
+          </p:txBody>
+        </p:sp>
+        <p:sp>
+          <p:nvSpPr>
+            <p:cNvPr id="42" name="TextBox 41"/>
+            <p:cNvSpPr txBox="1"/>
+            <p:nvPr/>
+          </p:nvSpPr>
+          <p:spPr>
+            <a:xfrm>
+              <a:off x="5823085" y="2522722"/>
+              <a:ext cx="1130438" cy="307777"/>
+            </a:xfrm>
+            <a:prstGeom prst="rect">
+              <a:avLst/>
+            </a:prstGeom>
+            <a:noFill/>
+          </p:spPr>
+          <p:txBody>
+            <a:bodyPr wrap="none" rtlCol="0">
+              <a:spAutoFit/>
+            </a:bodyPr>
+            <a:lstStyle/>
+            <a:p>
+              <a:pPr algn="ctr"/>
+              <a:r>
+                <a:rPr lang="en-US" sz="1400" i="1" dirty="0" err="1" smtClean="0"/>
+                <a:t>sample.emdf</a:t>
+              </a:r>
+              <a:endParaRPr lang="en-US" sz="1400" i="1" dirty="0"/>
+            </a:p>
+          </p:txBody>
+        </p:sp>
+        <p:cxnSp>
+          <p:nvCxnSpPr>
+            <p:cNvPr id="43" name="Straight Arrow Connector 42"/>
+            <p:cNvCxnSpPr>
+              <a:stCxn id="6" idx="3"/>
+              <a:endCxn id="72" idx="1"/>
+            </p:cNvCxnSpPr>
+            <p:nvPr/>
+          </p:nvCxnSpPr>
+          <p:spPr>
+            <a:xfrm>
+              <a:off x="3292332" y="3047468"/>
+              <a:ext cx="773611" cy="130"/>
+            </a:xfrm>
+            <a:prstGeom prst="straightConnector1">
+              <a:avLst/>
+            </a:prstGeom>
+            <a:ln w="12700">
+              <a:solidFill>
+                <a:schemeClr val="tx1"/>
+              </a:solidFill>
+              <a:tailEnd type="triangle"/>
+            </a:ln>
+          </p:spPr>
+          <p:style>
+            <a:lnRef idx="1">
+              <a:schemeClr val="accent1"/>
+            </a:lnRef>
+            <a:fillRef idx="0">
+              <a:schemeClr val="accent1"/>
+            </a:fillRef>
+            <a:effectRef idx="0">
+              <a:schemeClr val="accent1"/>
+            </a:effectRef>
+            <a:fontRef idx="minor">
+              <a:schemeClr val="tx1"/>
+            </a:fontRef>
+          </p:style>
+        </p:cxnSp>
+        <p:sp>
+          <p:nvSpPr>
+            <p:cNvPr id="48" name="TextBox 47"/>
+            <p:cNvSpPr txBox="1"/>
+            <p:nvPr/>
+          </p:nvSpPr>
+          <p:spPr>
+            <a:xfrm>
+              <a:off x="5278278" y="3271629"/>
+              <a:ext cx="1788824" cy="584775"/>
+            </a:xfrm>
+            <a:prstGeom prst="rect">
+              <a:avLst/>
+            </a:prstGeom>
+            <a:noFill/>
+          </p:spPr>
+          <p:txBody>
+            <a:bodyPr wrap="none" rtlCol="0">
+              <a:spAutoFit/>
+            </a:bodyPr>
+            <a:lstStyle/>
+            <a:p>
+              <a:pPr algn="ctr"/>
+              <a:r>
+                <a:rPr lang="en-US" sz="1600" dirty="0" smtClean="0"/>
+                <a:t>Gold standard</a:t>
+              </a:r>
+            </a:p>
+            <a:p>
+              <a:pPr algn="ctr"/>
+              <a:r>
+                <a:rPr lang="en-US" sz="1600" dirty="0" smtClean="0"/>
+                <a:t>event mention files</a:t>
+              </a:r>
+              <a:endParaRPr lang="en-US" sz="1600" dirty="0"/>
+            </a:p>
+          </p:txBody>
+        </p:sp>
+        <p:cxnSp>
+          <p:nvCxnSpPr>
+            <p:cNvPr id="49" name="Straight Arrow Connector 48"/>
+            <p:cNvCxnSpPr>
+              <a:stCxn id="72" idx="3"/>
+              <a:endCxn id="41" idx="1"/>
+            </p:cNvCxnSpPr>
+            <p:nvPr/>
+          </p:nvCxnSpPr>
+          <p:spPr>
+            <a:xfrm>
+              <a:off x="5292080" y="3047598"/>
+              <a:ext cx="400456" cy="0"/>
+            </a:xfrm>
+            <a:prstGeom prst="straightConnector1">
+              <a:avLst/>
+            </a:prstGeom>
+            <a:ln w="12700">
+              <a:solidFill>
+                <a:schemeClr val="tx1"/>
+              </a:solidFill>
+              <a:tailEnd type="triangle"/>
+            </a:ln>
+          </p:spPr>
+          <p:style>
+            <a:lnRef idx="1">
+              <a:schemeClr val="accent1"/>
+            </a:lnRef>
+            <a:fillRef idx="0">
+              <a:schemeClr val="accent1"/>
+            </a:fillRef>
+            <a:effectRef idx="0">
+              <a:schemeClr val="accent1"/>
+            </a:effectRef>
+            <a:fontRef idx="minor">
+              <a:schemeClr val="tx1"/>
+            </a:fontRef>
+          </p:style>
+        </p:cxnSp>
+        <p:sp>
+          <p:nvSpPr>
+            <p:cNvPr id="54" name="Flowchart: Document 53"/>
+            <p:cNvSpPr/>
+            <p:nvPr/>
+          </p:nvSpPr>
+          <p:spPr>
+            <a:xfrm>
+              <a:off x="4605034" y="5523639"/>
+              <a:ext cx="762000" cy="468868"/>
+            </a:xfrm>
+            <a:prstGeom prst="flowChartDocument">
+              <a:avLst/>
+            </a:prstGeom>
+            <a:solidFill>
+              <a:schemeClr val="accent4">
+                <a:lumMod val="40000"/>
+                <a:lumOff val="60000"/>
+              </a:schemeClr>
+            </a:solidFill>
+            <a:ln>
+              <a:solidFill>
+                <a:schemeClr val="tx1"/>
+              </a:solidFill>
+            </a:ln>
+          </p:spPr>
+          <p:style>
+            <a:lnRef idx="2">
+              <a:schemeClr val="accent1">
+                <a:shade val="50000"/>
+              </a:schemeClr>
+            </a:lnRef>
+            <a:fillRef idx="1">
+              <a:schemeClr val="accent1"/>
+            </a:fillRef>
+            <a:effectRef idx="0">
+              <a:schemeClr val="accent1"/>
+            </a:effectRef>
+            <a:fontRef idx="minor">
+              <a:schemeClr val="lt1"/>
+            </a:fontRef>
+          </p:style>
+          <p:txBody>
+            <a:bodyPr rtlCol="0" anchor="ctr"/>
+            <a:lstStyle/>
+            <a:p>
+              <a:pPr algn="ctr"/>
+              <a:endParaRPr lang="en-US"/>
+            </a:p>
+          </p:txBody>
+        </p:sp>
+        <p:sp>
+          <p:nvSpPr>
+            <p:cNvPr id="58" name="TextBox 57"/>
+            <p:cNvSpPr txBox="1"/>
+            <p:nvPr/>
+          </p:nvSpPr>
+          <p:spPr>
+            <a:xfrm>
+              <a:off x="4354667" y="6021288"/>
+              <a:ext cx="1294522" cy="584775"/>
+            </a:xfrm>
+            <a:prstGeom prst="rect">
+              <a:avLst/>
+            </a:prstGeom>
+            <a:noFill/>
+          </p:spPr>
+          <p:txBody>
+            <a:bodyPr wrap="none" rtlCol="0">
+              <a:spAutoFit/>
+            </a:bodyPr>
+            <a:lstStyle/>
+            <a:p>
+              <a:pPr algn="ctr"/>
+              <a:r>
+                <a:rPr lang="en-US" sz="1600" dirty="0" smtClean="0"/>
+                <a:t>System event</a:t>
+              </a:r>
+            </a:p>
+            <a:p>
+              <a:pPr algn="ctr"/>
+              <a:r>
+                <a:rPr lang="en-US" sz="1600" dirty="0" smtClean="0"/>
+                <a:t>mention files</a:t>
+              </a:r>
+              <a:endParaRPr lang="en-US" sz="1600" dirty="0"/>
+            </a:p>
+          </p:txBody>
+        </p:sp>
+        <p:cxnSp>
+          <p:nvCxnSpPr>
+            <p:cNvPr id="59" name="Straight Arrow Connector 58"/>
+            <p:cNvCxnSpPr>
+              <a:stCxn id="55" idx="3"/>
+              <a:endCxn id="54" idx="1"/>
+            </p:cNvCxnSpPr>
+            <p:nvPr/>
+          </p:nvCxnSpPr>
+          <p:spPr>
+            <a:xfrm>
+              <a:off x="3707904" y="5758073"/>
+              <a:ext cx="897130" cy="0"/>
+            </a:xfrm>
+            <a:prstGeom prst="straightConnector1">
+              <a:avLst/>
+            </a:prstGeom>
+            <a:ln w="12700">
+              <a:solidFill>
+                <a:schemeClr val="tx1"/>
+              </a:solidFill>
+              <a:tailEnd type="triangle"/>
+            </a:ln>
+          </p:spPr>
+          <p:style>
+            <a:lnRef idx="1">
+              <a:schemeClr val="accent1"/>
+            </a:lnRef>
+            <a:fillRef idx="0">
+              <a:schemeClr val="accent1"/>
+            </a:fillRef>
+            <a:effectRef idx="0">
+              <a:schemeClr val="accent1"/>
+            </a:effectRef>
+            <a:fontRef idx="minor">
+              <a:schemeClr val="tx1"/>
+            </a:fontRef>
+          </p:style>
+        </p:cxnSp>
+        <p:sp>
+          <p:nvSpPr>
+            <p:cNvPr id="63" name="TextBox 62"/>
+            <p:cNvSpPr txBox="1"/>
+            <p:nvPr/>
+          </p:nvSpPr>
+          <p:spPr>
+            <a:xfrm>
+              <a:off x="4629521" y="5241441"/>
+              <a:ext cx="1778885" cy="307777"/>
+            </a:xfrm>
+            <a:prstGeom prst="rect">
+              <a:avLst/>
+            </a:prstGeom>
+            <a:noFill/>
+          </p:spPr>
+          <p:txBody>
+            <a:bodyPr wrap="none" rtlCol="0">
+              <a:spAutoFit/>
+            </a:bodyPr>
+            <a:lstStyle/>
+            <a:p>
+              <a:pPr algn="ctr"/>
+              <a:r>
+                <a:rPr lang="en-US" sz="1400" i="1" dirty="0" smtClean="0"/>
+                <a:t>sample-system1.emdf</a:t>
+              </a:r>
+              <a:endParaRPr lang="en-US" sz="1400" i="1" dirty="0"/>
+            </a:p>
+          </p:txBody>
+        </p:sp>
+        <p:sp>
+          <p:nvSpPr>
+            <p:cNvPr id="72" name="Rounded Rectangle 71"/>
+            <p:cNvSpPr/>
+            <p:nvPr/>
+          </p:nvSpPr>
+          <p:spPr>
+            <a:xfrm>
+              <a:off x="4065943" y="2794495"/>
+              <a:ext cx="1226137" cy="506206"/>
+            </a:xfrm>
+            <a:prstGeom prst="roundRect">
+              <a:avLst/>
+            </a:prstGeom>
+            <a:noFill/>
+            <a:ln>
+              <a:solidFill>
+                <a:schemeClr val="tx1"/>
+              </a:solidFill>
+            </a:ln>
+          </p:spPr>
+          <p:style>
+            <a:lnRef idx="2">
+              <a:schemeClr val="accent1">
+                <a:shade val="50000"/>
+              </a:schemeClr>
+            </a:lnRef>
+            <a:fillRef idx="1">
+              <a:schemeClr val="accent1"/>
+            </a:fillRef>
+            <a:effectRef idx="0">
+              <a:schemeClr val="accent1"/>
+            </a:effectRef>
+            <a:fontRef idx="minor">
+              <a:schemeClr val="lt1"/>
+            </a:fontRef>
+          </p:style>
+          <p:txBody>
+            <a:bodyPr rtlCol="0" anchor="ctr"/>
+            <a:lstStyle/>
+            <a:p>
+              <a:pPr algn="ctr"/>
+              <a:r>
+                <a:rPr lang="en-US" dirty="0" smtClean="0">
+                  <a:solidFill>
+                    <a:schemeClr val="tx1"/>
+                  </a:solidFill>
+                </a:rPr>
+                <a:t>Converter</a:t>
+              </a:r>
+              <a:endParaRPr lang="en-US" dirty="0">
+                <a:solidFill>
+                  <a:schemeClr val="tx1"/>
+                </a:solidFill>
+              </a:endParaRPr>
+            </a:p>
+          </p:txBody>
+        </p:sp>
+        <p:cxnSp>
+          <p:nvCxnSpPr>
+            <p:cNvPr id="111" name="Elbow Connector 110"/>
+            <p:cNvCxnSpPr>
+              <a:stCxn id="41" idx="3"/>
+              <a:endCxn id="39" idx="0"/>
+            </p:cNvCxnSpPr>
+            <p:nvPr/>
+          </p:nvCxnSpPr>
+          <p:spPr>
+            <a:xfrm>
+              <a:off x="6454536" y="3047598"/>
+              <a:ext cx="708752" cy="1284793"/>
+            </a:xfrm>
+            <a:prstGeom prst="bentConnector2">
+              <a:avLst/>
+            </a:prstGeom>
+            <a:ln w="12700">
+              <a:solidFill>
+                <a:schemeClr val="tx1"/>
+              </a:solidFill>
+              <a:tailEnd type="triangle"/>
+            </a:ln>
+          </p:spPr>
+          <p:style>
+            <a:lnRef idx="1">
+              <a:schemeClr val="accent1"/>
+            </a:lnRef>
+            <a:fillRef idx="0">
+              <a:schemeClr val="accent1"/>
+            </a:fillRef>
+            <a:effectRef idx="0">
+              <a:schemeClr val="accent1"/>
+            </a:effectRef>
+            <a:fontRef idx="minor">
+              <a:schemeClr val="tx1"/>
+            </a:fontRef>
+          </p:style>
+        </p:cxnSp>
+        <p:sp>
+          <p:nvSpPr>
+            <p:cNvPr id="47" name="TextBox 46"/>
+            <p:cNvSpPr txBox="1"/>
+            <p:nvPr/>
+          </p:nvSpPr>
+          <p:spPr>
+            <a:xfrm>
+              <a:off x="2659846" y="2537752"/>
+              <a:ext cx="1034257" cy="307777"/>
+            </a:xfrm>
+            <a:prstGeom prst="rect">
+              <a:avLst/>
+            </a:prstGeom>
+            <a:noFill/>
+          </p:spPr>
+          <p:txBody>
+            <a:bodyPr wrap="none" rtlCol="0">
+              <a:spAutoFit/>
+            </a:bodyPr>
+            <a:lstStyle/>
+            <a:p>
+              <a:pPr algn="ctr"/>
+              <a:r>
+                <a:rPr lang="en-US" sz="1400" i="1" dirty="0" err="1" smtClean="0"/>
+                <a:t>sample.ann</a:t>
+              </a:r>
+              <a:endParaRPr lang="en-US" sz="1400" i="1" dirty="0"/>
+            </a:p>
+          </p:txBody>
+        </p:sp>
+        <p:cxnSp>
+          <p:nvCxnSpPr>
+            <p:cNvPr id="50" name="Elbow Connector 49"/>
+            <p:cNvCxnSpPr>
+              <a:stCxn id="23" idx="3"/>
+              <a:endCxn id="55" idx="1"/>
+            </p:cNvCxnSpPr>
+            <p:nvPr/>
+          </p:nvCxnSpPr>
+          <p:spPr>
+            <a:xfrm>
+              <a:off x="1187388" y="4419518"/>
+              <a:ext cx="739058" cy="1338555"/>
+            </a:xfrm>
+            <a:prstGeom prst="bentConnector3">
+              <a:avLst>
+                <a:gd name="adj1" fmla="val 33280"/>
+              </a:avLst>
+            </a:prstGeom>
+            <a:ln w="12700">
+              <a:solidFill>
+                <a:schemeClr val="tx1"/>
+              </a:solidFill>
+              <a:tailEnd type="triangle"/>
+            </a:ln>
+          </p:spPr>
+          <p:style>
+            <a:lnRef idx="1">
+              <a:schemeClr val="accent1"/>
+            </a:lnRef>
+            <a:fillRef idx="0">
+              <a:schemeClr val="accent1"/>
+            </a:fillRef>
+            <a:effectRef idx="0">
+              <a:schemeClr val="accent1"/>
+            </a:effectRef>
+            <a:fontRef idx="minor">
+              <a:schemeClr val="tx1"/>
+            </a:fontRef>
+          </p:style>
+        </p:cxnSp>
+        <p:sp>
+          <p:nvSpPr>
+            <p:cNvPr id="55" name="Rounded Rectangle 54"/>
+            <p:cNvSpPr/>
+            <p:nvPr/>
+          </p:nvSpPr>
+          <p:spPr>
+            <a:xfrm>
+              <a:off x="1926446" y="5466788"/>
+              <a:ext cx="1781458" cy="582569"/>
+            </a:xfrm>
+            <a:prstGeom prst="roundRect">
+              <a:avLst/>
+            </a:prstGeom>
+            <a:solidFill>
+              <a:schemeClr val="accent4">
+                <a:lumMod val="40000"/>
+                <a:lumOff val="60000"/>
+              </a:schemeClr>
+            </a:solidFill>
+            <a:ln>
+              <a:solidFill>
+                <a:schemeClr val="tx1"/>
+              </a:solidFill>
+            </a:ln>
+          </p:spPr>
+          <p:style>
+            <a:lnRef idx="2">
+              <a:schemeClr val="accent1">
+                <a:shade val="50000"/>
+              </a:schemeClr>
+            </a:lnRef>
+            <a:fillRef idx="1">
+              <a:schemeClr val="accent1"/>
+            </a:fillRef>
+            <a:effectRef idx="0">
+              <a:schemeClr val="accent1"/>
+            </a:effectRef>
+            <a:fontRef idx="minor">
+              <a:schemeClr val="lt1"/>
+            </a:fontRef>
+          </p:style>
+          <p:txBody>
+            <a:bodyPr rtlCol="0" anchor="ctr"/>
+            <a:lstStyle/>
+            <a:p>
+              <a:pPr algn="ctr"/>
+              <a:r>
+                <a:rPr lang="en-US" dirty="0">
+                  <a:solidFill>
+                    <a:schemeClr val="tx1"/>
+                  </a:solidFill>
+                </a:rPr>
+                <a:t>Event extraction system</a:t>
+              </a:r>
+            </a:p>
+          </p:txBody>
+        </p:sp>
+        <p:cxnSp>
+          <p:nvCxnSpPr>
+            <p:cNvPr id="64" name="Elbow Connector 63"/>
+            <p:cNvCxnSpPr>
+              <a:stCxn id="54" idx="3"/>
+              <a:endCxn id="39" idx="2"/>
+            </p:cNvCxnSpPr>
+            <p:nvPr/>
+          </p:nvCxnSpPr>
+          <p:spPr>
+            <a:xfrm flipV="1">
+              <a:off x="5367034" y="4838597"/>
+              <a:ext cx="1796254" cy="919476"/>
+            </a:xfrm>
+            <a:prstGeom prst="bentConnector2">
+              <a:avLst/>
+            </a:prstGeom>
+            <a:ln w="12700">
+              <a:solidFill>
+                <a:schemeClr val="tx1"/>
+              </a:solidFill>
+              <a:tailEnd type="triangle"/>
+            </a:ln>
+          </p:spPr>
+          <p:style>
+            <a:lnRef idx="1">
+              <a:schemeClr val="accent1"/>
+            </a:lnRef>
+            <a:fillRef idx="0">
+              <a:schemeClr val="accent1"/>
+            </a:fillRef>
+            <a:effectRef idx="0">
+              <a:schemeClr val="accent1"/>
+            </a:effectRef>
+            <a:fontRef idx="minor">
+              <a:schemeClr val="tx1"/>
+            </a:fontRef>
+          </p:style>
+        </p:cxnSp>
+        <p:sp>
+          <p:nvSpPr>
+            <p:cNvPr id="35" name="Flowchart: Document 34"/>
+            <p:cNvSpPr/>
+            <p:nvPr/>
+          </p:nvSpPr>
+          <p:spPr>
+            <a:xfrm>
+              <a:off x="3936628" y="4185084"/>
+              <a:ext cx="762000" cy="468868"/>
+            </a:xfrm>
+            <a:prstGeom prst="flowChartDocument">
+              <a:avLst/>
+            </a:prstGeom>
+            <a:solidFill>
+              <a:schemeClr val="accent3">
+                <a:lumMod val="40000"/>
+                <a:lumOff val="60000"/>
+              </a:schemeClr>
+            </a:solidFill>
+            <a:ln>
+              <a:solidFill>
+                <a:schemeClr val="tx1"/>
+              </a:solidFill>
+            </a:ln>
+          </p:spPr>
+          <p:style>
+            <a:lnRef idx="2">
+              <a:schemeClr val="accent1">
+                <a:shade val="50000"/>
+              </a:schemeClr>
+            </a:lnRef>
+            <a:fillRef idx="1">
+              <a:schemeClr val="accent1"/>
+            </a:fillRef>
+            <a:effectRef idx="0">
+              <a:schemeClr val="accent1"/>
+            </a:effectRef>
+            <a:fontRef idx="minor">
+              <a:schemeClr val="lt1"/>
+            </a:fontRef>
+          </p:style>
+          <p:txBody>
+            <a:bodyPr rtlCol="0" anchor="ctr"/>
+            <a:lstStyle/>
+            <a:p>
+              <a:pPr algn="ctr"/>
+              <a:endParaRPr lang="en-US"/>
+            </a:p>
+          </p:txBody>
+        </p:sp>
+        <p:cxnSp>
+          <p:nvCxnSpPr>
+            <p:cNvPr id="36" name="Straight Arrow Connector 35"/>
+            <p:cNvCxnSpPr>
+              <a:stCxn id="38" idx="3"/>
+              <a:endCxn id="35" idx="1"/>
+            </p:cNvCxnSpPr>
+            <p:nvPr/>
+          </p:nvCxnSpPr>
+          <p:spPr>
+            <a:xfrm>
+              <a:off x="3645577" y="4419518"/>
+              <a:ext cx="291051" cy="0"/>
+            </a:xfrm>
+            <a:prstGeom prst="straightConnector1">
+              <a:avLst/>
+            </a:prstGeom>
+            <a:ln w="12700">
+              <a:solidFill>
+                <a:schemeClr val="tx1"/>
+              </a:solidFill>
+              <a:tailEnd type="triangle"/>
+            </a:ln>
+          </p:spPr>
+          <p:style>
+            <a:lnRef idx="1">
+              <a:schemeClr val="accent1"/>
+            </a:lnRef>
+            <a:fillRef idx="0">
+              <a:schemeClr val="accent1"/>
+            </a:fillRef>
+            <a:effectRef idx="0">
+              <a:schemeClr val="accent1"/>
+            </a:effectRef>
+            <a:fontRef idx="minor">
+              <a:schemeClr val="tx1"/>
+            </a:fontRef>
+          </p:style>
+        </p:cxnSp>
+        <p:cxnSp>
+          <p:nvCxnSpPr>
+            <p:cNvPr id="37" name="Straight Arrow Connector 36"/>
+            <p:cNvCxnSpPr>
+              <a:stCxn id="23" idx="3"/>
+              <a:endCxn id="38" idx="1"/>
+            </p:cNvCxnSpPr>
+            <p:nvPr/>
+          </p:nvCxnSpPr>
+          <p:spPr>
+            <a:xfrm>
+              <a:off x="1187388" y="4419518"/>
+              <a:ext cx="760676" cy="0"/>
+            </a:xfrm>
+            <a:prstGeom prst="straightConnector1">
+              <a:avLst/>
+            </a:prstGeom>
+            <a:ln w="12700">
+              <a:solidFill>
+                <a:schemeClr val="tx1"/>
+              </a:solidFill>
+              <a:tailEnd type="triangle"/>
+            </a:ln>
+          </p:spPr>
+          <p:style>
+            <a:lnRef idx="1">
+              <a:schemeClr val="accent1"/>
+            </a:lnRef>
+            <a:fillRef idx="0">
+              <a:schemeClr val="accent1"/>
+            </a:fillRef>
+            <a:effectRef idx="0">
+              <a:schemeClr val="accent1"/>
+            </a:effectRef>
+            <a:fontRef idx="minor">
+              <a:schemeClr val="tx1"/>
+            </a:fontRef>
+          </p:style>
+        </p:cxnSp>
+        <p:sp>
+          <p:nvSpPr>
+            <p:cNvPr id="38" name="Rounded Rectangle 37"/>
+            <p:cNvSpPr/>
+            <p:nvPr/>
+          </p:nvSpPr>
+          <p:spPr>
+            <a:xfrm>
+              <a:off x="1948064" y="4115806"/>
+              <a:ext cx="1697513" cy="607423"/>
+            </a:xfrm>
+            <a:prstGeom prst="roundRect">
+              <a:avLst/>
+            </a:prstGeom>
+            <a:solidFill>
+              <a:schemeClr val="accent3">
+                <a:lumMod val="40000"/>
+                <a:lumOff val="60000"/>
+              </a:schemeClr>
+            </a:solidFill>
+            <a:ln>
+              <a:solidFill>
+                <a:schemeClr val="tx1"/>
+              </a:solidFill>
+            </a:ln>
+          </p:spPr>
+          <p:style>
+            <a:lnRef idx="2">
+              <a:schemeClr val="accent1">
+                <a:shade val="50000"/>
+              </a:schemeClr>
+            </a:lnRef>
+            <a:fillRef idx="1">
+              <a:schemeClr val="accent1"/>
+            </a:fillRef>
+            <a:effectRef idx="0">
+              <a:schemeClr val="accent1"/>
+            </a:effectRef>
+            <a:fontRef idx="minor">
+              <a:schemeClr val="lt1"/>
+            </a:fontRef>
+          </p:style>
+          <p:txBody>
+            <a:bodyPr rtlCol="0" anchor="ctr"/>
+            <a:lstStyle/>
+            <a:p>
+              <a:pPr algn="ctr"/>
+              <a:r>
+                <a:rPr lang="en-US" dirty="0" smtClean="0">
+                  <a:solidFill>
+                    <a:schemeClr val="tx1"/>
+                  </a:solidFill>
+                </a:rPr>
+                <a:t>(Gold standard)</a:t>
+              </a:r>
+            </a:p>
+            <a:p>
+              <a:pPr algn="ctr"/>
+              <a:r>
+                <a:rPr lang="en-US" dirty="0" err="1" smtClean="0">
+                  <a:solidFill>
+                    <a:schemeClr val="tx1"/>
+                  </a:solidFill>
+                </a:rPr>
+                <a:t>tokenizer</a:t>
+              </a:r>
+              <a:endParaRPr lang="en-US" dirty="0">
+                <a:solidFill>
+                  <a:schemeClr val="tx1"/>
+                </a:solidFill>
+              </a:endParaRPr>
+            </a:p>
+          </p:txBody>
+        </p:sp>
+        <p:sp>
+          <p:nvSpPr>
+            <p:cNvPr id="39" name="Rounded Rectangle 38"/>
+            <p:cNvSpPr/>
+            <p:nvPr/>
+          </p:nvSpPr>
+          <p:spPr>
+            <a:xfrm>
+              <a:off x="6550219" y="4332391"/>
+              <a:ext cx="1226137" cy="506206"/>
+            </a:xfrm>
+            <a:prstGeom prst="roundRect">
+              <a:avLst/>
+            </a:prstGeom>
+            <a:noFill/>
+            <a:ln>
+              <a:solidFill>
+                <a:schemeClr val="tx1"/>
+              </a:solidFill>
+            </a:ln>
+          </p:spPr>
+          <p:style>
+            <a:lnRef idx="2">
+              <a:schemeClr val="accent1">
+                <a:shade val="50000"/>
+              </a:schemeClr>
+            </a:lnRef>
+            <a:fillRef idx="1">
+              <a:schemeClr val="accent1"/>
+            </a:fillRef>
+            <a:effectRef idx="0">
+              <a:schemeClr val="accent1"/>
+            </a:effectRef>
+            <a:fontRef idx="minor">
+              <a:schemeClr val="lt1"/>
+            </a:fontRef>
+          </p:style>
+          <p:txBody>
+            <a:bodyPr rtlCol="0" anchor="ctr"/>
+            <a:lstStyle/>
+            <a:p>
+              <a:pPr algn="ctr"/>
+              <a:r>
+                <a:rPr lang="en-US" dirty="0">
+                  <a:solidFill>
+                    <a:schemeClr val="tx1"/>
+                  </a:solidFill>
+                </a:rPr>
+                <a:t>Evaluator</a:t>
+              </a:r>
+            </a:p>
+          </p:txBody>
+        </p:sp>
+        <p:sp>
+          <p:nvSpPr>
+            <p:cNvPr id="44" name="Flowchart: Process 43"/>
+            <p:cNvSpPr/>
+            <p:nvPr/>
+          </p:nvSpPr>
+          <p:spPr>
+            <a:xfrm>
+              <a:off x="8100392" y="4341725"/>
+              <a:ext cx="913901" cy="487537"/>
+            </a:xfrm>
+            <a:prstGeom prst="flowChartProcess">
+              <a:avLst/>
+            </a:prstGeom>
+            <a:noFill/>
+            <a:ln>
+              <a:solidFill>
+                <a:schemeClr val="tx1"/>
+              </a:solidFill>
+            </a:ln>
+          </p:spPr>
+          <p:style>
+            <a:lnRef idx="2">
+              <a:schemeClr val="accent1">
+                <a:shade val="50000"/>
+              </a:schemeClr>
+            </a:lnRef>
+            <a:fillRef idx="1">
+              <a:schemeClr val="accent1"/>
+            </a:fillRef>
+            <a:effectRef idx="0">
+              <a:schemeClr val="accent1"/>
+            </a:effectRef>
+            <a:fontRef idx="minor">
+              <a:schemeClr val="lt1"/>
+            </a:fontRef>
+          </p:style>
+          <p:txBody>
+            <a:bodyPr rtlCol="0" anchor="ctr"/>
+            <a:lstStyle/>
+            <a:p>
+              <a:pPr algn="ctr"/>
+              <a:r>
+                <a:rPr lang="en-US" dirty="0" smtClean="0">
+                  <a:solidFill>
+                    <a:schemeClr val="tx1"/>
+                  </a:solidFill>
+                </a:rPr>
+                <a:t>Results</a:t>
+              </a:r>
+              <a:endParaRPr lang="en-US" dirty="0">
+                <a:solidFill>
+                  <a:schemeClr val="tx1"/>
+                </a:solidFill>
+              </a:endParaRPr>
+            </a:p>
+          </p:txBody>
+        </p:sp>
+        <p:cxnSp>
+          <p:nvCxnSpPr>
+            <p:cNvPr id="45" name="Straight Arrow Connector 44"/>
+            <p:cNvCxnSpPr>
+              <a:stCxn id="39" idx="3"/>
+              <a:endCxn id="44" idx="1"/>
+            </p:cNvCxnSpPr>
+            <p:nvPr/>
+          </p:nvCxnSpPr>
+          <p:spPr>
+            <a:xfrm>
+              <a:off x="7776356" y="4585494"/>
+              <a:ext cx="324036" cy="0"/>
+            </a:xfrm>
+            <a:prstGeom prst="straightConnector1">
+              <a:avLst/>
+            </a:prstGeom>
+            <a:ln w="12700">
+              <a:solidFill>
+                <a:schemeClr val="tx1"/>
+              </a:solidFill>
+              <a:tailEnd type="triangle"/>
+            </a:ln>
+          </p:spPr>
+          <p:style>
+            <a:lnRef idx="1">
+              <a:schemeClr val="accent1"/>
+            </a:lnRef>
+            <a:fillRef idx="0">
+              <a:schemeClr val="accent1"/>
+            </a:fillRef>
+            <a:effectRef idx="0">
+              <a:schemeClr val="accent1"/>
+            </a:effectRef>
+            <a:fontRef idx="minor">
+              <a:schemeClr val="tx1"/>
+            </a:fontRef>
+          </p:style>
+        </p:cxnSp>
+        <p:sp>
+          <p:nvSpPr>
+            <p:cNvPr id="46" name="TextBox 45"/>
+            <p:cNvSpPr txBox="1"/>
+            <p:nvPr/>
+          </p:nvSpPr>
+          <p:spPr>
+            <a:xfrm>
+              <a:off x="4412962" y="3913311"/>
+              <a:ext cx="987130" cy="307777"/>
+            </a:xfrm>
+            <a:prstGeom prst="rect">
+              <a:avLst/>
+            </a:prstGeom>
+            <a:noFill/>
+          </p:spPr>
+          <p:txBody>
+            <a:bodyPr wrap="none" rtlCol="0">
+              <a:spAutoFit/>
+            </a:bodyPr>
+            <a:lstStyle/>
+            <a:p>
+              <a:pPr algn="ctr"/>
+              <a:r>
+                <a:rPr lang="en-US" sz="1400" i="1" dirty="0" err="1" smtClean="0"/>
+                <a:t>sample.tkn</a:t>
+              </a:r>
+              <a:endParaRPr lang="en-US" sz="1400" i="1" dirty="0"/>
+            </a:p>
+          </p:txBody>
+        </p:sp>
+        <p:sp>
+          <p:nvSpPr>
+            <p:cNvPr id="51" name="TextBox 50"/>
+            <p:cNvSpPr txBox="1"/>
+            <p:nvPr/>
+          </p:nvSpPr>
+          <p:spPr>
+            <a:xfrm>
+              <a:off x="4308157" y="4617132"/>
+              <a:ext cx="1055931" cy="338554"/>
+            </a:xfrm>
+            <a:prstGeom prst="rect">
+              <a:avLst/>
+            </a:prstGeom>
+            <a:noFill/>
+          </p:spPr>
+          <p:txBody>
+            <a:bodyPr wrap="none" rtlCol="0">
+              <a:spAutoFit/>
+            </a:bodyPr>
+            <a:lstStyle/>
+            <a:p>
+              <a:pPr algn="ctr"/>
+              <a:r>
+                <a:rPr lang="en-US" sz="1600" dirty="0" smtClean="0"/>
+                <a:t>Token files</a:t>
+              </a:r>
+              <a:endParaRPr lang="en-US" sz="1600" dirty="0"/>
+            </a:p>
+          </p:txBody>
+        </p:sp>
+        <p:cxnSp>
+          <p:nvCxnSpPr>
+            <p:cNvPr id="52" name="Elbow Connector 51"/>
+            <p:cNvCxnSpPr>
+              <a:stCxn id="35" idx="3"/>
+              <a:endCxn id="39" idx="1"/>
+            </p:cNvCxnSpPr>
+            <p:nvPr/>
+          </p:nvCxnSpPr>
+          <p:spPr>
+            <a:xfrm>
+              <a:off x="4698628" y="4419518"/>
+              <a:ext cx="1851591" cy="165976"/>
+            </a:xfrm>
+            <a:prstGeom prst="bentConnector3">
+              <a:avLst>
+                <a:gd name="adj1" fmla="val 50000"/>
+              </a:avLst>
+            </a:prstGeom>
+            <a:ln w="12700">
+              <a:solidFill>
+                <a:schemeClr val="tx1"/>
+              </a:solidFill>
+              <a:tailEnd type="triangle"/>
+            </a:ln>
+          </p:spPr>
+          <p:style>
+            <a:lnRef idx="1">
+              <a:schemeClr val="accent1"/>
+            </a:lnRef>
+            <a:fillRef idx="0">
+              <a:schemeClr val="accent1"/>
+            </a:fillRef>
+            <a:effectRef idx="0">
+              <a:schemeClr val="accent1"/>
+            </a:effectRef>
+            <a:fontRef idx="minor">
+              <a:schemeClr val="tx1"/>
+            </a:fontRef>
+          </p:style>
+        </p:cxnSp>
+        <p:cxnSp>
+          <p:nvCxnSpPr>
+            <p:cNvPr id="40" name="Elbow Connector 39"/>
+            <p:cNvCxnSpPr>
+              <a:stCxn id="23" idx="3"/>
+              <a:endCxn id="53" idx="2"/>
+            </p:cNvCxnSpPr>
+            <p:nvPr/>
+          </p:nvCxnSpPr>
+          <p:spPr>
+            <a:xfrm flipV="1">
+              <a:off x="1187388" y="3300701"/>
+              <a:ext cx="570261" cy="1118817"/>
+            </a:xfrm>
+            <a:prstGeom prst="bentConnector2">
+              <a:avLst/>
+            </a:prstGeom>
+            <a:ln w="12700">
+              <a:solidFill>
+                <a:schemeClr val="tx1"/>
+              </a:solidFill>
+              <a:tailEnd type="triangle"/>
+            </a:ln>
+          </p:spPr>
+          <p:style>
+            <a:lnRef idx="1">
+              <a:schemeClr val="accent1"/>
+            </a:lnRef>
+            <a:fillRef idx="0">
+              <a:schemeClr val="accent1"/>
+            </a:fillRef>
+            <a:effectRef idx="0">
+              <a:schemeClr val="accent1"/>
+            </a:effectRef>
+            <a:fontRef idx="minor">
+              <a:schemeClr val="tx1"/>
+            </a:fontRef>
+          </p:style>
+        </p:cxnSp>
+        <p:sp>
+          <p:nvSpPr>
+            <p:cNvPr id="53" name="Rounded Rectangle 52"/>
+            <p:cNvSpPr/>
+            <p:nvPr/>
+          </p:nvSpPr>
+          <p:spPr>
+            <a:xfrm>
+              <a:off x="1403648" y="2794495"/>
+              <a:ext cx="708001" cy="506206"/>
+            </a:xfrm>
+            <a:prstGeom prst="roundRect">
+              <a:avLst/>
+            </a:prstGeom>
+            <a:noFill/>
+            <a:ln>
+              <a:solidFill>
+                <a:schemeClr val="tx1"/>
+              </a:solidFill>
+            </a:ln>
+          </p:spPr>
+          <p:style>
+            <a:lnRef idx="2">
+              <a:schemeClr val="accent1">
+                <a:shade val="50000"/>
+              </a:schemeClr>
+            </a:lnRef>
+            <a:fillRef idx="1">
+              <a:schemeClr val="accent1"/>
+            </a:fillRef>
+            <a:effectRef idx="0">
+              <a:schemeClr val="accent1"/>
+            </a:effectRef>
+            <a:fontRef idx="minor">
+              <a:schemeClr val="lt1"/>
+            </a:fontRef>
+          </p:style>
+          <p:txBody>
+            <a:bodyPr rtlCol="0" anchor="ctr"/>
+            <a:lstStyle/>
+            <a:p>
+              <a:pPr algn="ctr"/>
+              <a:r>
+                <a:rPr lang="en-US" dirty="0" smtClean="0">
+                  <a:solidFill>
+                    <a:schemeClr val="tx1"/>
+                  </a:solidFill>
+                </a:rPr>
+                <a:t>brat</a:t>
+              </a:r>
+              <a:endParaRPr lang="en-US" dirty="0">
+                <a:solidFill>
+                  <a:schemeClr val="tx1"/>
+                </a:solidFill>
+              </a:endParaRPr>
+            </a:p>
+          </p:txBody>
+        </p:sp>
+      </p:grpSp>
+    </p:spTree>
+    <p:extLst>
+      <p:ext uri="{BB962C8B-B14F-4D97-AF65-F5344CB8AC3E}">
+        <p14:creationId xmlns:p14="http://schemas.microsoft.com/office/powerpoint/2010/main" val="2287174114"/>
+      </p:ext>
+    </p:extLst>
+  </p:cSld>
+  <p:clrMapOvr>
+    <a:masterClrMapping/>
+  </p:clrMapOvr>
+</p:sld>
+</file>
+
+<file path=ppt/slides/slide2.xml><?xml version="1.0" encoding="utf-8"?>
+<p:sld xmlns:a="http://schemas.openxmlformats.org/drawingml/2006/main" xmlns:r="http://schemas.openxmlformats.org/officeDocument/2006/relationships" xmlns:p="http://schemas.openxmlformats.org/presentationml/2006/main">
+  <p:cSld>
+    <p:spTree>
+      <p:nvGrpSpPr>
+        <p:cNvPr id="1" name=""/>
+        <p:cNvGrpSpPr/>
+        <p:nvPr/>
+      </p:nvGrpSpPr>
+      <p:grpSpPr>
+        <a:xfrm>
+          <a:off x="0" y="0"/>
+          <a:ext cx="0" cy="0"/>
+          <a:chOff x="0" y="0"/>
+          <a:chExt cx="0" cy="0"/>
+        </a:xfrm>
+      </p:grpSpPr>
+      <p:sp>
+        <p:nvSpPr>
+          <p:cNvPr id="2" name="Title 1"/>
+          <p:cNvSpPr>
+            <a:spLocks noGrp="1"/>
+          </p:cNvSpPr>
+          <p:nvPr>
+            <p:ph type="title"/>
+          </p:nvPr>
+        </p:nvSpPr>
+        <p:spPr>
+          <a:xfrm>
+            <a:off x="457200" y="188640"/>
+            <a:ext cx="8229600" cy="715962"/>
+          </a:xfrm>
+        </p:spPr>
+        <p:txBody>
+          <a:bodyPr>
+            <a:normAutofit fontScale="90000"/>
+          </a:bodyPr>
+          <a:lstStyle/>
+          <a:p>
+            <a:r>
+              <a:rPr lang="en-US" dirty="0" smtClean="0"/>
+              <a:t>Work flow (2): pre-tokenization</a:t>
+            </a:r>
+            <a:endParaRPr lang="en-US" dirty="0"/>
+          </a:p>
+        </p:txBody>
+      </p:sp>
+      <p:sp>
+        <p:nvSpPr>
+          <p:cNvPr id="3" name="Content Placeholder 2"/>
+          <p:cNvSpPr>
+            <a:spLocks noGrp="1"/>
+          </p:cNvSpPr>
+          <p:nvPr>
+            <p:ph idx="1"/>
+          </p:nvPr>
+        </p:nvSpPr>
+        <p:spPr>
+          <a:xfrm>
+            <a:off x="457200" y="1088740"/>
+            <a:ext cx="8229600" cy="936104"/>
+          </a:xfrm>
+        </p:spPr>
+        <p:txBody>
+          <a:bodyPr>
+            <a:normAutofit fontScale="62500" lnSpcReduction="20000"/>
+          </a:bodyPr>
+          <a:lstStyle/>
+          <a:p>
+            <a:r>
+              <a:rPr lang="en-US" dirty="0" smtClean="0"/>
+              <a:t>Design</a:t>
+            </a:r>
+          </a:p>
+          <a:p>
+            <a:pPr lvl="1"/>
+            <a:r>
+              <a:rPr lang="en-US" dirty="0"/>
+              <a:t>The evaluation file </a:t>
+            </a:r>
+            <a:r>
+              <a:rPr lang="en-US" dirty="0" smtClean="0"/>
+              <a:t>format</a:t>
+            </a:r>
+            <a:r>
+              <a:rPr lang="en-US" altLang="ja-JP" dirty="0" smtClean="0"/>
+              <a:t> (*.</a:t>
+            </a:r>
+            <a:r>
+              <a:rPr lang="en-US" altLang="ja-JP" dirty="0" err="1" smtClean="0"/>
+              <a:t>emdf</a:t>
+            </a:r>
+            <a:r>
+              <a:rPr lang="en-US" altLang="ja-JP" dirty="0" smtClean="0"/>
+              <a:t>)</a:t>
+            </a:r>
+            <a:r>
+              <a:rPr lang="en-US" dirty="0" smtClean="0"/>
+              <a:t> </a:t>
+            </a:r>
+            <a:r>
+              <a:rPr lang="en-US" dirty="0"/>
+              <a:t>is </a:t>
+            </a:r>
+            <a:r>
+              <a:rPr lang="en-US" dirty="0" smtClean="0"/>
+              <a:t>token-based (i.e., one token per line)</a:t>
+            </a:r>
+          </a:p>
+          <a:p>
+            <a:pPr lvl="1"/>
+            <a:r>
+              <a:rPr lang="en-US" dirty="0" smtClean="0"/>
+              <a:t>The gold standard and systems have the same tokenization as ground truth</a:t>
+            </a:r>
+            <a:endParaRPr lang="en-US" dirty="0"/>
           </a:p>
         </p:txBody>
       </p:sp>
@@ -3740,1686 +5460,6 @@
       </p:cxnSp>
       <p:sp>
         <p:nvSpPr>
-          <p:cNvPr id="20" name="TextBox 19"/>
-          <p:cNvSpPr txBox="1"/>
-          <p:nvPr/>
-        </p:nvSpPr>
-        <p:spPr>
-          <a:xfrm>
-            <a:off x="381735" y="4672881"/>
-            <a:ext cx="907749" cy="338554"/>
-          </a:xfrm>
-          <a:prstGeom prst="rect">
-            <a:avLst/>
-          </a:prstGeom>
-          <a:noFill/>
-        </p:spPr>
-        <p:txBody>
-          <a:bodyPr wrap="none" rtlCol="0">
-            <a:spAutoFit/>
-          </a:bodyPr>
-          <a:lstStyle/>
-          <a:p>
-            <a:pPr algn="ctr"/>
-            <a:r>
-              <a:rPr lang="en-US" sz="1600" dirty="0" smtClean="0"/>
-              <a:t>Text files</a:t>
-            </a:r>
-            <a:endParaRPr lang="en-US" sz="1600" dirty="0"/>
-          </a:p>
-        </p:txBody>
-      </p:sp>
-      <p:sp>
-        <p:nvSpPr>
-          <p:cNvPr id="21" name="TextBox 20"/>
-          <p:cNvSpPr txBox="1"/>
-          <p:nvPr/>
-        </p:nvSpPr>
-        <p:spPr>
-          <a:xfrm>
-            <a:off x="703556" y="3913311"/>
-            <a:ext cx="952120" cy="307777"/>
-          </a:xfrm>
-          <a:prstGeom prst="rect">
-            <a:avLst/>
-          </a:prstGeom>
-          <a:noFill/>
-        </p:spPr>
-        <p:txBody>
-          <a:bodyPr wrap="none" rtlCol="0">
-            <a:spAutoFit/>
-          </a:bodyPr>
-          <a:lstStyle/>
-          <a:p>
-            <a:pPr algn="ctr"/>
-            <a:r>
-              <a:rPr lang="en-US" sz="1400" i="1" dirty="0" smtClean="0"/>
-              <a:t>sample.txt</a:t>
-            </a:r>
-            <a:endParaRPr lang="en-US" sz="1400" i="1" dirty="0"/>
-          </a:p>
-        </p:txBody>
-      </p:sp>
-      <p:sp>
-        <p:nvSpPr>
-          <p:cNvPr id="23" name="Flowchart: Document 22"/>
-          <p:cNvSpPr/>
-          <p:nvPr/>
-        </p:nvSpPr>
-        <p:spPr>
-          <a:xfrm>
-            <a:off x="425388" y="4185084"/>
-            <a:ext cx="762000" cy="468868"/>
-          </a:xfrm>
-          <a:prstGeom prst="flowChartDocument">
-            <a:avLst/>
-          </a:prstGeom>
-          <a:solidFill>
-            <a:schemeClr val="bg1">
-              <a:lumMod val="75000"/>
-            </a:schemeClr>
-          </a:solidFill>
-          <a:ln>
-            <a:solidFill>
-              <a:schemeClr val="tx1"/>
-            </a:solidFill>
-          </a:ln>
-        </p:spPr>
-        <p:style>
-          <a:lnRef idx="2">
-            <a:schemeClr val="accent1">
-              <a:shade val="50000"/>
-            </a:schemeClr>
-          </a:lnRef>
-          <a:fillRef idx="1">
-            <a:schemeClr val="accent1"/>
-          </a:fillRef>
-          <a:effectRef idx="0">
-            <a:schemeClr val="accent1"/>
-          </a:effectRef>
-          <a:fontRef idx="minor">
-            <a:schemeClr val="lt1"/>
-          </a:fontRef>
-        </p:style>
-        <p:txBody>
-          <a:bodyPr rtlCol="0" anchor="ctr"/>
-          <a:lstStyle/>
-          <a:p>
-            <a:pPr algn="ctr"/>
-            <a:endParaRPr lang="en-US"/>
-          </a:p>
-        </p:txBody>
-      </p:sp>
-      <p:sp>
-        <p:nvSpPr>
-          <p:cNvPr id="41" name="Flowchart: Document 40"/>
-          <p:cNvSpPr/>
-          <p:nvPr/>
-        </p:nvSpPr>
-        <p:spPr>
-          <a:xfrm>
-            <a:off x="5692536" y="2813164"/>
-            <a:ext cx="762000" cy="468868"/>
-          </a:xfrm>
-          <a:prstGeom prst="flowChartDocument">
-            <a:avLst/>
-          </a:prstGeom>
-          <a:solidFill>
-            <a:schemeClr val="accent3">
-              <a:lumMod val="40000"/>
-              <a:lumOff val="60000"/>
-            </a:schemeClr>
-          </a:solidFill>
-          <a:ln>
-            <a:solidFill>
-              <a:schemeClr val="tx1"/>
-            </a:solidFill>
-          </a:ln>
-        </p:spPr>
-        <p:style>
-          <a:lnRef idx="2">
-            <a:schemeClr val="accent1">
-              <a:shade val="50000"/>
-            </a:schemeClr>
-          </a:lnRef>
-          <a:fillRef idx="1">
-            <a:schemeClr val="accent1"/>
-          </a:fillRef>
-          <a:effectRef idx="0">
-            <a:schemeClr val="accent1"/>
-          </a:effectRef>
-          <a:fontRef idx="minor">
-            <a:schemeClr val="lt1"/>
-          </a:fontRef>
-        </p:style>
-        <p:txBody>
-          <a:bodyPr rtlCol="0" anchor="ctr"/>
-          <a:lstStyle/>
-          <a:p>
-            <a:pPr algn="ctr"/>
-            <a:endParaRPr lang="en-US"/>
-          </a:p>
-        </p:txBody>
-      </p:sp>
-      <p:sp>
-        <p:nvSpPr>
-          <p:cNvPr id="42" name="TextBox 41"/>
-          <p:cNvSpPr txBox="1"/>
-          <p:nvPr/>
-        </p:nvSpPr>
-        <p:spPr>
-          <a:xfrm>
-            <a:off x="5854343" y="2522722"/>
-            <a:ext cx="1067921" cy="307777"/>
-          </a:xfrm>
-          <a:prstGeom prst="rect">
-            <a:avLst/>
-          </a:prstGeom>
-          <a:noFill/>
-        </p:spPr>
-        <p:txBody>
-          <a:bodyPr wrap="none" rtlCol="0">
-            <a:spAutoFit/>
-          </a:bodyPr>
-          <a:lstStyle/>
-          <a:p>
-            <a:pPr algn="ctr"/>
-            <a:r>
-              <a:rPr lang="en-US" sz="1400" i="1" dirty="0" err="1" smtClean="0"/>
-              <a:t>sample.eme</a:t>
-            </a:r>
-            <a:endParaRPr lang="en-US" sz="1400" i="1" dirty="0"/>
-          </a:p>
-        </p:txBody>
-      </p:sp>
-      <p:cxnSp>
-        <p:nvCxnSpPr>
-          <p:cNvPr id="43" name="Straight Arrow Connector 42"/>
-          <p:cNvCxnSpPr>
-            <a:stCxn id="6" idx="3"/>
-            <a:endCxn id="72" idx="1"/>
-          </p:cNvCxnSpPr>
-          <p:nvPr/>
-        </p:nvCxnSpPr>
-        <p:spPr>
-          <a:xfrm>
-            <a:off x="3292332" y="3047468"/>
-            <a:ext cx="773611" cy="130"/>
-          </a:xfrm>
-          <a:prstGeom prst="straightConnector1">
-            <a:avLst/>
-          </a:prstGeom>
-          <a:ln w="12700">
-            <a:solidFill>
-              <a:schemeClr val="tx1"/>
-            </a:solidFill>
-            <a:tailEnd type="triangle"/>
-          </a:ln>
-        </p:spPr>
-        <p:style>
-          <a:lnRef idx="1">
-            <a:schemeClr val="accent1"/>
-          </a:lnRef>
-          <a:fillRef idx="0">
-            <a:schemeClr val="accent1"/>
-          </a:fillRef>
-          <a:effectRef idx="0">
-            <a:schemeClr val="accent1"/>
-          </a:effectRef>
-          <a:fontRef idx="minor">
-            <a:schemeClr val="tx1"/>
-          </a:fontRef>
-        </p:style>
-      </p:cxnSp>
-      <p:sp>
-        <p:nvSpPr>
-          <p:cNvPr id="48" name="TextBox 47"/>
-          <p:cNvSpPr txBox="1"/>
-          <p:nvPr/>
-        </p:nvSpPr>
-        <p:spPr>
-          <a:xfrm>
-            <a:off x="5278278" y="3271629"/>
-            <a:ext cx="1788824" cy="584775"/>
-          </a:xfrm>
-          <a:prstGeom prst="rect">
-            <a:avLst/>
-          </a:prstGeom>
-          <a:noFill/>
-        </p:spPr>
-        <p:txBody>
-          <a:bodyPr wrap="none" rtlCol="0">
-            <a:spAutoFit/>
-          </a:bodyPr>
-          <a:lstStyle/>
-          <a:p>
-            <a:pPr algn="ctr"/>
-            <a:r>
-              <a:rPr lang="en-US" sz="1600" dirty="0" smtClean="0"/>
-              <a:t>Gold standard</a:t>
-            </a:r>
-          </a:p>
-          <a:p>
-            <a:pPr algn="ctr"/>
-            <a:r>
-              <a:rPr lang="en-US" sz="1600" dirty="0" smtClean="0"/>
-              <a:t>event mention files</a:t>
-            </a:r>
-            <a:endParaRPr lang="en-US" sz="1600" dirty="0"/>
-          </a:p>
-        </p:txBody>
-      </p:sp>
-      <p:cxnSp>
-        <p:nvCxnSpPr>
-          <p:cNvPr id="49" name="Straight Arrow Connector 48"/>
-          <p:cNvCxnSpPr>
-            <a:stCxn id="72" idx="3"/>
-            <a:endCxn id="41" idx="1"/>
-          </p:cNvCxnSpPr>
-          <p:nvPr/>
-        </p:nvCxnSpPr>
-        <p:spPr>
-          <a:xfrm>
-            <a:off x="5292080" y="3047598"/>
-            <a:ext cx="400456" cy="0"/>
-          </a:xfrm>
-          <a:prstGeom prst="straightConnector1">
-            <a:avLst/>
-          </a:prstGeom>
-          <a:ln w="12700">
-            <a:solidFill>
-              <a:schemeClr val="tx1"/>
-            </a:solidFill>
-            <a:tailEnd type="triangle"/>
-          </a:ln>
-        </p:spPr>
-        <p:style>
-          <a:lnRef idx="1">
-            <a:schemeClr val="accent1"/>
-          </a:lnRef>
-          <a:fillRef idx="0">
-            <a:schemeClr val="accent1"/>
-          </a:fillRef>
-          <a:effectRef idx="0">
-            <a:schemeClr val="accent1"/>
-          </a:effectRef>
-          <a:fontRef idx="minor">
-            <a:schemeClr val="tx1"/>
-          </a:fontRef>
-        </p:style>
-      </p:cxnSp>
-      <p:sp>
-        <p:nvSpPr>
-          <p:cNvPr id="54" name="Flowchart: Document 53"/>
-          <p:cNvSpPr/>
-          <p:nvPr/>
-        </p:nvSpPr>
-        <p:spPr>
-          <a:xfrm>
-            <a:off x="4605034" y="5523639"/>
-            <a:ext cx="762000" cy="468868"/>
-          </a:xfrm>
-          <a:prstGeom prst="flowChartDocument">
-            <a:avLst/>
-          </a:prstGeom>
-          <a:solidFill>
-            <a:schemeClr val="accent4">
-              <a:lumMod val="40000"/>
-              <a:lumOff val="60000"/>
-            </a:schemeClr>
-          </a:solidFill>
-          <a:ln>
-            <a:solidFill>
-              <a:schemeClr val="tx1"/>
-            </a:solidFill>
-          </a:ln>
-        </p:spPr>
-        <p:style>
-          <a:lnRef idx="2">
-            <a:schemeClr val="accent1">
-              <a:shade val="50000"/>
-            </a:schemeClr>
-          </a:lnRef>
-          <a:fillRef idx="1">
-            <a:schemeClr val="accent1"/>
-          </a:fillRef>
-          <a:effectRef idx="0">
-            <a:schemeClr val="accent1"/>
-          </a:effectRef>
-          <a:fontRef idx="minor">
-            <a:schemeClr val="lt1"/>
-          </a:fontRef>
-        </p:style>
-        <p:txBody>
-          <a:bodyPr rtlCol="0" anchor="ctr"/>
-          <a:lstStyle/>
-          <a:p>
-            <a:pPr algn="ctr"/>
-            <a:endParaRPr lang="en-US"/>
-          </a:p>
-        </p:txBody>
-      </p:sp>
-      <p:sp>
-        <p:nvSpPr>
-          <p:cNvPr id="58" name="TextBox 57"/>
-          <p:cNvSpPr txBox="1"/>
-          <p:nvPr/>
-        </p:nvSpPr>
-        <p:spPr>
-          <a:xfrm>
-            <a:off x="4354667" y="6021288"/>
-            <a:ext cx="1294522" cy="584775"/>
-          </a:xfrm>
-          <a:prstGeom prst="rect">
-            <a:avLst/>
-          </a:prstGeom>
-          <a:noFill/>
-        </p:spPr>
-        <p:txBody>
-          <a:bodyPr wrap="none" rtlCol="0">
-            <a:spAutoFit/>
-          </a:bodyPr>
-          <a:lstStyle/>
-          <a:p>
-            <a:pPr algn="ctr"/>
-            <a:r>
-              <a:rPr lang="en-US" sz="1600" dirty="0" smtClean="0"/>
-              <a:t>System event</a:t>
-            </a:r>
-          </a:p>
-          <a:p>
-            <a:pPr algn="ctr"/>
-            <a:r>
-              <a:rPr lang="en-US" sz="1600" dirty="0" smtClean="0"/>
-              <a:t>mention files</a:t>
-            </a:r>
-            <a:endParaRPr lang="en-US" sz="1600" dirty="0"/>
-          </a:p>
-        </p:txBody>
-      </p:sp>
-      <p:cxnSp>
-        <p:nvCxnSpPr>
-          <p:cNvPr id="59" name="Straight Arrow Connector 58"/>
-          <p:cNvCxnSpPr>
-            <a:stCxn id="55" idx="3"/>
-            <a:endCxn id="54" idx="1"/>
-          </p:cNvCxnSpPr>
-          <p:nvPr/>
-        </p:nvCxnSpPr>
-        <p:spPr>
-          <a:xfrm>
-            <a:off x="3707904" y="5758073"/>
-            <a:ext cx="897130" cy="0"/>
-          </a:xfrm>
-          <a:prstGeom prst="straightConnector1">
-            <a:avLst/>
-          </a:prstGeom>
-          <a:ln w="12700">
-            <a:solidFill>
-              <a:schemeClr val="tx1"/>
-            </a:solidFill>
-            <a:tailEnd type="triangle"/>
-          </a:ln>
-        </p:spPr>
-        <p:style>
-          <a:lnRef idx="1">
-            <a:schemeClr val="accent1"/>
-          </a:lnRef>
-          <a:fillRef idx="0">
-            <a:schemeClr val="accent1"/>
-          </a:fillRef>
-          <a:effectRef idx="0">
-            <a:schemeClr val="accent1"/>
-          </a:effectRef>
-          <a:fontRef idx="minor">
-            <a:schemeClr val="tx1"/>
-          </a:fontRef>
-        </p:style>
-      </p:cxnSp>
-      <p:sp>
-        <p:nvSpPr>
-          <p:cNvPr id="63" name="TextBox 62"/>
-          <p:cNvSpPr txBox="1"/>
-          <p:nvPr/>
-        </p:nvSpPr>
-        <p:spPr>
-          <a:xfrm>
-            <a:off x="4660779" y="5241441"/>
-            <a:ext cx="1716368" cy="307777"/>
-          </a:xfrm>
-          <a:prstGeom prst="rect">
-            <a:avLst/>
-          </a:prstGeom>
-          <a:noFill/>
-        </p:spPr>
-        <p:txBody>
-          <a:bodyPr wrap="none" rtlCol="0">
-            <a:spAutoFit/>
-          </a:bodyPr>
-          <a:lstStyle/>
-          <a:p>
-            <a:pPr algn="ctr"/>
-            <a:r>
-              <a:rPr lang="en-US" sz="1400" i="1" dirty="0" smtClean="0"/>
-              <a:t>sample-system1.eme</a:t>
-            </a:r>
-            <a:endParaRPr lang="en-US" sz="1400" i="1" dirty="0"/>
-          </a:p>
-        </p:txBody>
-      </p:sp>
-      <p:sp>
-        <p:nvSpPr>
-          <p:cNvPr id="72" name="Rounded Rectangle 71"/>
-          <p:cNvSpPr/>
-          <p:nvPr/>
-        </p:nvSpPr>
-        <p:spPr>
-          <a:xfrm>
-            <a:off x="4065943" y="2794495"/>
-            <a:ext cx="1226137" cy="506206"/>
-          </a:xfrm>
-          <a:prstGeom prst="roundRect">
-            <a:avLst/>
-          </a:prstGeom>
-          <a:noFill/>
-          <a:ln>
-            <a:solidFill>
-              <a:schemeClr val="tx1"/>
-            </a:solidFill>
-          </a:ln>
-        </p:spPr>
-        <p:style>
-          <a:lnRef idx="2">
-            <a:schemeClr val="accent1">
-              <a:shade val="50000"/>
-            </a:schemeClr>
-          </a:lnRef>
-          <a:fillRef idx="1">
-            <a:schemeClr val="accent1"/>
-          </a:fillRef>
-          <a:effectRef idx="0">
-            <a:schemeClr val="accent1"/>
-          </a:effectRef>
-          <a:fontRef idx="minor">
-            <a:schemeClr val="lt1"/>
-          </a:fontRef>
-        </p:style>
-        <p:txBody>
-          <a:bodyPr rtlCol="0" anchor="ctr"/>
-          <a:lstStyle/>
-          <a:p>
-            <a:pPr algn="ctr"/>
-            <a:r>
-              <a:rPr lang="en-US" dirty="0" smtClean="0">
-                <a:solidFill>
-                  <a:schemeClr val="tx1"/>
-                </a:solidFill>
-              </a:rPr>
-              <a:t>Converter</a:t>
-            </a:r>
-            <a:endParaRPr lang="en-US" dirty="0">
-              <a:solidFill>
-                <a:schemeClr val="tx1"/>
-              </a:solidFill>
-            </a:endParaRPr>
-          </a:p>
-        </p:txBody>
-      </p:sp>
-      <p:sp>
-        <p:nvSpPr>
-          <p:cNvPr id="107" name="Slide Number Placeholder 106"/>
-          <p:cNvSpPr>
-            <a:spLocks noGrp="1"/>
-          </p:cNvSpPr>
-          <p:nvPr>
-            <p:ph type="sldNum" sz="quarter" idx="12"/>
-          </p:nvPr>
-        </p:nvSpPr>
-        <p:spPr/>
-        <p:txBody>
-          <a:bodyPr/>
-          <a:lstStyle/>
-          <a:p>
-            <a:fld id="{B6F15528-21DE-4FAA-801E-634DDDAF4B2B}" type="slidenum">
-              <a:rPr lang="en-US" smtClean="0"/>
-              <a:pPr/>
-              <a:t>1</a:t>
-            </a:fld>
-            <a:endParaRPr lang="en-US" dirty="0"/>
-          </a:p>
-        </p:txBody>
-      </p:sp>
-      <p:cxnSp>
-        <p:nvCxnSpPr>
-          <p:cNvPr id="111" name="Elbow Connector 110"/>
-          <p:cNvCxnSpPr>
-            <a:stCxn id="41" idx="3"/>
-            <a:endCxn id="39" idx="0"/>
-          </p:cNvCxnSpPr>
-          <p:nvPr/>
-        </p:nvCxnSpPr>
-        <p:spPr>
-          <a:xfrm>
-            <a:off x="6454536" y="3047598"/>
-            <a:ext cx="708752" cy="1284793"/>
-          </a:xfrm>
-          <a:prstGeom prst="bentConnector2">
-            <a:avLst/>
-          </a:prstGeom>
-          <a:ln w="12700">
-            <a:solidFill>
-              <a:schemeClr val="tx1"/>
-            </a:solidFill>
-            <a:tailEnd type="triangle"/>
-          </a:ln>
-        </p:spPr>
-        <p:style>
-          <a:lnRef idx="1">
-            <a:schemeClr val="accent1"/>
-          </a:lnRef>
-          <a:fillRef idx="0">
-            <a:schemeClr val="accent1"/>
-          </a:fillRef>
-          <a:effectRef idx="0">
-            <a:schemeClr val="accent1"/>
-          </a:effectRef>
-          <a:fontRef idx="minor">
-            <a:schemeClr val="tx1"/>
-          </a:fontRef>
-        </p:style>
-      </p:cxnSp>
-      <p:sp>
-        <p:nvSpPr>
-          <p:cNvPr id="47" name="TextBox 46"/>
-          <p:cNvSpPr txBox="1"/>
-          <p:nvPr/>
-        </p:nvSpPr>
-        <p:spPr>
-          <a:xfrm>
-            <a:off x="2659846" y="2537752"/>
-            <a:ext cx="1034257" cy="307777"/>
-          </a:xfrm>
-          <a:prstGeom prst="rect">
-            <a:avLst/>
-          </a:prstGeom>
-          <a:noFill/>
-        </p:spPr>
-        <p:txBody>
-          <a:bodyPr wrap="none" rtlCol="0">
-            <a:spAutoFit/>
-          </a:bodyPr>
-          <a:lstStyle/>
-          <a:p>
-            <a:pPr algn="ctr"/>
-            <a:r>
-              <a:rPr lang="en-US" sz="1400" i="1" dirty="0" err="1" smtClean="0"/>
-              <a:t>sample.ann</a:t>
-            </a:r>
-            <a:endParaRPr lang="en-US" sz="1400" i="1" dirty="0"/>
-          </a:p>
-        </p:txBody>
-      </p:sp>
-      <p:cxnSp>
-        <p:nvCxnSpPr>
-          <p:cNvPr id="50" name="Elbow Connector 49"/>
-          <p:cNvCxnSpPr>
-            <a:stCxn id="23" idx="3"/>
-            <a:endCxn id="55" idx="1"/>
-          </p:cNvCxnSpPr>
-          <p:nvPr/>
-        </p:nvCxnSpPr>
-        <p:spPr>
-          <a:xfrm>
-            <a:off x="1187388" y="4419518"/>
-            <a:ext cx="739058" cy="1338555"/>
-          </a:xfrm>
-          <a:prstGeom prst="bentConnector3">
-            <a:avLst>
-              <a:gd name="adj1" fmla="val 33280"/>
-            </a:avLst>
-          </a:prstGeom>
-          <a:ln w="12700">
-            <a:solidFill>
-              <a:schemeClr val="tx1"/>
-            </a:solidFill>
-            <a:tailEnd type="triangle"/>
-          </a:ln>
-        </p:spPr>
-        <p:style>
-          <a:lnRef idx="1">
-            <a:schemeClr val="accent1"/>
-          </a:lnRef>
-          <a:fillRef idx="0">
-            <a:schemeClr val="accent1"/>
-          </a:fillRef>
-          <a:effectRef idx="0">
-            <a:schemeClr val="accent1"/>
-          </a:effectRef>
-          <a:fontRef idx="minor">
-            <a:schemeClr val="tx1"/>
-          </a:fontRef>
-        </p:style>
-      </p:cxnSp>
-      <p:sp>
-        <p:nvSpPr>
-          <p:cNvPr id="55" name="Rounded Rectangle 54"/>
-          <p:cNvSpPr/>
-          <p:nvPr/>
-        </p:nvSpPr>
-        <p:spPr>
-          <a:xfrm>
-            <a:off x="1926446" y="5466788"/>
-            <a:ext cx="1781458" cy="582569"/>
-          </a:xfrm>
-          <a:prstGeom prst="roundRect">
-            <a:avLst/>
-          </a:prstGeom>
-          <a:solidFill>
-            <a:schemeClr val="accent4">
-              <a:lumMod val="40000"/>
-              <a:lumOff val="60000"/>
-            </a:schemeClr>
-          </a:solidFill>
-          <a:ln>
-            <a:solidFill>
-              <a:schemeClr val="tx1"/>
-            </a:solidFill>
-          </a:ln>
-        </p:spPr>
-        <p:style>
-          <a:lnRef idx="2">
-            <a:schemeClr val="accent1">
-              <a:shade val="50000"/>
-            </a:schemeClr>
-          </a:lnRef>
-          <a:fillRef idx="1">
-            <a:schemeClr val="accent1"/>
-          </a:fillRef>
-          <a:effectRef idx="0">
-            <a:schemeClr val="accent1"/>
-          </a:effectRef>
-          <a:fontRef idx="minor">
-            <a:schemeClr val="lt1"/>
-          </a:fontRef>
-        </p:style>
-        <p:txBody>
-          <a:bodyPr rtlCol="0" anchor="ctr"/>
-          <a:lstStyle/>
-          <a:p>
-            <a:pPr algn="ctr"/>
-            <a:r>
-              <a:rPr lang="en-US" dirty="0">
-                <a:solidFill>
-                  <a:schemeClr val="tx1"/>
-                </a:solidFill>
-              </a:rPr>
-              <a:t>Event extraction system</a:t>
-            </a:r>
-          </a:p>
-        </p:txBody>
-      </p:sp>
-      <p:cxnSp>
-        <p:nvCxnSpPr>
-          <p:cNvPr id="64" name="Elbow Connector 63"/>
-          <p:cNvCxnSpPr>
-            <a:stCxn id="54" idx="3"/>
-            <a:endCxn id="39" idx="2"/>
-          </p:cNvCxnSpPr>
-          <p:nvPr/>
-        </p:nvCxnSpPr>
-        <p:spPr>
-          <a:xfrm flipV="1">
-            <a:off x="5367034" y="4838597"/>
-            <a:ext cx="1796254" cy="919476"/>
-          </a:xfrm>
-          <a:prstGeom prst="bentConnector2">
-            <a:avLst/>
-          </a:prstGeom>
-          <a:ln w="12700">
-            <a:solidFill>
-              <a:schemeClr val="tx1"/>
-            </a:solidFill>
-            <a:tailEnd type="triangle"/>
-          </a:ln>
-        </p:spPr>
-        <p:style>
-          <a:lnRef idx="1">
-            <a:schemeClr val="accent1"/>
-          </a:lnRef>
-          <a:fillRef idx="0">
-            <a:schemeClr val="accent1"/>
-          </a:fillRef>
-          <a:effectRef idx="0">
-            <a:schemeClr val="accent1"/>
-          </a:effectRef>
-          <a:fontRef idx="minor">
-            <a:schemeClr val="tx1"/>
-          </a:fontRef>
-        </p:style>
-      </p:cxnSp>
-      <p:sp>
-        <p:nvSpPr>
-          <p:cNvPr id="35" name="Flowchart: Document 34"/>
-          <p:cNvSpPr/>
-          <p:nvPr/>
-        </p:nvSpPr>
-        <p:spPr>
-          <a:xfrm>
-            <a:off x="3936628" y="4185084"/>
-            <a:ext cx="762000" cy="468868"/>
-          </a:xfrm>
-          <a:prstGeom prst="flowChartDocument">
-            <a:avLst/>
-          </a:prstGeom>
-          <a:solidFill>
-            <a:schemeClr val="accent3">
-              <a:lumMod val="40000"/>
-              <a:lumOff val="60000"/>
-            </a:schemeClr>
-          </a:solidFill>
-          <a:ln>
-            <a:solidFill>
-              <a:schemeClr val="tx1"/>
-            </a:solidFill>
-          </a:ln>
-        </p:spPr>
-        <p:style>
-          <a:lnRef idx="2">
-            <a:schemeClr val="accent1">
-              <a:shade val="50000"/>
-            </a:schemeClr>
-          </a:lnRef>
-          <a:fillRef idx="1">
-            <a:schemeClr val="accent1"/>
-          </a:fillRef>
-          <a:effectRef idx="0">
-            <a:schemeClr val="accent1"/>
-          </a:effectRef>
-          <a:fontRef idx="minor">
-            <a:schemeClr val="lt1"/>
-          </a:fontRef>
-        </p:style>
-        <p:txBody>
-          <a:bodyPr rtlCol="0" anchor="ctr"/>
-          <a:lstStyle/>
-          <a:p>
-            <a:pPr algn="ctr"/>
-            <a:endParaRPr lang="en-US"/>
-          </a:p>
-        </p:txBody>
-      </p:sp>
-      <p:cxnSp>
-        <p:nvCxnSpPr>
-          <p:cNvPr id="36" name="Straight Arrow Connector 35"/>
-          <p:cNvCxnSpPr>
-            <a:stCxn id="38" idx="3"/>
-            <a:endCxn id="35" idx="1"/>
-          </p:cNvCxnSpPr>
-          <p:nvPr/>
-        </p:nvCxnSpPr>
-        <p:spPr>
-          <a:xfrm>
-            <a:off x="3645577" y="4419518"/>
-            <a:ext cx="291051" cy="0"/>
-          </a:xfrm>
-          <a:prstGeom prst="straightConnector1">
-            <a:avLst/>
-          </a:prstGeom>
-          <a:ln w="12700">
-            <a:solidFill>
-              <a:schemeClr val="tx1"/>
-            </a:solidFill>
-            <a:tailEnd type="triangle"/>
-          </a:ln>
-        </p:spPr>
-        <p:style>
-          <a:lnRef idx="1">
-            <a:schemeClr val="accent1"/>
-          </a:lnRef>
-          <a:fillRef idx="0">
-            <a:schemeClr val="accent1"/>
-          </a:fillRef>
-          <a:effectRef idx="0">
-            <a:schemeClr val="accent1"/>
-          </a:effectRef>
-          <a:fontRef idx="minor">
-            <a:schemeClr val="tx1"/>
-          </a:fontRef>
-        </p:style>
-      </p:cxnSp>
-      <p:cxnSp>
-        <p:nvCxnSpPr>
-          <p:cNvPr id="37" name="Straight Arrow Connector 36"/>
-          <p:cNvCxnSpPr>
-            <a:stCxn id="23" idx="3"/>
-            <a:endCxn id="38" idx="1"/>
-          </p:cNvCxnSpPr>
-          <p:nvPr/>
-        </p:nvCxnSpPr>
-        <p:spPr>
-          <a:xfrm>
-            <a:off x="1187388" y="4419518"/>
-            <a:ext cx="760676" cy="0"/>
-          </a:xfrm>
-          <a:prstGeom prst="straightConnector1">
-            <a:avLst/>
-          </a:prstGeom>
-          <a:ln w="12700">
-            <a:solidFill>
-              <a:schemeClr val="tx1"/>
-            </a:solidFill>
-            <a:tailEnd type="triangle"/>
-          </a:ln>
-        </p:spPr>
-        <p:style>
-          <a:lnRef idx="1">
-            <a:schemeClr val="accent1"/>
-          </a:lnRef>
-          <a:fillRef idx="0">
-            <a:schemeClr val="accent1"/>
-          </a:fillRef>
-          <a:effectRef idx="0">
-            <a:schemeClr val="accent1"/>
-          </a:effectRef>
-          <a:fontRef idx="minor">
-            <a:schemeClr val="tx1"/>
-          </a:fontRef>
-        </p:style>
-      </p:cxnSp>
-      <p:sp>
-        <p:nvSpPr>
-          <p:cNvPr id="38" name="Rounded Rectangle 37"/>
-          <p:cNvSpPr/>
-          <p:nvPr/>
-        </p:nvSpPr>
-        <p:spPr>
-          <a:xfrm>
-            <a:off x="1948064" y="4115806"/>
-            <a:ext cx="1697513" cy="607423"/>
-          </a:xfrm>
-          <a:prstGeom prst="roundRect">
-            <a:avLst/>
-          </a:prstGeom>
-          <a:solidFill>
-            <a:schemeClr val="accent3">
-              <a:lumMod val="40000"/>
-              <a:lumOff val="60000"/>
-            </a:schemeClr>
-          </a:solidFill>
-          <a:ln>
-            <a:solidFill>
-              <a:schemeClr val="tx1"/>
-            </a:solidFill>
-          </a:ln>
-        </p:spPr>
-        <p:style>
-          <a:lnRef idx="2">
-            <a:schemeClr val="accent1">
-              <a:shade val="50000"/>
-            </a:schemeClr>
-          </a:lnRef>
-          <a:fillRef idx="1">
-            <a:schemeClr val="accent1"/>
-          </a:fillRef>
-          <a:effectRef idx="0">
-            <a:schemeClr val="accent1"/>
-          </a:effectRef>
-          <a:fontRef idx="minor">
-            <a:schemeClr val="lt1"/>
-          </a:fontRef>
-        </p:style>
-        <p:txBody>
-          <a:bodyPr rtlCol="0" anchor="ctr"/>
-          <a:lstStyle/>
-          <a:p>
-            <a:pPr algn="ctr"/>
-            <a:r>
-              <a:rPr lang="en-US" dirty="0" smtClean="0">
-                <a:solidFill>
-                  <a:schemeClr val="tx1"/>
-                </a:solidFill>
-              </a:rPr>
-              <a:t>(Gold standard)</a:t>
-            </a:r>
-          </a:p>
-          <a:p>
-            <a:pPr algn="ctr"/>
-            <a:r>
-              <a:rPr lang="en-US" dirty="0" err="1" smtClean="0">
-                <a:solidFill>
-                  <a:schemeClr val="tx1"/>
-                </a:solidFill>
-              </a:rPr>
-              <a:t>tokenizer</a:t>
-            </a:r>
-            <a:endParaRPr lang="en-US" dirty="0">
-              <a:solidFill>
-                <a:schemeClr val="tx1"/>
-              </a:solidFill>
-            </a:endParaRPr>
-          </a:p>
-        </p:txBody>
-      </p:sp>
-      <p:sp>
-        <p:nvSpPr>
-          <p:cNvPr id="39" name="Rounded Rectangle 38"/>
-          <p:cNvSpPr/>
-          <p:nvPr/>
-        </p:nvSpPr>
-        <p:spPr>
-          <a:xfrm>
-            <a:off x="6550219" y="4332391"/>
-            <a:ext cx="1226137" cy="506206"/>
-          </a:xfrm>
-          <a:prstGeom prst="roundRect">
-            <a:avLst/>
-          </a:prstGeom>
-          <a:noFill/>
-          <a:ln>
-            <a:solidFill>
-              <a:schemeClr val="tx1"/>
-            </a:solidFill>
-          </a:ln>
-        </p:spPr>
-        <p:style>
-          <a:lnRef idx="2">
-            <a:schemeClr val="accent1">
-              <a:shade val="50000"/>
-            </a:schemeClr>
-          </a:lnRef>
-          <a:fillRef idx="1">
-            <a:schemeClr val="accent1"/>
-          </a:fillRef>
-          <a:effectRef idx="0">
-            <a:schemeClr val="accent1"/>
-          </a:effectRef>
-          <a:fontRef idx="minor">
-            <a:schemeClr val="lt1"/>
-          </a:fontRef>
-        </p:style>
-        <p:txBody>
-          <a:bodyPr rtlCol="0" anchor="ctr"/>
-          <a:lstStyle/>
-          <a:p>
-            <a:pPr algn="ctr"/>
-            <a:r>
-              <a:rPr lang="en-US" dirty="0">
-                <a:solidFill>
-                  <a:schemeClr val="tx1"/>
-                </a:solidFill>
-              </a:rPr>
-              <a:t>Evaluator</a:t>
-            </a:r>
-          </a:p>
-        </p:txBody>
-      </p:sp>
-      <p:sp>
-        <p:nvSpPr>
-          <p:cNvPr id="44" name="Flowchart: Process 43"/>
-          <p:cNvSpPr/>
-          <p:nvPr/>
-        </p:nvSpPr>
-        <p:spPr>
-          <a:xfrm>
-            <a:off x="8100392" y="4341725"/>
-            <a:ext cx="913901" cy="487537"/>
-          </a:xfrm>
-          <a:prstGeom prst="flowChartProcess">
-            <a:avLst/>
-          </a:prstGeom>
-          <a:noFill/>
-          <a:ln>
-            <a:solidFill>
-              <a:schemeClr val="tx1"/>
-            </a:solidFill>
-          </a:ln>
-        </p:spPr>
-        <p:style>
-          <a:lnRef idx="2">
-            <a:schemeClr val="accent1">
-              <a:shade val="50000"/>
-            </a:schemeClr>
-          </a:lnRef>
-          <a:fillRef idx="1">
-            <a:schemeClr val="accent1"/>
-          </a:fillRef>
-          <a:effectRef idx="0">
-            <a:schemeClr val="accent1"/>
-          </a:effectRef>
-          <a:fontRef idx="minor">
-            <a:schemeClr val="lt1"/>
-          </a:fontRef>
-        </p:style>
-        <p:txBody>
-          <a:bodyPr rtlCol="0" anchor="ctr"/>
-          <a:lstStyle/>
-          <a:p>
-            <a:pPr algn="ctr"/>
-            <a:r>
-              <a:rPr lang="en-US" dirty="0" smtClean="0">
-                <a:solidFill>
-                  <a:schemeClr val="tx1"/>
-                </a:solidFill>
-              </a:rPr>
-              <a:t>Results</a:t>
-            </a:r>
-            <a:endParaRPr lang="en-US" dirty="0">
-              <a:solidFill>
-                <a:schemeClr val="tx1"/>
-              </a:solidFill>
-            </a:endParaRPr>
-          </a:p>
-        </p:txBody>
-      </p:sp>
-      <p:cxnSp>
-        <p:nvCxnSpPr>
-          <p:cNvPr id="45" name="Straight Arrow Connector 44"/>
-          <p:cNvCxnSpPr>
-            <a:stCxn id="39" idx="3"/>
-            <a:endCxn id="44" idx="1"/>
-          </p:cNvCxnSpPr>
-          <p:nvPr/>
-        </p:nvCxnSpPr>
-        <p:spPr>
-          <a:xfrm>
-            <a:off x="7776356" y="4585494"/>
-            <a:ext cx="324036" cy="0"/>
-          </a:xfrm>
-          <a:prstGeom prst="straightConnector1">
-            <a:avLst/>
-          </a:prstGeom>
-          <a:ln w="12700">
-            <a:solidFill>
-              <a:schemeClr val="tx1"/>
-            </a:solidFill>
-            <a:tailEnd type="triangle"/>
-          </a:ln>
-        </p:spPr>
-        <p:style>
-          <a:lnRef idx="1">
-            <a:schemeClr val="accent1"/>
-          </a:lnRef>
-          <a:fillRef idx="0">
-            <a:schemeClr val="accent1"/>
-          </a:fillRef>
-          <a:effectRef idx="0">
-            <a:schemeClr val="accent1"/>
-          </a:effectRef>
-          <a:fontRef idx="minor">
-            <a:schemeClr val="tx1"/>
-          </a:fontRef>
-        </p:style>
-      </p:cxnSp>
-      <p:sp>
-        <p:nvSpPr>
-          <p:cNvPr id="46" name="TextBox 45"/>
-          <p:cNvSpPr txBox="1"/>
-          <p:nvPr/>
-        </p:nvSpPr>
-        <p:spPr>
-          <a:xfrm>
-            <a:off x="4412962" y="3913311"/>
-            <a:ext cx="987130" cy="307777"/>
-          </a:xfrm>
-          <a:prstGeom prst="rect">
-            <a:avLst/>
-          </a:prstGeom>
-          <a:noFill/>
-        </p:spPr>
-        <p:txBody>
-          <a:bodyPr wrap="none" rtlCol="0">
-            <a:spAutoFit/>
-          </a:bodyPr>
-          <a:lstStyle/>
-          <a:p>
-            <a:pPr algn="ctr"/>
-            <a:r>
-              <a:rPr lang="en-US" sz="1400" i="1" dirty="0" err="1" smtClean="0"/>
-              <a:t>sample.tkn</a:t>
-            </a:r>
-            <a:endParaRPr lang="en-US" sz="1400" i="1" dirty="0"/>
-          </a:p>
-        </p:txBody>
-      </p:sp>
-      <p:sp>
-        <p:nvSpPr>
-          <p:cNvPr id="51" name="TextBox 50"/>
-          <p:cNvSpPr txBox="1"/>
-          <p:nvPr/>
-        </p:nvSpPr>
-        <p:spPr>
-          <a:xfrm>
-            <a:off x="4308157" y="4617132"/>
-            <a:ext cx="1055931" cy="338554"/>
-          </a:xfrm>
-          <a:prstGeom prst="rect">
-            <a:avLst/>
-          </a:prstGeom>
-          <a:noFill/>
-        </p:spPr>
-        <p:txBody>
-          <a:bodyPr wrap="none" rtlCol="0">
-            <a:spAutoFit/>
-          </a:bodyPr>
-          <a:lstStyle/>
-          <a:p>
-            <a:pPr algn="ctr"/>
-            <a:r>
-              <a:rPr lang="en-US" sz="1600" dirty="0" smtClean="0"/>
-              <a:t>Token files</a:t>
-            </a:r>
-            <a:endParaRPr lang="en-US" sz="1600" dirty="0"/>
-          </a:p>
-        </p:txBody>
-      </p:sp>
-      <p:cxnSp>
-        <p:nvCxnSpPr>
-          <p:cNvPr id="52" name="Elbow Connector 51"/>
-          <p:cNvCxnSpPr>
-            <a:stCxn id="35" idx="3"/>
-            <a:endCxn id="39" idx="1"/>
-          </p:cNvCxnSpPr>
-          <p:nvPr/>
-        </p:nvCxnSpPr>
-        <p:spPr>
-          <a:xfrm>
-            <a:off x="4698628" y="4419518"/>
-            <a:ext cx="1851591" cy="165976"/>
-          </a:xfrm>
-          <a:prstGeom prst="bentConnector3">
-            <a:avLst>
-              <a:gd name="adj1" fmla="val 50000"/>
-            </a:avLst>
-          </a:prstGeom>
-          <a:ln w="12700">
-            <a:solidFill>
-              <a:schemeClr val="tx1"/>
-            </a:solidFill>
-            <a:tailEnd type="triangle"/>
-          </a:ln>
-        </p:spPr>
-        <p:style>
-          <a:lnRef idx="1">
-            <a:schemeClr val="accent1"/>
-          </a:lnRef>
-          <a:fillRef idx="0">
-            <a:schemeClr val="accent1"/>
-          </a:fillRef>
-          <a:effectRef idx="0">
-            <a:schemeClr val="accent1"/>
-          </a:effectRef>
-          <a:fontRef idx="minor">
-            <a:schemeClr val="tx1"/>
-          </a:fontRef>
-        </p:style>
-      </p:cxnSp>
-      <p:cxnSp>
-        <p:nvCxnSpPr>
-          <p:cNvPr id="40" name="Elbow Connector 39"/>
-          <p:cNvCxnSpPr>
-            <a:stCxn id="23" idx="3"/>
-            <a:endCxn id="53" idx="2"/>
-          </p:cNvCxnSpPr>
-          <p:nvPr/>
-        </p:nvCxnSpPr>
-        <p:spPr>
-          <a:xfrm flipV="1">
-            <a:off x="1187388" y="3300701"/>
-            <a:ext cx="570261" cy="1118817"/>
-          </a:xfrm>
-          <a:prstGeom prst="bentConnector2">
-            <a:avLst/>
-          </a:prstGeom>
-          <a:ln w="12700">
-            <a:solidFill>
-              <a:schemeClr val="tx1"/>
-            </a:solidFill>
-            <a:tailEnd type="triangle"/>
-          </a:ln>
-        </p:spPr>
-        <p:style>
-          <a:lnRef idx="1">
-            <a:schemeClr val="accent1"/>
-          </a:lnRef>
-          <a:fillRef idx="0">
-            <a:schemeClr val="accent1"/>
-          </a:fillRef>
-          <a:effectRef idx="0">
-            <a:schemeClr val="accent1"/>
-          </a:effectRef>
-          <a:fontRef idx="minor">
-            <a:schemeClr val="tx1"/>
-          </a:fontRef>
-        </p:style>
-      </p:cxnSp>
-      <p:sp>
-        <p:nvSpPr>
-          <p:cNvPr id="53" name="Rounded Rectangle 52"/>
-          <p:cNvSpPr/>
-          <p:nvPr/>
-        </p:nvSpPr>
-        <p:spPr>
-          <a:xfrm>
-            <a:off x="1403648" y="2794495"/>
-            <a:ext cx="708001" cy="506206"/>
-          </a:xfrm>
-          <a:prstGeom prst="roundRect">
-            <a:avLst/>
-          </a:prstGeom>
-          <a:noFill/>
-          <a:ln>
-            <a:solidFill>
-              <a:schemeClr val="tx1"/>
-            </a:solidFill>
-          </a:ln>
-        </p:spPr>
-        <p:style>
-          <a:lnRef idx="2">
-            <a:schemeClr val="accent1">
-              <a:shade val="50000"/>
-            </a:schemeClr>
-          </a:lnRef>
-          <a:fillRef idx="1">
-            <a:schemeClr val="accent1"/>
-          </a:fillRef>
-          <a:effectRef idx="0">
-            <a:schemeClr val="accent1"/>
-          </a:effectRef>
-          <a:fontRef idx="minor">
-            <a:schemeClr val="lt1"/>
-          </a:fontRef>
-        </p:style>
-        <p:txBody>
-          <a:bodyPr rtlCol="0" anchor="ctr"/>
-          <a:lstStyle/>
-          <a:p>
-            <a:pPr algn="ctr"/>
-            <a:r>
-              <a:rPr lang="en-US" dirty="0" smtClean="0">
-                <a:solidFill>
-                  <a:schemeClr val="tx1"/>
-                </a:solidFill>
-              </a:rPr>
-              <a:t>brat</a:t>
-            </a:r>
-            <a:endParaRPr lang="en-US" dirty="0">
-              <a:solidFill>
-                <a:schemeClr val="tx1"/>
-              </a:solidFill>
-            </a:endParaRPr>
-          </a:p>
-        </p:txBody>
-      </p:sp>
-    </p:spTree>
-    <p:extLst>
-      <p:ext uri="{BB962C8B-B14F-4D97-AF65-F5344CB8AC3E}">
-        <p14:creationId xmlns:p14="http://schemas.microsoft.com/office/powerpoint/2010/main" val="2287174114"/>
-      </p:ext>
-    </p:extLst>
-  </p:cSld>
-  <p:clrMapOvr>
-    <a:masterClrMapping/>
-  </p:clrMapOvr>
-</p:sld>
-</file>
-
-<file path=ppt/slides/slide2.xml><?xml version="1.0" encoding="utf-8"?>
-<p:sld xmlns:a="http://schemas.openxmlformats.org/drawingml/2006/main" xmlns:r="http://schemas.openxmlformats.org/officeDocument/2006/relationships" xmlns:p="http://schemas.openxmlformats.org/presentationml/2006/main">
-  <p:cSld>
-    <p:spTree>
-      <p:nvGrpSpPr>
-        <p:cNvPr id="1" name=""/>
-        <p:cNvGrpSpPr/>
-        <p:nvPr/>
-      </p:nvGrpSpPr>
-      <p:grpSpPr>
-        <a:xfrm>
-          <a:off x="0" y="0"/>
-          <a:ext cx="0" cy="0"/>
-          <a:chOff x="0" y="0"/>
-          <a:chExt cx="0" cy="0"/>
-        </a:xfrm>
-      </p:grpSpPr>
-      <p:sp>
-        <p:nvSpPr>
-          <p:cNvPr id="2" name="Title 1"/>
-          <p:cNvSpPr>
-            <a:spLocks noGrp="1"/>
-          </p:cNvSpPr>
-          <p:nvPr>
-            <p:ph type="title"/>
-          </p:nvPr>
-        </p:nvSpPr>
-        <p:spPr>
-          <a:xfrm>
-            <a:off x="457200" y="188640"/>
-            <a:ext cx="8229600" cy="715962"/>
-          </a:xfrm>
-        </p:spPr>
-        <p:txBody>
-          <a:bodyPr>
-            <a:normAutofit fontScale="90000"/>
-          </a:bodyPr>
-          <a:lstStyle/>
-          <a:p>
-            <a:r>
-              <a:rPr lang="en-US" dirty="0" smtClean="0"/>
-              <a:t>Work flow (2): pre-tokenization</a:t>
-            </a:r>
-            <a:endParaRPr lang="en-US" dirty="0"/>
-          </a:p>
-        </p:txBody>
-      </p:sp>
-      <p:sp>
-        <p:nvSpPr>
-          <p:cNvPr id="3" name="Content Placeholder 2"/>
-          <p:cNvSpPr>
-            <a:spLocks noGrp="1"/>
-          </p:cNvSpPr>
-          <p:nvPr>
-            <p:ph idx="1"/>
-          </p:nvPr>
-        </p:nvSpPr>
-        <p:spPr>
-          <a:xfrm>
-            <a:off x="457200" y="1088740"/>
-            <a:ext cx="8229600" cy="936104"/>
-          </a:xfrm>
-        </p:spPr>
-        <p:txBody>
-          <a:bodyPr>
-            <a:normAutofit fontScale="62500" lnSpcReduction="20000"/>
-          </a:bodyPr>
-          <a:lstStyle/>
-          <a:p>
-            <a:r>
-              <a:rPr lang="en-US" dirty="0" smtClean="0"/>
-              <a:t>Design</a:t>
-            </a:r>
-          </a:p>
-          <a:p>
-            <a:pPr lvl="1"/>
-            <a:r>
-              <a:rPr lang="en-US" dirty="0"/>
-              <a:t>The evaluation file </a:t>
-            </a:r>
-            <a:r>
-              <a:rPr lang="en-US" dirty="0" smtClean="0"/>
-              <a:t>format</a:t>
-            </a:r>
-            <a:r>
-              <a:rPr lang="en-US" altLang="ja-JP" dirty="0" smtClean="0"/>
-              <a:t> (*.eme)</a:t>
-            </a:r>
-            <a:r>
-              <a:rPr lang="en-US" dirty="0" smtClean="0"/>
-              <a:t> </a:t>
-            </a:r>
-            <a:r>
-              <a:rPr lang="en-US" dirty="0"/>
-              <a:t>is </a:t>
-            </a:r>
-            <a:r>
-              <a:rPr lang="en-US" dirty="0" smtClean="0"/>
-              <a:t>token-based (i.e., one token per line)</a:t>
-            </a:r>
-          </a:p>
-          <a:p>
-            <a:pPr lvl="1"/>
-            <a:r>
-              <a:rPr lang="en-US" dirty="0" smtClean="0"/>
-              <a:t>The gold standard and systems have the same tokenization as ground truth</a:t>
-            </a:r>
-            <a:endParaRPr lang="en-US" dirty="0"/>
-          </a:p>
-        </p:txBody>
-      </p:sp>
-      <p:sp>
-        <p:nvSpPr>
-          <p:cNvPr id="4" name="Smiley Face 3"/>
-          <p:cNvSpPr/>
-          <p:nvPr/>
-        </p:nvSpPr>
-        <p:spPr>
-          <a:xfrm>
-            <a:off x="671998" y="2856968"/>
-            <a:ext cx="381000" cy="381000"/>
-          </a:xfrm>
-          <a:prstGeom prst="smileyFace">
-            <a:avLst/>
-          </a:prstGeom>
-          <a:noFill/>
-          <a:ln>
-            <a:solidFill>
-              <a:schemeClr val="tx1"/>
-            </a:solidFill>
-          </a:ln>
-        </p:spPr>
-        <p:style>
-          <a:lnRef idx="2">
-            <a:schemeClr val="accent1">
-              <a:shade val="50000"/>
-            </a:schemeClr>
-          </a:lnRef>
-          <a:fillRef idx="1">
-            <a:schemeClr val="accent1"/>
-          </a:fillRef>
-          <a:effectRef idx="0">
-            <a:schemeClr val="accent1"/>
-          </a:effectRef>
-          <a:fontRef idx="minor">
-            <a:schemeClr val="lt1"/>
-          </a:fontRef>
-        </p:style>
-        <p:txBody>
-          <a:bodyPr rtlCol="0" anchor="ctr"/>
-          <a:lstStyle/>
-          <a:p>
-            <a:pPr algn="ctr"/>
-            <a:endParaRPr lang="en-US"/>
-          </a:p>
-        </p:txBody>
-      </p:sp>
-      <p:sp>
-        <p:nvSpPr>
-          <p:cNvPr id="5" name="TextBox 4"/>
-          <p:cNvSpPr txBox="1"/>
-          <p:nvPr/>
-        </p:nvSpPr>
-        <p:spPr>
-          <a:xfrm>
-            <a:off x="273723" y="3235545"/>
-            <a:ext cx="1152127" cy="584775"/>
-          </a:xfrm>
-          <a:prstGeom prst="rect">
-            <a:avLst/>
-          </a:prstGeom>
-          <a:noFill/>
-        </p:spPr>
-        <p:txBody>
-          <a:bodyPr wrap="square" rtlCol="0">
-            <a:spAutoFit/>
-          </a:bodyPr>
-          <a:lstStyle/>
-          <a:p>
-            <a:pPr algn="ctr"/>
-            <a:r>
-              <a:rPr lang="en-US" sz="1600" dirty="0" smtClean="0"/>
-              <a:t>Human annotators</a:t>
-            </a:r>
-            <a:endParaRPr lang="en-US" sz="1600" dirty="0"/>
-          </a:p>
-        </p:txBody>
-      </p:sp>
-      <p:sp>
-        <p:nvSpPr>
-          <p:cNvPr id="6" name="Flowchart: Document 5"/>
-          <p:cNvSpPr/>
-          <p:nvPr/>
-        </p:nvSpPr>
-        <p:spPr>
-          <a:xfrm>
-            <a:off x="2530332" y="2813034"/>
-            <a:ext cx="762000" cy="468868"/>
-          </a:xfrm>
-          <a:prstGeom prst="flowChartDocument">
-            <a:avLst/>
-          </a:prstGeom>
-          <a:solidFill>
-            <a:schemeClr val="accent3">
-              <a:lumMod val="40000"/>
-              <a:lumOff val="60000"/>
-            </a:schemeClr>
-          </a:solidFill>
-          <a:ln>
-            <a:solidFill>
-              <a:schemeClr val="tx1"/>
-            </a:solidFill>
-          </a:ln>
-        </p:spPr>
-        <p:style>
-          <a:lnRef idx="2">
-            <a:schemeClr val="accent1">
-              <a:shade val="50000"/>
-            </a:schemeClr>
-          </a:lnRef>
-          <a:fillRef idx="1">
-            <a:schemeClr val="accent1"/>
-          </a:fillRef>
-          <a:effectRef idx="0">
-            <a:schemeClr val="accent1"/>
-          </a:effectRef>
-          <a:fontRef idx="minor">
-            <a:schemeClr val="lt1"/>
-          </a:fontRef>
-        </p:style>
-        <p:txBody>
-          <a:bodyPr rtlCol="0" anchor="ctr"/>
-          <a:lstStyle/>
-          <a:p>
-            <a:pPr algn="ctr"/>
-            <a:endParaRPr lang="en-US"/>
-          </a:p>
-        </p:txBody>
-      </p:sp>
-      <p:sp>
-        <p:nvSpPr>
-          <p:cNvPr id="8" name="TextBox 7"/>
-          <p:cNvSpPr txBox="1"/>
-          <p:nvPr/>
-        </p:nvSpPr>
-        <p:spPr>
-          <a:xfrm>
-            <a:off x="2180210" y="3280260"/>
-            <a:ext cx="1485087" cy="584775"/>
-          </a:xfrm>
-          <a:prstGeom prst="rect">
-            <a:avLst/>
-          </a:prstGeom>
-          <a:noFill/>
-        </p:spPr>
-        <p:txBody>
-          <a:bodyPr wrap="none" rtlCol="0">
-            <a:spAutoFit/>
-          </a:bodyPr>
-          <a:lstStyle/>
-          <a:p>
-            <a:pPr algn="ctr"/>
-            <a:r>
-              <a:rPr lang="en-US" sz="1600" dirty="0" smtClean="0"/>
-              <a:t>Gold standard</a:t>
-            </a:r>
-          </a:p>
-          <a:p>
-            <a:pPr algn="ctr"/>
-            <a:r>
-              <a:rPr lang="en-US" sz="1600" dirty="0" smtClean="0"/>
-              <a:t>annotation files</a:t>
-            </a:r>
-            <a:endParaRPr lang="en-US" sz="1600" dirty="0"/>
-          </a:p>
-        </p:txBody>
-      </p:sp>
-      <p:cxnSp>
-        <p:nvCxnSpPr>
-          <p:cNvPr id="10" name="Straight Arrow Connector 9"/>
-          <p:cNvCxnSpPr>
-            <a:stCxn id="4" idx="6"/>
-            <a:endCxn id="53" idx="1"/>
-          </p:cNvCxnSpPr>
-          <p:nvPr/>
-        </p:nvCxnSpPr>
-        <p:spPr>
-          <a:xfrm>
-            <a:off x="1052998" y="3047468"/>
-            <a:ext cx="350650" cy="130"/>
-          </a:xfrm>
-          <a:prstGeom prst="straightConnector1">
-            <a:avLst/>
-          </a:prstGeom>
-          <a:ln w="12700">
-            <a:solidFill>
-              <a:schemeClr val="tx1"/>
-            </a:solidFill>
-            <a:tailEnd type="triangle"/>
-          </a:ln>
-        </p:spPr>
-        <p:style>
-          <a:lnRef idx="1">
-            <a:schemeClr val="accent1"/>
-          </a:lnRef>
-          <a:fillRef idx="0">
-            <a:schemeClr val="accent1"/>
-          </a:fillRef>
-          <a:effectRef idx="0">
-            <a:schemeClr val="accent1"/>
-          </a:effectRef>
-          <a:fontRef idx="minor">
-            <a:schemeClr val="tx1"/>
-          </a:fontRef>
-        </p:style>
-      </p:cxnSp>
-      <p:cxnSp>
-        <p:nvCxnSpPr>
-          <p:cNvPr id="12" name="Straight Arrow Connector 11"/>
-          <p:cNvCxnSpPr>
-            <a:stCxn id="53" idx="3"/>
-            <a:endCxn id="6" idx="1"/>
-          </p:cNvCxnSpPr>
-          <p:nvPr/>
-        </p:nvCxnSpPr>
-        <p:spPr>
-          <a:xfrm flipV="1">
-            <a:off x="2111649" y="3047468"/>
-            <a:ext cx="418683" cy="130"/>
-          </a:xfrm>
-          <a:prstGeom prst="straightConnector1">
-            <a:avLst/>
-          </a:prstGeom>
-          <a:ln w="12700">
-            <a:solidFill>
-              <a:schemeClr val="tx1"/>
-            </a:solidFill>
-            <a:tailEnd type="triangle"/>
-          </a:ln>
-        </p:spPr>
-        <p:style>
-          <a:lnRef idx="1">
-            <a:schemeClr val="accent1"/>
-          </a:lnRef>
-          <a:fillRef idx="0">
-            <a:schemeClr val="accent1"/>
-          </a:fillRef>
-          <a:effectRef idx="0">
-            <a:schemeClr val="accent1"/>
-          </a:effectRef>
-          <a:fontRef idx="minor">
-            <a:schemeClr val="tx1"/>
-          </a:fontRef>
-        </p:style>
-      </p:cxnSp>
-      <p:sp>
-        <p:nvSpPr>
           <p:cNvPr id="19" name="Flowchart: Document 18"/>
           <p:cNvSpPr/>
           <p:nvPr/>
@@ -5838,8 +5878,8 @@
         </p:nvSpPr>
         <p:spPr>
           <a:xfrm>
-            <a:off x="5854343" y="2522722"/>
-            <a:ext cx="1067921" cy="307777"/>
+            <a:off x="5823085" y="2522722"/>
+            <a:ext cx="1130438" cy="307777"/>
           </a:xfrm>
           <a:prstGeom prst="rect">
             <a:avLst/>
@@ -5855,7 +5895,7 @@
             <a:pPr algn="ctr"/>
             <a:r>
               <a:rPr lang="en-US" sz="1400" i="1" dirty="0" err="1" smtClean="0"/>
-              <a:t>sample.eme</a:t>
+              <a:t>sample.emdf</a:t>
             </a:r>
             <a:endParaRPr lang="en-US" sz="1400" i="1" dirty="0"/>
           </a:p>
@@ -6113,8 +6153,8 @@
         </p:nvSpPr>
         <p:spPr>
           <a:xfrm>
-            <a:off x="4660779" y="5241441"/>
-            <a:ext cx="1716368" cy="307777"/>
+            <a:off x="4629521" y="5241441"/>
+            <a:ext cx="1778885" cy="307777"/>
           </a:xfrm>
           <a:prstGeom prst="rect">
             <a:avLst/>
@@ -6130,7 +6170,7 @@
             <a:pPr algn="ctr"/>
             <a:r>
               <a:rPr lang="en-US" sz="1400" i="1" dirty="0" smtClean="0"/>
-              <a:t>sample-system1.eme</a:t>
+              <a:t>sample-system1.emdf</a:t>
             </a:r>
             <a:endParaRPr lang="en-US" sz="1400" i="1" dirty="0"/>
           </a:p>

</xml_diff>

<commit_message>
Modify wording in ppt
</commit_message>
<xml_diff>
--- a/doc/evm-eval-work-flow.pptx
+++ b/doc/evm-eval-work-flow.pptx
@@ -5,12 +5,13 @@
     <p:sldMasterId id="2147483648" r:id="rId1"/>
   </p:sldMasterIdLst>
   <p:notesMasterIdLst>
-    <p:notesMasterId r:id="rId5"/>
+    <p:notesMasterId r:id="rId6"/>
   </p:notesMasterIdLst>
   <p:sldIdLst>
     <p:sldId id="259" r:id="rId2"/>
     <p:sldId id="258" r:id="rId3"/>
     <p:sldId id="260" r:id="rId4"/>
+    <p:sldId id="261" r:id="rId5"/>
   </p:sldIdLst>
   <p:sldSz cx="9144000" cy="6858000" type="screen4x3"/>
   <p:notesSz cx="6858000" cy="9144000"/>
@@ -195,7 +196,7 @@
             <a:fld id="{1D635E4C-BAB0-4BAB-AAF7-4D9825D68060}" type="datetimeFigureOut">
               <a:rPr lang="en-US" smtClean="0"/>
               <a:pPr/>
-              <a:t>8/8/2014</a:t>
+              <a:t>8/10/14</a:t>
             </a:fld>
             <a:endParaRPr lang="en-US"/>
           </a:p>
@@ -646,7 +647,7 @@
             <a:fld id="{3B56066F-CE6C-4B27-993A-2842BDE8189B}" type="datetime1">
               <a:rPr lang="en-US" smtClean="0"/>
               <a:pPr/>
-              <a:t>8/8/2014</a:t>
+              <a:t>8/10/14</a:t>
             </a:fld>
             <a:endParaRPr lang="en-US"/>
           </a:p>
@@ -813,7 +814,7 @@
             <a:fld id="{61174E08-E9E9-4260-BC0A-45316FB7E636}" type="datetime1">
               <a:rPr lang="en-US" smtClean="0"/>
               <a:pPr/>
-              <a:t>8/8/2014</a:t>
+              <a:t>8/10/14</a:t>
             </a:fld>
             <a:endParaRPr lang="en-US"/>
           </a:p>
@@ -990,7 +991,7 @@
             <a:fld id="{64C675E3-4156-4610-8C23-B8FBCA8F0F60}" type="datetime1">
               <a:rPr lang="en-US" smtClean="0"/>
               <a:pPr/>
-              <a:t>8/8/2014</a:t>
+              <a:t>8/10/14</a:t>
             </a:fld>
             <a:endParaRPr lang="en-US"/>
           </a:p>
@@ -1157,7 +1158,7 @@
             <a:fld id="{119C4F61-BDF2-4F97-8BCC-87B3B636DDF2}" type="datetime1">
               <a:rPr lang="en-US" smtClean="0"/>
               <a:pPr/>
-              <a:t>8/8/2014</a:t>
+              <a:t>8/10/14</a:t>
             </a:fld>
             <a:endParaRPr lang="en-US"/>
           </a:p>
@@ -1400,7 +1401,7 @@
             <a:fld id="{02F0C2A0-F4E4-41A2-82A2-5525FFA2797A}" type="datetime1">
               <a:rPr lang="en-US" smtClean="0"/>
               <a:pPr/>
-              <a:t>8/8/2014</a:t>
+              <a:t>8/10/14</a:t>
             </a:fld>
             <a:endParaRPr lang="en-US"/>
           </a:p>
@@ -1685,7 +1686,7 @@
             <a:fld id="{19C68C49-B72E-4B6B-B516-758D46CA9D72}" type="datetime1">
               <a:rPr lang="en-US" smtClean="0"/>
               <a:pPr/>
-              <a:t>8/8/2014</a:t>
+              <a:t>8/10/14</a:t>
             </a:fld>
             <a:endParaRPr lang="en-US"/>
           </a:p>
@@ -2104,7 +2105,7 @@
             <a:fld id="{1AC33444-61AF-4C04-94BE-279981869E66}" type="datetime1">
               <a:rPr lang="en-US" smtClean="0"/>
               <a:pPr/>
-              <a:t>8/8/2014</a:t>
+              <a:t>8/10/14</a:t>
             </a:fld>
             <a:endParaRPr lang="en-US"/>
           </a:p>
@@ -2219,7 +2220,7 @@
             <a:fld id="{680EC325-BE6D-4D10-BEAB-D93726F5911A}" type="datetime1">
               <a:rPr lang="en-US" smtClean="0"/>
               <a:pPr/>
-              <a:t>8/8/2014</a:t>
+              <a:t>8/10/14</a:t>
             </a:fld>
             <a:endParaRPr lang="en-US"/>
           </a:p>
@@ -2311,7 +2312,7 @@
             <a:fld id="{B1972600-64F6-4C1F-838C-01314CB42182}" type="datetime1">
               <a:rPr lang="en-US" smtClean="0"/>
               <a:pPr/>
-              <a:t>8/8/2014</a:t>
+              <a:t>8/10/14</a:t>
             </a:fld>
             <a:endParaRPr lang="en-US"/>
           </a:p>
@@ -2585,7 +2586,7 @@
             <a:fld id="{EAB60A1F-67E6-47A6-8991-02AEC54F3211}" type="datetime1">
               <a:rPr lang="en-US" smtClean="0"/>
               <a:pPr/>
-              <a:t>8/8/2014</a:t>
+              <a:t>8/10/14</a:t>
             </a:fld>
             <a:endParaRPr lang="en-US"/>
           </a:p>
@@ -2835,7 +2836,7 @@
             <a:fld id="{78DCC502-29AC-46C3-8325-CE3B184A6144}" type="datetime1">
               <a:rPr lang="en-US" smtClean="0"/>
               <a:pPr/>
-              <a:t>8/8/2014</a:t>
+              <a:t>8/10/14</a:t>
             </a:fld>
             <a:endParaRPr lang="en-US"/>
           </a:p>
@@ -3045,7 +3046,7 @@
             <a:fld id="{3DFC592B-B14E-40A5-81F6-981F0BC4FA39}" type="datetime1">
               <a:rPr lang="en-US" smtClean="0"/>
               <a:pPr/>
-              <a:t>8/8/2014</a:t>
+              <a:t>8/10/14</a:t>
             </a:fld>
             <a:endParaRPr lang="en-US"/>
           </a:p>
@@ -3463,7 +3464,7 @@
         <p:spPr>
           <a:xfrm>
             <a:off x="457200" y="1088740"/>
-            <a:ext cx="8229600" cy="1152128"/>
+            <a:ext cx="8229600" cy="1368152"/>
           </a:xfrm>
         </p:spPr>
         <p:txBody>
@@ -3484,24 +3485,28 @@
               <a:t>The evaluation file format (*.</a:t>
             </a:r>
             <a:r>
+              <a:rPr lang="en-US" dirty="0" err="1"/>
+              <a:t>c</a:t>
+            </a:r>
+            <a:r>
               <a:rPr lang="en-US" dirty="0" err="1" smtClean="0"/>
-              <a:t>emdf</a:t>
+              <a:t>bf</a:t>
             </a:r>
             <a:r>
               <a:rPr lang="en-US" dirty="0" smtClean="0"/>
-              <a:t>) </a:t>
+              <a:t>) is character-based, but the evaluator considers tokens.</a:t>
+            </a:r>
+            <a:endParaRPr lang="en-US" dirty="0"/>
+          </a:p>
+          <a:p>
+            <a:pPr lvl="1"/>
+            <a:r>
+              <a:rPr lang="en-US" dirty="0"/>
+              <a:t>A token file is an intermediate file to be used in </a:t>
             </a:r>
             <a:r>
               <a:rPr lang="en-US" dirty="0" smtClean="0"/>
-              <a:t>is character-based, but the evaluator considers tokens</a:t>
-            </a:r>
-            <a:endParaRPr lang="en-US" dirty="0"/>
-          </a:p>
-          <a:p>
-            <a:pPr lvl="1"/>
-            <a:r>
-              <a:rPr lang="en-US" dirty="0"/>
-              <a:t>A token file is an intermediate file to be used in evaluation</a:t>
+              <a:t>evaluation, but it is not known by the participants, mismatches can happen between the tokens being used.</a:t>
             </a:r>
           </a:p>
         </p:txBody>
@@ -3964,8 +3969,8 @@
           </p:nvSpPr>
           <p:spPr>
             <a:xfrm>
-              <a:off x="5823085" y="2522722"/>
-              <a:ext cx="1130438" cy="307777"/>
+              <a:off x="5873217" y="2522722"/>
+              <a:ext cx="1030175" cy="307777"/>
             </a:xfrm>
             <a:prstGeom prst="rect">
               <a:avLst/>
@@ -3981,7 +3986,7 @@
               <a:pPr algn="ctr"/>
               <a:r>
                 <a:rPr lang="en-US" sz="1400" i="1" dirty="0" err="1" smtClean="0"/>
-                <a:t>sample.emdf</a:t>
+                <a:t>Sample.cbf</a:t>
               </a:r>
               <a:endParaRPr lang="en-US" sz="1400" i="1" dirty="0"/>
             </a:p>
@@ -4239,8 +4244,8 @@
           </p:nvSpPr>
           <p:spPr>
             <a:xfrm>
-              <a:off x="4629521" y="5241441"/>
-              <a:ext cx="1778885" cy="307777"/>
+              <a:off x="4689864" y="5241441"/>
+              <a:ext cx="1658201" cy="307777"/>
             </a:xfrm>
             <a:prstGeom prst="rect">
               <a:avLst/>
@@ -4256,7 +4261,15 @@
               <a:pPr algn="ctr"/>
               <a:r>
                 <a:rPr lang="en-US" sz="1400" i="1" dirty="0" smtClean="0"/>
-                <a:t>sample-system1.emdf</a:t>
+                <a:t>sample-system1.</a:t>
+              </a:r>
+              <a:r>
+                <a:rPr lang="en-US" sz="1400" i="1" dirty="0"/>
+                <a:t>c</a:t>
+              </a:r>
+              <a:r>
+                <a:rPr lang="en-US" sz="1400" i="1" dirty="0" smtClean="0"/>
+                <a:t>bf</a:t>
               </a:r>
               <a:endParaRPr lang="en-US" sz="1400" i="1" dirty="0"/>
             </a:p>
@@ -5155,7 +5168,7 @@
         <p:spPr>
           <a:xfrm>
             <a:off x="457200" y="1088740"/>
-            <a:ext cx="8229600" cy="936104"/>
+            <a:ext cx="8229600" cy="1368152"/>
           </a:xfrm>
         </p:spPr>
         <p:txBody>
@@ -5185,7 +5198,7 @@
             </a:r>
             <a:r>
               <a:rPr lang="en-US" altLang="ja-JP" dirty="0" err="1" smtClean="0"/>
-              <a:t>emdf</a:t>
+              <a:t>tbf</a:t>
             </a:r>
             <a:r>
               <a:rPr lang="en-US" altLang="ja-JP" dirty="0" smtClean="0"/>
@@ -5208,7 +5221,7 @@
             <a:pPr lvl="1"/>
             <a:r>
               <a:rPr lang="en-US" dirty="0" smtClean="0"/>
-              <a:t>The gold standard and systems have the same tokenization as ground truth</a:t>
+              <a:t>The tokenization file used by annotators will be released to the participants, gold standard and systems will report annotations use the same tokenization.</a:t>
             </a:r>
             <a:endParaRPr lang="en-US" dirty="0"/>
           </a:p>
@@ -5878,8 +5891,8 @@
         </p:nvSpPr>
         <p:spPr>
           <a:xfrm>
-            <a:off x="5823085" y="2522722"/>
-            <a:ext cx="1130438" cy="307777"/>
+            <a:off x="5880492" y="2522722"/>
+            <a:ext cx="1015623" cy="307777"/>
           </a:xfrm>
           <a:prstGeom prst="rect">
             <a:avLst/>
@@ -5895,7 +5908,7 @@
             <a:pPr algn="ctr"/>
             <a:r>
               <a:rPr lang="en-US" sz="1400" i="1" dirty="0" err="1" smtClean="0"/>
-              <a:t>sample.emdf</a:t>
+              <a:t>Sample.tbf</a:t>
             </a:r>
             <a:endParaRPr lang="en-US" sz="1400" i="1" dirty="0"/>
           </a:p>
@@ -6153,8 +6166,8 @@
         </p:nvSpPr>
         <p:spPr>
           <a:xfrm>
-            <a:off x="4629521" y="5241441"/>
-            <a:ext cx="1778885" cy="307777"/>
+            <a:off x="4689864" y="5241441"/>
+            <a:ext cx="1658201" cy="307777"/>
           </a:xfrm>
           <a:prstGeom prst="rect">
             <a:avLst/>
@@ -6170,7 +6183,7 @@
             <a:pPr algn="ctr"/>
             <a:r>
               <a:rPr lang="en-US" sz="1400" i="1" dirty="0" smtClean="0"/>
-              <a:t>sample-system1.emdf</a:t>
+              <a:t>sample-system1.tbf</a:t>
             </a:r>
             <a:endParaRPr lang="en-US" sz="1400" i="1" dirty="0"/>
           </a:p>
@@ -6410,7 +6423,12 @@
             <p:ph type="sldNum" sz="quarter" idx="12"/>
           </p:nvPr>
         </p:nvSpPr>
-        <p:spPr/>
+        <p:spPr>
+          <a:xfrm>
+            <a:off x="7740352" y="5841268"/>
+            <a:ext cx="2133600" cy="365125"/>
+          </a:xfrm>
+        </p:spPr>
         <p:txBody>
           <a:bodyPr/>
           <a:lstStyle/>
@@ -7085,6 +7103,415 @@
     <p:extLst>
       <p:ext uri="{BB962C8B-B14F-4D97-AF65-F5344CB8AC3E}">
         <p14:creationId xmlns:p14="http://schemas.microsoft.com/office/powerpoint/2010/main" val="1961293978"/>
+      </p:ext>
+    </p:extLst>
+  </p:cSld>
+  <p:clrMapOvr>
+    <a:masterClrMapping/>
+  </p:clrMapOvr>
+</p:sld>
+</file>
+
+<file path=ppt/slides/slide4.xml><?xml version="1.0" encoding="utf-8"?>
+<p:sld xmlns:a="http://schemas.openxmlformats.org/drawingml/2006/main" xmlns:r="http://schemas.openxmlformats.org/officeDocument/2006/relationships" xmlns:p="http://schemas.openxmlformats.org/presentationml/2006/main">
+  <p:cSld>
+    <p:spTree>
+      <p:nvGrpSpPr>
+        <p:cNvPr id="1" name=""/>
+        <p:cNvGrpSpPr/>
+        <p:nvPr/>
+      </p:nvGrpSpPr>
+      <p:grpSpPr>
+        <a:xfrm>
+          <a:off x="0" y="0"/>
+          <a:ext cx="0" cy="0"/>
+          <a:chOff x="0" y="0"/>
+          <a:chExt cx="0" cy="0"/>
+        </a:xfrm>
+      </p:grpSpPr>
+      <p:sp>
+        <p:nvSpPr>
+          <p:cNvPr id="2" name="Title 1"/>
+          <p:cNvSpPr>
+            <a:spLocks noGrp="1"/>
+          </p:cNvSpPr>
+          <p:nvPr>
+            <p:ph type="title"/>
+          </p:nvPr>
+        </p:nvSpPr>
+        <p:spPr/>
+        <p:txBody>
+          <a:bodyPr/>
+          <a:lstStyle/>
+          <a:p>
+            <a:r>
+              <a:rPr lang="en-US" dirty="0" smtClean="0"/>
+              <a:t>Simplified token file (*.</a:t>
+            </a:r>
+            <a:r>
+              <a:rPr lang="en-US" dirty="0" err="1" smtClean="0"/>
+              <a:t>tkn</a:t>
+            </a:r>
+            <a:r>
+              <a:rPr lang="en-US" dirty="0" smtClean="0"/>
+              <a:t>)</a:t>
+            </a:r>
+            <a:endParaRPr lang="en-US" dirty="0"/>
+          </a:p>
+        </p:txBody>
+      </p:sp>
+      <p:sp>
+        <p:nvSpPr>
+          <p:cNvPr id="3" name="Content Placeholder 2"/>
+          <p:cNvSpPr>
+            <a:spLocks noGrp="1"/>
+          </p:cNvSpPr>
+          <p:nvPr>
+            <p:ph idx="1"/>
+          </p:nvPr>
+        </p:nvSpPr>
+        <p:spPr>
+          <a:xfrm>
+            <a:off x="457200" y="1484784"/>
+            <a:ext cx="8229600" cy="1368152"/>
+          </a:xfrm>
+        </p:spPr>
+        <p:txBody>
+          <a:bodyPr>
+            <a:normAutofit fontScale="92500" lnSpcReduction="20000"/>
+          </a:bodyPr>
+          <a:lstStyle/>
+          <a:p>
+            <a:r>
+              <a:rPr lang="en-US" dirty="0" smtClean="0"/>
+              <a:t>line := &lt;token id&gt; &lt;token string&gt; &lt;begin&gt; &lt;end&gt;</a:t>
+            </a:r>
+          </a:p>
+          <a:p>
+            <a:pPr lvl="1"/>
+            <a:r>
+              <a:rPr lang="en-US" dirty="0" smtClean="0"/>
+              <a:t>E.g</a:t>
+            </a:r>
+            <a:r>
+              <a:rPr lang="en-US" dirty="0"/>
+              <a:t>., should we be talking to someone about this</a:t>
+            </a:r>
+            <a:r>
+              <a:rPr lang="en-US" dirty="0" smtClean="0"/>
+              <a:t>?</a:t>
+            </a:r>
+          </a:p>
+          <a:p>
+            <a:pPr lvl="1"/>
+            <a:r>
+              <a:rPr lang="en-US" dirty="0" smtClean="0"/>
+              <a:t>Text of the tokens are not necessary.</a:t>
+            </a:r>
+          </a:p>
+        </p:txBody>
+      </p:sp>
+      <p:sp>
+        <p:nvSpPr>
+          <p:cNvPr id="4" name="Slide Number Placeholder 3"/>
+          <p:cNvSpPr>
+            <a:spLocks noGrp="1"/>
+          </p:cNvSpPr>
+          <p:nvPr>
+            <p:ph type="sldNum" sz="quarter" idx="12"/>
+          </p:nvPr>
+        </p:nvSpPr>
+        <p:spPr/>
+        <p:txBody>
+          <a:bodyPr/>
+          <a:lstStyle/>
+          <a:p>
+            <a:fld id="{B6F15528-21DE-4FAA-801E-634DDDAF4B2B}" type="slidenum">
+              <a:rPr lang="en-US" smtClean="0"/>
+              <a:pPr/>
+              <a:t>4</a:t>
+            </a:fld>
+            <a:endParaRPr lang="en-US"/>
+          </a:p>
+        </p:txBody>
+      </p:sp>
+      <p:sp>
+        <p:nvSpPr>
+          <p:cNvPr id="5" name="Rectangle 4"/>
+          <p:cNvSpPr/>
+          <p:nvPr/>
+        </p:nvSpPr>
+        <p:spPr>
+          <a:xfrm>
+            <a:off x="1799692" y="3068960"/>
+            <a:ext cx="3276364" cy="2556284"/>
+          </a:xfrm>
+          <a:prstGeom prst="rect">
+            <a:avLst/>
+          </a:prstGeom>
+          <a:noFill/>
+          <a:ln w="9525">
+            <a:solidFill>
+              <a:schemeClr val="tx1"/>
+            </a:solidFill>
+          </a:ln>
+        </p:spPr>
+        <p:style>
+          <a:lnRef idx="2">
+            <a:schemeClr val="accent1">
+              <a:shade val="50000"/>
+            </a:schemeClr>
+          </a:lnRef>
+          <a:fillRef idx="1">
+            <a:schemeClr val="accent1"/>
+          </a:fillRef>
+          <a:effectRef idx="0">
+            <a:schemeClr val="accent1"/>
+          </a:effectRef>
+          <a:fontRef idx="minor">
+            <a:schemeClr val="lt1"/>
+          </a:fontRef>
+        </p:style>
+        <p:txBody>
+          <a:bodyPr rtlCol="0" anchor="t" anchorCtr="0"/>
+          <a:lstStyle/>
+          <a:p>
+            <a:r>
+              <a:rPr lang="en-US" dirty="0">
+                <a:solidFill>
+                  <a:schemeClr val="tx1"/>
+                </a:solidFill>
+              </a:rPr>
+              <a:t>1 </a:t>
+            </a:r>
+            <a:r>
+              <a:rPr lang="en-US" dirty="0" smtClean="0">
+                <a:solidFill>
+                  <a:schemeClr val="tx1"/>
+                </a:solidFill>
+              </a:rPr>
+              <a:t>0 </a:t>
+            </a:r>
+            <a:r>
+              <a:rPr lang="en-US" dirty="0">
+                <a:solidFill>
+                  <a:schemeClr val="tx1"/>
+                </a:solidFill>
+              </a:rPr>
+              <a:t>6</a:t>
+            </a:r>
+          </a:p>
+          <a:p>
+            <a:r>
+              <a:rPr lang="en-US" dirty="0">
+                <a:solidFill>
+                  <a:schemeClr val="tx1"/>
+                </a:solidFill>
+              </a:rPr>
+              <a:t>2 </a:t>
+            </a:r>
+            <a:r>
+              <a:rPr lang="en-US" dirty="0" smtClean="0">
+                <a:solidFill>
+                  <a:schemeClr val="tx1"/>
+                </a:solidFill>
+              </a:rPr>
+              <a:t>7 </a:t>
+            </a:r>
+            <a:r>
+              <a:rPr lang="en-US" dirty="0">
+                <a:solidFill>
+                  <a:schemeClr val="tx1"/>
+                </a:solidFill>
+              </a:rPr>
+              <a:t>9</a:t>
+            </a:r>
+          </a:p>
+          <a:p>
+            <a:r>
+              <a:rPr lang="en-US" dirty="0">
+                <a:solidFill>
+                  <a:schemeClr val="tx1"/>
+                </a:solidFill>
+              </a:rPr>
+              <a:t>3 </a:t>
+            </a:r>
+            <a:r>
+              <a:rPr lang="en-US" dirty="0" smtClean="0">
+                <a:solidFill>
+                  <a:schemeClr val="tx1"/>
+                </a:solidFill>
+              </a:rPr>
+              <a:t>10 </a:t>
+            </a:r>
+            <a:r>
+              <a:rPr lang="en-US" dirty="0">
+                <a:solidFill>
+                  <a:schemeClr val="tx1"/>
+                </a:solidFill>
+              </a:rPr>
+              <a:t>12</a:t>
+            </a:r>
+          </a:p>
+          <a:p>
+            <a:r>
+              <a:rPr lang="en-US" dirty="0">
+                <a:solidFill>
+                  <a:schemeClr val="tx1"/>
+                </a:solidFill>
+              </a:rPr>
+              <a:t>4 </a:t>
+            </a:r>
+            <a:r>
+              <a:rPr lang="en-US" dirty="0" smtClean="0">
+                <a:solidFill>
+                  <a:schemeClr val="tx1"/>
+                </a:solidFill>
+              </a:rPr>
+              <a:t>13 </a:t>
+            </a:r>
+            <a:r>
+              <a:rPr lang="en-US" dirty="0">
+                <a:solidFill>
+                  <a:schemeClr val="tx1"/>
+                </a:solidFill>
+              </a:rPr>
+              <a:t>20</a:t>
+            </a:r>
+          </a:p>
+          <a:p>
+            <a:r>
+              <a:rPr lang="en-US" dirty="0">
+                <a:solidFill>
+                  <a:schemeClr val="tx1"/>
+                </a:solidFill>
+              </a:rPr>
+              <a:t>5 </a:t>
+            </a:r>
+            <a:r>
+              <a:rPr lang="en-US" dirty="0" smtClean="0">
+                <a:solidFill>
+                  <a:schemeClr val="tx1"/>
+                </a:solidFill>
+              </a:rPr>
+              <a:t>21 </a:t>
+            </a:r>
+            <a:r>
+              <a:rPr lang="en-US" dirty="0">
+                <a:solidFill>
+                  <a:schemeClr val="tx1"/>
+                </a:solidFill>
+              </a:rPr>
+              <a:t>23</a:t>
+            </a:r>
+          </a:p>
+          <a:p>
+            <a:r>
+              <a:rPr lang="en-US" dirty="0">
+                <a:solidFill>
+                  <a:schemeClr val="tx1"/>
+                </a:solidFill>
+              </a:rPr>
+              <a:t>6 </a:t>
+            </a:r>
+            <a:r>
+              <a:rPr lang="en-US" dirty="0" smtClean="0">
+                <a:solidFill>
+                  <a:schemeClr val="tx1"/>
+                </a:solidFill>
+              </a:rPr>
+              <a:t>24 </a:t>
+            </a:r>
+            <a:r>
+              <a:rPr lang="en-US" dirty="0">
+                <a:solidFill>
+                  <a:schemeClr val="tx1"/>
+                </a:solidFill>
+              </a:rPr>
+              <a:t>31</a:t>
+            </a:r>
+          </a:p>
+          <a:p>
+            <a:r>
+              <a:rPr lang="en-US" dirty="0">
+                <a:solidFill>
+                  <a:schemeClr val="tx1"/>
+                </a:solidFill>
+              </a:rPr>
+              <a:t>7 </a:t>
+            </a:r>
+            <a:r>
+              <a:rPr lang="en-US" dirty="0" smtClean="0">
+                <a:solidFill>
+                  <a:schemeClr val="tx1"/>
+                </a:solidFill>
+              </a:rPr>
+              <a:t>32 </a:t>
+            </a:r>
+            <a:r>
+              <a:rPr lang="en-US" dirty="0">
+                <a:solidFill>
+                  <a:schemeClr val="tx1"/>
+                </a:solidFill>
+              </a:rPr>
+              <a:t>37</a:t>
+            </a:r>
+          </a:p>
+          <a:p>
+            <a:r>
+              <a:rPr lang="en-US" dirty="0">
+                <a:solidFill>
+                  <a:schemeClr val="tx1"/>
+                </a:solidFill>
+              </a:rPr>
+              <a:t>8 </a:t>
+            </a:r>
+            <a:r>
+              <a:rPr lang="en-US" dirty="0" smtClean="0">
+                <a:solidFill>
+                  <a:schemeClr val="tx1"/>
+                </a:solidFill>
+              </a:rPr>
+              <a:t>38 </a:t>
+            </a:r>
+            <a:r>
+              <a:rPr lang="en-US" dirty="0">
+                <a:solidFill>
+                  <a:schemeClr val="tx1"/>
+                </a:solidFill>
+              </a:rPr>
+              <a:t>42</a:t>
+            </a:r>
+          </a:p>
+          <a:p>
+            <a:r>
+              <a:rPr lang="en-US" dirty="0">
+                <a:solidFill>
+                  <a:schemeClr val="tx1"/>
+                </a:solidFill>
+              </a:rPr>
+              <a:t>9 </a:t>
+            </a:r>
+            <a:r>
+              <a:rPr lang="en-US" dirty="0" smtClean="0">
+                <a:solidFill>
+                  <a:schemeClr val="tx1"/>
+                </a:solidFill>
+              </a:rPr>
+              <a:t>42 43</a:t>
+            </a:r>
+            <a:endParaRPr lang="en-US" dirty="0">
+              <a:solidFill>
+                <a:schemeClr val="tx1"/>
+              </a:solidFill>
+            </a:endParaRPr>
+          </a:p>
+        </p:txBody>
+      </p:sp>
+    </p:spTree>
+    <p:extLst>
+      <p:ext uri="{BB962C8B-B14F-4D97-AF65-F5344CB8AC3E}">
+        <p14:creationId xmlns:p14="http://schemas.microsoft.com/office/powerpoint/2010/main" val="3926713668"/>
       </p:ext>
     </p:extLst>
   </p:cSld>

</xml_diff>

<commit_message>
Updates on the workflow figure for pre-tokenization.
</commit_message>
<xml_diff>
--- a/doc/evm-eval-work-flow.pptx
+++ b/doc/evm-eval-work-flow.pptx
@@ -198,7 +198,7 @@
             <a:fld id="{1D635E4C-BAB0-4BAB-AAF7-4D9825D68060}" type="datetimeFigureOut">
               <a:rPr lang="en-US" smtClean="0"/>
               <a:pPr/>
-              <a:t>8/12/14</a:t>
+              <a:t>8/21/2014</a:t>
             </a:fld>
             <a:endParaRPr lang="en-US"/>
           </a:p>
@@ -649,7 +649,7 @@
             <a:fld id="{3B56066F-CE6C-4B27-993A-2842BDE8189B}" type="datetime1">
               <a:rPr lang="en-US" smtClean="0"/>
               <a:pPr/>
-              <a:t>8/12/14</a:t>
+              <a:t>8/21/2014</a:t>
             </a:fld>
             <a:endParaRPr lang="en-US"/>
           </a:p>
@@ -816,7 +816,7 @@
             <a:fld id="{61174E08-E9E9-4260-BC0A-45316FB7E636}" type="datetime1">
               <a:rPr lang="en-US" smtClean="0"/>
               <a:pPr/>
-              <a:t>8/12/14</a:t>
+              <a:t>8/21/2014</a:t>
             </a:fld>
             <a:endParaRPr lang="en-US"/>
           </a:p>
@@ -993,7 +993,7 @@
             <a:fld id="{64C675E3-4156-4610-8C23-B8FBCA8F0F60}" type="datetime1">
               <a:rPr lang="en-US" smtClean="0"/>
               <a:pPr/>
-              <a:t>8/12/14</a:t>
+              <a:t>8/21/2014</a:t>
             </a:fld>
             <a:endParaRPr lang="en-US"/>
           </a:p>
@@ -1160,7 +1160,7 @@
             <a:fld id="{119C4F61-BDF2-4F97-8BCC-87B3B636DDF2}" type="datetime1">
               <a:rPr lang="en-US" smtClean="0"/>
               <a:pPr/>
-              <a:t>8/12/14</a:t>
+              <a:t>8/21/2014</a:t>
             </a:fld>
             <a:endParaRPr lang="en-US"/>
           </a:p>
@@ -1403,7 +1403,7 @@
             <a:fld id="{02F0C2A0-F4E4-41A2-82A2-5525FFA2797A}" type="datetime1">
               <a:rPr lang="en-US" smtClean="0"/>
               <a:pPr/>
-              <a:t>8/12/14</a:t>
+              <a:t>8/21/2014</a:t>
             </a:fld>
             <a:endParaRPr lang="en-US"/>
           </a:p>
@@ -1688,7 +1688,7 @@
             <a:fld id="{19C68C49-B72E-4B6B-B516-758D46CA9D72}" type="datetime1">
               <a:rPr lang="en-US" smtClean="0"/>
               <a:pPr/>
-              <a:t>8/12/14</a:t>
+              <a:t>8/21/2014</a:t>
             </a:fld>
             <a:endParaRPr lang="en-US"/>
           </a:p>
@@ -2107,7 +2107,7 @@
             <a:fld id="{1AC33444-61AF-4C04-94BE-279981869E66}" type="datetime1">
               <a:rPr lang="en-US" smtClean="0"/>
               <a:pPr/>
-              <a:t>8/12/14</a:t>
+              <a:t>8/21/2014</a:t>
             </a:fld>
             <a:endParaRPr lang="en-US"/>
           </a:p>
@@ -2222,7 +2222,7 @@
             <a:fld id="{680EC325-BE6D-4D10-BEAB-D93726F5911A}" type="datetime1">
               <a:rPr lang="en-US" smtClean="0"/>
               <a:pPr/>
-              <a:t>8/12/14</a:t>
+              <a:t>8/21/2014</a:t>
             </a:fld>
             <a:endParaRPr lang="en-US"/>
           </a:p>
@@ -2314,7 +2314,7 @@
             <a:fld id="{B1972600-64F6-4C1F-838C-01314CB42182}" type="datetime1">
               <a:rPr lang="en-US" smtClean="0"/>
               <a:pPr/>
-              <a:t>8/12/14</a:t>
+              <a:t>8/21/2014</a:t>
             </a:fld>
             <a:endParaRPr lang="en-US"/>
           </a:p>
@@ -2588,7 +2588,7 @@
             <a:fld id="{EAB60A1F-67E6-47A6-8991-02AEC54F3211}" type="datetime1">
               <a:rPr lang="en-US" smtClean="0"/>
               <a:pPr/>
-              <a:t>8/12/14</a:t>
+              <a:t>8/21/2014</a:t>
             </a:fld>
             <a:endParaRPr lang="en-US"/>
           </a:p>
@@ -2838,7 +2838,7 @@
             <a:fld id="{78DCC502-29AC-46C3-8325-CE3B184A6144}" type="datetime1">
               <a:rPr lang="en-US" smtClean="0"/>
               <a:pPr/>
-              <a:t>8/12/14</a:t>
+              <a:t>8/21/2014</a:t>
             </a:fld>
             <a:endParaRPr lang="en-US"/>
           </a:p>
@@ -3048,7 +3048,7 @@
             <a:fld id="{3DFC592B-B14E-40A5-81F6-981F0BC4FA39}" type="datetime1">
               <a:rPr lang="en-US" smtClean="0"/>
               <a:pPr/>
-              <a:t>8/12/14</a:t>
+              <a:t>8/21/2014</a:t>
             </a:fld>
             <a:endParaRPr lang="en-US"/>
           </a:p>
@@ -3725,7 +3725,6 @@
                   <a:rPr lang="en-US" sz="1600" dirty="0" smtClean="0"/>
                   <a:t>Human</a:t>
                 </a:r>
-                <a:endParaRPr lang="en-US" sz="1600" dirty="0" smtClean="0"/>
               </a:p>
               <a:p>
                 <a:pPr algn="ctr"/>
@@ -4282,11 +4281,7 @@
                 <a:pPr algn="ctr"/>
                 <a:r>
                   <a:rPr lang="en-US" sz="1400" i="1" dirty="0" smtClean="0"/>
-                  <a:t>sample-system1</a:t>
-                </a:r>
-                <a:r>
-                  <a:rPr lang="en-US" sz="1400" i="1" dirty="0" smtClean="0"/>
-                  <a:t>.</a:t>
+                  <a:t>sample-system1.</a:t>
                 </a:r>
                 <a:r>
                   <a:rPr lang="en-US" sz="1400" i="1" dirty="0"/>
@@ -5140,15 +5135,7 @@
             <a:p>
               <a:r>
                 <a:rPr lang="en-US" dirty="0" smtClean="0"/>
-                <a:t>Human extraction</a:t>
-              </a:r>
-              <a:r>
-                <a:rPr lang="en-US" dirty="0" smtClean="0"/>
-                <a:t> system</a:t>
-              </a:r>
-              <a:r>
-                <a:rPr lang="en-US" dirty="0" smtClean="0"/>
-                <a:t> </a:t>
+                <a:t>Human extraction system </a:t>
               </a:r>
               <a:endParaRPr lang="en-US" dirty="0"/>
             </a:p>
@@ -5250,7 +5237,6 @@
               <a:rPr lang="en-US" dirty="0"/>
               <a:t>Work flow (2): pre-tokenization</a:t>
             </a:r>
-            <a:endParaRPr lang="en-US" dirty="0"/>
           </a:p>
         </p:txBody>
       </p:sp>
@@ -5319,1688 +5305,6 @@
           </a:p>
         </p:txBody>
       </p:sp>
-      <p:grpSp>
-        <p:nvGrpSpPr>
-          <p:cNvPr id="88" name="Group 87"/>
-          <p:cNvGrpSpPr/>
-          <p:nvPr/>
-        </p:nvGrpSpPr>
-        <p:grpSpPr>
-          <a:xfrm>
-            <a:off x="18030" y="2384884"/>
-            <a:ext cx="9090474" cy="4473116"/>
-            <a:chOff x="18030" y="2384884"/>
-            <a:chExt cx="9090474" cy="4473116"/>
-          </a:xfrm>
-        </p:grpSpPr>
-        <p:grpSp>
-          <p:nvGrpSpPr>
-            <p:cNvPr id="9" name="Group 8"/>
-            <p:cNvGrpSpPr/>
-            <p:nvPr/>
-          </p:nvGrpSpPr>
-          <p:grpSpPr>
-            <a:xfrm>
-              <a:off x="18030" y="2672916"/>
-              <a:ext cx="9090474" cy="4185084"/>
-              <a:chOff x="-74738" y="2433642"/>
-              <a:chExt cx="9090474" cy="4185084"/>
-            </a:xfrm>
-          </p:grpSpPr>
-          <p:sp>
-            <p:nvSpPr>
-              <p:cNvPr id="4" name="Smiley Face 3"/>
-              <p:cNvSpPr/>
-              <p:nvPr/>
-            </p:nvSpPr>
-            <p:spPr>
-              <a:xfrm>
-                <a:off x="1220898" y="2505650"/>
-                <a:ext cx="381000" cy="381000"/>
-              </a:xfrm>
-              <a:prstGeom prst="smileyFace">
-                <a:avLst/>
-              </a:prstGeom>
-              <a:noFill/>
-              <a:ln>
-                <a:solidFill>
-                  <a:schemeClr val="tx1"/>
-                </a:solidFill>
-              </a:ln>
-            </p:spPr>
-            <p:style>
-              <a:lnRef idx="2">
-                <a:schemeClr val="accent1">
-                  <a:shade val="50000"/>
-                </a:schemeClr>
-              </a:lnRef>
-              <a:fillRef idx="1">
-                <a:schemeClr val="accent1"/>
-              </a:fillRef>
-              <a:effectRef idx="0">
-                <a:schemeClr val="accent1"/>
-              </a:effectRef>
-              <a:fontRef idx="minor">
-                <a:schemeClr val="lt1"/>
-              </a:fontRef>
-            </p:style>
-            <p:txBody>
-              <a:bodyPr rtlCol="0" anchor="ctr"/>
-              <a:lstStyle/>
-              <a:p>
-                <a:pPr algn="ctr"/>
-                <a:endParaRPr lang="en-US" dirty="0"/>
-              </a:p>
-            </p:txBody>
-          </p:sp>
-          <p:sp>
-            <p:nvSpPr>
-              <p:cNvPr id="5" name="TextBox 4"/>
-              <p:cNvSpPr txBox="1"/>
-              <p:nvPr/>
-            </p:nvSpPr>
-            <p:spPr>
-              <a:xfrm>
-                <a:off x="32766" y="2433642"/>
-                <a:ext cx="1152127" cy="584775"/>
-              </a:xfrm>
-              <a:prstGeom prst="rect">
-                <a:avLst/>
-              </a:prstGeom>
-              <a:noFill/>
-            </p:spPr>
-            <p:txBody>
-              <a:bodyPr wrap="square" rtlCol="0">
-                <a:spAutoFit/>
-              </a:bodyPr>
-              <a:lstStyle/>
-              <a:p>
-                <a:pPr algn="ctr"/>
-                <a:r>
-                  <a:rPr lang="en-US" sz="1600" dirty="0" smtClean="0"/>
-                  <a:t>Human annotators</a:t>
-                </a:r>
-                <a:endParaRPr lang="en-US" sz="1600" dirty="0"/>
-              </a:p>
-            </p:txBody>
-          </p:sp>
-          <p:sp>
-            <p:nvSpPr>
-              <p:cNvPr id="6" name="Flowchart: Document 5"/>
-              <p:cNvSpPr/>
-              <p:nvPr/>
-            </p:nvSpPr>
-            <p:spPr>
-              <a:xfrm>
-                <a:off x="2817132" y="2813034"/>
-                <a:ext cx="762000" cy="468868"/>
-              </a:xfrm>
-              <a:prstGeom prst="flowChartDocument">
-                <a:avLst/>
-              </a:prstGeom>
-              <a:solidFill>
-                <a:schemeClr val="accent3">
-                  <a:lumMod val="40000"/>
-                  <a:lumOff val="60000"/>
-                </a:schemeClr>
-              </a:solidFill>
-              <a:ln>
-                <a:solidFill>
-                  <a:schemeClr val="tx1"/>
-                </a:solidFill>
-              </a:ln>
-            </p:spPr>
-            <p:style>
-              <a:lnRef idx="2">
-                <a:schemeClr val="accent1">
-                  <a:shade val="50000"/>
-                </a:schemeClr>
-              </a:lnRef>
-              <a:fillRef idx="1">
-                <a:schemeClr val="accent1"/>
-              </a:fillRef>
-              <a:effectRef idx="0">
-                <a:schemeClr val="accent1"/>
-              </a:effectRef>
-              <a:fontRef idx="minor">
-                <a:schemeClr val="lt1"/>
-              </a:fontRef>
-            </p:style>
-            <p:txBody>
-              <a:bodyPr rtlCol="0" anchor="ctr"/>
-              <a:lstStyle/>
-              <a:p>
-                <a:pPr algn="ctr"/>
-                <a:endParaRPr lang="en-US" dirty="0"/>
-              </a:p>
-            </p:txBody>
-          </p:sp>
-          <p:sp>
-            <p:nvSpPr>
-              <p:cNvPr id="8" name="TextBox 7"/>
-              <p:cNvSpPr txBox="1"/>
-              <p:nvPr/>
-            </p:nvSpPr>
-            <p:spPr>
-              <a:xfrm>
-                <a:off x="2524384" y="3280260"/>
-                <a:ext cx="1488508" cy="584776"/>
-              </a:xfrm>
-              <a:prstGeom prst="rect">
-                <a:avLst/>
-              </a:prstGeom>
-              <a:noFill/>
-            </p:spPr>
-            <p:txBody>
-              <a:bodyPr wrap="none" rtlCol="0">
-                <a:spAutoFit/>
-              </a:bodyPr>
-              <a:lstStyle/>
-              <a:p>
-                <a:pPr algn="ctr"/>
-                <a:r>
-                  <a:rPr lang="en-US" sz="1600" dirty="0" smtClean="0"/>
-                  <a:t>Human</a:t>
-                </a:r>
-                <a:endParaRPr lang="en-US" sz="1600" dirty="0" smtClean="0"/>
-              </a:p>
-              <a:p>
-                <a:pPr algn="ctr"/>
-                <a:r>
-                  <a:rPr lang="en-US" sz="1600" dirty="0"/>
-                  <a:t>a</a:t>
-                </a:r>
-                <a:r>
-                  <a:rPr lang="en-US" sz="1600" dirty="0" smtClean="0"/>
-                  <a:t>nnotation files</a:t>
-                </a:r>
-                <a:endParaRPr lang="en-US" sz="1600" dirty="0"/>
-              </a:p>
-            </p:txBody>
-          </p:sp>
-          <p:cxnSp>
-            <p:nvCxnSpPr>
-              <p:cNvPr id="10" name="Straight Arrow Connector 9"/>
-              <p:cNvCxnSpPr>
-                <a:stCxn id="4" idx="6"/>
-                <a:endCxn id="53" idx="1"/>
-              </p:cNvCxnSpPr>
-              <p:nvPr/>
-            </p:nvCxnSpPr>
-            <p:spPr>
-              <a:xfrm>
-                <a:off x="1601898" y="2696150"/>
-                <a:ext cx="177034" cy="351448"/>
-              </a:xfrm>
-              <a:prstGeom prst="straightConnector1">
-                <a:avLst/>
-              </a:prstGeom>
-              <a:ln w="12700">
-                <a:solidFill>
-                  <a:schemeClr val="tx1"/>
-                </a:solidFill>
-                <a:tailEnd type="triangle"/>
-              </a:ln>
-            </p:spPr>
-            <p:style>
-              <a:lnRef idx="1">
-                <a:schemeClr val="accent1"/>
-              </a:lnRef>
-              <a:fillRef idx="0">
-                <a:schemeClr val="accent1"/>
-              </a:fillRef>
-              <a:effectRef idx="0">
-                <a:schemeClr val="accent1"/>
-              </a:effectRef>
-              <a:fontRef idx="minor">
-                <a:schemeClr val="tx1"/>
-              </a:fontRef>
-            </p:style>
-          </p:cxnSp>
-          <p:cxnSp>
-            <p:nvCxnSpPr>
-              <p:cNvPr id="12" name="Straight Arrow Connector 11"/>
-              <p:cNvCxnSpPr>
-                <a:stCxn id="53" idx="3"/>
-                <a:endCxn id="6" idx="1"/>
-              </p:cNvCxnSpPr>
-              <p:nvPr/>
-            </p:nvCxnSpPr>
-            <p:spPr>
-              <a:xfrm flipV="1">
-                <a:off x="2486933" y="3047468"/>
-                <a:ext cx="330199" cy="130"/>
-              </a:xfrm>
-              <a:prstGeom prst="straightConnector1">
-                <a:avLst/>
-              </a:prstGeom>
-              <a:ln w="12700">
-                <a:solidFill>
-                  <a:schemeClr val="tx1"/>
-                </a:solidFill>
-                <a:tailEnd type="triangle"/>
-              </a:ln>
-            </p:spPr>
-            <p:style>
-              <a:lnRef idx="1">
-                <a:schemeClr val="accent1"/>
-              </a:lnRef>
-              <a:fillRef idx="0">
-                <a:schemeClr val="accent1"/>
-              </a:fillRef>
-              <a:effectRef idx="0">
-                <a:schemeClr val="accent1"/>
-              </a:effectRef>
-              <a:fontRef idx="minor">
-                <a:schemeClr val="tx1"/>
-              </a:fontRef>
-            </p:style>
-          </p:cxnSp>
-          <p:sp>
-            <p:nvSpPr>
-              <p:cNvPr id="20" name="TextBox 19"/>
-              <p:cNvSpPr txBox="1"/>
-              <p:nvPr/>
-            </p:nvSpPr>
-            <p:spPr>
-              <a:xfrm>
-                <a:off x="-74738" y="4617223"/>
-                <a:ext cx="907749" cy="338554"/>
-              </a:xfrm>
-              <a:prstGeom prst="rect">
-                <a:avLst/>
-              </a:prstGeom>
-              <a:noFill/>
-            </p:spPr>
-            <p:txBody>
-              <a:bodyPr wrap="none" rtlCol="0">
-                <a:spAutoFit/>
-              </a:bodyPr>
-              <a:lstStyle/>
-              <a:p>
-                <a:pPr algn="ctr"/>
-                <a:r>
-                  <a:rPr lang="en-US" sz="1600" dirty="0" smtClean="0"/>
-                  <a:t>Text files</a:t>
-                </a:r>
-                <a:endParaRPr lang="en-US" sz="1600" dirty="0"/>
-              </a:p>
-            </p:txBody>
-          </p:sp>
-          <p:sp>
-            <p:nvSpPr>
-              <p:cNvPr id="21" name="TextBox 20"/>
-              <p:cNvSpPr txBox="1"/>
-              <p:nvPr/>
-            </p:nvSpPr>
-            <p:spPr>
-              <a:xfrm>
-                <a:off x="176782" y="3873802"/>
-                <a:ext cx="952120" cy="307777"/>
-              </a:xfrm>
-              <a:prstGeom prst="rect">
-                <a:avLst/>
-              </a:prstGeom>
-              <a:noFill/>
-            </p:spPr>
-            <p:txBody>
-              <a:bodyPr wrap="none" rtlCol="0">
-                <a:spAutoFit/>
-              </a:bodyPr>
-              <a:lstStyle/>
-              <a:p>
-                <a:pPr algn="ctr"/>
-                <a:r>
-                  <a:rPr lang="en-US" sz="1400" i="1" dirty="0" smtClean="0"/>
-                  <a:t>sample.txt</a:t>
-                </a:r>
-                <a:endParaRPr lang="en-US" sz="1400" i="1" dirty="0"/>
-              </a:p>
-            </p:txBody>
-          </p:sp>
-          <p:sp>
-            <p:nvSpPr>
-              <p:cNvPr id="23" name="Flowchart: Document 22"/>
-              <p:cNvSpPr/>
-              <p:nvPr/>
-            </p:nvSpPr>
-            <p:spPr>
-              <a:xfrm>
-                <a:off x="213294" y="4185175"/>
-                <a:ext cx="762000" cy="468868"/>
-              </a:xfrm>
-              <a:prstGeom prst="flowChartDocument">
-                <a:avLst/>
-              </a:prstGeom>
-              <a:solidFill>
-                <a:schemeClr val="bg1">
-                  <a:lumMod val="75000"/>
-                </a:schemeClr>
-              </a:solidFill>
-              <a:ln>
-                <a:solidFill>
-                  <a:schemeClr val="tx1"/>
-                </a:solidFill>
-              </a:ln>
-            </p:spPr>
-            <p:style>
-              <a:lnRef idx="2">
-                <a:schemeClr val="accent1">
-                  <a:shade val="50000"/>
-                </a:schemeClr>
-              </a:lnRef>
-              <a:fillRef idx="1">
-                <a:schemeClr val="accent1"/>
-              </a:fillRef>
-              <a:effectRef idx="0">
-                <a:schemeClr val="accent1"/>
-              </a:effectRef>
-              <a:fontRef idx="minor">
-                <a:schemeClr val="lt1"/>
-              </a:fontRef>
-            </p:style>
-            <p:txBody>
-              <a:bodyPr rtlCol="0" anchor="ctr"/>
-              <a:lstStyle/>
-              <a:p>
-                <a:pPr algn="ctr"/>
-                <a:endParaRPr lang="en-US" dirty="0"/>
-              </a:p>
-            </p:txBody>
-          </p:sp>
-          <p:sp>
-            <p:nvSpPr>
-              <p:cNvPr id="41" name="Flowchart: Document 40"/>
-              <p:cNvSpPr/>
-              <p:nvPr/>
-            </p:nvSpPr>
-            <p:spPr>
-              <a:xfrm>
-                <a:off x="5931008" y="2813164"/>
-                <a:ext cx="762000" cy="468868"/>
-              </a:xfrm>
-              <a:prstGeom prst="flowChartDocument">
-                <a:avLst/>
-              </a:prstGeom>
-              <a:solidFill>
-                <a:schemeClr val="accent3">
-                  <a:lumMod val="40000"/>
-                  <a:lumOff val="60000"/>
-                </a:schemeClr>
-              </a:solidFill>
-              <a:ln>
-                <a:solidFill>
-                  <a:schemeClr val="tx1"/>
-                </a:solidFill>
-              </a:ln>
-            </p:spPr>
-            <p:style>
-              <a:lnRef idx="2">
-                <a:schemeClr val="accent1">
-                  <a:shade val="50000"/>
-                </a:schemeClr>
-              </a:lnRef>
-              <a:fillRef idx="1">
-                <a:schemeClr val="accent1"/>
-              </a:fillRef>
-              <a:effectRef idx="0">
-                <a:schemeClr val="accent1"/>
-              </a:effectRef>
-              <a:fontRef idx="minor">
-                <a:schemeClr val="lt1"/>
-              </a:fontRef>
-            </p:style>
-            <p:txBody>
-              <a:bodyPr rtlCol="0" anchor="ctr"/>
-              <a:lstStyle/>
-              <a:p>
-                <a:pPr algn="ctr"/>
-                <a:endParaRPr lang="en-US" dirty="0"/>
-              </a:p>
-            </p:txBody>
-          </p:sp>
-          <p:sp>
-            <p:nvSpPr>
-              <p:cNvPr id="42" name="TextBox 41"/>
-              <p:cNvSpPr txBox="1"/>
-              <p:nvPr/>
-            </p:nvSpPr>
-            <p:spPr>
-              <a:xfrm>
-                <a:off x="5895646" y="2528991"/>
-                <a:ext cx="1015623" cy="307777"/>
-              </a:xfrm>
-              <a:prstGeom prst="rect">
-                <a:avLst/>
-              </a:prstGeom>
-              <a:noFill/>
-            </p:spPr>
-            <p:txBody>
-              <a:bodyPr wrap="none" rtlCol="0">
-                <a:spAutoFit/>
-              </a:bodyPr>
-              <a:lstStyle/>
-              <a:p>
-                <a:pPr algn="ctr"/>
-                <a:r>
-                  <a:rPr lang="en-US" sz="1400" i="1" dirty="0" err="1" smtClean="0"/>
-                  <a:t>Sample.tbf</a:t>
-                </a:r>
-                <a:endParaRPr lang="en-US" sz="1400" i="1" dirty="0"/>
-              </a:p>
-            </p:txBody>
-          </p:sp>
-          <p:cxnSp>
-            <p:nvCxnSpPr>
-              <p:cNvPr id="43" name="Straight Arrow Connector 42"/>
-              <p:cNvCxnSpPr>
-                <a:stCxn id="6" idx="3"/>
-                <a:endCxn id="72" idx="1"/>
-              </p:cNvCxnSpPr>
-              <p:nvPr/>
-            </p:nvCxnSpPr>
-            <p:spPr>
-              <a:xfrm flipV="1">
-                <a:off x="3579132" y="3046785"/>
-                <a:ext cx="288032" cy="683"/>
-              </a:xfrm>
-              <a:prstGeom prst="straightConnector1">
-                <a:avLst/>
-              </a:prstGeom>
-              <a:ln w="12700">
-                <a:solidFill>
-                  <a:schemeClr val="tx1"/>
-                </a:solidFill>
-                <a:tailEnd type="triangle"/>
-              </a:ln>
-            </p:spPr>
-            <p:style>
-              <a:lnRef idx="1">
-                <a:schemeClr val="accent1"/>
-              </a:lnRef>
-              <a:fillRef idx="0">
-                <a:schemeClr val="accent1"/>
-              </a:fillRef>
-              <a:effectRef idx="0">
-                <a:schemeClr val="accent1"/>
-              </a:effectRef>
-              <a:fontRef idx="minor">
-                <a:schemeClr val="tx1"/>
-              </a:fontRef>
-            </p:style>
-          </p:cxnSp>
-          <p:sp>
-            <p:nvSpPr>
-              <p:cNvPr id="48" name="TextBox 47"/>
-              <p:cNvSpPr txBox="1"/>
-              <p:nvPr/>
-            </p:nvSpPr>
-            <p:spPr>
-              <a:xfrm>
-                <a:off x="5487344" y="3261734"/>
-                <a:ext cx="1788824" cy="584775"/>
-              </a:xfrm>
-              <a:prstGeom prst="rect">
-                <a:avLst/>
-              </a:prstGeom>
-              <a:noFill/>
-            </p:spPr>
-            <p:txBody>
-              <a:bodyPr wrap="none" rtlCol="0">
-                <a:spAutoFit/>
-              </a:bodyPr>
-              <a:lstStyle/>
-              <a:p>
-                <a:pPr algn="ctr"/>
-                <a:r>
-                  <a:rPr lang="en-US" sz="1600" dirty="0" smtClean="0"/>
-                  <a:t>Gold standard</a:t>
-                </a:r>
-              </a:p>
-              <a:p>
-                <a:pPr algn="ctr"/>
-                <a:r>
-                  <a:rPr lang="en-US" sz="1600" dirty="0" smtClean="0"/>
-                  <a:t>event mention files</a:t>
-                </a:r>
-                <a:endParaRPr lang="en-US" sz="1600" dirty="0"/>
-              </a:p>
-            </p:txBody>
-          </p:sp>
-          <p:cxnSp>
-            <p:nvCxnSpPr>
-              <p:cNvPr id="49" name="Straight Arrow Connector 48"/>
-              <p:cNvCxnSpPr>
-                <a:stCxn id="72" idx="3"/>
-                <a:endCxn id="41" idx="1"/>
-              </p:cNvCxnSpPr>
-              <p:nvPr/>
-            </p:nvCxnSpPr>
-            <p:spPr>
-              <a:xfrm>
-                <a:off x="5093301" y="3046785"/>
-                <a:ext cx="837707" cy="813"/>
-              </a:xfrm>
-              <a:prstGeom prst="straightConnector1">
-                <a:avLst/>
-              </a:prstGeom>
-              <a:ln w="12700">
-                <a:solidFill>
-                  <a:schemeClr val="tx1"/>
-                </a:solidFill>
-                <a:tailEnd type="triangle"/>
-              </a:ln>
-            </p:spPr>
-            <p:style>
-              <a:lnRef idx="1">
-                <a:schemeClr val="accent1"/>
-              </a:lnRef>
-              <a:fillRef idx="0">
-                <a:schemeClr val="accent1"/>
-              </a:fillRef>
-              <a:effectRef idx="0">
-                <a:schemeClr val="accent1"/>
-              </a:effectRef>
-              <a:fontRef idx="minor">
-                <a:schemeClr val="tx1"/>
-              </a:fontRef>
-            </p:style>
-          </p:cxnSp>
-          <p:sp>
-            <p:nvSpPr>
-              <p:cNvPr id="54" name="Flowchart: Document 53"/>
-              <p:cNvSpPr/>
-              <p:nvPr/>
-            </p:nvSpPr>
-            <p:spPr>
-              <a:xfrm>
-                <a:off x="6009430" y="5517323"/>
-                <a:ext cx="762000" cy="468868"/>
-              </a:xfrm>
-              <a:prstGeom prst="flowChartDocument">
-                <a:avLst/>
-              </a:prstGeom>
-              <a:solidFill>
-                <a:schemeClr val="accent4">
-                  <a:lumMod val="40000"/>
-                  <a:lumOff val="60000"/>
-                </a:schemeClr>
-              </a:solidFill>
-              <a:ln>
-                <a:solidFill>
-                  <a:schemeClr val="tx1"/>
-                </a:solidFill>
-              </a:ln>
-            </p:spPr>
-            <p:style>
-              <a:lnRef idx="2">
-                <a:schemeClr val="accent1">
-                  <a:shade val="50000"/>
-                </a:schemeClr>
-              </a:lnRef>
-              <a:fillRef idx="1">
-                <a:schemeClr val="accent1"/>
-              </a:fillRef>
-              <a:effectRef idx="0">
-                <a:schemeClr val="accent1"/>
-              </a:effectRef>
-              <a:fontRef idx="minor">
-                <a:schemeClr val="lt1"/>
-              </a:fontRef>
-            </p:style>
-            <p:txBody>
-              <a:bodyPr rtlCol="0" anchor="ctr"/>
-              <a:lstStyle/>
-              <a:p>
-                <a:pPr algn="ctr"/>
-                <a:endParaRPr lang="en-US" dirty="0"/>
-              </a:p>
-            </p:txBody>
-          </p:sp>
-          <p:sp>
-            <p:nvSpPr>
-              <p:cNvPr id="58" name="TextBox 57"/>
-              <p:cNvSpPr txBox="1"/>
-              <p:nvPr/>
-            </p:nvSpPr>
-            <p:spPr>
-              <a:xfrm>
-                <a:off x="5667364" y="6033951"/>
-                <a:ext cx="1294522" cy="584775"/>
-              </a:xfrm>
-              <a:prstGeom prst="rect">
-                <a:avLst/>
-              </a:prstGeom>
-              <a:noFill/>
-            </p:spPr>
-            <p:txBody>
-              <a:bodyPr wrap="none" rtlCol="0">
-                <a:spAutoFit/>
-              </a:bodyPr>
-              <a:lstStyle/>
-              <a:p>
-                <a:pPr algn="ctr"/>
-                <a:r>
-                  <a:rPr lang="en-US" sz="1600" dirty="0" smtClean="0"/>
-                  <a:t>System event</a:t>
-                </a:r>
-              </a:p>
-              <a:p>
-                <a:pPr algn="ctr"/>
-                <a:r>
-                  <a:rPr lang="en-US" sz="1600" dirty="0" smtClean="0"/>
-                  <a:t>mention files</a:t>
-                </a:r>
-                <a:endParaRPr lang="en-US" sz="1600" dirty="0"/>
-              </a:p>
-            </p:txBody>
-          </p:sp>
-          <p:cxnSp>
-            <p:nvCxnSpPr>
-              <p:cNvPr id="59" name="Straight Arrow Connector 58"/>
-              <p:cNvCxnSpPr>
-                <a:stCxn id="55" idx="3"/>
-                <a:endCxn id="54" idx="1"/>
-              </p:cNvCxnSpPr>
-              <p:nvPr/>
-            </p:nvCxnSpPr>
-            <p:spPr>
-              <a:xfrm>
-                <a:off x="5415336" y="5749263"/>
-                <a:ext cx="594094" cy="2494"/>
-              </a:xfrm>
-              <a:prstGeom prst="straightConnector1">
-                <a:avLst/>
-              </a:prstGeom>
-              <a:ln w="12700">
-                <a:solidFill>
-                  <a:schemeClr val="tx1"/>
-                </a:solidFill>
-                <a:tailEnd type="triangle"/>
-              </a:ln>
-            </p:spPr>
-            <p:style>
-              <a:lnRef idx="1">
-                <a:schemeClr val="accent1"/>
-              </a:lnRef>
-              <a:fillRef idx="0">
-                <a:schemeClr val="accent1"/>
-              </a:fillRef>
-              <a:effectRef idx="0">
-                <a:schemeClr val="accent1"/>
-              </a:effectRef>
-              <a:fontRef idx="minor">
-                <a:schemeClr val="tx1"/>
-              </a:fontRef>
-            </p:style>
-          </p:cxnSp>
-          <p:sp>
-            <p:nvSpPr>
-              <p:cNvPr id="63" name="TextBox 62"/>
-              <p:cNvSpPr txBox="1"/>
-              <p:nvPr/>
-            </p:nvSpPr>
-            <p:spPr>
-              <a:xfrm>
-                <a:off x="5577382" y="5193287"/>
-                <a:ext cx="1658201" cy="307777"/>
-              </a:xfrm>
-              <a:prstGeom prst="rect">
-                <a:avLst/>
-              </a:prstGeom>
-              <a:noFill/>
-            </p:spPr>
-            <p:txBody>
-              <a:bodyPr wrap="none" rtlCol="0">
-                <a:spAutoFit/>
-              </a:bodyPr>
-              <a:lstStyle/>
-              <a:p>
-                <a:pPr algn="ctr"/>
-                <a:r>
-                  <a:rPr lang="en-US" sz="1400" i="1" dirty="0" smtClean="0"/>
-                  <a:t>sample-system1</a:t>
-                </a:r>
-                <a:r>
-                  <a:rPr lang="en-US" sz="1400" i="1" dirty="0" smtClean="0"/>
-                  <a:t>.</a:t>
-                </a:r>
-                <a:r>
-                  <a:rPr lang="en-US" sz="1400" i="1" dirty="0"/>
-                  <a:t>t</a:t>
-                </a:r>
-                <a:r>
-                  <a:rPr lang="en-US" sz="1400" i="1" dirty="0" smtClean="0"/>
-                  <a:t>bf</a:t>
-                </a:r>
-                <a:endParaRPr lang="en-US" sz="1400" i="1" dirty="0"/>
-              </a:p>
-            </p:txBody>
-          </p:sp>
-          <p:sp>
-            <p:nvSpPr>
-              <p:cNvPr id="72" name="Rounded Rectangle 71"/>
-              <p:cNvSpPr/>
-              <p:nvPr/>
-            </p:nvSpPr>
-            <p:spPr>
-              <a:xfrm>
-                <a:off x="3867164" y="2793682"/>
-                <a:ext cx="1226137" cy="506206"/>
-              </a:xfrm>
-              <a:prstGeom prst="roundRect">
-                <a:avLst/>
-              </a:prstGeom>
-              <a:noFill/>
-              <a:ln>
-                <a:solidFill>
-                  <a:schemeClr val="tx1"/>
-                </a:solidFill>
-              </a:ln>
-            </p:spPr>
-            <p:style>
-              <a:lnRef idx="2">
-                <a:schemeClr val="accent1">
-                  <a:shade val="50000"/>
-                </a:schemeClr>
-              </a:lnRef>
-              <a:fillRef idx="1">
-                <a:schemeClr val="accent1"/>
-              </a:fillRef>
-              <a:effectRef idx="0">
-                <a:schemeClr val="accent1"/>
-              </a:effectRef>
-              <a:fontRef idx="minor">
-                <a:schemeClr val="lt1"/>
-              </a:fontRef>
-            </p:style>
-            <p:txBody>
-              <a:bodyPr rtlCol="0" anchor="ctr"/>
-              <a:lstStyle/>
-              <a:p>
-                <a:pPr algn="ctr"/>
-                <a:r>
-                  <a:rPr lang="en-US" dirty="0" smtClean="0">
-                    <a:solidFill>
-                      <a:schemeClr val="tx1"/>
-                    </a:solidFill>
-                  </a:rPr>
-                  <a:t>Converter</a:t>
-                </a:r>
-                <a:endParaRPr lang="en-US" dirty="0">
-                  <a:solidFill>
-                    <a:schemeClr val="tx1"/>
-                  </a:solidFill>
-                </a:endParaRPr>
-              </a:p>
-            </p:txBody>
-          </p:sp>
-          <p:cxnSp>
-            <p:nvCxnSpPr>
-              <p:cNvPr id="111" name="Elbow Connector 110"/>
-              <p:cNvCxnSpPr>
-                <a:stCxn id="41" idx="3"/>
-                <a:endCxn id="39" idx="0"/>
-              </p:cNvCxnSpPr>
-              <p:nvPr/>
-            </p:nvCxnSpPr>
-            <p:spPr>
-              <a:xfrm>
-                <a:off x="6693008" y="3047598"/>
-                <a:ext cx="488033" cy="1101573"/>
-              </a:xfrm>
-              <a:prstGeom prst="bentConnector2">
-                <a:avLst/>
-              </a:prstGeom>
-              <a:ln w="12700">
-                <a:solidFill>
-                  <a:schemeClr val="tx1"/>
-                </a:solidFill>
-                <a:tailEnd type="triangle"/>
-              </a:ln>
-            </p:spPr>
-            <p:style>
-              <a:lnRef idx="1">
-                <a:schemeClr val="accent1"/>
-              </a:lnRef>
-              <a:fillRef idx="0">
-                <a:schemeClr val="accent1"/>
-              </a:fillRef>
-              <a:effectRef idx="0">
-                <a:schemeClr val="accent1"/>
-              </a:effectRef>
-              <a:fontRef idx="minor">
-                <a:schemeClr val="tx1"/>
-              </a:fontRef>
-            </p:style>
-          </p:cxnSp>
-          <p:sp>
-            <p:nvSpPr>
-              <p:cNvPr id="47" name="TextBox 46"/>
-              <p:cNvSpPr txBox="1"/>
-              <p:nvPr/>
-            </p:nvSpPr>
-            <p:spPr>
-              <a:xfrm>
-                <a:off x="2679032" y="2541654"/>
-                <a:ext cx="1034257" cy="307777"/>
-              </a:xfrm>
-              <a:prstGeom prst="rect">
-                <a:avLst/>
-              </a:prstGeom>
-              <a:noFill/>
-            </p:spPr>
-            <p:txBody>
-              <a:bodyPr wrap="none" rtlCol="0">
-                <a:spAutoFit/>
-              </a:bodyPr>
-              <a:lstStyle/>
-              <a:p>
-                <a:pPr algn="ctr"/>
-                <a:r>
-                  <a:rPr lang="en-US" sz="1400" i="1" dirty="0" err="1" smtClean="0"/>
-                  <a:t>sample.ann</a:t>
-                </a:r>
-                <a:endParaRPr lang="en-US" sz="1400" i="1" dirty="0"/>
-              </a:p>
-            </p:txBody>
-          </p:sp>
-          <p:cxnSp>
-            <p:nvCxnSpPr>
-              <p:cNvPr id="50" name="Elbow Connector 49"/>
-              <p:cNvCxnSpPr>
-                <a:stCxn id="23" idx="2"/>
-                <a:endCxn id="55" idx="1"/>
-              </p:cNvCxnSpPr>
-              <p:nvPr/>
-            </p:nvCxnSpPr>
-            <p:spPr>
-              <a:xfrm rot="16200000" flipH="1">
-                <a:off x="317471" y="4899869"/>
-                <a:ext cx="1126217" cy="572570"/>
-              </a:xfrm>
-              <a:prstGeom prst="bentConnector2">
-                <a:avLst/>
-              </a:prstGeom>
-              <a:ln w="12700">
-                <a:solidFill>
-                  <a:schemeClr val="tx1"/>
-                </a:solidFill>
-                <a:tailEnd type="triangle"/>
-              </a:ln>
-            </p:spPr>
-            <p:style>
-              <a:lnRef idx="1">
-                <a:schemeClr val="accent1"/>
-              </a:lnRef>
-              <a:fillRef idx="0">
-                <a:schemeClr val="accent1"/>
-              </a:fillRef>
-              <a:effectRef idx="0">
-                <a:schemeClr val="accent1"/>
-              </a:effectRef>
-              <a:fontRef idx="minor">
-                <a:schemeClr val="tx1"/>
-              </a:fontRef>
-            </p:style>
-          </p:cxnSp>
-          <p:sp>
-            <p:nvSpPr>
-              <p:cNvPr id="55" name="Rounded Rectangle 54"/>
-              <p:cNvSpPr/>
-              <p:nvPr/>
-            </p:nvSpPr>
-            <p:spPr>
-              <a:xfrm>
-                <a:off x="1166864" y="5457978"/>
-                <a:ext cx="4248472" cy="582569"/>
-              </a:xfrm>
-              <a:prstGeom prst="roundRect">
-                <a:avLst/>
-              </a:prstGeom>
-              <a:solidFill>
-                <a:schemeClr val="accent4">
-                  <a:lumMod val="40000"/>
-                  <a:lumOff val="60000"/>
-                </a:schemeClr>
-              </a:solidFill>
-              <a:ln>
-                <a:solidFill>
-                  <a:schemeClr val="tx1"/>
-                </a:solidFill>
-              </a:ln>
-            </p:spPr>
-            <p:style>
-              <a:lnRef idx="2">
-                <a:schemeClr val="accent1">
-                  <a:shade val="50000"/>
-                </a:schemeClr>
-              </a:lnRef>
-              <a:fillRef idx="1">
-                <a:schemeClr val="accent1"/>
-              </a:fillRef>
-              <a:effectRef idx="0">
-                <a:schemeClr val="accent1"/>
-              </a:effectRef>
-              <a:fontRef idx="minor">
-                <a:schemeClr val="lt1"/>
-              </a:fontRef>
-            </p:style>
-            <p:txBody>
-              <a:bodyPr rtlCol="0" anchor="ctr"/>
-              <a:lstStyle/>
-              <a:p>
-                <a:pPr algn="ctr"/>
-                <a:r>
-                  <a:rPr lang="en-US" dirty="0">
-                    <a:solidFill>
-                      <a:schemeClr val="tx1"/>
-                    </a:solidFill>
-                  </a:rPr>
-                  <a:t>Event extraction system</a:t>
-                </a:r>
-              </a:p>
-            </p:txBody>
-          </p:sp>
-          <p:cxnSp>
-            <p:nvCxnSpPr>
-              <p:cNvPr id="64" name="Elbow Connector 63"/>
-              <p:cNvCxnSpPr>
-                <a:stCxn id="54" idx="3"/>
-                <a:endCxn id="39" idx="2"/>
-              </p:cNvCxnSpPr>
-              <p:nvPr/>
-            </p:nvCxnSpPr>
-            <p:spPr>
-              <a:xfrm flipV="1">
-                <a:off x="6771430" y="4655377"/>
-                <a:ext cx="409611" cy="1096380"/>
-              </a:xfrm>
-              <a:prstGeom prst="bentConnector2">
-                <a:avLst/>
-              </a:prstGeom>
-              <a:ln w="12700">
-                <a:solidFill>
-                  <a:schemeClr val="tx1"/>
-                </a:solidFill>
-                <a:tailEnd type="triangle"/>
-              </a:ln>
-            </p:spPr>
-            <p:style>
-              <a:lnRef idx="1">
-                <a:schemeClr val="accent1"/>
-              </a:lnRef>
-              <a:fillRef idx="0">
-                <a:schemeClr val="accent1"/>
-              </a:fillRef>
-              <a:effectRef idx="0">
-                <a:schemeClr val="accent1"/>
-              </a:effectRef>
-              <a:fontRef idx="minor">
-                <a:schemeClr val="tx1"/>
-              </a:fontRef>
-            </p:style>
-          </p:cxnSp>
-          <p:sp>
-            <p:nvSpPr>
-              <p:cNvPr id="35" name="Flowchart: Document 34"/>
-              <p:cNvSpPr/>
-              <p:nvPr/>
-            </p:nvSpPr>
-            <p:spPr>
-              <a:xfrm>
-                <a:off x="2922170" y="4197838"/>
-                <a:ext cx="762000" cy="468868"/>
-              </a:xfrm>
-              <a:prstGeom prst="flowChartDocument">
-                <a:avLst/>
-              </a:prstGeom>
-              <a:solidFill>
-                <a:schemeClr val="accent3">
-                  <a:lumMod val="40000"/>
-                  <a:lumOff val="60000"/>
-                </a:schemeClr>
-              </a:solidFill>
-              <a:ln>
-                <a:solidFill>
-                  <a:schemeClr val="tx1"/>
-                </a:solidFill>
-              </a:ln>
-            </p:spPr>
-            <p:style>
-              <a:lnRef idx="2">
-                <a:schemeClr val="accent1">
-                  <a:shade val="50000"/>
-                </a:schemeClr>
-              </a:lnRef>
-              <a:fillRef idx="1">
-                <a:schemeClr val="accent1"/>
-              </a:fillRef>
-              <a:effectRef idx="0">
-                <a:schemeClr val="accent1"/>
-              </a:effectRef>
-              <a:fontRef idx="minor">
-                <a:schemeClr val="lt1"/>
-              </a:fontRef>
-            </p:style>
-            <p:txBody>
-              <a:bodyPr rtlCol="0" anchor="ctr"/>
-              <a:lstStyle/>
-              <a:p>
-                <a:pPr algn="ctr"/>
-                <a:endParaRPr lang="en-US" dirty="0"/>
-              </a:p>
-            </p:txBody>
-          </p:sp>
-          <p:cxnSp>
-            <p:nvCxnSpPr>
-              <p:cNvPr id="36" name="Straight Arrow Connector 35"/>
-              <p:cNvCxnSpPr>
-                <a:stCxn id="38" idx="3"/>
-                <a:endCxn id="35" idx="1"/>
-              </p:cNvCxnSpPr>
-              <p:nvPr/>
-            </p:nvCxnSpPr>
-            <p:spPr>
-              <a:xfrm>
-                <a:off x="2625053" y="4429542"/>
-                <a:ext cx="297117" cy="2730"/>
-              </a:xfrm>
-              <a:prstGeom prst="straightConnector1">
-                <a:avLst/>
-              </a:prstGeom>
-              <a:ln w="12700">
-                <a:solidFill>
-                  <a:schemeClr val="tx1"/>
-                </a:solidFill>
-                <a:tailEnd type="triangle"/>
-              </a:ln>
-            </p:spPr>
-            <p:style>
-              <a:lnRef idx="1">
-                <a:schemeClr val="accent1"/>
-              </a:lnRef>
-              <a:fillRef idx="0">
-                <a:schemeClr val="accent1"/>
-              </a:fillRef>
-              <a:effectRef idx="0">
-                <a:schemeClr val="accent1"/>
-              </a:effectRef>
-              <a:fontRef idx="minor">
-                <a:schemeClr val="tx1"/>
-              </a:fontRef>
-            </p:style>
-          </p:cxnSp>
-          <p:cxnSp>
-            <p:nvCxnSpPr>
-              <p:cNvPr id="37" name="Straight Arrow Connector 36"/>
-              <p:cNvCxnSpPr>
-                <a:stCxn id="23" idx="3"/>
-                <a:endCxn id="38" idx="1"/>
-              </p:cNvCxnSpPr>
-              <p:nvPr/>
-            </p:nvCxnSpPr>
-            <p:spPr>
-              <a:xfrm>
-                <a:off x="975294" y="4419609"/>
-                <a:ext cx="497632" cy="9933"/>
-              </a:xfrm>
-              <a:prstGeom prst="straightConnector1">
-                <a:avLst/>
-              </a:prstGeom>
-              <a:ln w="12700">
-                <a:solidFill>
-                  <a:schemeClr val="tx1"/>
-                </a:solidFill>
-                <a:tailEnd type="triangle"/>
-              </a:ln>
-            </p:spPr>
-            <p:style>
-              <a:lnRef idx="1">
-                <a:schemeClr val="accent1"/>
-              </a:lnRef>
-              <a:fillRef idx="0">
-                <a:schemeClr val="accent1"/>
-              </a:fillRef>
-              <a:effectRef idx="0">
-                <a:schemeClr val="accent1"/>
-              </a:effectRef>
-              <a:fontRef idx="minor">
-                <a:schemeClr val="tx1"/>
-              </a:fontRef>
-            </p:style>
-          </p:cxnSp>
-          <p:sp>
-            <p:nvSpPr>
-              <p:cNvPr id="38" name="Rounded Rectangle 37"/>
-              <p:cNvSpPr/>
-              <p:nvPr/>
-            </p:nvSpPr>
-            <p:spPr>
-              <a:xfrm>
-                <a:off x="1472926" y="4125830"/>
-                <a:ext cx="1152127" cy="607423"/>
-              </a:xfrm>
-              <a:prstGeom prst="roundRect">
-                <a:avLst/>
-              </a:prstGeom>
-              <a:solidFill>
-                <a:schemeClr val="accent3">
-                  <a:lumMod val="40000"/>
-                  <a:lumOff val="60000"/>
-                </a:schemeClr>
-              </a:solidFill>
-              <a:ln>
-                <a:solidFill>
-                  <a:schemeClr val="tx1"/>
-                </a:solidFill>
-              </a:ln>
-            </p:spPr>
-            <p:style>
-              <a:lnRef idx="2">
-                <a:schemeClr val="accent1">
-                  <a:shade val="50000"/>
-                </a:schemeClr>
-              </a:lnRef>
-              <a:fillRef idx="1">
-                <a:schemeClr val="accent1"/>
-              </a:fillRef>
-              <a:effectRef idx="0">
-                <a:schemeClr val="accent1"/>
-              </a:effectRef>
-              <a:fontRef idx="minor">
-                <a:schemeClr val="lt1"/>
-              </a:fontRef>
-            </p:style>
-            <p:txBody>
-              <a:bodyPr rtlCol="0" anchor="ctr"/>
-              <a:lstStyle/>
-              <a:p>
-                <a:pPr algn="ctr"/>
-                <a:r>
-                  <a:rPr lang="en-US" dirty="0" err="1" smtClean="0">
-                    <a:solidFill>
-                      <a:schemeClr val="tx1"/>
-                    </a:solidFill>
-                  </a:rPr>
-                  <a:t>tokenizer</a:t>
-                </a:r>
-                <a:endParaRPr lang="en-US" dirty="0">
-                  <a:solidFill>
-                    <a:schemeClr val="tx1"/>
-                  </a:solidFill>
-                </a:endParaRPr>
-              </a:p>
-            </p:txBody>
-          </p:sp>
-          <p:sp>
-            <p:nvSpPr>
-              <p:cNvPr id="39" name="Rounded Rectangle 38"/>
-              <p:cNvSpPr/>
-              <p:nvPr/>
-            </p:nvSpPr>
-            <p:spPr>
-              <a:xfrm>
-                <a:off x="6567972" y="4149171"/>
-                <a:ext cx="1226137" cy="506206"/>
-              </a:xfrm>
-              <a:prstGeom prst="roundRect">
-                <a:avLst/>
-              </a:prstGeom>
-              <a:noFill/>
-              <a:ln>
-                <a:solidFill>
-                  <a:schemeClr val="tx1"/>
-                </a:solidFill>
-              </a:ln>
-            </p:spPr>
-            <p:style>
-              <a:lnRef idx="2">
-                <a:schemeClr val="accent1">
-                  <a:shade val="50000"/>
-                </a:schemeClr>
-              </a:lnRef>
-              <a:fillRef idx="1">
-                <a:schemeClr val="accent1"/>
-              </a:fillRef>
-              <a:effectRef idx="0">
-                <a:schemeClr val="accent1"/>
-              </a:effectRef>
-              <a:fontRef idx="minor">
-                <a:schemeClr val="lt1"/>
-              </a:fontRef>
-            </p:style>
-            <p:txBody>
-              <a:bodyPr rtlCol="0" anchor="ctr"/>
-              <a:lstStyle/>
-              <a:p>
-                <a:pPr algn="ctr"/>
-                <a:r>
-                  <a:rPr lang="en-US" dirty="0">
-                    <a:solidFill>
-                      <a:schemeClr val="tx1"/>
-                    </a:solidFill>
-                  </a:rPr>
-                  <a:t>Evaluator</a:t>
-                </a:r>
-              </a:p>
-            </p:txBody>
-          </p:sp>
-          <p:sp>
-            <p:nvSpPr>
-              <p:cNvPr id="44" name="Flowchart: Process 43"/>
-              <p:cNvSpPr/>
-              <p:nvPr/>
-            </p:nvSpPr>
-            <p:spPr>
-              <a:xfrm>
-                <a:off x="8101835" y="4149171"/>
-                <a:ext cx="913901" cy="487537"/>
-              </a:xfrm>
-              <a:prstGeom prst="flowChartProcess">
-                <a:avLst/>
-              </a:prstGeom>
-              <a:noFill/>
-              <a:ln>
-                <a:solidFill>
-                  <a:schemeClr val="tx1"/>
-                </a:solidFill>
-              </a:ln>
-            </p:spPr>
-            <p:style>
-              <a:lnRef idx="2">
-                <a:schemeClr val="accent1">
-                  <a:shade val="50000"/>
-                </a:schemeClr>
-              </a:lnRef>
-              <a:fillRef idx="1">
-                <a:schemeClr val="accent1"/>
-              </a:fillRef>
-              <a:effectRef idx="0">
-                <a:schemeClr val="accent1"/>
-              </a:effectRef>
-              <a:fontRef idx="minor">
-                <a:schemeClr val="lt1"/>
-              </a:fontRef>
-            </p:style>
-            <p:txBody>
-              <a:bodyPr rtlCol="0" anchor="ctr"/>
-              <a:lstStyle/>
-              <a:p>
-                <a:pPr algn="ctr"/>
-                <a:r>
-                  <a:rPr lang="en-US" dirty="0" smtClean="0">
-                    <a:solidFill>
-                      <a:schemeClr val="tx1"/>
-                    </a:solidFill>
-                  </a:rPr>
-                  <a:t>Results</a:t>
-                </a:r>
-                <a:endParaRPr lang="en-US" dirty="0">
-                  <a:solidFill>
-                    <a:schemeClr val="tx1"/>
-                  </a:solidFill>
-                </a:endParaRPr>
-              </a:p>
-            </p:txBody>
-          </p:sp>
-          <p:cxnSp>
-            <p:nvCxnSpPr>
-              <p:cNvPr id="45" name="Straight Arrow Connector 44"/>
-              <p:cNvCxnSpPr>
-                <a:stCxn id="39" idx="3"/>
-                <a:endCxn id="44" idx="1"/>
-              </p:cNvCxnSpPr>
-              <p:nvPr/>
-            </p:nvCxnSpPr>
-            <p:spPr>
-              <a:xfrm flipV="1">
-                <a:off x="7794109" y="4392940"/>
-                <a:ext cx="307726" cy="9334"/>
-              </a:xfrm>
-              <a:prstGeom prst="straightConnector1">
-                <a:avLst/>
-              </a:prstGeom>
-              <a:ln w="12700">
-                <a:solidFill>
-                  <a:schemeClr val="tx1"/>
-                </a:solidFill>
-                <a:tailEnd type="triangle"/>
-              </a:ln>
-            </p:spPr>
-            <p:style>
-              <a:lnRef idx="1">
-                <a:schemeClr val="accent1"/>
-              </a:lnRef>
-              <a:fillRef idx="0">
-                <a:schemeClr val="accent1"/>
-              </a:fillRef>
-              <a:effectRef idx="0">
-                <a:schemeClr val="accent1"/>
-              </a:effectRef>
-              <a:fontRef idx="minor">
-                <a:schemeClr val="tx1"/>
-              </a:fontRef>
-            </p:style>
-          </p:cxnSp>
-          <p:sp>
-            <p:nvSpPr>
-              <p:cNvPr id="46" name="TextBox 45"/>
-              <p:cNvSpPr txBox="1"/>
-              <p:nvPr/>
-            </p:nvSpPr>
-            <p:spPr>
-              <a:xfrm>
-                <a:off x="2913085" y="3913311"/>
-                <a:ext cx="987130" cy="307777"/>
-              </a:xfrm>
-              <a:prstGeom prst="rect">
-                <a:avLst/>
-              </a:prstGeom>
-              <a:noFill/>
-            </p:spPr>
-            <p:txBody>
-              <a:bodyPr wrap="none" rtlCol="0">
-                <a:spAutoFit/>
-              </a:bodyPr>
-              <a:lstStyle/>
-              <a:p>
-                <a:pPr algn="ctr"/>
-                <a:r>
-                  <a:rPr lang="en-US" sz="1400" i="1" dirty="0" err="1" smtClean="0"/>
-                  <a:t>sample.tkn</a:t>
-                </a:r>
-                <a:endParaRPr lang="en-US" sz="1400" i="1" dirty="0"/>
-              </a:p>
-            </p:txBody>
-          </p:sp>
-          <p:sp>
-            <p:nvSpPr>
-              <p:cNvPr id="51" name="TextBox 50"/>
-              <p:cNvSpPr txBox="1"/>
-              <p:nvPr/>
-            </p:nvSpPr>
-            <p:spPr>
-              <a:xfrm>
-                <a:off x="2877081" y="4617132"/>
-                <a:ext cx="1055931" cy="338554"/>
-              </a:xfrm>
-              <a:prstGeom prst="rect">
-                <a:avLst/>
-              </a:prstGeom>
-              <a:noFill/>
-            </p:spPr>
-            <p:txBody>
-              <a:bodyPr wrap="none" rtlCol="0">
-                <a:spAutoFit/>
-              </a:bodyPr>
-              <a:lstStyle/>
-              <a:p>
-                <a:pPr algn="ctr"/>
-                <a:r>
-                  <a:rPr lang="en-US" sz="1600" dirty="0" smtClean="0"/>
-                  <a:t>Token files</a:t>
-                </a:r>
-                <a:endParaRPr lang="en-US" sz="1600" dirty="0"/>
-              </a:p>
-            </p:txBody>
-          </p:sp>
-          <p:sp>
-            <p:nvSpPr>
-              <p:cNvPr id="53" name="Rounded Rectangle 52"/>
-              <p:cNvSpPr/>
-              <p:nvPr/>
-            </p:nvSpPr>
-            <p:spPr>
-              <a:xfrm>
-                <a:off x="1778932" y="2794495"/>
-                <a:ext cx="708001" cy="506206"/>
-              </a:xfrm>
-              <a:prstGeom prst="roundRect">
-                <a:avLst/>
-              </a:prstGeom>
-              <a:noFill/>
-              <a:ln>
-                <a:solidFill>
-                  <a:schemeClr val="tx1"/>
-                </a:solidFill>
-              </a:ln>
-            </p:spPr>
-            <p:style>
-              <a:lnRef idx="2">
-                <a:schemeClr val="accent1">
-                  <a:shade val="50000"/>
-                </a:schemeClr>
-              </a:lnRef>
-              <a:fillRef idx="1">
-                <a:schemeClr val="accent1"/>
-              </a:fillRef>
-              <a:effectRef idx="0">
-                <a:schemeClr val="accent1"/>
-              </a:effectRef>
-              <a:fontRef idx="minor">
-                <a:schemeClr val="lt1"/>
-              </a:fontRef>
-            </p:style>
-            <p:txBody>
-              <a:bodyPr rtlCol="0" anchor="ctr"/>
-              <a:lstStyle/>
-              <a:p>
-                <a:pPr algn="ctr"/>
-                <a:r>
-                  <a:rPr lang="en-US" dirty="0" smtClean="0">
-                    <a:solidFill>
-                      <a:schemeClr val="tx1"/>
-                    </a:solidFill>
-                  </a:rPr>
-                  <a:t>brat</a:t>
-                </a:r>
-                <a:endParaRPr lang="en-US" dirty="0">
-                  <a:solidFill>
-                    <a:schemeClr val="tx1"/>
-                  </a:solidFill>
-                </a:endParaRPr>
-              </a:p>
-            </p:txBody>
-          </p:sp>
-        </p:grpSp>
-        <p:cxnSp>
-          <p:nvCxnSpPr>
-            <p:cNvPr id="123" name="Elbow Connector 122"/>
-            <p:cNvCxnSpPr>
-              <a:stCxn id="23" idx="0"/>
-              <a:endCxn id="53" idx="1"/>
-            </p:cNvCxnSpPr>
-            <p:nvPr/>
-          </p:nvCxnSpPr>
-          <p:spPr>
-            <a:xfrm rot="5400000" flipH="1" flipV="1">
-              <a:off x="710593" y="3263342"/>
-              <a:ext cx="1137577" cy="1184638"/>
-            </a:xfrm>
-            <a:prstGeom prst="bentConnector2">
-              <a:avLst/>
-            </a:prstGeom>
-            <a:ln w="12700">
-              <a:solidFill>
-                <a:schemeClr val="tx1"/>
-              </a:solidFill>
-              <a:tailEnd type="triangle"/>
-            </a:ln>
-          </p:spPr>
-          <p:style>
-            <a:lnRef idx="1">
-              <a:schemeClr val="accent1"/>
-            </a:lnRef>
-            <a:fillRef idx="0">
-              <a:schemeClr val="accent1"/>
-            </a:fillRef>
-            <a:effectRef idx="0">
-              <a:schemeClr val="accent1"/>
-            </a:effectRef>
-            <a:fontRef idx="minor">
-              <a:schemeClr val="tx1"/>
-            </a:fontRef>
-          </p:style>
-        </p:cxnSp>
-        <p:sp>
-          <p:nvSpPr>
-            <p:cNvPr id="68" name="Rounded Rectangle 67"/>
-            <p:cNvSpPr/>
-            <p:nvPr/>
-          </p:nvSpPr>
-          <p:spPr>
-            <a:xfrm>
-              <a:off x="1151620" y="2384884"/>
-              <a:ext cx="4356484" cy="1728192"/>
-            </a:xfrm>
-            <a:prstGeom prst="roundRect">
-              <a:avLst/>
-            </a:prstGeom>
-            <a:noFill/>
-            <a:ln>
-              <a:solidFill>
-                <a:schemeClr val="tx1"/>
-              </a:solidFill>
-            </a:ln>
-          </p:spPr>
-          <p:style>
-            <a:lnRef idx="2">
-              <a:schemeClr val="accent1">
-                <a:shade val="50000"/>
-              </a:schemeClr>
-            </a:lnRef>
-            <a:fillRef idx="1">
-              <a:schemeClr val="accent1"/>
-            </a:fillRef>
-            <a:effectRef idx="0">
-              <a:schemeClr val="accent1"/>
-            </a:effectRef>
-            <a:fontRef idx="minor">
-              <a:schemeClr val="lt1"/>
-            </a:fontRef>
-          </p:style>
-          <p:txBody>
-            <a:bodyPr rtlCol="0" anchor="ctr"/>
-            <a:lstStyle/>
-            <a:p>
-              <a:pPr algn="ctr"/>
-              <a:endParaRPr lang="en-US" dirty="0">
-                <a:solidFill>
-                  <a:schemeClr val="tx1"/>
-                </a:solidFill>
-              </a:endParaRPr>
-            </a:p>
-          </p:txBody>
-        </p:sp>
-        <p:sp>
-          <p:nvSpPr>
-            <p:cNvPr id="61" name="TextBox 60"/>
-            <p:cNvSpPr txBox="1"/>
-            <p:nvPr/>
-          </p:nvSpPr>
-          <p:spPr>
-            <a:xfrm>
-              <a:off x="2915816" y="2384884"/>
-              <a:ext cx="2584399" cy="369332"/>
-            </a:xfrm>
-            <a:prstGeom prst="rect">
-              <a:avLst/>
-            </a:prstGeom>
-            <a:noFill/>
-          </p:spPr>
-          <p:txBody>
-            <a:bodyPr wrap="none" rtlCol="0">
-              <a:spAutoFit/>
-            </a:bodyPr>
-            <a:lstStyle/>
-            <a:p>
-              <a:r>
-                <a:rPr lang="en-US" dirty="0" smtClean="0"/>
-                <a:t>Human extraction system </a:t>
-              </a:r>
-              <a:endParaRPr lang="en-US" dirty="0"/>
-            </a:p>
-          </p:txBody>
-        </p:sp>
-        <p:cxnSp>
-          <p:nvCxnSpPr>
-            <p:cNvPr id="76" name="Elbow Connector 75"/>
-            <p:cNvCxnSpPr>
-              <a:stCxn id="35" idx="3"/>
-            </p:cNvCxnSpPr>
-            <p:nvPr/>
-          </p:nvCxnSpPr>
-          <p:spPr>
-            <a:xfrm>
-              <a:off x="3776938" y="4671546"/>
-              <a:ext cx="795062" cy="1025706"/>
-            </a:xfrm>
-            <a:prstGeom prst="bentConnector2">
-              <a:avLst/>
-            </a:prstGeom>
-            <a:ln w="12700">
-              <a:solidFill>
-                <a:schemeClr val="tx1"/>
-              </a:solidFill>
-              <a:tailEnd type="triangle"/>
-            </a:ln>
-          </p:spPr>
-          <p:style>
-            <a:lnRef idx="1">
-              <a:schemeClr val="accent1"/>
-            </a:lnRef>
-            <a:fillRef idx="0">
-              <a:schemeClr val="accent1"/>
-            </a:fillRef>
-            <a:effectRef idx="0">
-              <a:schemeClr val="accent1"/>
-            </a:effectRef>
-            <a:fontRef idx="minor">
-              <a:schemeClr val="tx1"/>
-            </a:fontRef>
-          </p:style>
-        </p:cxnSp>
-        <p:cxnSp>
-          <p:nvCxnSpPr>
-            <p:cNvPr id="86" name="Elbow Connector 85"/>
-            <p:cNvCxnSpPr>
-              <a:stCxn id="35" idx="3"/>
-              <a:endCxn id="72" idx="2"/>
-            </p:cNvCxnSpPr>
-            <p:nvPr/>
-          </p:nvCxnSpPr>
-          <p:spPr>
-            <a:xfrm flipV="1">
-              <a:off x="3776938" y="3539162"/>
-              <a:ext cx="796063" cy="1132384"/>
-            </a:xfrm>
-            <a:prstGeom prst="bentConnector2">
-              <a:avLst/>
-            </a:prstGeom>
-            <a:ln w="12700">
-              <a:solidFill>
-                <a:schemeClr val="tx1"/>
-              </a:solidFill>
-              <a:tailEnd type="triangle"/>
-            </a:ln>
-          </p:spPr>
-          <p:style>
-            <a:lnRef idx="1">
-              <a:schemeClr val="accent1"/>
-            </a:lnRef>
-            <a:fillRef idx="0">
-              <a:schemeClr val="accent1"/>
-            </a:fillRef>
-            <a:effectRef idx="0">
-              <a:schemeClr val="accent1"/>
-            </a:effectRef>
-            <a:fontRef idx="minor">
-              <a:schemeClr val="tx1"/>
-            </a:fontRef>
-          </p:style>
-        </p:cxnSp>
-      </p:grpSp>
       <p:sp>
         <p:nvSpPr>
           <p:cNvPr id="177" name="Slide Number Placeholder 106"/>
@@ -7127,6 +5431,1708 @@
           </a:p>
         </p:txBody>
       </p:sp>
+      <p:grpSp>
+        <p:nvGrpSpPr>
+          <p:cNvPr id="32" name="Group 31"/>
+          <p:cNvGrpSpPr/>
+          <p:nvPr/>
+        </p:nvGrpSpPr>
+        <p:grpSpPr>
+          <a:xfrm>
+            <a:off x="85019" y="2348880"/>
+            <a:ext cx="8965278" cy="4509120"/>
+            <a:chOff x="85019" y="2348880"/>
+            <a:chExt cx="8965278" cy="4509120"/>
+          </a:xfrm>
+        </p:grpSpPr>
+        <p:sp>
+          <p:nvSpPr>
+            <p:cNvPr id="4" name="Smiley Face 3"/>
+            <p:cNvSpPr/>
+            <p:nvPr/>
+          </p:nvSpPr>
+          <p:spPr>
+            <a:xfrm>
+              <a:off x="1313666" y="2744924"/>
+              <a:ext cx="381000" cy="381000"/>
+            </a:xfrm>
+            <a:prstGeom prst="smileyFace">
+              <a:avLst/>
+            </a:prstGeom>
+            <a:noFill/>
+            <a:ln>
+              <a:solidFill>
+                <a:schemeClr val="tx1"/>
+              </a:solidFill>
+            </a:ln>
+          </p:spPr>
+          <p:style>
+            <a:lnRef idx="2">
+              <a:schemeClr val="accent1">
+                <a:shade val="50000"/>
+              </a:schemeClr>
+            </a:lnRef>
+            <a:fillRef idx="1">
+              <a:schemeClr val="accent1"/>
+            </a:fillRef>
+            <a:effectRef idx="0">
+              <a:schemeClr val="accent1"/>
+            </a:effectRef>
+            <a:fontRef idx="minor">
+              <a:schemeClr val="lt1"/>
+            </a:fontRef>
+          </p:style>
+          <p:txBody>
+            <a:bodyPr rtlCol="0" anchor="ctr"/>
+            <a:lstStyle/>
+            <a:p>
+              <a:pPr algn="ctr"/>
+              <a:endParaRPr lang="en-US" dirty="0"/>
+            </a:p>
+          </p:txBody>
+        </p:sp>
+        <p:sp>
+          <p:nvSpPr>
+            <p:cNvPr id="5" name="TextBox 4"/>
+            <p:cNvSpPr txBox="1"/>
+            <p:nvPr/>
+          </p:nvSpPr>
+          <p:spPr>
+            <a:xfrm>
+              <a:off x="107504" y="2636912"/>
+              <a:ext cx="1152127" cy="584775"/>
+            </a:xfrm>
+            <a:prstGeom prst="rect">
+              <a:avLst/>
+            </a:prstGeom>
+            <a:noFill/>
+          </p:spPr>
+          <p:txBody>
+            <a:bodyPr wrap="square" rtlCol="0">
+              <a:spAutoFit/>
+            </a:bodyPr>
+            <a:lstStyle/>
+            <a:p>
+              <a:pPr algn="ctr"/>
+              <a:r>
+                <a:rPr lang="en-US" sz="1600" dirty="0" smtClean="0"/>
+                <a:t>Human annotators</a:t>
+              </a:r>
+              <a:endParaRPr lang="en-US" sz="1600" dirty="0"/>
+            </a:p>
+          </p:txBody>
+        </p:sp>
+        <p:sp>
+          <p:nvSpPr>
+            <p:cNvPr id="6" name="Flowchart: Document 5"/>
+            <p:cNvSpPr/>
+            <p:nvPr/>
+          </p:nvSpPr>
+          <p:spPr>
+            <a:xfrm>
+              <a:off x="2909900" y="3052308"/>
+              <a:ext cx="762000" cy="468868"/>
+            </a:xfrm>
+            <a:prstGeom prst="flowChartDocument">
+              <a:avLst/>
+            </a:prstGeom>
+            <a:solidFill>
+              <a:schemeClr val="accent3">
+                <a:lumMod val="40000"/>
+                <a:lumOff val="60000"/>
+              </a:schemeClr>
+            </a:solidFill>
+            <a:ln>
+              <a:solidFill>
+                <a:schemeClr val="tx1"/>
+              </a:solidFill>
+            </a:ln>
+          </p:spPr>
+          <p:style>
+            <a:lnRef idx="2">
+              <a:schemeClr val="accent1">
+                <a:shade val="50000"/>
+              </a:schemeClr>
+            </a:lnRef>
+            <a:fillRef idx="1">
+              <a:schemeClr val="accent1"/>
+            </a:fillRef>
+            <a:effectRef idx="0">
+              <a:schemeClr val="accent1"/>
+            </a:effectRef>
+            <a:fontRef idx="minor">
+              <a:schemeClr val="lt1"/>
+            </a:fontRef>
+          </p:style>
+          <p:txBody>
+            <a:bodyPr rtlCol="0" anchor="ctr"/>
+            <a:lstStyle/>
+            <a:p>
+              <a:pPr algn="ctr"/>
+              <a:endParaRPr lang="en-US" dirty="0"/>
+            </a:p>
+          </p:txBody>
+        </p:sp>
+        <p:sp>
+          <p:nvSpPr>
+            <p:cNvPr id="8" name="TextBox 7"/>
+            <p:cNvSpPr txBox="1"/>
+            <p:nvPr/>
+          </p:nvSpPr>
+          <p:spPr>
+            <a:xfrm>
+              <a:off x="2833176" y="3492297"/>
+              <a:ext cx="1558804" cy="584775"/>
+            </a:xfrm>
+            <a:prstGeom prst="rect">
+              <a:avLst/>
+            </a:prstGeom>
+            <a:noFill/>
+          </p:spPr>
+          <p:txBody>
+            <a:bodyPr wrap="square" rtlCol="0">
+              <a:spAutoFit/>
+            </a:bodyPr>
+            <a:lstStyle/>
+            <a:p>
+              <a:r>
+                <a:rPr lang="en-US" sz="1600" dirty="0" smtClean="0"/>
+                <a:t>Human annotation </a:t>
+              </a:r>
+              <a:r>
+                <a:rPr lang="en-US" sz="1600" dirty="0" smtClean="0"/>
+                <a:t>files</a:t>
+              </a:r>
+              <a:endParaRPr lang="en-US" sz="1600" dirty="0"/>
+            </a:p>
+          </p:txBody>
+        </p:sp>
+        <p:cxnSp>
+          <p:nvCxnSpPr>
+            <p:cNvPr id="10" name="Straight Arrow Connector 9"/>
+            <p:cNvCxnSpPr>
+              <a:stCxn id="4" idx="6"/>
+              <a:endCxn id="53" idx="1"/>
+            </p:cNvCxnSpPr>
+            <p:nvPr/>
+          </p:nvCxnSpPr>
+          <p:spPr>
+            <a:xfrm>
+              <a:off x="1694666" y="2935424"/>
+              <a:ext cx="177034" cy="351448"/>
+            </a:xfrm>
+            <a:prstGeom prst="straightConnector1">
+              <a:avLst/>
+            </a:prstGeom>
+            <a:ln w="12700">
+              <a:solidFill>
+                <a:schemeClr val="tx1"/>
+              </a:solidFill>
+              <a:tailEnd type="triangle"/>
+            </a:ln>
+          </p:spPr>
+          <p:style>
+            <a:lnRef idx="1">
+              <a:schemeClr val="accent1"/>
+            </a:lnRef>
+            <a:fillRef idx="0">
+              <a:schemeClr val="accent1"/>
+            </a:fillRef>
+            <a:effectRef idx="0">
+              <a:schemeClr val="accent1"/>
+            </a:effectRef>
+            <a:fontRef idx="minor">
+              <a:schemeClr val="tx1"/>
+            </a:fontRef>
+          </p:style>
+        </p:cxnSp>
+        <p:cxnSp>
+          <p:nvCxnSpPr>
+            <p:cNvPr id="12" name="Straight Arrow Connector 11"/>
+            <p:cNvCxnSpPr>
+              <a:stCxn id="53" idx="3"/>
+              <a:endCxn id="6" idx="1"/>
+            </p:cNvCxnSpPr>
+            <p:nvPr/>
+          </p:nvCxnSpPr>
+          <p:spPr>
+            <a:xfrm flipV="1">
+              <a:off x="2579701" y="3286742"/>
+              <a:ext cx="330199" cy="130"/>
+            </a:xfrm>
+            <a:prstGeom prst="straightConnector1">
+              <a:avLst/>
+            </a:prstGeom>
+            <a:ln w="12700">
+              <a:solidFill>
+                <a:schemeClr val="tx1"/>
+              </a:solidFill>
+              <a:tailEnd type="triangle"/>
+            </a:ln>
+          </p:spPr>
+          <p:style>
+            <a:lnRef idx="1">
+              <a:schemeClr val="accent1"/>
+            </a:lnRef>
+            <a:fillRef idx="0">
+              <a:schemeClr val="accent1"/>
+            </a:fillRef>
+            <a:effectRef idx="0">
+              <a:schemeClr val="accent1"/>
+            </a:effectRef>
+            <a:fontRef idx="minor">
+              <a:schemeClr val="tx1"/>
+            </a:fontRef>
+          </p:style>
+        </p:cxnSp>
+        <p:sp>
+          <p:nvSpPr>
+            <p:cNvPr id="20" name="TextBox 19"/>
+            <p:cNvSpPr txBox="1"/>
+            <p:nvPr/>
+          </p:nvSpPr>
+          <p:spPr>
+            <a:xfrm>
+              <a:off x="85019" y="4860449"/>
+              <a:ext cx="634553" cy="584775"/>
+            </a:xfrm>
+            <a:prstGeom prst="rect">
+              <a:avLst/>
+            </a:prstGeom>
+            <a:noFill/>
+          </p:spPr>
+          <p:txBody>
+            <a:bodyPr wrap="square" rtlCol="0">
+              <a:spAutoFit/>
+            </a:bodyPr>
+            <a:lstStyle/>
+            <a:p>
+              <a:pPr algn="ctr"/>
+              <a:r>
+                <a:rPr lang="en-US" sz="1600" dirty="0" smtClean="0"/>
+                <a:t>Text files</a:t>
+              </a:r>
+              <a:endParaRPr lang="en-US" sz="1600" dirty="0"/>
+            </a:p>
+          </p:txBody>
+        </p:sp>
+        <p:sp>
+          <p:nvSpPr>
+            <p:cNvPr id="21" name="TextBox 20"/>
+            <p:cNvSpPr txBox="1"/>
+            <p:nvPr/>
+          </p:nvSpPr>
+          <p:spPr>
+            <a:xfrm>
+              <a:off x="647564" y="4165339"/>
+              <a:ext cx="952120" cy="307777"/>
+            </a:xfrm>
+            <a:prstGeom prst="rect">
+              <a:avLst/>
+            </a:prstGeom>
+            <a:noFill/>
+          </p:spPr>
+          <p:txBody>
+            <a:bodyPr wrap="none" rtlCol="0">
+              <a:spAutoFit/>
+            </a:bodyPr>
+            <a:lstStyle/>
+            <a:p>
+              <a:pPr algn="ctr"/>
+              <a:r>
+                <a:rPr lang="en-US" sz="1400" i="1" dirty="0" smtClean="0"/>
+                <a:t>sample.txt</a:t>
+              </a:r>
+              <a:endParaRPr lang="en-US" sz="1400" i="1" dirty="0"/>
+            </a:p>
+          </p:txBody>
+        </p:sp>
+        <p:sp>
+          <p:nvSpPr>
+            <p:cNvPr id="23" name="Flowchart: Document 22"/>
+            <p:cNvSpPr/>
+            <p:nvPr/>
+          </p:nvSpPr>
+          <p:spPr>
+            <a:xfrm>
+              <a:off x="317612" y="4437112"/>
+              <a:ext cx="762000" cy="468868"/>
+            </a:xfrm>
+            <a:prstGeom prst="flowChartDocument">
+              <a:avLst/>
+            </a:prstGeom>
+            <a:solidFill>
+              <a:schemeClr val="bg1">
+                <a:lumMod val="75000"/>
+              </a:schemeClr>
+            </a:solidFill>
+            <a:ln>
+              <a:solidFill>
+                <a:schemeClr val="tx1"/>
+              </a:solidFill>
+            </a:ln>
+          </p:spPr>
+          <p:style>
+            <a:lnRef idx="2">
+              <a:schemeClr val="accent1">
+                <a:shade val="50000"/>
+              </a:schemeClr>
+            </a:lnRef>
+            <a:fillRef idx="1">
+              <a:schemeClr val="accent1"/>
+            </a:fillRef>
+            <a:effectRef idx="0">
+              <a:schemeClr val="accent1"/>
+            </a:effectRef>
+            <a:fontRef idx="minor">
+              <a:schemeClr val="lt1"/>
+            </a:fontRef>
+          </p:style>
+          <p:txBody>
+            <a:bodyPr rtlCol="0" anchor="ctr"/>
+            <a:lstStyle/>
+            <a:p>
+              <a:pPr algn="ctr"/>
+              <a:endParaRPr lang="en-US" dirty="0"/>
+            </a:p>
+          </p:txBody>
+        </p:sp>
+        <p:sp>
+          <p:nvSpPr>
+            <p:cNvPr id="41" name="Flowchart: Document 40"/>
+            <p:cNvSpPr/>
+            <p:nvPr/>
+          </p:nvSpPr>
+          <p:spPr>
+            <a:xfrm>
+              <a:off x="6023776" y="3052438"/>
+              <a:ext cx="762000" cy="468868"/>
+            </a:xfrm>
+            <a:prstGeom prst="flowChartDocument">
+              <a:avLst/>
+            </a:prstGeom>
+            <a:solidFill>
+              <a:schemeClr val="accent3">
+                <a:lumMod val="40000"/>
+                <a:lumOff val="60000"/>
+              </a:schemeClr>
+            </a:solidFill>
+            <a:ln>
+              <a:solidFill>
+                <a:schemeClr val="tx1"/>
+              </a:solidFill>
+            </a:ln>
+          </p:spPr>
+          <p:style>
+            <a:lnRef idx="2">
+              <a:schemeClr val="accent1">
+                <a:shade val="50000"/>
+              </a:schemeClr>
+            </a:lnRef>
+            <a:fillRef idx="1">
+              <a:schemeClr val="accent1"/>
+            </a:fillRef>
+            <a:effectRef idx="0">
+              <a:schemeClr val="accent1"/>
+            </a:effectRef>
+            <a:fontRef idx="minor">
+              <a:schemeClr val="lt1"/>
+            </a:fontRef>
+          </p:style>
+          <p:txBody>
+            <a:bodyPr rtlCol="0" anchor="ctr"/>
+            <a:lstStyle/>
+            <a:p>
+              <a:pPr algn="ctr"/>
+              <a:endParaRPr lang="en-US" dirty="0"/>
+            </a:p>
+          </p:txBody>
+        </p:sp>
+        <p:sp>
+          <p:nvSpPr>
+            <p:cNvPr id="42" name="TextBox 41"/>
+            <p:cNvSpPr txBox="1"/>
+            <p:nvPr/>
+          </p:nvSpPr>
+          <p:spPr>
+            <a:xfrm>
+              <a:off x="5988414" y="2768265"/>
+              <a:ext cx="1015623" cy="307777"/>
+            </a:xfrm>
+            <a:prstGeom prst="rect">
+              <a:avLst/>
+            </a:prstGeom>
+            <a:noFill/>
+          </p:spPr>
+          <p:txBody>
+            <a:bodyPr wrap="none" rtlCol="0">
+              <a:spAutoFit/>
+            </a:bodyPr>
+            <a:lstStyle/>
+            <a:p>
+              <a:pPr algn="ctr"/>
+              <a:r>
+                <a:rPr lang="en-US" sz="1400" i="1" dirty="0" err="1" smtClean="0"/>
+                <a:t>Sample.tbf</a:t>
+              </a:r>
+              <a:endParaRPr lang="en-US" sz="1400" i="1" dirty="0"/>
+            </a:p>
+          </p:txBody>
+        </p:sp>
+        <p:cxnSp>
+          <p:nvCxnSpPr>
+            <p:cNvPr id="43" name="Straight Arrow Connector 42"/>
+            <p:cNvCxnSpPr>
+              <a:stCxn id="6" idx="3"/>
+              <a:endCxn id="72" idx="1"/>
+            </p:cNvCxnSpPr>
+            <p:nvPr/>
+          </p:nvCxnSpPr>
+          <p:spPr>
+            <a:xfrm flipV="1">
+              <a:off x="3671900" y="3286059"/>
+              <a:ext cx="288032" cy="683"/>
+            </a:xfrm>
+            <a:prstGeom prst="straightConnector1">
+              <a:avLst/>
+            </a:prstGeom>
+            <a:ln w="12700">
+              <a:solidFill>
+                <a:schemeClr val="tx1"/>
+              </a:solidFill>
+              <a:tailEnd type="triangle"/>
+            </a:ln>
+          </p:spPr>
+          <p:style>
+            <a:lnRef idx="1">
+              <a:schemeClr val="accent1"/>
+            </a:lnRef>
+            <a:fillRef idx="0">
+              <a:schemeClr val="accent1"/>
+            </a:fillRef>
+            <a:effectRef idx="0">
+              <a:schemeClr val="accent1"/>
+            </a:effectRef>
+            <a:fontRef idx="minor">
+              <a:schemeClr val="tx1"/>
+            </a:fontRef>
+          </p:style>
+        </p:cxnSp>
+        <p:sp>
+          <p:nvSpPr>
+            <p:cNvPr id="48" name="TextBox 47"/>
+            <p:cNvSpPr txBox="1"/>
+            <p:nvPr/>
+          </p:nvSpPr>
+          <p:spPr>
+            <a:xfrm>
+              <a:off x="5580112" y="3501008"/>
+              <a:ext cx="1788824" cy="584775"/>
+            </a:xfrm>
+            <a:prstGeom prst="rect">
+              <a:avLst/>
+            </a:prstGeom>
+            <a:noFill/>
+          </p:spPr>
+          <p:txBody>
+            <a:bodyPr wrap="none" rtlCol="0">
+              <a:spAutoFit/>
+            </a:bodyPr>
+            <a:lstStyle/>
+            <a:p>
+              <a:pPr algn="ctr"/>
+              <a:r>
+                <a:rPr lang="en-US" sz="1600" dirty="0" smtClean="0"/>
+                <a:t>Gold standard</a:t>
+              </a:r>
+            </a:p>
+            <a:p>
+              <a:pPr algn="ctr"/>
+              <a:r>
+                <a:rPr lang="en-US" sz="1600" dirty="0" smtClean="0"/>
+                <a:t>event mention files</a:t>
+              </a:r>
+              <a:endParaRPr lang="en-US" sz="1600" dirty="0"/>
+            </a:p>
+          </p:txBody>
+        </p:sp>
+        <p:cxnSp>
+          <p:nvCxnSpPr>
+            <p:cNvPr id="49" name="Straight Arrow Connector 48"/>
+            <p:cNvCxnSpPr>
+              <a:stCxn id="72" idx="3"/>
+              <a:endCxn id="41" idx="1"/>
+            </p:cNvCxnSpPr>
+            <p:nvPr/>
+          </p:nvCxnSpPr>
+          <p:spPr>
+            <a:xfrm>
+              <a:off x="5186069" y="3286059"/>
+              <a:ext cx="837707" cy="813"/>
+            </a:xfrm>
+            <a:prstGeom prst="straightConnector1">
+              <a:avLst/>
+            </a:prstGeom>
+            <a:ln w="12700">
+              <a:solidFill>
+                <a:schemeClr val="tx1"/>
+              </a:solidFill>
+              <a:tailEnd type="triangle"/>
+            </a:ln>
+          </p:spPr>
+          <p:style>
+            <a:lnRef idx="1">
+              <a:schemeClr val="accent1"/>
+            </a:lnRef>
+            <a:fillRef idx="0">
+              <a:schemeClr val="accent1"/>
+            </a:fillRef>
+            <a:effectRef idx="0">
+              <a:schemeClr val="accent1"/>
+            </a:effectRef>
+            <a:fontRef idx="minor">
+              <a:schemeClr val="tx1"/>
+            </a:fontRef>
+          </p:style>
+        </p:cxnSp>
+        <p:sp>
+          <p:nvSpPr>
+            <p:cNvPr id="54" name="Flowchart: Document 53"/>
+            <p:cNvSpPr/>
+            <p:nvPr/>
+          </p:nvSpPr>
+          <p:spPr>
+            <a:xfrm>
+              <a:off x="6102198" y="5756597"/>
+              <a:ext cx="762000" cy="468868"/>
+            </a:xfrm>
+            <a:prstGeom prst="flowChartDocument">
+              <a:avLst/>
+            </a:prstGeom>
+            <a:solidFill>
+              <a:schemeClr val="accent4">
+                <a:lumMod val="40000"/>
+                <a:lumOff val="60000"/>
+              </a:schemeClr>
+            </a:solidFill>
+            <a:ln>
+              <a:solidFill>
+                <a:schemeClr val="tx1"/>
+              </a:solidFill>
+            </a:ln>
+          </p:spPr>
+          <p:style>
+            <a:lnRef idx="2">
+              <a:schemeClr val="accent1">
+                <a:shade val="50000"/>
+              </a:schemeClr>
+            </a:lnRef>
+            <a:fillRef idx="1">
+              <a:schemeClr val="accent1"/>
+            </a:fillRef>
+            <a:effectRef idx="0">
+              <a:schemeClr val="accent1"/>
+            </a:effectRef>
+            <a:fontRef idx="minor">
+              <a:schemeClr val="lt1"/>
+            </a:fontRef>
+          </p:style>
+          <p:txBody>
+            <a:bodyPr rtlCol="0" anchor="ctr"/>
+            <a:lstStyle/>
+            <a:p>
+              <a:pPr algn="ctr"/>
+              <a:endParaRPr lang="en-US" dirty="0"/>
+            </a:p>
+          </p:txBody>
+        </p:sp>
+        <p:sp>
+          <p:nvSpPr>
+            <p:cNvPr id="58" name="TextBox 57"/>
+            <p:cNvSpPr txBox="1"/>
+            <p:nvPr/>
+          </p:nvSpPr>
+          <p:spPr>
+            <a:xfrm>
+              <a:off x="5760132" y="6273225"/>
+              <a:ext cx="1294522" cy="584775"/>
+            </a:xfrm>
+            <a:prstGeom prst="rect">
+              <a:avLst/>
+            </a:prstGeom>
+            <a:noFill/>
+          </p:spPr>
+          <p:txBody>
+            <a:bodyPr wrap="none" rtlCol="0">
+              <a:spAutoFit/>
+            </a:bodyPr>
+            <a:lstStyle/>
+            <a:p>
+              <a:pPr algn="ctr"/>
+              <a:r>
+                <a:rPr lang="en-US" sz="1600" dirty="0" smtClean="0"/>
+                <a:t>System event</a:t>
+              </a:r>
+            </a:p>
+            <a:p>
+              <a:pPr algn="ctr"/>
+              <a:r>
+                <a:rPr lang="en-US" sz="1600" dirty="0" smtClean="0"/>
+                <a:t>mention files</a:t>
+              </a:r>
+              <a:endParaRPr lang="en-US" sz="1600" dirty="0"/>
+            </a:p>
+          </p:txBody>
+        </p:sp>
+        <p:cxnSp>
+          <p:nvCxnSpPr>
+            <p:cNvPr id="59" name="Straight Arrow Connector 58"/>
+            <p:cNvCxnSpPr>
+              <a:stCxn id="55" idx="3"/>
+              <a:endCxn id="54" idx="1"/>
+            </p:cNvCxnSpPr>
+            <p:nvPr/>
+          </p:nvCxnSpPr>
+          <p:spPr>
+            <a:xfrm>
+              <a:off x="5508104" y="5988537"/>
+              <a:ext cx="594094" cy="2494"/>
+            </a:xfrm>
+            <a:prstGeom prst="straightConnector1">
+              <a:avLst/>
+            </a:prstGeom>
+            <a:ln w="12700">
+              <a:solidFill>
+                <a:schemeClr val="tx1"/>
+              </a:solidFill>
+              <a:tailEnd type="triangle"/>
+            </a:ln>
+          </p:spPr>
+          <p:style>
+            <a:lnRef idx="1">
+              <a:schemeClr val="accent1"/>
+            </a:lnRef>
+            <a:fillRef idx="0">
+              <a:schemeClr val="accent1"/>
+            </a:fillRef>
+            <a:effectRef idx="0">
+              <a:schemeClr val="accent1"/>
+            </a:effectRef>
+            <a:fontRef idx="minor">
+              <a:schemeClr val="tx1"/>
+            </a:fontRef>
+          </p:style>
+        </p:cxnSp>
+        <p:sp>
+          <p:nvSpPr>
+            <p:cNvPr id="63" name="TextBox 62"/>
+            <p:cNvSpPr txBox="1"/>
+            <p:nvPr/>
+          </p:nvSpPr>
+          <p:spPr>
+            <a:xfrm>
+              <a:off x="5670150" y="5432561"/>
+              <a:ext cx="1658201" cy="307777"/>
+            </a:xfrm>
+            <a:prstGeom prst="rect">
+              <a:avLst/>
+            </a:prstGeom>
+            <a:noFill/>
+          </p:spPr>
+          <p:txBody>
+            <a:bodyPr wrap="none" rtlCol="0">
+              <a:spAutoFit/>
+            </a:bodyPr>
+            <a:lstStyle/>
+            <a:p>
+              <a:pPr algn="ctr"/>
+              <a:r>
+                <a:rPr lang="en-US" sz="1400" i="1" dirty="0" smtClean="0"/>
+                <a:t>sample-system1.</a:t>
+              </a:r>
+              <a:r>
+                <a:rPr lang="en-US" sz="1400" i="1" dirty="0"/>
+                <a:t>t</a:t>
+              </a:r>
+              <a:r>
+                <a:rPr lang="en-US" sz="1400" i="1" dirty="0" smtClean="0"/>
+                <a:t>bf</a:t>
+              </a:r>
+              <a:endParaRPr lang="en-US" sz="1400" i="1" dirty="0"/>
+            </a:p>
+          </p:txBody>
+        </p:sp>
+        <p:sp>
+          <p:nvSpPr>
+            <p:cNvPr id="72" name="Rounded Rectangle 71"/>
+            <p:cNvSpPr/>
+            <p:nvPr/>
+          </p:nvSpPr>
+          <p:spPr>
+            <a:xfrm>
+              <a:off x="3959932" y="3032956"/>
+              <a:ext cx="1226137" cy="506206"/>
+            </a:xfrm>
+            <a:prstGeom prst="roundRect">
+              <a:avLst/>
+            </a:prstGeom>
+            <a:noFill/>
+            <a:ln>
+              <a:solidFill>
+                <a:schemeClr val="tx1"/>
+              </a:solidFill>
+            </a:ln>
+          </p:spPr>
+          <p:style>
+            <a:lnRef idx="2">
+              <a:schemeClr val="accent1">
+                <a:shade val="50000"/>
+              </a:schemeClr>
+            </a:lnRef>
+            <a:fillRef idx="1">
+              <a:schemeClr val="accent1"/>
+            </a:fillRef>
+            <a:effectRef idx="0">
+              <a:schemeClr val="accent1"/>
+            </a:effectRef>
+            <a:fontRef idx="minor">
+              <a:schemeClr val="lt1"/>
+            </a:fontRef>
+          </p:style>
+          <p:txBody>
+            <a:bodyPr rtlCol="0" anchor="ctr"/>
+            <a:lstStyle/>
+            <a:p>
+              <a:pPr algn="ctr"/>
+              <a:r>
+                <a:rPr lang="en-US" dirty="0" smtClean="0">
+                  <a:solidFill>
+                    <a:schemeClr val="tx1"/>
+                  </a:solidFill>
+                </a:rPr>
+                <a:t>Converter</a:t>
+              </a:r>
+              <a:endParaRPr lang="en-US" dirty="0">
+                <a:solidFill>
+                  <a:schemeClr val="tx1"/>
+                </a:solidFill>
+              </a:endParaRPr>
+            </a:p>
+          </p:txBody>
+        </p:sp>
+        <p:cxnSp>
+          <p:nvCxnSpPr>
+            <p:cNvPr id="111" name="Elbow Connector 110"/>
+            <p:cNvCxnSpPr>
+              <a:stCxn id="41" idx="3"/>
+              <a:endCxn id="39" idx="0"/>
+            </p:cNvCxnSpPr>
+            <p:nvPr/>
+          </p:nvCxnSpPr>
+          <p:spPr>
+            <a:xfrm>
+              <a:off x="6785776" y="3286872"/>
+              <a:ext cx="488033" cy="1101573"/>
+            </a:xfrm>
+            <a:prstGeom prst="bentConnector2">
+              <a:avLst/>
+            </a:prstGeom>
+            <a:ln w="12700">
+              <a:solidFill>
+                <a:schemeClr val="tx1"/>
+              </a:solidFill>
+              <a:tailEnd type="triangle"/>
+            </a:ln>
+          </p:spPr>
+          <p:style>
+            <a:lnRef idx="1">
+              <a:schemeClr val="accent1"/>
+            </a:lnRef>
+            <a:fillRef idx="0">
+              <a:schemeClr val="accent1"/>
+            </a:fillRef>
+            <a:effectRef idx="0">
+              <a:schemeClr val="accent1"/>
+            </a:effectRef>
+            <a:fontRef idx="minor">
+              <a:schemeClr val="tx1"/>
+            </a:fontRef>
+          </p:style>
+        </p:cxnSp>
+        <p:sp>
+          <p:nvSpPr>
+            <p:cNvPr id="47" name="TextBox 46"/>
+            <p:cNvSpPr txBox="1"/>
+            <p:nvPr/>
+          </p:nvSpPr>
+          <p:spPr>
+            <a:xfrm>
+              <a:off x="2771800" y="2780928"/>
+              <a:ext cx="1034257" cy="307777"/>
+            </a:xfrm>
+            <a:prstGeom prst="rect">
+              <a:avLst/>
+            </a:prstGeom>
+            <a:noFill/>
+          </p:spPr>
+          <p:txBody>
+            <a:bodyPr wrap="none" rtlCol="0">
+              <a:spAutoFit/>
+            </a:bodyPr>
+            <a:lstStyle/>
+            <a:p>
+              <a:pPr algn="ctr"/>
+              <a:r>
+                <a:rPr lang="en-US" sz="1400" i="1" dirty="0" err="1" smtClean="0"/>
+                <a:t>sample.ann</a:t>
+              </a:r>
+              <a:endParaRPr lang="en-US" sz="1400" i="1" dirty="0"/>
+            </a:p>
+          </p:txBody>
+        </p:sp>
+        <p:cxnSp>
+          <p:nvCxnSpPr>
+            <p:cNvPr id="50" name="Elbow Connector 49"/>
+            <p:cNvCxnSpPr>
+              <a:stCxn id="23" idx="2"/>
+              <a:endCxn id="55" idx="1"/>
+            </p:cNvCxnSpPr>
+            <p:nvPr/>
+          </p:nvCxnSpPr>
+          <p:spPr>
+            <a:xfrm rot="16200000" flipH="1">
+              <a:off x="422345" y="5151250"/>
+              <a:ext cx="1113554" cy="561020"/>
+            </a:xfrm>
+            <a:prstGeom prst="bentConnector2">
+              <a:avLst/>
+            </a:prstGeom>
+            <a:ln w="12700">
+              <a:solidFill>
+                <a:schemeClr val="tx1"/>
+              </a:solidFill>
+              <a:tailEnd type="triangle"/>
+            </a:ln>
+          </p:spPr>
+          <p:style>
+            <a:lnRef idx="1">
+              <a:schemeClr val="accent1"/>
+            </a:lnRef>
+            <a:fillRef idx="0">
+              <a:schemeClr val="accent1"/>
+            </a:fillRef>
+            <a:effectRef idx="0">
+              <a:schemeClr val="accent1"/>
+            </a:effectRef>
+            <a:fontRef idx="minor">
+              <a:schemeClr val="tx1"/>
+            </a:fontRef>
+          </p:style>
+        </p:cxnSp>
+        <p:sp>
+          <p:nvSpPr>
+            <p:cNvPr id="55" name="Rounded Rectangle 54"/>
+            <p:cNvSpPr/>
+            <p:nvPr/>
+          </p:nvSpPr>
+          <p:spPr>
+            <a:xfrm>
+              <a:off x="1259632" y="5697252"/>
+              <a:ext cx="4248472" cy="582569"/>
+            </a:xfrm>
+            <a:prstGeom prst="roundRect">
+              <a:avLst/>
+            </a:prstGeom>
+            <a:solidFill>
+              <a:schemeClr val="accent4">
+                <a:lumMod val="40000"/>
+                <a:lumOff val="60000"/>
+              </a:schemeClr>
+            </a:solidFill>
+            <a:ln>
+              <a:solidFill>
+                <a:schemeClr val="tx1"/>
+              </a:solidFill>
+            </a:ln>
+          </p:spPr>
+          <p:style>
+            <a:lnRef idx="2">
+              <a:schemeClr val="accent1">
+                <a:shade val="50000"/>
+              </a:schemeClr>
+            </a:lnRef>
+            <a:fillRef idx="1">
+              <a:schemeClr val="accent1"/>
+            </a:fillRef>
+            <a:effectRef idx="0">
+              <a:schemeClr val="accent1"/>
+            </a:effectRef>
+            <a:fontRef idx="minor">
+              <a:schemeClr val="lt1"/>
+            </a:fontRef>
+          </p:style>
+          <p:txBody>
+            <a:bodyPr rtlCol="0" anchor="ctr"/>
+            <a:lstStyle/>
+            <a:p>
+              <a:pPr algn="ctr"/>
+              <a:r>
+                <a:rPr lang="en-US" dirty="0">
+                  <a:solidFill>
+                    <a:schemeClr val="tx1"/>
+                  </a:solidFill>
+                </a:rPr>
+                <a:t>Event extraction system</a:t>
+              </a:r>
+            </a:p>
+          </p:txBody>
+        </p:sp>
+        <p:cxnSp>
+          <p:nvCxnSpPr>
+            <p:cNvPr id="64" name="Elbow Connector 63"/>
+            <p:cNvCxnSpPr>
+              <a:stCxn id="54" idx="3"/>
+              <a:endCxn id="39" idx="2"/>
+            </p:cNvCxnSpPr>
+            <p:nvPr/>
+          </p:nvCxnSpPr>
+          <p:spPr>
+            <a:xfrm flipV="1">
+              <a:off x="6864198" y="4894651"/>
+              <a:ext cx="409611" cy="1096380"/>
+            </a:xfrm>
+            <a:prstGeom prst="bentConnector2">
+              <a:avLst/>
+            </a:prstGeom>
+            <a:ln w="12700">
+              <a:solidFill>
+                <a:schemeClr val="tx1"/>
+              </a:solidFill>
+              <a:tailEnd type="triangle"/>
+            </a:ln>
+          </p:spPr>
+          <p:style>
+            <a:lnRef idx="1">
+              <a:schemeClr val="accent1"/>
+            </a:lnRef>
+            <a:fillRef idx="0">
+              <a:schemeClr val="accent1"/>
+            </a:fillRef>
+            <a:effectRef idx="0">
+              <a:schemeClr val="accent1"/>
+            </a:effectRef>
+            <a:fontRef idx="minor">
+              <a:schemeClr val="tx1"/>
+            </a:fontRef>
+          </p:style>
+        </p:cxnSp>
+        <p:sp>
+          <p:nvSpPr>
+            <p:cNvPr id="35" name="Flowchart: Document 34"/>
+            <p:cNvSpPr/>
+            <p:nvPr/>
+          </p:nvSpPr>
+          <p:spPr>
+            <a:xfrm>
+              <a:off x="3014938" y="4437112"/>
+              <a:ext cx="762000" cy="468868"/>
+            </a:xfrm>
+            <a:prstGeom prst="flowChartDocument">
+              <a:avLst/>
+            </a:prstGeom>
+            <a:solidFill>
+              <a:schemeClr val="accent3">
+                <a:lumMod val="40000"/>
+                <a:lumOff val="60000"/>
+              </a:schemeClr>
+            </a:solidFill>
+            <a:ln>
+              <a:solidFill>
+                <a:schemeClr val="tx1"/>
+              </a:solidFill>
+            </a:ln>
+          </p:spPr>
+          <p:style>
+            <a:lnRef idx="2">
+              <a:schemeClr val="accent1">
+                <a:shade val="50000"/>
+              </a:schemeClr>
+            </a:lnRef>
+            <a:fillRef idx="1">
+              <a:schemeClr val="accent1"/>
+            </a:fillRef>
+            <a:effectRef idx="0">
+              <a:schemeClr val="accent1"/>
+            </a:effectRef>
+            <a:fontRef idx="minor">
+              <a:schemeClr val="lt1"/>
+            </a:fontRef>
+          </p:style>
+          <p:txBody>
+            <a:bodyPr rtlCol="0" anchor="ctr"/>
+            <a:lstStyle/>
+            <a:p>
+              <a:pPr algn="ctr"/>
+              <a:endParaRPr lang="en-US" dirty="0"/>
+            </a:p>
+          </p:txBody>
+        </p:sp>
+        <p:cxnSp>
+          <p:nvCxnSpPr>
+            <p:cNvPr id="36" name="Straight Arrow Connector 35"/>
+            <p:cNvCxnSpPr>
+              <a:stCxn id="38" idx="3"/>
+              <a:endCxn id="35" idx="1"/>
+            </p:cNvCxnSpPr>
+            <p:nvPr/>
+          </p:nvCxnSpPr>
+          <p:spPr>
+            <a:xfrm>
+              <a:off x="2717821" y="4668816"/>
+              <a:ext cx="297117" cy="2730"/>
+            </a:xfrm>
+            <a:prstGeom prst="straightConnector1">
+              <a:avLst/>
+            </a:prstGeom>
+            <a:ln w="12700">
+              <a:solidFill>
+                <a:schemeClr val="tx1"/>
+              </a:solidFill>
+              <a:tailEnd type="triangle"/>
+            </a:ln>
+          </p:spPr>
+          <p:style>
+            <a:lnRef idx="1">
+              <a:schemeClr val="accent1"/>
+            </a:lnRef>
+            <a:fillRef idx="0">
+              <a:schemeClr val="accent1"/>
+            </a:fillRef>
+            <a:effectRef idx="0">
+              <a:schemeClr val="accent1"/>
+            </a:effectRef>
+            <a:fontRef idx="minor">
+              <a:schemeClr val="tx1"/>
+            </a:fontRef>
+          </p:style>
+        </p:cxnSp>
+        <p:cxnSp>
+          <p:nvCxnSpPr>
+            <p:cNvPr id="37" name="Straight Arrow Connector 36"/>
+            <p:cNvCxnSpPr>
+              <a:stCxn id="23" idx="3"/>
+              <a:endCxn id="38" idx="1"/>
+            </p:cNvCxnSpPr>
+            <p:nvPr/>
+          </p:nvCxnSpPr>
+          <p:spPr>
+            <a:xfrm flipV="1">
+              <a:off x="1079612" y="4668816"/>
+              <a:ext cx="486082" cy="2730"/>
+            </a:xfrm>
+            <a:prstGeom prst="straightConnector1">
+              <a:avLst/>
+            </a:prstGeom>
+            <a:ln w="12700">
+              <a:solidFill>
+                <a:schemeClr val="tx1"/>
+              </a:solidFill>
+              <a:tailEnd type="triangle"/>
+            </a:ln>
+          </p:spPr>
+          <p:style>
+            <a:lnRef idx="1">
+              <a:schemeClr val="accent1"/>
+            </a:lnRef>
+            <a:fillRef idx="0">
+              <a:schemeClr val="accent1"/>
+            </a:fillRef>
+            <a:effectRef idx="0">
+              <a:schemeClr val="accent1"/>
+            </a:effectRef>
+            <a:fontRef idx="minor">
+              <a:schemeClr val="tx1"/>
+            </a:fontRef>
+          </p:style>
+        </p:cxnSp>
+        <p:sp>
+          <p:nvSpPr>
+            <p:cNvPr id="38" name="Rounded Rectangle 37"/>
+            <p:cNvSpPr/>
+            <p:nvPr/>
+          </p:nvSpPr>
+          <p:spPr>
+            <a:xfrm>
+              <a:off x="1565694" y="4365104"/>
+              <a:ext cx="1152127" cy="607423"/>
+            </a:xfrm>
+            <a:prstGeom prst="roundRect">
+              <a:avLst/>
+            </a:prstGeom>
+            <a:solidFill>
+              <a:schemeClr val="accent3">
+                <a:lumMod val="40000"/>
+                <a:lumOff val="60000"/>
+              </a:schemeClr>
+            </a:solidFill>
+            <a:ln>
+              <a:solidFill>
+                <a:schemeClr val="tx1"/>
+              </a:solidFill>
+            </a:ln>
+          </p:spPr>
+          <p:style>
+            <a:lnRef idx="2">
+              <a:schemeClr val="accent1">
+                <a:shade val="50000"/>
+              </a:schemeClr>
+            </a:lnRef>
+            <a:fillRef idx="1">
+              <a:schemeClr val="accent1"/>
+            </a:fillRef>
+            <a:effectRef idx="0">
+              <a:schemeClr val="accent1"/>
+            </a:effectRef>
+            <a:fontRef idx="minor">
+              <a:schemeClr val="lt1"/>
+            </a:fontRef>
+          </p:style>
+          <p:txBody>
+            <a:bodyPr rtlCol="0" anchor="ctr"/>
+            <a:lstStyle/>
+            <a:p>
+              <a:pPr algn="ctr"/>
+              <a:r>
+                <a:rPr lang="en-US" dirty="0" err="1">
+                  <a:solidFill>
+                    <a:schemeClr val="tx1"/>
+                  </a:solidFill>
+                </a:rPr>
+                <a:t>T</a:t>
+              </a:r>
+              <a:r>
+                <a:rPr lang="en-US" dirty="0" err="1" smtClean="0">
+                  <a:solidFill>
+                    <a:schemeClr val="tx1"/>
+                  </a:solidFill>
+                </a:rPr>
+                <a:t>okenizer</a:t>
+              </a:r>
+              <a:endParaRPr lang="en-US" dirty="0">
+                <a:solidFill>
+                  <a:schemeClr val="tx1"/>
+                </a:solidFill>
+              </a:endParaRPr>
+            </a:p>
+          </p:txBody>
+        </p:sp>
+        <p:sp>
+          <p:nvSpPr>
+            <p:cNvPr id="39" name="Rounded Rectangle 38"/>
+            <p:cNvSpPr/>
+            <p:nvPr/>
+          </p:nvSpPr>
+          <p:spPr>
+            <a:xfrm>
+              <a:off x="6660740" y="4388445"/>
+              <a:ext cx="1226137" cy="506206"/>
+            </a:xfrm>
+            <a:prstGeom prst="roundRect">
+              <a:avLst/>
+            </a:prstGeom>
+            <a:noFill/>
+            <a:ln>
+              <a:solidFill>
+                <a:schemeClr val="tx1"/>
+              </a:solidFill>
+            </a:ln>
+          </p:spPr>
+          <p:style>
+            <a:lnRef idx="2">
+              <a:schemeClr val="accent1">
+                <a:shade val="50000"/>
+              </a:schemeClr>
+            </a:lnRef>
+            <a:fillRef idx="1">
+              <a:schemeClr val="accent1"/>
+            </a:fillRef>
+            <a:effectRef idx="0">
+              <a:schemeClr val="accent1"/>
+            </a:effectRef>
+            <a:fontRef idx="minor">
+              <a:schemeClr val="lt1"/>
+            </a:fontRef>
+          </p:style>
+          <p:txBody>
+            <a:bodyPr rtlCol="0" anchor="ctr"/>
+            <a:lstStyle/>
+            <a:p>
+              <a:pPr algn="ctr"/>
+              <a:r>
+                <a:rPr lang="en-US" dirty="0">
+                  <a:solidFill>
+                    <a:schemeClr val="tx1"/>
+                  </a:solidFill>
+                </a:rPr>
+                <a:t>Evaluator</a:t>
+              </a:r>
+            </a:p>
+          </p:txBody>
+        </p:sp>
+        <p:sp>
+          <p:nvSpPr>
+            <p:cNvPr id="44" name="Flowchart: Process 43"/>
+            <p:cNvSpPr/>
+            <p:nvPr/>
+          </p:nvSpPr>
+          <p:spPr>
+            <a:xfrm>
+              <a:off x="8136396" y="4387446"/>
+              <a:ext cx="913901" cy="507205"/>
+            </a:xfrm>
+            <a:prstGeom prst="flowChartProcess">
+              <a:avLst/>
+            </a:prstGeom>
+            <a:noFill/>
+            <a:ln>
+              <a:solidFill>
+                <a:schemeClr val="tx1"/>
+              </a:solidFill>
+            </a:ln>
+          </p:spPr>
+          <p:style>
+            <a:lnRef idx="2">
+              <a:schemeClr val="accent1">
+                <a:shade val="50000"/>
+              </a:schemeClr>
+            </a:lnRef>
+            <a:fillRef idx="1">
+              <a:schemeClr val="accent1"/>
+            </a:fillRef>
+            <a:effectRef idx="0">
+              <a:schemeClr val="accent1"/>
+            </a:effectRef>
+            <a:fontRef idx="minor">
+              <a:schemeClr val="lt1"/>
+            </a:fontRef>
+          </p:style>
+          <p:txBody>
+            <a:bodyPr rtlCol="0" anchor="ctr"/>
+            <a:lstStyle/>
+            <a:p>
+              <a:pPr algn="ctr"/>
+              <a:r>
+                <a:rPr lang="en-US" dirty="0" smtClean="0">
+                  <a:solidFill>
+                    <a:schemeClr val="tx1"/>
+                  </a:solidFill>
+                </a:rPr>
+                <a:t>Results</a:t>
+              </a:r>
+              <a:endParaRPr lang="en-US" dirty="0">
+                <a:solidFill>
+                  <a:schemeClr val="tx1"/>
+                </a:solidFill>
+              </a:endParaRPr>
+            </a:p>
+          </p:txBody>
+        </p:sp>
+        <p:cxnSp>
+          <p:nvCxnSpPr>
+            <p:cNvPr id="45" name="Straight Arrow Connector 44"/>
+            <p:cNvCxnSpPr>
+              <a:stCxn id="39" idx="3"/>
+              <a:endCxn id="44" idx="1"/>
+            </p:cNvCxnSpPr>
+            <p:nvPr/>
+          </p:nvCxnSpPr>
+          <p:spPr>
+            <a:xfrm flipV="1">
+              <a:off x="7886877" y="4641049"/>
+              <a:ext cx="249519" cy="499"/>
+            </a:xfrm>
+            <a:prstGeom prst="straightConnector1">
+              <a:avLst/>
+            </a:prstGeom>
+            <a:ln w="12700">
+              <a:solidFill>
+                <a:schemeClr val="tx1"/>
+              </a:solidFill>
+              <a:tailEnd type="triangle"/>
+            </a:ln>
+          </p:spPr>
+          <p:style>
+            <a:lnRef idx="1">
+              <a:schemeClr val="accent1"/>
+            </a:lnRef>
+            <a:fillRef idx="0">
+              <a:schemeClr val="accent1"/>
+            </a:fillRef>
+            <a:effectRef idx="0">
+              <a:schemeClr val="accent1"/>
+            </a:effectRef>
+            <a:fontRef idx="minor">
+              <a:schemeClr val="tx1"/>
+            </a:fontRef>
+          </p:style>
+        </p:cxnSp>
+        <p:sp>
+          <p:nvSpPr>
+            <p:cNvPr id="46" name="TextBox 45"/>
+            <p:cNvSpPr txBox="1"/>
+            <p:nvPr/>
+          </p:nvSpPr>
+          <p:spPr>
+            <a:xfrm>
+              <a:off x="3005853" y="4152585"/>
+              <a:ext cx="987130" cy="307777"/>
+            </a:xfrm>
+            <a:prstGeom prst="rect">
+              <a:avLst/>
+            </a:prstGeom>
+            <a:noFill/>
+          </p:spPr>
+          <p:txBody>
+            <a:bodyPr wrap="none" rtlCol="0">
+              <a:spAutoFit/>
+            </a:bodyPr>
+            <a:lstStyle/>
+            <a:p>
+              <a:pPr algn="ctr"/>
+              <a:r>
+                <a:rPr lang="en-US" sz="1400" i="1" dirty="0" err="1" smtClean="0"/>
+                <a:t>sample.tkn</a:t>
+              </a:r>
+              <a:endParaRPr lang="en-US" sz="1400" i="1" dirty="0"/>
+            </a:p>
+          </p:txBody>
+        </p:sp>
+        <p:sp>
+          <p:nvSpPr>
+            <p:cNvPr id="51" name="TextBox 50"/>
+            <p:cNvSpPr txBox="1"/>
+            <p:nvPr/>
+          </p:nvSpPr>
+          <p:spPr>
+            <a:xfrm>
+              <a:off x="2969849" y="4856406"/>
+              <a:ext cx="1055931" cy="338554"/>
+            </a:xfrm>
+            <a:prstGeom prst="rect">
+              <a:avLst/>
+            </a:prstGeom>
+            <a:noFill/>
+          </p:spPr>
+          <p:txBody>
+            <a:bodyPr wrap="none" rtlCol="0">
+              <a:spAutoFit/>
+            </a:bodyPr>
+            <a:lstStyle/>
+            <a:p>
+              <a:pPr algn="ctr"/>
+              <a:r>
+                <a:rPr lang="en-US" sz="1600" dirty="0" smtClean="0"/>
+                <a:t>Token files</a:t>
+              </a:r>
+              <a:endParaRPr lang="en-US" sz="1600" dirty="0"/>
+            </a:p>
+          </p:txBody>
+        </p:sp>
+        <p:sp>
+          <p:nvSpPr>
+            <p:cNvPr id="53" name="Rounded Rectangle 52"/>
+            <p:cNvSpPr/>
+            <p:nvPr/>
+          </p:nvSpPr>
+          <p:spPr>
+            <a:xfrm>
+              <a:off x="1871700" y="3033769"/>
+              <a:ext cx="708001" cy="506206"/>
+            </a:xfrm>
+            <a:prstGeom prst="roundRect">
+              <a:avLst/>
+            </a:prstGeom>
+            <a:noFill/>
+            <a:ln>
+              <a:solidFill>
+                <a:schemeClr val="tx1"/>
+              </a:solidFill>
+            </a:ln>
+          </p:spPr>
+          <p:style>
+            <a:lnRef idx="2">
+              <a:schemeClr val="accent1">
+                <a:shade val="50000"/>
+              </a:schemeClr>
+            </a:lnRef>
+            <a:fillRef idx="1">
+              <a:schemeClr val="accent1"/>
+            </a:fillRef>
+            <a:effectRef idx="0">
+              <a:schemeClr val="accent1"/>
+            </a:effectRef>
+            <a:fontRef idx="minor">
+              <a:schemeClr val="lt1"/>
+            </a:fontRef>
+          </p:style>
+          <p:txBody>
+            <a:bodyPr rtlCol="0" anchor="ctr"/>
+            <a:lstStyle/>
+            <a:p>
+              <a:pPr algn="ctr"/>
+              <a:r>
+                <a:rPr lang="en-US" dirty="0" smtClean="0">
+                  <a:solidFill>
+                    <a:schemeClr val="tx1"/>
+                  </a:solidFill>
+                </a:rPr>
+                <a:t>brat</a:t>
+              </a:r>
+              <a:endParaRPr lang="en-US" dirty="0">
+                <a:solidFill>
+                  <a:schemeClr val="tx1"/>
+                </a:solidFill>
+              </a:endParaRPr>
+            </a:p>
+          </p:txBody>
+        </p:sp>
+        <p:cxnSp>
+          <p:nvCxnSpPr>
+            <p:cNvPr id="123" name="Elbow Connector 122"/>
+            <p:cNvCxnSpPr>
+              <a:stCxn id="23" idx="0"/>
+              <a:endCxn id="53" idx="1"/>
+            </p:cNvCxnSpPr>
+            <p:nvPr/>
+          </p:nvCxnSpPr>
+          <p:spPr>
+            <a:xfrm rot="5400000" flipH="1" flipV="1">
+              <a:off x="710036" y="3275448"/>
+              <a:ext cx="1150240" cy="1173088"/>
+            </a:xfrm>
+            <a:prstGeom prst="bentConnector2">
+              <a:avLst/>
+            </a:prstGeom>
+            <a:ln w="12700">
+              <a:solidFill>
+                <a:schemeClr val="tx1"/>
+              </a:solidFill>
+              <a:tailEnd type="triangle"/>
+            </a:ln>
+          </p:spPr>
+          <p:style>
+            <a:lnRef idx="1">
+              <a:schemeClr val="accent1"/>
+            </a:lnRef>
+            <a:fillRef idx="0">
+              <a:schemeClr val="accent1"/>
+            </a:fillRef>
+            <a:effectRef idx="0">
+              <a:schemeClr val="accent1"/>
+            </a:effectRef>
+            <a:fontRef idx="minor">
+              <a:schemeClr val="tx1"/>
+            </a:fontRef>
+          </p:style>
+        </p:cxnSp>
+        <p:sp>
+          <p:nvSpPr>
+            <p:cNvPr id="68" name="Rounded Rectangle 67"/>
+            <p:cNvSpPr/>
+            <p:nvPr/>
+          </p:nvSpPr>
+          <p:spPr>
+            <a:xfrm>
+              <a:off x="1223628" y="2348880"/>
+              <a:ext cx="4356484" cy="1728192"/>
+            </a:xfrm>
+            <a:prstGeom prst="roundRect">
+              <a:avLst>
+                <a:gd name="adj" fmla="val 11193"/>
+              </a:avLst>
+            </a:prstGeom>
+            <a:noFill/>
+            <a:ln>
+              <a:solidFill>
+                <a:schemeClr val="tx1"/>
+              </a:solidFill>
+            </a:ln>
+          </p:spPr>
+          <p:style>
+            <a:lnRef idx="2">
+              <a:schemeClr val="accent1">
+                <a:shade val="50000"/>
+              </a:schemeClr>
+            </a:lnRef>
+            <a:fillRef idx="1">
+              <a:schemeClr val="accent1"/>
+            </a:fillRef>
+            <a:effectRef idx="0">
+              <a:schemeClr val="accent1"/>
+            </a:effectRef>
+            <a:fontRef idx="minor">
+              <a:schemeClr val="lt1"/>
+            </a:fontRef>
+          </p:style>
+          <p:txBody>
+            <a:bodyPr rtlCol="0" anchor="ctr"/>
+            <a:lstStyle/>
+            <a:p>
+              <a:pPr algn="ctr"/>
+              <a:endParaRPr lang="en-US" dirty="0">
+                <a:solidFill>
+                  <a:schemeClr val="tx1"/>
+                </a:solidFill>
+              </a:endParaRPr>
+            </a:p>
+          </p:txBody>
+        </p:sp>
+        <p:sp>
+          <p:nvSpPr>
+            <p:cNvPr id="61" name="TextBox 60"/>
+            <p:cNvSpPr txBox="1"/>
+            <p:nvPr/>
+          </p:nvSpPr>
+          <p:spPr>
+            <a:xfrm>
+              <a:off x="2915816" y="2384884"/>
+              <a:ext cx="2584399" cy="369332"/>
+            </a:xfrm>
+            <a:prstGeom prst="rect">
+              <a:avLst/>
+            </a:prstGeom>
+            <a:noFill/>
+          </p:spPr>
+          <p:txBody>
+            <a:bodyPr wrap="none" rtlCol="0">
+              <a:spAutoFit/>
+            </a:bodyPr>
+            <a:lstStyle/>
+            <a:p>
+              <a:r>
+                <a:rPr lang="en-US" dirty="0" smtClean="0"/>
+                <a:t>Human extraction system </a:t>
+              </a:r>
+              <a:endParaRPr lang="en-US" dirty="0"/>
+            </a:p>
+          </p:txBody>
+        </p:sp>
+        <p:cxnSp>
+          <p:nvCxnSpPr>
+            <p:cNvPr id="76" name="Elbow Connector 75"/>
+            <p:cNvCxnSpPr>
+              <a:stCxn id="35" idx="3"/>
+            </p:cNvCxnSpPr>
+            <p:nvPr/>
+          </p:nvCxnSpPr>
+          <p:spPr>
+            <a:xfrm>
+              <a:off x="3776938" y="4671546"/>
+              <a:ext cx="795062" cy="1025706"/>
+            </a:xfrm>
+            <a:prstGeom prst="bentConnector2">
+              <a:avLst/>
+            </a:prstGeom>
+            <a:ln w="12700">
+              <a:solidFill>
+                <a:schemeClr val="tx1"/>
+              </a:solidFill>
+              <a:tailEnd type="triangle"/>
+            </a:ln>
+          </p:spPr>
+          <p:style>
+            <a:lnRef idx="1">
+              <a:schemeClr val="accent1"/>
+            </a:lnRef>
+            <a:fillRef idx="0">
+              <a:schemeClr val="accent1"/>
+            </a:fillRef>
+            <a:effectRef idx="0">
+              <a:schemeClr val="accent1"/>
+            </a:effectRef>
+            <a:fontRef idx="minor">
+              <a:schemeClr val="tx1"/>
+            </a:fontRef>
+          </p:style>
+        </p:cxnSp>
+        <p:cxnSp>
+          <p:nvCxnSpPr>
+            <p:cNvPr id="86" name="Elbow Connector 85"/>
+            <p:cNvCxnSpPr>
+              <a:stCxn id="35" idx="3"/>
+              <a:endCxn id="72" idx="2"/>
+            </p:cNvCxnSpPr>
+            <p:nvPr/>
+          </p:nvCxnSpPr>
+          <p:spPr>
+            <a:xfrm flipV="1">
+              <a:off x="3776938" y="3539162"/>
+              <a:ext cx="796063" cy="1132384"/>
+            </a:xfrm>
+            <a:prstGeom prst="bentConnector2">
+              <a:avLst/>
+            </a:prstGeom>
+            <a:ln w="12700">
+              <a:solidFill>
+                <a:schemeClr val="tx1"/>
+              </a:solidFill>
+              <a:tailEnd type="triangle"/>
+            </a:ln>
+          </p:spPr>
+          <p:style>
+            <a:lnRef idx="1">
+              <a:schemeClr val="accent1"/>
+            </a:lnRef>
+            <a:fillRef idx="0">
+              <a:schemeClr val="accent1"/>
+            </a:fillRef>
+            <a:effectRef idx="0">
+              <a:schemeClr val="accent1"/>
+            </a:effectRef>
+            <a:fontRef idx="minor">
+              <a:schemeClr val="tx1"/>
+            </a:fontRef>
+          </p:style>
+        </p:cxnSp>
+        <p:cxnSp>
+          <p:nvCxnSpPr>
+            <p:cNvPr id="52" name="Straight Arrow Connector 51"/>
+            <p:cNvCxnSpPr>
+              <a:endCxn id="38" idx="0"/>
+            </p:cNvCxnSpPr>
+            <p:nvPr/>
+          </p:nvCxnSpPr>
+          <p:spPr>
+            <a:xfrm flipH="1">
+              <a:off x="2141758" y="3492297"/>
+              <a:ext cx="774058" cy="872807"/>
+            </a:xfrm>
+            <a:prstGeom prst="straightConnector1">
+              <a:avLst/>
+            </a:prstGeom>
+            <a:ln w="12700">
+              <a:solidFill>
+                <a:schemeClr val="tx1"/>
+              </a:solidFill>
+              <a:tailEnd type="triangle"/>
+            </a:ln>
+          </p:spPr>
+          <p:style>
+            <a:lnRef idx="1">
+              <a:schemeClr val="accent1"/>
+            </a:lnRef>
+            <a:fillRef idx="0">
+              <a:schemeClr val="accent1"/>
+            </a:fillRef>
+            <a:effectRef idx="0">
+              <a:schemeClr val="accent1"/>
+            </a:effectRef>
+            <a:fontRef idx="minor">
+              <a:schemeClr val="tx1"/>
+            </a:fontRef>
+          </p:style>
+        </p:cxnSp>
+      </p:grpSp>
     </p:spTree>
     <p:extLst>
       <p:ext uri="{BB962C8B-B14F-4D97-AF65-F5344CB8AC3E}">
@@ -8844,11 +8850,11 @@
   <p:clrMapOvr>
     <a:masterClrMapping/>
   </p:clrMapOvr>
-  <mc:AlternateContent xmlns:mc="http://schemas.openxmlformats.org/markup-compatibility/2006">
-    <mc:Choice xmlns:p14="http://schemas.microsoft.com/office/powerpoint/2010/main" Requires="p14">
+  <mc:AlternateContent xmlns:mc="http://schemas.openxmlformats.org/markup-compatibility/2006" xmlns:p14="http://schemas.microsoft.com/office/powerpoint/2010/main">
+    <mc:Choice Requires="p14">
       <p:transition spd="slow" p14:dur="2000"/>
     </mc:Choice>
-    <mc:Fallback>
+    <mc:Fallback xmlns="">
       <p:transition xmlns:p14="http://schemas.microsoft.com/office/powerpoint/2010/main" spd="slow"/>
     </mc:Fallback>
   </mc:AlternateContent>
@@ -10586,11 +10592,11 @@
   <p:clrMapOvr>
     <a:masterClrMapping/>
   </p:clrMapOvr>
-  <mc:AlternateContent xmlns:mc="http://schemas.openxmlformats.org/markup-compatibility/2006">
-    <mc:Choice xmlns:p14="http://schemas.microsoft.com/office/powerpoint/2010/main" Requires="p14">
+  <mc:AlternateContent xmlns:mc="http://schemas.openxmlformats.org/markup-compatibility/2006" xmlns:p14="http://schemas.microsoft.com/office/powerpoint/2010/main">
+    <mc:Choice Requires="p14">
       <p:transition spd="slow" p14:dur="2000"/>
     </mc:Choice>
-    <mc:Fallback>
+    <mc:Fallback xmlns="">
       <p:transition xmlns:p14="http://schemas.microsoft.com/office/powerpoint/2010/main" spd="slow"/>
     </mc:Fallback>
   </mc:AlternateContent>

</xml_diff>

<commit_message>
Finished the pre-tokenization section.
</commit_message>
<xml_diff>
--- a/doc/evm-eval-work-flow.pptx
+++ b/doc/evm-eval-work-flow.pptx
@@ -198,7 +198,7 @@
             <a:fld id="{1D635E4C-BAB0-4BAB-AAF7-4D9825D68060}" type="datetimeFigureOut">
               <a:rPr lang="en-US" smtClean="0"/>
               <a:pPr/>
-              <a:t>8/21/2014</a:t>
+              <a:t>8/22/2014</a:t>
             </a:fld>
             <a:endParaRPr lang="en-US"/>
           </a:p>
@@ -649,7 +649,7 @@
             <a:fld id="{3B56066F-CE6C-4B27-993A-2842BDE8189B}" type="datetime1">
               <a:rPr lang="en-US" smtClean="0"/>
               <a:pPr/>
-              <a:t>8/21/2014</a:t>
+              <a:t>8/22/2014</a:t>
             </a:fld>
             <a:endParaRPr lang="en-US"/>
           </a:p>
@@ -816,7 +816,7 @@
             <a:fld id="{61174E08-E9E9-4260-BC0A-45316FB7E636}" type="datetime1">
               <a:rPr lang="en-US" smtClean="0"/>
               <a:pPr/>
-              <a:t>8/21/2014</a:t>
+              <a:t>8/22/2014</a:t>
             </a:fld>
             <a:endParaRPr lang="en-US"/>
           </a:p>
@@ -993,7 +993,7 @@
             <a:fld id="{64C675E3-4156-4610-8C23-B8FBCA8F0F60}" type="datetime1">
               <a:rPr lang="en-US" smtClean="0"/>
               <a:pPr/>
-              <a:t>8/21/2014</a:t>
+              <a:t>8/22/2014</a:t>
             </a:fld>
             <a:endParaRPr lang="en-US"/>
           </a:p>
@@ -1160,7 +1160,7 @@
             <a:fld id="{119C4F61-BDF2-4F97-8BCC-87B3B636DDF2}" type="datetime1">
               <a:rPr lang="en-US" smtClean="0"/>
               <a:pPr/>
-              <a:t>8/21/2014</a:t>
+              <a:t>8/22/2014</a:t>
             </a:fld>
             <a:endParaRPr lang="en-US"/>
           </a:p>
@@ -1403,7 +1403,7 @@
             <a:fld id="{02F0C2A0-F4E4-41A2-82A2-5525FFA2797A}" type="datetime1">
               <a:rPr lang="en-US" smtClean="0"/>
               <a:pPr/>
-              <a:t>8/21/2014</a:t>
+              <a:t>8/22/2014</a:t>
             </a:fld>
             <a:endParaRPr lang="en-US"/>
           </a:p>
@@ -1688,7 +1688,7 @@
             <a:fld id="{19C68C49-B72E-4B6B-B516-758D46CA9D72}" type="datetime1">
               <a:rPr lang="en-US" smtClean="0"/>
               <a:pPr/>
-              <a:t>8/21/2014</a:t>
+              <a:t>8/22/2014</a:t>
             </a:fld>
             <a:endParaRPr lang="en-US"/>
           </a:p>
@@ -2107,7 +2107,7 @@
             <a:fld id="{1AC33444-61AF-4C04-94BE-279981869E66}" type="datetime1">
               <a:rPr lang="en-US" smtClean="0"/>
               <a:pPr/>
-              <a:t>8/21/2014</a:t>
+              <a:t>8/22/2014</a:t>
             </a:fld>
             <a:endParaRPr lang="en-US"/>
           </a:p>
@@ -2222,7 +2222,7 @@
             <a:fld id="{680EC325-BE6D-4D10-BEAB-D93726F5911A}" type="datetime1">
               <a:rPr lang="en-US" smtClean="0"/>
               <a:pPr/>
-              <a:t>8/21/2014</a:t>
+              <a:t>8/22/2014</a:t>
             </a:fld>
             <a:endParaRPr lang="en-US"/>
           </a:p>
@@ -2314,7 +2314,7 @@
             <a:fld id="{B1972600-64F6-4C1F-838C-01314CB42182}" type="datetime1">
               <a:rPr lang="en-US" smtClean="0"/>
               <a:pPr/>
-              <a:t>8/21/2014</a:t>
+              <a:t>8/22/2014</a:t>
             </a:fld>
             <a:endParaRPr lang="en-US"/>
           </a:p>
@@ -2588,7 +2588,7 @@
             <a:fld id="{EAB60A1F-67E6-47A6-8991-02AEC54F3211}" type="datetime1">
               <a:rPr lang="en-US" smtClean="0"/>
               <a:pPr/>
-              <a:t>8/21/2014</a:t>
+              <a:t>8/22/2014</a:t>
             </a:fld>
             <a:endParaRPr lang="en-US"/>
           </a:p>
@@ -2838,7 +2838,7 @@
             <a:fld id="{78DCC502-29AC-46C3-8325-CE3B184A6144}" type="datetime1">
               <a:rPr lang="en-US" smtClean="0"/>
               <a:pPr/>
-              <a:t>8/21/2014</a:t>
+              <a:t>8/22/2014</a:t>
             </a:fld>
             <a:endParaRPr lang="en-US"/>
           </a:p>
@@ -3048,7 +3048,7 @@
             <a:fld id="{3DFC592B-B14E-40A5-81F6-981F0BC4FA39}" type="datetime1">
               <a:rPr lang="en-US" smtClean="0"/>
               <a:pPr/>
-              <a:t>8/21/2014</a:t>
+              <a:t>8/22/2014</a:t>
             </a:fld>
             <a:endParaRPr lang="en-US"/>
           </a:p>
@@ -5119,8 +5119,8 @@
           </p:nvSpPr>
           <p:spPr>
             <a:xfrm>
-              <a:off x="2934324" y="2384884"/>
-              <a:ext cx="2584399" cy="369332"/>
+              <a:off x="2178240" y="2384884"/>
+              <a:ext cx="3297569" cy="369332"/>
             </a:xfrm>
             <a:prstGeom prst="rect">
               <a:avLst/>
@@ -5135,7 +5135,11 @@
             <a:p>
               <a:r>
                 <a:rPr lang="en-US" dirty="0" smtClean="0"/>
-                <a:t>Human extraction system </a:t>
+                <a:t>Human </a:t>
+              </a:r>
+              <a:r>
+                <a:rPr lang="en-US" dirty="0" smtClean="0"/>
+                <a:t>event mention detection </a:t>
               </a:r>
               <a:endParaRPr lang="en-US" dirty="0"/>
             </a:p>
@@ -5433,7 +5437,7 @@
       </p:sp>
       <p:grpSp>
         <p:nvGrpSpPr>
-          <p:cNvPr id="32" name="Group 31"/>
+          <p:cNvPr id="7" name="Group 6"/>
           <p:cNvGrpSpPr/>
           <p:nvPr/>
         </p:nvGrpSpPr>
@@ -5445,1558 +5449,1704 @@
             <a:chExt cx="8965278" cy="4509120"/>
           </a:xfrm>
         </p:grpSpPr>
+        <p:grpSp>
+          <p:nvGrpSpPr>
+            <p:cNvPr id="32" name="Group 31"/>
+            <p:cNvGrpSpPr/>
+            <p:nvPr/>
+          </p:nvGrpSpPr>
+          <p:grpSpPr>
+            <a:xfrm>
+              <a:off x="85019" y="2348880"/>
+              <a:ext cx="8965278" cy="4509120"/>
+              <a:chOff x="85019" y="2348880"/>
+              <a:chExt cx="8965278" cy="4509120"/>
+            </a:xfrm>
+          </p:grpSpPr>
+          <p:sp>
+            <p:nvSpPr>
+              <p:cNvPr id="4" name="Smiley Face 3"/>
+              <p:cNvSpPr/>
+              <p:nvPr/>
+            </p:nvSpPr>
+            <p:spPr>
+              <a:xfrm>
+                <a:off x="1313666" y="2744924"/>
+                <a:ext cx="381000" cy="381000"/>
+              </a:xfrm>
+              <a:prstGeom prst="smileyFace">
+                <a:avLst/>
+              </a:prstGeom>
+              <a:noFill/>
+              <a:ln>
+                <a:solidFill>
+                  <a:schemeClr val="tx1"/>
+                </a:solidFill>
+              </a:ln>
+            </p:spPr>
+            <p:style>
+              <a:lnRef idx="2">
+                <a:schemeClr val="accent1">
+                  <a:shade val="50000"/>
+                </a:schemeClr>
+              </a:lnRef>
+              <a:fillRef idx="1">
+                <a:schemeClr val="accent1"/>
+              </a:fillRef>
+              <a:effectRef idx="0">
+                <a:schemeClr val="accent1"/>
+              </a:effectRef>
+              <a:fontRef idx="minor">
+                <a:schemeClr val="lt1"/>
+              </a:fontRef>
+            </p:style>
+            <p:txBody>
+              <a:bodyPr rtlCol="0" anchor="ctr"/>
+              <a:lstStyle/>
+              <a:p>
+                <a:pPr algn="ctr"/>
+                <a:endParaRPr lang="en-US" dirty="0"/>
+              </a:p>
+            </p:txBody>
+          </p:sp>
+          <p:sp>
+            <p:nvSpPr>
+              <p:cNvPr id="5" name="TextBox 4"/>
+              <p:cNvSpPr txBox="1"/>
+              <p:nvPr/>
+            </p:nvSpPr>
+            <p:spPr>
+              <a:xfrm>
+                <a:off x="107504" y="2636912"/>
+                <a:ext cx="1152127" cy="584775"/>
+              </a:xfrm>
+              <a:prstGeom prst="rect">
+                <a:avLst/>
+              </a:prstGeom>
+              <a:noFill/>
+            </p:spPr>
+            <p:txBody>
+              <a:bodyPr wrap="square" rtlCol="0">
+                <a:spAutoFit/>
+              </a:bodyPr>
+              <a:lstStyle/>
+              <a:p>
+                <a:pPr algn="ctr"/>
+                <a:r>
+                  <a:rPr lang="en-US" sz="1600" dirty="0" smtClean="0"/>
+                  <a:t>Human annotators</a:t>
+                </a:r>
+                <a:endParaRPr lang="en-US" sz="1600" dirty="0"/>
+              </a:p>
+            </p:txBody>
+          </p:sp>
+          <p:sp>
+            <p:nvSpPr>
+              <p:cNvPr id="6" name="Flowchart: Document 5"/>
+              <p:cNvSpPr/>
+              <p:nvPr/>
+            </p:nvSpPr>
+            <p:spPr>
+              <a:xfrm>
+                <a:off x="2909900" y="3052308"/>
+                <a:ext cx="762000" cy="468868"/>
+              </a:xfrm>
+              <a:prstGeom prst="flowChartDocument">
+                <a:avLst/>
+              </a:prstGeom>
+              <a:solidFill>
+                <a:schemeClr val="accent3">
+                  <a:lumMod val="40000"/>
+                  <a:lumOff val="60000"/>
+                </a:schemeClr>
+              </a:solidFill>
+              <a:ln>
+                <a:solidFill>
+                  <a:schemeClr val="tx1"/>
+                </a:solidFill>
+              </a:ln>
+            </p:spPr>
+            <p:style>
+              <a:lnRef idx="2">
+                <a:schemeClr val="accent1">
+                  <a:shade val="50000"/>
+                </a:schemeClr>
+              </a:lnRef>
+              <a:fillRef idx="1">
+                <a:schemeClr val="accent1"/>
+              </a:fillRef>
+              <a:effectRef idx="0">
+                <a:schemeClr val="accent1"/>
+              </a:effectRef>
+              <a:fontRef idx="minor">
+                <a:schemeClr val="lt1"/>
+              </a:fontRef>
+            </p:style>
+            <p:txBody>
+              <a:bodyPr rtlCol="0" anchor="ctr"/>
+              <a:lstStyle/>
+              <a:p>
+                <a:pPr algn="ctr"/>
+                <a:endParaRPr lang="en-US" dirty="0"/>
+              </a:p>
+            </p:txBody>
+          </p:sp>
+          <p:sp>
+            <p:nvSpPr>
+              <p:cNvPr id="8" name="TextBox 7"/>
+              <p:cNvSpPr txBox="1"/>
+              <p:nvPr/>
+            </p:nvSpPr>
+            <p:spPr>
+              <a:xfrm>
+                <a:off x="2833176" y="3492297"/>
+                <a:ext cx="1558804" cy="584775"/>
+              </a:xfrm>
+              <a:prstGeom prst="rect">
+                <a:avLst/>
+              </a:prstGeom>
+              <a:noFill/>
+            </p:spPr>
+            <p:txBody>
+              <a:bodyPr wrap="square" rtlCol="0">
+                <a:spAutoFit/>
+              </a:bodyPr>
+              <a:lstStyle/>
+              <a:p>
+                <a:r>
+                  <a:rPr lang="en-US" sz="1600" dirty="0" smtClean="0"/>
+                  <a:t>Human annotation files</a:t>
+                </a:r>
+                <a:endParaRPr lang="en-US" sz="1600" dirty="0"/>
+              </a:p>
+            </p:txBody>
+          </p:sp>
+          <p:cxnSp>
+            <p:nvCxnSpPr>
+              <p:cNvPr id="10" name="Straight Arrow Connector 9"/>
+              <p:cNvCxnSpPr>
+                <a:stCxn id="4" idx="6"/>
+                <a:endCxn id="53" idx="1"/>
+              </p:cNvCxnSpPr>
+              <p:nvPr/>
+            </p:nvCxnSpPr>
+            <p:spPr>
+              <a:xfrm>
+                <a:off x="1694666" y="2935424"/>
+                <a:ext cx="177034" cy="351448"/>
+              </a:xfrm>
+              <a:prstGeom prst="straightConnector1">
+                <a:avLst/>
+              </a:prstGeom>
+              <a:ln w="12700">
+                <a:solidFill>
+                  <a:schemeClr val="tx1"/>
+                </a:solidFill>
+                <a:tailEnd type="triangle"/>
+              </a:ln>
+            </p:spPr>
+            <p:style>
+              <a:lnRef idx="1">
+                <a:schemeClr val="accent1"/>
+              </a:lnRef>
+              <a:fillRef idx="0">
+                <a:schemeClr val="accent1"/>
+              </a:fillRef>
+              <a:effectRef idx="0">
+                <a:schemeClr val="accent1"/>
+              </a:effectRef>
+              <a:fontRef idx="minor">
+                <a:schemeClr val="tx1"/>
+              </a:fontRef>
+            </p:style>
+          </p:cxnSp>
+          <p:cxnSp>
+            <p:nvCxnSpPr>
+              <p:cNvPr id="12" name="Straight Arrow Connector 11"/>
+              <p:cNvCxnSpPr>
+                <a:stCxn id="53" idx="3"/>
+                <a:endCxn id="6" idx="1"/>
+              </p:cNvCxnSpPr>
+              <p:nvPr/>
+            </p:nvCxnSpPr>
+            <p:spPr>
+              <a:xfrm flipV="1">
+                <a:off x="2579701" y="3286742"/>
+                <a:ext cx="330199" cy="130"/>
+              </a:xfrm>
+              <a:prstGeom prst="straightConnector1">
+                <a:avLst/>
+              </a:prstGeom>
+              <a:ln w="12700">
+                <a:solidFill>
+                  <a:schemeClr val="tx1"/>
+                </a:solidFill>
+                <a:tailEnd type="triangle"/>
+              </a:ln>
+            </p:spPr>
+            <p:style>
+              <a:lnRef idx="1">
+                <a:schemeClr val="accent1"/>
+              </a:lnRef>
+              <a:fillRef idx="0">
+                <a:schemeClr val="accent1"/>
+              </a:fillRef>
+              <a:effectRef idx="0">
+                <a:schemeClr val="accent1"/>
+              </a:effectRef>
+              <a:fontRef idx="minor">
+                <a:schemeClr val="tx1"/>
+              </a:fontRef>
+            </p:style>
+          </p:cxnSp>
+          <p:sp>
+            <p:nvSpPr>
+              <p:cNvPr id="20" name="TextBox 19"/>
+              <p:cNvSpPr txBox="1"/>
+              <p:nvPr/>
+            </p:nvSpPr>
+            <p:spPr>
+              <a:xfrm>
+                <a:off x="85019" y="4860449"/>
+                <a:ext cx="634553" cy="584775"/>
+              </a:xfrm>
+              <a:prstGeom prst="rect">
+                <a:avLst/>
+              </a:prstGeom>
+              <a:noFill/>
+            </p:spPr>
+            <p:txBody>
+              <a:bodyPr wrap="square" rtlCol="0">
+                <a:spAutoFit/>
+              </a:bodyPr>
+              <a:lstStyle/>
+              <a:p>
+                <a:pPr algn="ctr"/>
+                <a:r>
+                  <a:rPr lang="en-US" sz="1600" dirty="0" smtClean="0"/>
+                  <a:t>Text files</a:t>
+                </a:r>
+                <a:endParaRPr lang="en-US" sz="1600" dirty="0"/>
+              </a:p>
+            </p:txBody>
+          </p:sp>
+          <p:sp>
+            <p:nvSpPr>
+              <p:cNvPr id="21" name="TextBox 20"/>
+              <p:cNvSpPr txBox="1"/>
+              <p:nvPr/>
+            </p:nvSpPr>
+            <p:spPr>
+              <a:xfrm>
+                <a:off x="647564" y="4165339"/>
+                <a:ext cx="952120" cy="307777"/>
+              </a:xfrm>
+              <a:prstGeom prst="rect">
+                <a:avLst/>
+              </a:prstGeom>
+              <a:noFill/>
+            </p:spPr>
+            <p:txBody>
+              <a:bodyPr wrap="none" rtlCol="0">
+                <a:spAutoFit/>
+              </a:bodyPr>
+              <a:lstStyle/>
+              <a:p>
+                <a:pPr algn="ctr"/>
+                <a:r>
+                  <a:rPr lang="en-US" sz="1400" i="1" dirty="0" smtClean="0"/>
+                  <a:t>sample.txt</a:t>
+                </a:r>
+                <a:endParaRPr lang="en-US" sz="1400" i="1" dirty="0"/>
+              </a:p>
+            </p:txBody>
+          </p:sp>
+          <p:sp>
+            <p:nvSpPr>
+              <p:cNvPr id="23" name="Flowchart: Document 22"/>
+              <p:cNvSpPr/>
+              <p:nvPr/>
+            </p:nvSpPr>
+            <p:spPr>
+              <a:xfrm>
+                <a:off x="317612" y="4437112"/>
+                <a:ext cx="762000" cy="468868"/>
+              </a:xfrm>
+              <a:prstGeom prst="flowChartDocument">
+                <a:avLst/>
+              </a:prstGeom>
+              <a:solidFill>
+                <a:schemeClr val="bg1">
+                  <a:lumMod val="75000"/>
+                </a:schemeClr>
+              </a:solidFill>
+              <a:ln>
+                <a:solidFill>
+                  <a:schemeClr val="tx1"/>
+                </a:solidFill>
+              </a:ln>
+            </p:spPr>
+            <p:style>
+              <a:lnRef idx="2">
+                <a:schemeClr val="accent1">
+                  <a:shade val="50000"/>
+                </a:schemeClr>
+              </a:lnRef>
+              <a:fillRef idx="1">
+                <a:schemeClr val="accent1"/>
+              </a:fillRef>
+              <a:effectRef idx="0">
+                <a:schemeClr val="accent1"/>
+              </a:effectRef>
+              <a:fontRef idx="minor">
+                <a:schemeClr val="lt1"/>
+              </a:fontRef>
+            </p:style>
+            <p:txBody>
+              <a:bodyPr rtlCol="0" anchor="ctr"/>
+              <a:lstStyle/>
+              <a:p>
+                <a:pPr algn="ctr"/>
+                <a:endParaRPr lang="en-US" dirty="0"/>
+              </a:p>
+            </p:txBody>
+          </p:sp>
+          <p:sp>
+            <p:nvSpPr>
+              <p:cNvPr id="41" name="Flowchart: Document 40"/>
+              <p:cNvSpPr/>
+              <p:nvPr/>
+            </p:nvSpPr>
+            <p:spPr>
+              <a:xfrm>
+                <a:off x="6023776" y="3052438"/>
+                <a:ext cx="762000" cy="468868"/>
+              </a:xfrm>
+              <a:prstGeom prst="flowChartDocument">
+                <a:avLst/>
+              </a:prstGeom>
+              <a:solidFill>
+                <a:schemeClr val="accent3">
+                  <a:lumMod val="40000"/>
+                  <a:lumOff val="60000"/>
+                </a:schemeClr>
+              </a:solidFill>
+              <a:ln>
+                <a:solidFill>
+                  <a:schemeClr val="tx1"/>
+                </a:solidFill>
+              </a:ln>
+            </p:spPr>
+            <p:style>
+              <a:lnRef idx="2">
+                <a:schemeClr val="accent1">
+                  <a:shade val="50000"/>
+                </a:schemeClr>
+              </a:lnRef>
+              <a:fillRef idx="1">
+                <a:schemeClr val="accent1"/>
+              </a:fillRef>
+              <a:effectRef idx="0">
+                <a:schemeClr val="accent1"/>
+              </a:effectRef>
+              <a:fontRef idx="minor">
+                <a:schemeClr val="lt1"/>
+              </a:fontRef>
+            </p:style>
+            <p:txBody>
+              <a:bodyPr rtlCol="0" anchor="ctr"/>
+              <a:lstStyle/>
+              <a:p>
+                <a:pPr algn="ctr"/>
+                <a:endParaRPr lang="en-US" dirty="0"/>
+              </a:p>
+            </p:txBody>
+          </p:sp>
+          <p:sp>
+            <p:nvSpPr>
+              <p:cNvPr id="42" name="TextBox 41"/>
+              <p:cNvSpPr txBox="1"/>
+              <p:nvPr/>
+            </p:nvSpPr>
+            <p:spPr>
+              <a:xfrm>
+                <a:off x="6016318" y="2768265"/>
+                <a:ext cx="959815" cy="307777"/>
+              </a:xfrm>
+              <a:prstGeom prst="rect">
+                <a:avLst/>
+              </a:prstGeom>
+              <a:noFill/>
+            </p:spPr>
+            <p:txBody>
+              <a:bodyPr wrap="none" rtlCol="0">
+                <a:spAutoFit/>
+              </a:bodyPr>
+              <a:lstStyle/>
+              <a:p>
+                <a:pPr algn="ctr"/>
+                <a:r>
+                  <a:rPr lang="en-US" sz="1400" i="1" dirty="0" err="1"/>
+                  <a:t>s</a:t>
+                </a:r>
+                <a:r>
+                  <a:rPr lang="en-US" sz="1400" i="1" dirty="0" err="1" smtClean="0"/>
+                  <a:t>ample.tbf</a:t>
+                </a:r>
+                <a:endParaRPr lang="en-US" sz="1400" i="1" dirty="0"/>
+              </a:p>
+            </p:txBody>
+          </p:sp>
+          <p:cxnSp>
+            <p:nvCxnSpPr>
+              <p:cNvPr id="43" name="Straight Arrow Connector 42"/>
+              <p:cNvCxnSpPr>
+                <a:stCxn id="6" idx="3"/>
+                <a:endCxn id="72" idx="1"/>
+              </p:cNvCxnSpPr>
+              <p:nvPr/>
+            </p:nvCxnSpPr>
+            <p:spPr>
+              <a:xfrm flipV="1">
+                <a:off x="3671900" y="3286059"/>
+                <a:ext cx="288032" cy="683"/>
+              </a:xfrm>
+              <a:prstGeom prst="straightConnector1">
+                <a:avLst/>
+              </a:prstGeom>
+              <a:ln w="12700">
+                <a:solidFill>
+                  <a:schemeClr val="tx1"/>
+                </a:solidFill>
+                <a:tailEnd type="triangle"/>
+              </a:ln>
+            </p:spPr>
+            <p:style>
+              <a:lnRef idx="1">
+                <a:schemeClr val="accent1"/>
+              </a:lnRef>
+              <a:fillRef idx="0">
+                <a:schemeClr val="accent1"/>
+              </a:fillRef>
+              <a:effectRef idx="0">
+                <a:schemeClr val="accent1"/>
+              </a:effectRef>
+              <a:fontRef idx="minor">
+                <a:schemeClr val="tx1"/>
+              </a:fontRef>
+            </p:style>
+          </p:cxnSp>
+          <p:sp>
+            <p:nvSpPr>
+              <p:cNvPr id="48" name="TextBox 47"/>
+              <p:cNvSpPr txBox="1"/>
+              <p:nvPr/>
+            </p:nvSpPr>
+            <p:spPr>
+              <a:xfrm>
+                <a:off x="5580112" y="3501008"/>
+                <a:ext cx="1788824" cy="584775"/>
+              </a:xfrm>
+              <a:prstGeom prst="rect">
+                <a:avLst/>
+              </a:prstGeom>
+              <a:noFill/>
+            </p:spPr>
+            <p:txBody>
+              <a:bodyPr wrap="none" rtlCol="0">
+                <a:spAutoFit/>
+              </a:bodyPr>
+              <a:lstStyle/>
+              <a:p>
+                <a:pPr algn="ctr"/>
+                <a:r>
+                  <a:rPr lang="en-US" sz="1600" dirty="0" smtClean="0"/>
+                  <a:t>Gold standard</a:t>
+                </a:r>
+              </a:p>
+              <a:p>
+                <a:pPr algn="ctr"/>
+                <a:r>
+                  <a:rPr lang="en-US" sz="1600" dirty="0" smtClean="0"/>
+                  <a:t>event mention files</a:t>
+                </a:r>
+                <a:endParaRPr lang="en-US" sz="1600" dirty="0"/>
+              </a:p>
+            </p:txBody>
+          </p:sp>
+          <p:cxnSp>
+            <p:nvCxnSpPr>
+              <p:cNvPr id="49" name="Straight Arrow Connector 48"/>
+              <p:cNvCxnSpPr>
+                <a:stCxn id="72" idx="3"/>
+                <a:endCxn id="41" idx="1"/>
+              </p:cNvCxnSpPr>
+              <p:nvPr/>
+            </p:nvCxnSpPr>
+            <p:spPr>
+              <a:xfrm>
+                <a:off x="5186069" y="3286059"/>
+                <a:ext cx="837707" cy="813"/>
+              </a:xfrm>
+              <a:prstGeom prst="straightConnector1">
+                <a:avLst/>
+              </a:prstGeom>
+              <a:ln w="12700">
+                <a:solidFill>
+                  <a:schemeClr val="tx1"/>
+                </a:solidFill>
+                <a:tailEnd type="triangle"/>
+              </a:ln>
+            </p:spPr>
+            <p:style>
+              <a:lnRef idx="1">
+                <a:schemeClr val="accent1"/>
+              </a:lnRef>
+              <a:fillRef idx="0">
+                <a:schemeClr val="accent1"/>
+              </a:fillRef>
+              <a:effectRef idx="0">
+                <a:schemeClr val="accent1"/>
+              </a:effectRef>
+              <a:fontRef idx="minor">
+                <a:schemeClr val="tx1"/>
+              </a:fontRef>
+            </p:style>
+          </p:cxnSp>
+          <p:sp>
+            <p:nvSpPr>
+              <p:cNvPr id="54" name="Flowchart: Document 53"/>
+              <p:cNvSpPr/>
+              <p:nvPr/>
+            </p:nvSpPr>
+            <p:spPr>
+              <a:xfrm>
+                <a:off x="6102198" y="5756597"/>
+                <a:ext cx="762000" cy="468868"/>
+              </a:xfrm>
+              <a:prstGeom prst="flowChartDocument">
+                <a:avLst/>
+              </a:prstGeom>
+              <a:solidFill>
+                <a:schemeClr val="accent4">
+                  <a:lumMod val="40000"/>
+                  <a:lumOff val="60000"/>
+                </a:schemeClr>
+              </a:solidFill>
+              <a:ln>
+                <a:solidFill>
+                  <a:schemeClr val="tx1"/>
+                </a:solidFill>
+              </a:ln>
+            </p:spPr>
+            <p:style>
+              <a:lnRef idx="2">
+                <a:schemeClr val="accent1">
+                  <a:shade val="50000"/>
+                </a:schemeClr>
+              </a:lnRef>
+              <a:fillRef idx="1">
+                <a:schemeClr val="accent1"/>
+              </a:fillRef>
+              <a:effectRef idx="0">
+                <a:schemeClr val="accent1"/>
+              </a:effectRef>
+              <a:fontRef idx="minor">
+                <a:schemeClr val="lt1"/>
+              </a:fontRef>
+            </p:style>
+            <p:txBody>
+              <a:bodyPr rtlCol="0" anchor="ctr"/>
+              <a:lstStyle/>
+              <a:p>
+                <a:pPr algn="ctr"/>
+                <a:endParaRPr lang="en-US" dirty="0"/>
+              </a:p>
+            </p:txBody>
+          </p:sp>
+          <p:sp>
+            <p:nvSpPr>
+              <p:cNvPr id="58" name="TextBox 57"/>
+              <p:cNvSpPr txBox="1"/>
+              <p:nvPr/>
+            </p:nvSpPr>
+            <p:spPr>
+              <a:xfrm>
+                <a:off x="5760132" y="6273225"/>
+                <a:ext cx="1294522" cy="584775"/>
+              </a:xfrm>
+              <a:prstGeom prst="rect">
+                <a:avLst/>
+              </a:prstGeom>
+              <a:noFill/>
+            </p:spPr>
+            <p:txBody>
+              <a:bodyPr wrap="none" rtlCol="0">
+                <a:spAutoFit/>
+              </a:bodyPr>
+              <a:lstStyle/>
+              <a:p>
+                <a:pPr algn="ctr"/>
+                <a:r>
+                  <a:rPr lang="en-US" sz="1600" dirty="0" smtClean="0"/>
+                  <a:t>System event</a:t>
+                </a:r>
+              </a:p>
+              <a:p>
+                <a:pPr algn="ctr"/>
+                <a:r>
+                  <a:rPr lang="en-US" sz="1600" dirty="0" smtClean="0"/>
+                  <a:t>mention files</a:t>
+                </a:r>
+                <a:endParaRPr lang="en-US" sz="1600" dirty="0"/>
+              </a:p>
+            </p:txBody>
+          </p:sp>
+          <p:cxnSp>
+            <p:nvCxnSpPr>
+              <p:cNvPr id="59" name="Straight Arrow Connector 58"/>
+              <p:cNvCxnSpPr>
+                <a:stCxn id="55" idx="3"/>
+                <a:endCxn id="54" idx="1"/>
+              </p:cNvCxnSpPr>
+              <p:nvPr/>
+            </p:nvCxnSpPr>
+            <p:spPr>
+              <a:xfrm>
+                <a:off x="5508104" y="5988537"/>
+                <a:ext cx="594094" cy="2494"/>
+              </a:xfrm>
+              <a:prstGeom prst="straightConnector1">
+                <a:avLst/>
+              </a:prstGeom>
+              <a:ln w="12700">
+                <a:solidFill>
+                  <a:schemeClr val="tx1"/>
+                </a:solidFill>
+                <a:tailEnd type="triangle"/>
+              </a:ln>
+            </p:spPr>
+            <p:style>
+              <a:lnRef idx="1">
+                <a:schemeClr val="accent1"/>
+              </a:lnRef>
+              <a:fillRef idx="0">
+                <a:schemeClr val="accent1"/>
+              </a:fillRef>
+              <a:effectRef idx="0">
+                <a:schemeClr val="accent1"/>
+              </a:effectRef>
+              <a:fontRef idx="minor">
+                <a:schemeClr val="tx1"/>
+              </a:fontRef>
+            </p:style>
+          </p:cxnSp>
+          <p:sp>
+            <p:nvSpPr>
+              <p:cNvPr id="63" name="TextBox 62"/>
+              <p:cNvSpPr txBox="1"/>
+              <p:nvPr/>
+            </p:nvSpPr>
+            <p:spPr>
+              <a:xfrm>
+                <a:off x="5670150" y="5432561"/>
+                <a:ext cx="1658201" cy="307777"/>
+              </a:xfrm>
+              <a:prstGeom prst="rect">
+                <a:avLst/>
+              </a:prstGeom>
+              <a:noFill/>
+            </p:spPr>
+            <p:txBody>
+              <a:bodyPr wrap="none" rtlCol="0">
+                <a:spAutoFit/>
+              </a:bodyPr>
+              <a:lstStyle/>
+              <a:p>
+                <a:pPr algn="ctr"/>
+                <a:r>
+                  <a:rPr lang="en-US" sz="1400" i="1" dirty="0" smtClean="0"/>
+                  <a:t>sample-system1.</a:t>
+                </a:r>
+                <a:r>
+                  <a:rPr lang="en-US" sz="1400" i="1" dirty="0"/>
+                  <a:t>t</a:t>
+                </a:r>
+                <a:r>
+                  <a:rPr lang="en-US" sz="1400" i="1" dirty="0" smtClean="0"/>
+                  <a:t>bf</a:t>
+                </a:r>
+                <a:endParaRPr lang="en-US" sz="1400" i="1" dirty="0"/>
+              </a:p>
+            </p:txBody>
+          </p:sp>
+          <p:sp>
+            <p:nvSpPr>
+              <p:cNvPr id="72" name="Rounded Rectangle 71"/>
+              <p:cNvSpPr/>
+              <p:nvPr/>
+            </p:nvSpPr>
+            <p:spPr>
+              <a:xfrm>
+                <a:off x="3959932" y="3032956"/>
+                <a:ext cx="1226137" cy="506206"/>
+              </a:xfrm>
+              <a:prstGeom prst="roundRect">
+                <a:avLst/>
+              </a:prstGeom>
+              <a:noFill/>
+              <a:ln>
+                <a:solidFill>
+                  <a:schemeClr val="tx1"/>
+                </a:solidFill>
+              </a:ln>
+            </p:spPr>
+            <p:style>
+              <a:lnRef idx="2">
+                <a:schemeClr val="accent1">
+                  <a:shade val="50000"/>
+                </a:schemeClr>
+              </a:lnRef>
+              <a:fillRef idx="1">
+                <a:schemeClr val="accent1"/>
+              </a:fillRef>
+              <a:effectRef idx="0">
+                <a:schemeClr val="accent1"/>
+              </a:effectRef>
+              <a:fontRef idx="minor">
+                <a:schemeClr val="lt1"/>
+              </a:fontRef>
+            </p:style>
+            <p:txBody>
+              <a:bodyPr rtlCol="0" anchor="ctr"/>
+              <a:lstStyle/>
+              <a:p>
+                <a:pPr algn="ctr"/>
+                <a:r>
+                  <a:rPr lang="en-US" dirty="0" smtClean="0">
+                    <a:solidFill>
+                      <a:schemeClr val="tx1"/>
+                    </a:solidFill>
+                  </a:rPr>
+                  <a:t>Converter</a:t>
+                </a:r>
+                <a:endParaRPr lang="en-US" dirty="0">
+                  <a:solidFill>
+                    <a:schemeClr val="tx1"/>
+                  </a:solidFill>
+                </a:endParaRPr>
+              </a:p>
+            </p:txBody>
+          </p:sp>
+          <p:cxnSp>
+            <p:nvCxnSpPr>
+              <p:cNvPr id="111" name="Elbow Connector 110"/>
+              <p:cNvCxnSpPr>
+                <a:stCxn id="41" idx="3"/>
+                <a:endCxn id="39" idx="0"/>
+              </p:cNvCxnSpPr>
+              <p:nvPr/>
+            </p:nvCxnSpPr>
+            <p:spPr>
+              <a:xfrm>
+                <a:off x="6785776" y="3286872"/>
+                <a:ext cx="488033" cy="1101573"/>
+              </a:xfrm>
+              <a:prstGeom prst="bentConnector2">
+                <a:avLst/>
+              </a:prstGeom>
+              <a:ln w="12700">
+                <a:solidFill>
+                  <a:schemeClr val="tx1"/>
+                </a:solidFill>
+                <a:tailEnd type="triangle"/>
+              </a:ln>
+            </p:spPr>
+            <p:style>
+              <a:lnRef idx="1">
+                <a:schemeClr val="accent1"/>
+              </a:lnRef>
+              <a:fillRef idx="0">
+                <a:schemeClr val="accent1"/>
+              </a:fillRef>
+              <a:effectRef idx="0">
+                <a:schemeClr val="accent1"/>
+              </a:effectRef>
+              <a:fontRef idx="minor">
+                <a:schemeClr val="tx1"/>
+              </a:fontRef>
+            </p:style>
+          </p:cxnSp>
+          <p:sp>
+            <p:nvSpPr>
+              <p:cNvPr id="47" name="TextBox 46"/>
+              <p:cNvSpPr txBox="1"/>
+              <p:nvPr/>
+            </p:nvSpPr>
+            <p:spPr>
+              <a:xfrm>
+                <a:off x="2771800" y="2780928"/>
+                <a:ext cx="1034257" cy="307777"/>
+              </a:xfrm>
+              <a:prstGeom prst="rect">
+                <a:avLst/>
+              </a:prstGeom>
+              <a:noFill/>
+            </p:spPr>
+            <p:txBody>
+              <a:bodyPr wrap="none" rtlCol="0">
+                <a:spAutoFit/>
+              </a:bodyPr>
+              <a:lstStyle/>
+              <a:p>
+                <a:pPr algn="ctr"/>
+                <a:r>
+                  <a:rPr lang="en-US" sz="1400" i="1" dirty="0" err="1" smtClean="0"/>
+                  <a:t>sample.ann</a:t>
+                </a:r>
+                <a:endParaRPr lang="en-US" sz="1400" i="1" dirty="0"/>
+              </a:p>
+            </p:txBody>
+          </p:sp>
+          <p:cxnSp>
+            <p:nvCxnSpPr>
+              <p:cNvPr id="50" name="Elbow Connector 49"/>
+              <p:cNvCxnSpPr>
+                <a:stCxn id="23" idx="2"/>
+                <a:endCxn id="55" idx="1"/>
+              </p:cNvCxnSpPr>
+              <p:nvPr/>
+            </p:nvCxnSpPr>
+            <p:spPr>
+              <a:xfrm rot="16200000" flipH="1">
+                <a:off x="422345" y="5151250"/>
+                <a:ext cx="1113554" cy="561020"/>
+              </a:xfrm>
+              <a:prstGeom prst="bentConnector2">
+                <a:avLst/>
+              </a:prstGeom>
+              <a:ln w="12700">
+                <a:solidFill>
+                  <a:schemeClr val="tx1"/>
+                </a:solidFill>
+                <a:tailEnd type="triangle"/>
+              </a:ln>
+            </p:spPr>
+            <p:style>
+              <a:lnRef idx="1">
+                <a:schemeClr val="accent1"/>
+              </a:lnRef>
+              <a:fillRef idx="0">
+                <a:schemeClr val="accent1"/>
+              </a:fillRef>
+              <a:effectRef idx="0">
+                <a:schemeClr val="accent1"/>
+              </a:effectRef>
+              <a:fontRef idx="minor">
+                <a:schemeClr val="tx1"/>
+              </a:fontRef>
+            </p:style>
+          </p:cxnSp>
+          <p:sp>
+            <p:nvSpPr>
+              <p:cNvPr id="55" name="Rounded Rectangle 54"/>
+              <p:cNvSpPr/>
+              <p:nvPr/>
+            </p:nvSpPr>
+            <p:spPr>
+              <a:xfrm>
+                <a:off x="1259632" y="5697252"/>
+                <a:ext cx="4248472" cy="582569"/>
+              </a:xfrm>
+              <a:prstGeom prst="roundRect">
+                <a:avLst/>
+              </a:prstGeom>
+              <a:solidFill>
+                <a:schemeClr val="accent4">
+                  <a:lumMod val="40000"/>
+                  <a:lumOff val="60000"/>
+                </a:schemeClr>
+              </a:solidFill>
+              <a:ln>
+                <a:solidFill>
+                  <a:schemeClr val="tx1"/>
+                </a:solidFill>
+              </a:ln>
+            </p:spPr>
+            <p:style>
+              <a:lnRef idx="2">
+                <a:schemeClr val="accent1">
+                  <a:shade val="50000"/>
+                </a:schemeClr>
+              </a:lnRef>
+              <a:fillRef idx="1">
+                <a:schemeClr val="accent1"/>
+              </a:fillRef>
+              <a:effectRef idx="0">
+                <a:schemeClr val="accent1"/>
+              </a:effectRef>
+              <a:fontRef idx="minor">
+                <a:schemeClr val="lt1"/>
+              </a:fontRef>
+            </p:style>
+            <p:txBody>
+              <a:bodyPr rtlCol="0" anchor="ctr"/>
+              <a:lstStyle/>
+              <a:p>
+                <a:pPr algn="ctr"/>
+                <a:r>
+                  <a:rPr lang="en-US" dirty="0">
+                    <a:solidFill>
+                      <a:schemeClr val="tx1"/>
+                    </a:solidFill>
+                  </a:rPr>
+                  <a:t>Event </a:t>
+                </a:r>
+                <a:r>
+                  <a:rPr lang="en-US" dirty="0" smtClean="0">
+                    <a:solidFill>
+                      <a:schemeClr val="tx1"/>
+                    </a:solidFill>
+                  </a:rPr>
+                  <a:t>mention detection </a:t>
+                </a:r>
+                <a:r>
+                  <a:rPr lang="en-US" dirty="0">
+                    <a:solidFill>
+                      <a:schemeClr val="tx1"/>
+                    </a:solidFill>
+                  </a:rPr>
+                  <a:t>system</a:t>
+                </a:r>
+              </a:p>
+            </p:txBody>
+          </p:sp>
+          <p:cxnSp>
+            <p:nvCxnSpPr>
+              <p:cNvPr id="64" name="Elbow Connector 63"/>
+              <p:cNvCxnSpPr>
+                <a:stCxn id="54" idx="3"/>
+                <a:endCxn id="39" idx="2"/>
+              </p:cNvCxnSpPr>
+              <p:nvPr/>
+            </p:nvCxnSpPr>
+            <p:spPr>
+              <a:xfrm flipV="1">
+                <a:off x="6864198" y="4894651"/>
+                <a:ext cx="409611" cy="1096380"/>
+              </a:xfrm>
+              <a:prstGeom prst="bentConnector2">
+                <a:avLst/>
+              </a:prstGeom>
+              <a:ln w="12700">
+                <a:solidFill>
+                  <a:schemeClr val="tx1"/>
+                </a:solidFill>
+                <a:tailEnd type="triangle"/>
+              </a:ln>
+            </p:spPr>
+            <p:style>
+              <a:lnRef idx="1">
+                <a:schemeClr val="accent1"/>
+              </a:lnRef>
+              <a:fillRef idx="0">
+                <a:schemeClr val="accent1"/>
+              </a:fillRef>
+              <a:effectRef idx="0">
+                <a:schemeClr val="accent1"/>
+              </a:effectRef>
+              <a:fontRef idx="minor">
+                <a:schemeClr val="tx1"/>
+              </a:fontRef>
+            </p:style>
+          </p:cxnSp>
+          <p:sp>
+            <p:nvSpPr>
+              <p:cNvPr id="35" name="Flowchart: Document 34"/>
+              <p:cNvSpPr/>
+              <p:nvPr/>
+            </p:nvSpPr>
+            <p:spPr>
+              <a:xfrm>
+                <a:off x="3014938" y="4437112"/>
+                <a:ext cx="762000" cy="468868"/>
+              </a:xfrm>
+              <a:prstGeom prst="flowChartDocument">
+                <a:avLst/>
+              </a:prstGeom>
+              <a:solidFill>
+                <a:schemeClr val="accent3">
+                  <a:lumMod val="40000"/>
+                  <a:lumOff val="60000"/>
+                </a:schemeClr>
+              </a:solidFill>
+              <a:ln>
+                <a:solidFill>
+                  <a:schemeClr val="tx1"/>
+                </a:solidFill>
+              </a:ln>
+            </p:spPr>
+            <p:style>
+              <a:lnRef idx="2">
+                <a:schemeClr val="accent1">
+                  <a:shade val="50000"/>
+                </a:schemeClr>
+              </a:lnRef>
+              <a:fillRef idx="1">
+                <a:schemeClr val="accent1"/>
+              </a:fillRef>
+              <a:effectRef idx="0">
+                <a:schemeClr val="accent1"/>
+              </a:effectRef>
+              <a:fontRef idx="minor">
+                <a:schemeClr val="lt1"/>
+              </a:fontRef>
+            </p:style>
+            <p:txBody>
+              <a:bodyPr rtlCol="0" anchor="ctr"/>
+              <a:lstStyle/>
+              <a:p>
+                <a:pPr algn="ctr"/>
+                <a:endParaRPr lang="en-US" dirty="0"/>
+              </a:p>
+            </p:txBody>
+          </p:sp>
+          <p:cxnSp>
+            <p:nvCxnSpPr>
+              <p:cNvPr id="36" name="Straight Arrow Connector 35"/>
+              <p:cNvCxnSpPr>
+                <a:stCxn id="38" idx="3"/>
+                <a:endCxn id="35" idx="1"/>
+              </p:cNvCxnSpPr>
+              <p:nvPr/>
+            </p:nvCxnSpPr>
+            <p:spPr>
+              <a:xfrm>
+                <a:off x="2717821" y="4668816"/>
+                <a:ext cx="297117" cy="2730"/>
+              </a:xfrm>
+              <a:prstGeom prst="straightConnector1">
+                <a:avLst/>
+              </a:prstGeom>
+              <a:ln w="12700">
+                <a:solidFill>
+                  <a:schemeClr val="tx1"/>
+                </a:solidFill>
+                <a:tailEnd type="triangle"/>
+              </a:ln>
+            </p:spPr>
+            <p:style>
+              <a:lnRef idx="1">
+                <a:schemeClr val="accent1"/>
+              </a:lnRef>
+              <a:fillRef idx="0">
+                <a:schemeClr val="accent1"/>
+              </a:fillRef>
+              <a:effectRef idx="0">
+                <a:schemeClr val="accent1"/>
+              </a:effectRef>
+              <a:fontRef idx="minor">
+                <a:schemeClr val="tx1"/>
+              </a:fontRef>
+            </p:style>
+          </p:cxnSp>
+          <p:cxnSp>
+            <p:nvCxnSpPr>
+              <p:cNvPr id="37" name="Straight Arrow Connector 36"/>
+              <p:cNvCxnSpPr>
+                <a:stCxn id="23" idx="3"/>
+                <a:endCxn id="38" idx="1"/>
+              </p:cNvCxnSpPr>
+              <p:nvPr/>
+            </p:nvCxnSpPr>
+            <p:spPr>
+              <a:xfrm flipV="1">
+                <a:off x="1079612" y="4668816"/>
+                <a:ext cx="486082" cy="2730"/>
+              </a:xfrm>
+              <a:prstGeom prst="straightConnector1">
+                <a:avLst/>
+              </a:prstGeom>
+              <a:ln w="12700">
+                <a:solidFill>
+                  <a:schemeClr val="tx1"/>
+                </a:solidFill>
+                <a:tailEnd type="triangle"/>
+              </a:ln>
+            </p:spPr>
+            <p:style>
+              <a:lnRef idx="1">
+                <a:schemeClr val="accent1"/>
+              </a:lnRef>
+              <a:fillRef idx="0">
+                <a:schemeClr val="accent1"/>
+              </a:fillRef>
+              <a:effectRef idx="0">
+                <a:schemeClr val="accent1"/>
+              </a:effectRef>
+              <a:fontRef idx="minor">
+                <a:schemeClr val="tx1"/>
+              </a:fontRef>
+            </p:style>
+          </p:cxnSp>
+          <p:sp>
+            <p:nvSpPr>
+              <p:cNvPr id="38" name="Rounded Rectangle 37"/>
+              <p:cNvSpPr/>
+              <p:nvPr/>
+            </p:nvSpPr>
+            <p:spPr>
+              <a:xfrm>
+                <a:off x="1565694" y="4365104"/>
+                <a:ext cx="1152127" cy="607423"/>
+              </a:xfrm>
+              <a:prstGeom prst="roundRect">
+                <a:avLst/>
+              </a:prstGeom>
+              <a:solidFill>
+                <a:schemeClr val="accent3">
+                  <a:lumMod val="40000"/>
+                  <a:lumOff val="60000"/>
+                </a:schemeClr>
+              </a:solidFill>
+              <a:ln>
+                <a:solidFill>
+                  <a:schemeClr val="tx1"/>
+                </a:solidFill>
+              </a:ln>
+            </p:spPr>
+            <p:style>
+              <a:lnRef idx="2">
+                <a:schemeClr val="accent1">
+                  <a:shade val="50000"/>
+                </a:schemeClr>
+              </a:lnRef>
+              <a:fillRef idx="1">
+                <a:schemeClr val="accent1"/>
+              </a:fillRef>
+              <a:effectRef idx="0">
+                <a:schemeClr val="accent1"/>
+              </a:effectRef>
+              <a:fontRef idx="minor">
+                <a:schemeClr val="lt1"/>
+              </a:fontRef>
+            </p:style>
+            <p:txBody>
+              <a:bodyPr rtlCol="0" anchor="ctr"/>
+              <a:lstStyle/>
+              <a:p>
+                <a:pPr algn="ctr"/>
+                <a:r>
+                  <a:rPr lang="en-US" dirty="0" err="1">
+                    <a:solidFill>
+                      <a:schemeClr val="tx1"/>
+                    </a:solidFill>
+                  </a:rPr>
+                  <a:t>T</a:t>
+                </a:r>
+                <a:r>
+                  <a:rPr lang="en-US" dirty="0" err="1" smtClean="0">
+                    <a:solidFill>
+                      <a:schemeClr val="tx1"/>
+                    </a:solidFill>
+                  </a:rPr>
+                  <a:t>okenizer</a:t>
+                </a:r>
+                <a:endParaRPr lang="en-US" dirty="0">
+                  <a:solidFill>
+                    <a:schemeClr val="tx1"/>
+                  </a:solidFill>
+                </a:endParaRPr>
+              </a:p>
+            </p:txBody>
+          </p:sp>
+          <p:sp>
+            <p:nvSpPr>
+              <p:cNvPr id="39" name="Rounded Rectangle 38"/>
+              <p:cNvSpPr/>
+              <p:nvPr/>
+            </p:nvSpPr>
+            <p:spPr>
+              <a:xfrm>
+                <a:off x="6660740" y="4388445"/>
+                <a:ext cx="1226137" cy="506206"/>
+              </a:xfrm>
+              <a:prstGeom prst="roundRect">
+                <a:avLst/>
+              </a:prstGeom>
+              <a:noFill/>
+              <a:ln>
+                <a:solidFill>
+                  <a:schemeClr val="tx1"/>
+                </a:solidFill>
+              </a:ln>
+            </p:spPr>
+            <p:style>
+              <a:lnRef idx="2">
+                <a:schemeClr val="accent1">
+                  <a:shade val="50000"/>
+                </a:schemeClr>
+              </a:lnRef>
+              <a:fillRef idx="1">
+                <a:schemeClr val="accent1"/>
+              </a:fillRef>
+              <a:effectRef idx="0">
+                <a:schemeClr val="accent1"/>
+              </a:effectRef>
+              <a:fontRef idx="minor">
+                <a:schemeClr val="lt1"/>
+              </a:fontRef>
+            </p:style>
+            <p:txBody>
+              <a:bodyPr rtlCol="0" anchor="ctr"/>
+              <a:lstStyle/>
+              <a:p>
+                <a:pPr algn="ctr"/>
+                <a:r>
+                  <a:rPr lang="en-US" dirty="0">
+                    <a:solidFill>
+                      <a:schemeClr val="tx1"/>
+                    </a:solidFill>
+                  </a:rPr>
+                  <a:t>Evaluator</a:t>
+                </a:r>
+              </a:p>
+            </p:txBody>
+          </p:sp>
+          <p:sp>
+            <p:nvSpPr>
+              <p:cNvPr id="44" name="Flowchart: Process 43"/>
+              <p:cNvSpPr/>
+              <p:nvPr/>
+            </p:nvSpPr>
+            <p:spPr>
+              <a:xfrm>
+                <a:off x="8136396" y="4387446"/>
+                <a:ext cx="913901" cy="507205"/>
+              </a:xfrm>
+              <a:prstGeom prst="flowChartProcess">
+                <a:avLst/>
+              </a:prstGeom>
+              <a:noFill/>
+              <a:ln>
+                <a:solidFill>
+                  <a:schemeClr val="tx1"/>
+                </a:solidFill>
+              </a:ln>
+            </p:spPr>
+            <p:style>
+              <a:lnRef idx="2">
+                <a:schemeClr val="accent1">
+                  <a:shade val="50000"/>
+                </a:schemeClr>
+              </a:lnRef>
+              <a:fillRef idx="1">
+                <a:schemeClr val="accent1"/>
+              </a:fillRef>
+              <a:effectRef idx="0">
+                <a:schemeClr val="accent1"/>
+              </a:effectRef>
+              <a:fontRef idx="minor">
+                <a:schemeClr val="lt1"/>
+              </a:fontRef>
+            </p:style>
+            <p:txBody>
+              <a:bodyPr rtlCol="0" anchor="ctr"/>
+              <a:lstStyle/>
+              <a:p>
+                <a:pPr algn="ctr"/>
+                <a:r>
+                  <a:rPr lang="en-US" dirty="0" smtClean="0">
+                    <a:solidFill>
+                      <a:schemeClr val="tx1"/>
+                    </a:solidFill>
+                  </a:rPr>
+                  <a:t>Results</a:t>
+                </a:r>
+                <a:endParaRPr lang="en-US" dirty="0">
+                  <a:solidFill>
+                    <a:schemeClr val="tx1"/>
+                  </a:solidFill>
+                </a:endParaRPr>
+              </a:p>
+            </p:txBody>
+          </p:sp>
+          <p:cxnSp>
+            <p:nvCxnSpPr>
+              <p:cNvPr id="45" name="Straight Arrow Connector 44"/>
+              <p:cNvCxnSpPr>
+                <a:stCxn id="39" idx="3"/>
+                <a:endCxn id="44" idx="1"/>
+              </p:cNvCxnSpPr>
+              <p:nvPr/>
+            </p:nvCxnSpPr>
+            <p:spPr>
+              <a:xfrm flipV="1">
+                <a:off x="7886877" y="4641049"/>
+                <a:ext cx="249519" cy="499"/>
+              </a:xfrm>
+              <a:prstGeom prst="straightConnector1">
+                <a:avLst/>
+              </a:prstGeom>
+              <a:ln w="12700">
+                <a:solidFill>
+                  <a:schemeClr val="tx1"/>
+                </a:solidFill>
+                <a:tailEnd type="triangle"/>
+              </a:ln>
+            </p:spPr>
+            <p:style>
+              <a:lnRef idx="1">
+                <a:schemeClr val="accent1"/>
+              </a:lnRef>
+              <a:fillRef idx="0">
+                <a:schemeClr val="accent1"/>
+              </a:fillRef>
+              <a:effectRef idx="0">
+                <a:schemeClr val="accent1"/>
+              </a:effectRef>
+              <a:fontRef idx="minor">
+                <a:schemeClr val="tx1"/>
+              </a:fontRef>
+            </p:style>
+          </p:cxnSp>
+          <p:sp>
+            <p:nvSpPr>
+              <p:cNvPr id="46" name="TextBox 45"/>
+              <p:cNvSpPr txBox="1"/>
+              <p:nvPr/>
+            </p:nvSpPr>
+            <p:spPr>
+              <a:xfrm>
+                <a:off x="3005853" y="4152585"/>
+                <a:ext cx="987130" cy="307777"/>
+              </a:xfrm>
+              <a:prstGeom prst="rect">
+                <a:avLst/>
+              </a:prstGeom>
+              <a:noFill/>
+            </p:spPr>
+            <p:txBody>
+              <a:bodyPr wrap="none" rtlCol="0">
+                <a:spAutoFit/>
+              </a:bodyPr>
+              <a:lstStyle/>
+              <a:p>
+                <a:pPr algn="ctr"/>
+                <a:r>
+                  <a:rPr lang="en-US" sz="1400" i="1" dirty="0" err="1" smtClean="0"/>
+                  <a:t>sample.tkn</a:t>
+                </a:r>
+                <a:endParaRPr lang="en-US" sz="1400" i="1" dirty="0"/>
+              </a:p>
+            </p:txBody>
+          </p:sp>
+          <p:sp>
+            <p:nvSpPr>
+              <p:cNvPr id="51" name="TextBox 50"/>
+              <p:cNvSpPr txBox="1"/>
+              <p:nvPr/>
+            </p:nvSpPr>
+            <p:spPr>
+              <a:xfrm>
+                <a:off x="2969849" y="4856406"/>
+                <a:ext cx="1055931" cy="338554"/>
+              </a:xfrm>
+              <a:prstGeom prst="rect">
+                <a:avLst/>
+              </a:prstGeom>
+              <a:noFill/>
+            </p:spPr>
+            <p:txBody>
+              <a:bodyPr wrap="none" rtlCol="0">
+                <a:spAutoFit/>
+              </a:bodyPr>
+              <a:lstStyle/>
+              <a:p>
+                <a:pPr algn="ctr"/>
+                <a:r>
+                  <a:rPr lang="en-US" sz="1600" dirty="0" smtClean="0"/>
+                  <a:t>Token files</a:t>
+                </a:r>
+                <a:endParaRPr lang="en-US" sz="1600" dirty="0"/>
+              </a:p>
+            </p:txBody>
+          </p:sp>
+          <p:sp>
+            <p:nvSpPr>
+              <p:cNvPr id="53" name="Rounded Rectangle 52"/>
+              <p:cNvSpPr/>
+              <p:nvPr/>
+            </p:nvSpPr>
+            <p:spPr>
+              <a:xfrm>
+                <a:off x="1871700" y="3033769"/>
+                <a:ext cx="708001" cy="506206"/>
+              </a:xfrm>
+              <a:prstGeom prst="roundRect">
+                <a:avLst/>
+              </a:prstGeom>
+              <a:noFill/>
+              <a:ln>
+                <a:solidFill>
+                  <a:schemeClr val="tx1"/>
+                </a:solidFill>
+              </a:ln>
+            </p:spPr>
+            <p:style>
+              <a:lnRef idx="2">
+                <a:schemeClr val="accent1">
+                  <a:shade val="50000"/>
+                </a:schemeClr>
+              </a:lnRef>
+              <a:fillRef idx="1">
+                <a:schemeClr val="accent1"/>
+              </a:fillRef>
+              <a:effectRef idx="0">
+                <a:schemeClr val="accent1"/>
+              </a:effectRef>
+              <a:fontRef idx="minor">
+                <a:schemeClr val="lt1"/>
+              </a:fontRef>
+            </p:style>
+            <p:txBody>
+              <a:bodyPr rtlCol="0" anchor="ctr"/>
+              <a:lstStyle/>
+              <a:p>
+                <a:pPr algn="ctr"/>
+                <a:r>
+                  <a:rPr lang="en-US" dirty="0" smtClean="0">
+                    <a:solidFill>
+                      <a:schemeClr val="tx1"/>
+                    </a:solidFill>
+                  </a:rPr>
+                  <a:t>brat</a:t>
+                </a:r>
+                <a:endParaRPr lang="en-US" dirty="0">
+                  <a:solidFill>
+                    <a:schemeClr val="tx1"/>
+                  </a:solidFill>
+                </a:endParaRPr>
+              </a:p>
+            </p:txBody>
+          </p:sp>
+          <p:cxnSp>
+            <p:nvCxnSpPr>
+              <p:cNvPr id="123" name="Elbow Connector 122"/>
+              <p:cNvCxnSpPr>
+                <a:stCxn id="23" idx="0"/>
+                <a:endCxn id="53" idx="1"/>
+              </p:cNvCxnSpPr>
+              <p:nvPr/>
+            </p:nvCxnSpPr>
+            <p:spPr>
+              <a:xfrm rot="5400000" flipH="1" flipV="1">
+                <a:off x="710036" y="3275448"/>
+                <a:ext cx="1150240" cy="1173088"/>
+              </a:xfrm>
+              <a:prstGeom prst="bentConnector2">
+                <a:avLst/>
+              </a:prstGeom>
+              <a:ln w="12700">
+                <a:solidFill>
+                  <a:schemeClr val="tx1"/>
+                </a:solidFill>
+                <a:tailEnd type="triangle"/>
+              </a:ln>
+            </p:spPr>
+            <p:style>
+              <a:lnRef idx="1">
+                <a:schemeClr val="accent1"/>
+              </a:lnRef>
+              <a:fillRef idx="0">
+                <a:schemeClr val="accent1"/>
+              </a:fillRef>
+              <a:effectRef idx="0">
+                <a:schemeClr val="accent1"/>
+              </a:effectRef>
+              <a:fontRef idx="minor">
+                <a:schemeClr val="tx1"/>
+              </a:fontRef>
+            </p:style>
+          </p:cxnSp>
+          <p:sp>
+            <p:nvSpPr>
+              <p:cNvPr id="68" name="Rounded Rectangle 67"/>
+              <p:cNvSpPr/>
+              <p:nvPr/>
+            </p:nvSpPr>
+            <p:spPr>
+              <a:xfrm>
+                <a:off x="1223628" y="2348880"/>
+                <a:ext cx="4356484" cy="1728192"/>
+              </a:xfrm>
+              <a:prstGeom prst="roundRect">
+                <a:avLst>
+                  <a:gd name="adj" fmla="val 11193"/>
+                </a:avLst>
+              </a:prstGeom>
+              <a:noFill/>
+              <a:ln>
+                <a:solidFill>
+                  <a:schemeClr val="tx1"/>
+                </a:solidFill>
+              </a:ln>
+            </p:spPr>
+            <p:style>
+              <a:lnRef idx="2">
+                <a:schemeClr val="accent1">
+                  <a:shade val="50000"/>
+                </a:schemeClr>
+              </a:lnRef>
+              <a:fillRef idx="1">
+                <a:schemeClr val="accent1"/>
+              </a:fillRef>
+              <a:effectRef idx="0">
+                <a:schemeClr val="accent1"/>
+              </a:effectRef>
+              <a:fontRef idx="minor">
+                <a:schemeClr val="lt1"/>
+              </a:fontRef>
+            </p:style>
+            <p:txBody>
+              <a:bodyPr rtlCol="0" anchor="ctr"/>
+              <a:lstStyle/>
+              <a:p>
+                <a:pPr algn="ctr"/>
+                <a:endParaRPr lang="en-US" dirty="0">
+                  <a:solidFill>
+                    <a:schemeClr val="tx1"/>
+                  </a:solidFill>
+                </a:endParaRPr>
+              </a:p>
+            </p:txBody>
+          </p:sp>
+          <p:cxnSp>
+            <p:nvCxnSpPr>
+              <p:cNvPr id="76" name="Elbow Connector 75"/>
+              <p:cNvCxnSpPr>
+                <a:stCxn id="35" idx="3"/>
+              </p:cNvCxnSpPr>
+              <p:nvPr/>
+            </p:nvCxnSpPr>
+            <p:spPr>
+              <a:xfrm>
+                <a:off x="3776938" y="4671546"/>
+                <a:ext cx="795062" cy="1025706"/>
+              </a:xfrm>
+              <a:prstGeom prst="bentConnector2">
+                <a:avLst/>
+              </a:prstGeom>
+              <a:ln w="12700">
+                <a:solidFill>
+                  <a:schemeClr val="tx1"/>
+                </a:solidFill>
+                <a:tailEnd type="triangle"/>
+              </a:ln>
+            </p:spPr>
+            <p:style>
+              <a:lnRef idx="1">
+                <a:schemeClr val="accent1"/>
+              </a:lnRef>
+              <a:fillRef idx="0">
+                <a:schemeClr val="accent1"/>
+              </a:fillRef>
+              <a:effectRef idx="0">
+                <a:schemeClr val="accent1"/>
+              </a:effectRef>
+              <a:fontRef idx="minor">
+                <a:schemeClr val="tx1"/>
+              </a:fontRef>
+            </p:style>
+          </p:cxnSp>
+          <p:cxnSp>
+            <p:nvCxnSpPr>
+              <p:cNvPr id="86" name="Elbow Connector 85"/>
+              <p:cNvCxnSpPr>
+                <a:stCxn id="35" idx="3"/>
+                <a:endCxn id="72" idx="2"/>
+              </p:cNvCxnSpPr>
+              <p:nvPr/>
+            </p:nvCxnSpPr>
+            <p:spPr>
+              <a:xfrm flipV="1">
+                <a:off x="3776938" y="3539162"/>
+                <a:ext cx="796063" cy="1132384"/>
+              </a:xfrm>
+              <a:prstGeom prst="bentConnector2">
+                <a:avLst/>
+              </a:prstGeom>
+              <a:ln w="12700">
+                <a:solidFill>
+                  <a:schemeClr val="tx1"/>
+                </a:solidFill>
+                <a:tailEnd type="triangle"/>
+              </a:ln>
+            </p:spPr>
+            <p:style>
+              <a:lnRef idx="1">
+                <a:schemeClr val="accent1"/>
+              </a:lnRef>
+              <a:fillRef idx="0">
+                <a:schemeClr val="accent1"/>
+              </a:fillRef>
+              <a:effectRef idx="0">
+                <a:schemeClr val="accent1"/>
+              </a:effectRef>
+              <a:fontRef idx="minor">
+                <a:schemeClr val="tx1"/>
+              </a:fontRef>
+            </p:style>
+          </p:cxnSp>
+          <p:cxnSp>
+            <p:nvCxnSpPr>
+              <p:cNvPr id="52" name="Straight Arrow Connector 51"/>
+              <p:cNvCxnSpPr>
+                <a:endCxn id="38" idx="0"/>
+              </p:cNvCxnSpPr>
+              <p:nvPr/>
+            </p:nvCxnSpPr>
+            <p:spPr>
+              <a:xfrm flipH="1">
+                <a:off x="2141758" y="3492297"/>
+                <a:ext cx="774058" cy="872807"/>
+              </a:xfrm>
+              <a:prstGeom prst="straightConnector1">
+                <a:avLst/>
+              </a:prstGeom>
+              <a:ln w="12700">
+                <a:solidFill>
+                  <a:schemeClr val="tx1"/>
+                </a:solidFill>
+                <a:tailEnd type="triangle"/>
+              </a:ln>
+            </p:spPr>
+            <p:style>
+              <a:lnRef idx="1">
+                <a:schemeClr val="accent1"/>
+              </a:lnRef>
+              <a:fillRef idx="0">
+                <a:schemeClr val="accent1"/>
+              </a:fillRef>
+              <a:effectRef idx="0">
+                <a:schemeClr val="accent1"/>
+              </a:effectRef>
+              <a:fontRef idx="minor">
+                <a:schemeClr val="tx1"/>
+              </a:fontRef>
+            </p:style>
+          </p:cxnSp>
+        </p:grpSp>
         <p:sp>
           <p:nvSpPr>
-            <p:cNvPr id="4" name="Smiley Face 3"/>
-            <p:cNvSpPr/>
-            <p:nvPr/>
-          </p:nvSpPr>
-          <p:spPr>
-            <a:xfrm>
-              <a:off x="1313666" y="2744924"/>
-              <a:ext cx="381000" cy="381000"/>
-            </a:xfrm>
-            <a:prstGeom prst="smileyFace">
-              <a:avLst/>
-            </a:prstGeom>
-            <a:noFill/>
-            <a:ln>
-              <a:solidFill>
-                <a:schemeClr val="tx1"/>
-              </a:solidFill>
-            </a:ln>
-          </p:spPr>
-          <p:style>
-            <a:lnRef idx="2">
-              <a:schemeClr val="accent1">
-                <a:shade val="50000"/>
-              </a:schemeClr>
-            </a:lnRef>
-            <a:fillRef idx="1">
-              <a:schemeClr val="accent1"/>
-            </a:fillRef>
-            <a:effectRef idx="0">
-              <a:schemeClr val="accent1"/>
-            </a:effectRef>
-            <a:fontRef idx="minor">
-              <a:schemeClr val="lt1"/>
-            </a:fontRef>
-          </p:style>
-          <p:txBody>
-            <a:bodyPr rtlCol="0" anchor="ctr"/>
-            <a:lstStyle/>
-            <a:p>
-              <a:pPr algn="ctr"/>
-              <a:endParaRPr lang="en-US" dirty="0"/>
-            </a:p>
-          </p:txBody>
-        </p:sp>
-        <p:sp>
-          <p:nvSpPr>
-            <p:cNvPr id="5" name="TextBox 4"/>
+            <p:cNvPr id="56" name="TextBox 55"/>
             <p:cNvSpPr txBox="1"/>
             <p:nvPr/>
           </p:nvSpPr>
           <p:spPr>
             <a:xfrm>
-              <a:off x="107504" y="2636912"/>
-              <a:ext cx="1152127" cy="584775"/>
-            </a:xfrm>
-            <a:prstGeom prst="rect">
-              <a:avLst/>
-            </a:prstGeom>
-            <a:noFill/>
-          </p:spPr>
-          <p:txBody>
-            <a:bodyPr wrap="square" rtlCol="0">
-              <a:spAutoFit/>
-            </a:bodyPr>
-            <a:lstStyle/>
-            <a:p>
-              <a:pPr algn="ctr"/>
-              <a:r>
-                <a:rPr lang="en-US" sz="1600" dirty="0" smtClean="0"/>
-                <a:t>Human annotators</a:t>
-              </a:r>
-              <a:endParaRPr lang="en-US" sz="1600" dirty="0"/>
-            </a:p>
-          </p:txBody>
-        </p:sp>
-        <p:sp>
-          <p:nvSpPr>
-            <p:cNvPr id="6" name="Flowchart: Document 5"/>
-            <p:cNvSpPr/>
-            <p:nvPr/>
-          </p:nvSpPr>
-          <p:spPr>
-            <a:xfrm>
-              <a:off x="2909900" y="3052308"/>
-              <a:ext cx="762000" cy="468868"/>
-            </a:xfrm>
-            <a:prstGeom prst="flowChartDocument">
-              <a:avLst/>
-            </a:prstGeom>
-            <a:solidFill>
-              <a:schemeClr val="accent3">
-                <a:lumMod val="40000"/>
-                <a:lumOff val="60000"/>
-              </a:schemeClr>
-            </a:solidFill>
-            <a:ln>
-              <a:solidFill>
-                <a:schemeClr val="tx1"/>
-              </a:solidFill>
-            </a:ln>
-          </p:spPr>
-          <p:style>
-            <a:lnRef idx="2">
-              <a:schemeClr val="accent1">
-                <a:shade val="50000"/>
-              </a:schemeClr>
-            </a:lnRef>
-            <a:fillRef idx="1">
-              <a:schemeClr val="accent1"/>
-            </a:fillRef>
-            <a:effectRef idx="0">
-              <a:schemeClr val="accent1"/>
-            </a:effectRef>
-            <a:fontRef idx="minor">
-              <a:schemeClr val="lt1"/>
-            </a:fontRef>
-          </p:style>
-          <p:txBody>
-            <a:bodyPr rtlCol="0" anchor="ctr"/>
-            <a:lstStyle/>
-            <a:p>
-              <a:pPr algn="ctr"/>
-              <a:endParaRPr lang="en-US" dirty="0"/>
-            </a:p>
-          </p:txBody>
-        </p:sp>
-        <p:sp>
-          <p:nvSpPr>
-            <p:cNvPr id="8" name="TextBox 7"/>
-            <p:cNvSpPr txBox="1"/>
-            <p:nvPr/>
-          </p:nvSpPr>
-          <p:spPr>
-            <a:xfrm>
-              <a:off x="2833176" y="3492297"/>
-              <a:ext cx="1558804" cy="584775"/>
-            </a:xfrm>
-            <a:prstGeom prst="rect">
-              <a:avLst/>
-            </a:prstGeom>
-            <a:noFill/>
-          </p:spPr>
-          <p:txBody>
-            <a:bodyPr wrap="square" rtlCol="0">
-              <a:spAutoFit/>
-            </a:bodyPr>
-            <a:lstStyle/>
-            <a:p>
-              <a:r>
-                <a:rPr lang="en-US" sz="1600" dirty="0" smtClean="0"/>
-                <a:t>Human annotation </a:t>
-              </a:r>
-              <a:r>
-                <a:rPr lang="en-US" sz="1600" dirty="0" smtClean="0"/>
-                <a:t>files</a:t>
-              </a:r>
-              <a:endParaRPr lang="en-US" sz="1600" dirty="0"/>
-            </a:p>
-          </p:txBody>
-        </p:sp>
-        <p:cxnSp>
-          <p:nvCxnSpPr>
-            <p:cNvPr id="10" name="Straight Arrow Connector 9"/>
-            <p:cNvCxnSpPr>
-              <a:stCxn id="4" idx="6"/>
-              <a:endCxn id="53" idx="1"/>
-            </p:cNvCxnSpPr>
-            <p:nvPr/>
-          </p:nvCxnSpPr>
-          <p:spPr>
-            <a:xfrm>
-              <a:off x="1694666" y="2935424"/>
-              <a:ext cx="177034" cy="351448"/>
-            </a:xfrm>
-            <a:prstGeom prst="straightConnector1">
-              <a:avLst/>
-            </a:prstGeom>
-            <a:ln w="12700">
-              <a:solidFill>
-                <a:schemeClr val="tx1"/>
-              </a:solidFill>
-              <a:tailEnd type="triangle"/>
-            </a:ln>
-          </p:spPr>
-          <p:style>
-            <a:lnRef idx="1">
-              <a:schemeClr val="accent1"/>
-            </a:lnRef>
-            <a:fillRef idx="0">
-              <a:schemeClr val="accent1"/>
-            </a:fillRef>
-            <a:effectRef idx="0">
-              <a:schemeClr val="accent1"/>
-            </a:effectRef>
-            <a:fontRef idx="minor">
-              <a:schemeClr val="tx1"/>
-            </a:fontRef>
-          </p:style>
-        </p:cxnSp>
-        <p:cxnSp>
-          <p:nvCxnSpPr>
-            <p:cNvPr id="12" name="Straight Arrow Connector 11"/>
-            <p:cNvCxnSpPr>
-              <a:stCxn id="53" idx="3"/>
-              <a:endCxn id="6" idx="1"/>
-            </p:cNvCxnSpPr>
-            <p:nvPr/>
-          </p:nvCxnSpPr>
-          <p:spPr>
-            <a:xfrm flipV="1">
-              <a:off x="2579701" y="3286742"/>
-              <a:ext cx="330199" cy="130"/>
-            </a:xfrm>
-            <a:prstGeom prst="straightConnector1">
-              <a:avLst/>
-            </a:prstGeom>
-            <a:ln w="12700">
-              <a:solidFill>
-                <a:schemeClr val="tx1"/>
-              </a:solidFill>
-              <a:tailEnd type="triangle"/>
-            </a:ln>
-          </p:spPr>
-          <p:style>
-            <a:lnRef idx="1">
-              <a:schemeClr val="accent1"/>
-            </a:lnRef>
-            <a:fillRef idx="0">
-              <a:schemeClr val="accent1"/>
-            </a:fillRef>
-            <a:effectRef idx="0">
-              <a:schemeClr val="accent1"/>
-            </a:effectRef>
-            <a:fontRef idx="minor">
-              <a:schemeClr val="tx1"/>
-            </a:fontRef>
-          </p:style>
-        </p:cxnSp>
-        <p:sp>
-          <p:nvSpPr>
-            <p:cNvPr id="20" name="TextBox 19"/>
-            <p:cNvSpPr txBox="1"/>
-            <p:nvPr/>
-          </p:nvSpPr>
-          <p:spPr>
-            <a:xfrm>
-              <a:off x="85019" y="4860449"/>
-              <a:ext cx="634553" cy="584775"/>
-            </a:xfrm>
-            <a:prstGeom prst="rect">
-              <a:avLst/>
-            </a:prstGeom>
-            <a:noFill/>
-          </p:spPr>
-          <p:txBody>
-            <a:bodyPr wrap="square" rtlCol="0">
-              <a:spAutoFit/>
-            </a:bodyPr>
-            <a:lstStyle/>
-            <a:p>
-              <a:pPr algn="ctr"/>
-              <a:r>
-                <a:rPr lang="en-US" sz="1600" dirty="0" smtClean="0"/>
-                <a:t>Text files</a:t>
-              </a:r>
-              <a:endParaRPr lang="en-US" sz="1600" dirty="0"/>
-            </a:p>
-          </p:txBody>
-        </p:sp>
-        <p:sp>
-          <p:nvSpPr>
-            <p:cNvPr id="21" name="TextBox 20"/>
-            <p:cNvSpPr txBox="1"/>
-            <p:nvPr/>
-          </p:nvSpPr>
-          <p:spPr>
-            <a:xfrm>
-              <a:off x="647564" y="4165339"/>
-              <a:ext cx="952120" cy="307777"/>
-            </a:xfrm>
-            <a:prstGeom prst="rect">
-              <a:avLst/>
-            </a:prstGeom>
-            <a:noFill/>
-          </p:spPr>
-          <p:txBody>
-            <a:bodyPr wrap="none" rtlCol="0">
-              <a:spAutoFit/>
-            </a:bodyPr>
-            <a:lstStyle/>
-            <a:p>
-              <a:pPr algn="ctr"/>
-              <a:r>
-                <a:rPr lang="en-US" sz="1400" i="1" dirty="0" smtClean="0"/>
-                <a:t>sample.txt</a:t>
-              </a:r>
-              <a:endParaRPr lang="en-US" sz="1400" i="1" dirty="0"/>
-            </a:p>
-          </p:txBody>
-        </p:sp>
-        <p:sp>
-          <p:nvSpPr>
-            <p:cNvPr id="23" name="Flowchart: Document 22"/>
-            <p:cNvSpPr/>
-            <p:nvPr/>
-          </p:nvSpPr>
-          <p:spPr>
-            <a:xfrm>
-              <a:off x="317612" y="4437112"/>
-              <a:ext cx="762000" cy="468868"/>
-            </a:xfrm>
-            <a:prstGeom prst="flowChartDocument">
-              <a:avLst/>
-            </a:prstGeom>
-            <a:solidFill>
-              <a:schemeClr val="bg1">
-                <a:lumMod val="75000"/>
-              </a:schemeClr>
-            </a:solidFill>
-            <a:ln>
-              <a:solidFill>
-                <a:schemeClr val="tx1"/>
-              </a:solidFill>
-            </a:ln>
-          </p:spPr>
-          <p:style>
-            <a:lnRef idx="2">
-              <a:schemeClr val="accent1">
-                <a:shade val="50000"/>
-              </a:schemeClr>
-            </a:lnRef>
-            <a:fillRef idx="1">
-              <a:schemeClr val="accent1"/>
-            </a:fillRef>
-            <a:effectRef idx="0">
-              <a:schemeClr val="accent1"/>
-            </a:effectRef>
-            <a:fontRef idx="minor">
-              <a:schemeClr val="lt1"/>
-            </a:fontRef>
-          </p:style>
-          <p:txBody>
-            <a:bodyPr rtlCol="0" anchor="ctr"/>
-            <a:lstStyle/>
-            <a:p>
-              <a:pPr algn="ctr"/>
-              <a:endParaRPr lang="en-US" dirty="0"/>
-            </a:p>
-          </p:txBody>
-        </p:sp>
-        <p:sp>
-          <p:nvSpPr>
-            <p:cNvPr id="41" name="Flowchart: Document 40"/>
-            <p:cNvSpPr/>
-            <p:nvPr/>
-          </p:nvSpPr>
-          <p:spPr>
-            <a:xfrm>
-              <a:off x="6023776" y="3052438"/>
-              <a:ext cx="762000" cy="468868"/>
-            </a:xfrm>
-            <a:prstGeom prst="flowChartDocument">
-              <a:avLst/>
-            </a:prstGeom>
-            <a:solidFill>
-              <a:schemeClr val="accent3">
-                <a:lumMod val="40000"/>
-                <a:lumOff val="60000"/>
-              </a:schemeClr>
-            </a:solidFill>
-            <a:ln>
-              <a:solidFill>
-                <a:schemeClr val="tx1"/>
-              </a:solidFill>
-            </a:ln>
-          </p:spPr>
-          <p:style>
-            <a:lnRef idx="2">
-              <a:schemeClr val="accent1">
-                <a:shade val="50000"/>
-              </a:schemeClr>
-            </a:lnRef>
-            <a:fillRef idx="1">
-              <a:schemeClr val="accent1"/>
-            </a:fillRef>
-            <a:effectRef idx="0">
-              <a:schemeClr val="accent1"/>
-            </a:effectRef>
-            <a:fontRef idx="minor">
-              <a:schemeClr val="lt1"/>
-            </a:fontRef>
-          </p:style>
-          <p:txBody>
-            <a:bodyPr rtlCol="0" anchor="ctr"/>
-            <a:lstStyle/>
-            <a:p>
-              <a:pPr algn="ctr"/>
-              <a:endParaRPr lang="en-US" dirty="0"/>
-            </a:p>
-          </p:txBody>
-        </p:sp>
-        <p:sp>
-          <p:nvSpPr>
-            <p:cNvPr id="42" name="TextBox 41"/>
-            <p:cNvSpPr txBox="1"/>
-            <p:nvPr/>
-          </p:nvSpPr>
-          <p:spPr>
-            <a:xfrm>
-              <a:off x="5988414" y="2768265"/>
-              <a:ext cx="1015623" cy="307777"/>
-            </a:xfrm>
-            <a:prstGeom prst="rect">
-              <a:avLst/>
-            </a:prstGeom>
-            <a:noFill/>
-          </p:spPr>
-          <p:txBody>
-            <a:bodyPr wrap="none" rtlCol="0">
-              <a:spAutoFit/>
-            </a:bodyPr>
-            <a:lstStyle/>
-            <a:p>
-              <a:pPr algn="ctr"/>
-              <a:r>
-                <a:rPr lang="en-US" sz="1400" i="1" dirty="0" err="1" smtClean="0"/>
-                <a:t>Sample.tbf</a:t>
-              </a:r>
-              <a:endParaRPr lang="en-US" sz="1400" i="1" dirty="0"/>
-            </a:p>
-          </p:txBody>
-        </p:sp>
-        <p:cxnSp>
-          <p:nvCxnSpPr>
-            <p:cNvPr id="43" name="Straight Arrow Connector 42"/>
-            <p:cNvCxnSpPr>
-              <a:stCxn id="6" idx="3"/>
-              <a:endCxn id="72" idx="1"/>
-            </p:cNvCxnSpPr>
-            <p:nvPr/>
-          </p:nvCxnSpPr>
-          <p:spPr>
-            <a:xfrm flipV="1">
-              <a:off x="3671900" y="3286059"/>
-              <a:ext cx="288032" cy="683"/>
-            </a:xfrm>
-            <a:prstGeom prst="straightConnector1">
-              <a:avLst/>
-            </a:prstGeom>
-            <a:ln w="12700">
-              <a:solidFill>
-                <a:schemeClr val="tx1"/>
-              </a:solidFill>
-              <a:tailEnd type="triangle"/>
-            </a:ln>
-          </p:spPr>
-          <p:style>
-            <a:lnRef idx="1">
-              <a:schemeClr val="accent1"/>
-            </a:lnRef>
-            <a:fillRef idx="0">
-              <a:schemeClr val="accent1"/>
-            </a:fillRef>
-            <a:effectRef idx="0">
-              <a:schemeClr val="accent1"/>
-            </a:effectRef>
-            <a:fontRef idx="minor">
-              <a:schemeClr val="tx1"/>
-            </a:fontRef>
-          </p:style>
-        </p:cxnSp>
-        <p:sp>
-          <p:nvSpPr>
-            <p:cNvPr id="48" name="TextBox 47"/>
-            <p:cNvSpPr txBox="1"/>
-            <p:nvPr/>
-          </p:nvSpPr>
-          <p:spPr>
-            <a:xfrm>
-              <a:off x="5580112" y="3501008"/>
-              <a:ext cx="1788824" cy="584775"/>
-            </a:xfrm>
-            <a:prstGeom prst="rect">
-              <a:avLst/>
-            </a:prstGeom>
-            <a:noFill/>
-          </p:spPr>
-          <p:txBody>
-            <a:bodyPr wrap="none" rtlCol="0">
-              <a:spAutoFit/>
-            </a:bodyPr>
-            <a:lstStyle/>
-            <a:p>
-              <a:pPr algn="ctr"/>
-              <a:r>
-                <a:rPr lang="en-US" sz="1600" dirty="0" smtClean="0"/>
-                <a:t>Gold standard</a:t>
-              </a:r>
-            </a:p>
-            <a:p>
-              <a:pPr algn="ctr"/>
-              <a:r>
-                <a:rPr lang="en-US" sz="1600" dirty="0" smtClean="0"/>
-                <a:t>event mention files</a:t>
-              </a:r>
-              <a:endParaRPr lang="en-US" sz="1600" dirty="0"/>
-            </a:p>
-          </p:txBody>
-        </p:sp>
-        <p:cxnSp>
-          <p:nvCxnSpPr>
-            <p:cNvPr id="49" name="Straight Arrow Connector 48"/>
-            <p:cNvCxnSpPr>
-              <a:stCxn id="72" idx="3"/>
-              <a:endCxn id="41" idx="1"/>
-            </p:cNvCxnSpPr>
-            <p:nvPr/>
-          </p:nvCxnSpPr>
-          <p:spPr>
-            <a:xfrm>
-              <a:off x="5186069" y="3286059"/>
-              <a:ext cx="837707" cy="813"/>
-            </a:xfrm>
-            <a:prstGeom prst="straightConnector1">
-              <a:avLst/>
-            </a:prstGeom>
-            <a:ln w="12700">
-              <a:solidFill>
-                <a:schemeClr val="tx1"/>
-              </a:solidFill>
-              <a:tailEnd type="triangle"/>
-            </a:ln>
-          </p:spPr>
-          <p:style>
-            <a:lnRef idx="1">
-              <a:schemeClr val="accent1"/>
-            </a:lnRef>
-            <a:fillRef idx="0">
-              <a:schemeClr val="accent1"/>
-            </a:fillRef>
-            <a:effectRef idx="0">
-              <a:schemeClr val="accent1"/>
-            </a:effectRef>
-            <a:fontRef idx="minor">
-              <a:schemeClr val="tx1"/>
-            </a:fontRef>
-          </p:style>
-        </p:cxnSp>
-        <p:sp>
-          <p:nvSpPr>
-            <p:cNvPr id="54" name="Flowchart: Document 53"/>
-            <p:cNvSpPr/>
-            <p:nvPr/>
-          </p:nvSpPr>
-          <p:spPr>
-            <a:xfrm>
-              <a:off x="6102198" y="5756597"/>
-              <a:ext cx="762000" cy="468868"/>
-            </a:xfrm>
-            <a:prstGeom prst="flowChartDocument">
-              <a:avLst/>
-            </a:prstGeom>
-            <a:solidFill>
-              <a:schemeClr val="accent4">
-                <a:lumMod val="40000"/>
-                <a:lumOff val="60000"/>
-              </a:schemeClr>
-            </a:solidFill>
-            <a:ln>
-              <a:solidFill>
-                <a:schemeClr val="tx1"/>
-              </a:solidFill>
-            </a:ln>
-          </p:spPr>
-          <p:style>
-            <a:lnRef idx="2">
-              <a:schemeClr val="accent1">
-                <a:shade val="50000"/>
-              </a:schemeClr>
-            </a:lnRef>
-            <a:fillRef idx="1">
-              <a:schemeClr val="accent1"/>
-            </a:fillRef>
-            <a:effectRef idx="0">
-              <a:schemeClr val="accent1"/>
-            </a:effectRef>
-            <a:fontRef idx="minor">
-              <a:schemeClr val="lt1"/>
-            </a:fontRef>
-          </p:style>
-          <p:txBody>
-            <a:bodyPr rtlCol="0" anchor="ctr"/>
-            <a:lstStyle/>
-            <a:p>
-              <a:pPr algn="ctr"/>
-              <a:endParaRPr lang="en-US" dirty="0"/>
-            </a:p>
-          </p:txBody>
-        </p:sp>
-        <p:sp>
-          <p:nvSpPr>
-            <p:cNvPr id="58" name="TextBox 57"/>
-            <p:cNvSpPr txBox="1"/>
-            <p:nvPr/>
-          </p:nvSpPr>
-          <p:spPr>
-            <a:xfrm>
-              <a:off x="5760132" y="6273225"/>
-              <a:ext cx="1294522" cy="584775"/>
-            </a:xfrm>
-            <a:prstGeom prst="rect">
-              <a:avLst/>
-            </a:prstGeom>
-            <a:noFill/>
-          </p:spPr>
-          <p:txBody>
-            <a:bodyPr wrap="none" rtlCol="0">
-              <a:spAutoFit/>
-            </a:bodyPr>
-            <a:lstStyle/>
-            <a:p>
-              <a:pPr algn="ctr"/>
-              <a:r>
-                <a:rPr lang="en-US" sz="1600" dirty="0" smtClean="0"/>
-                <a:t>System event</a:t>
-              </a:r>
-            </a:p>
-            <a:p>
-              <a:pPr algn="ctr"/>
-              <a:r>
-                <a:rPr lang="en-US" sz="1600" dirty="0" smtClean="0"/>
-                <a:t>mention files</a:t>
-              </a:r>
-              <a:endParaRPr lang="en-US" sz="1600" dirty="0"/>
-            </a:p>
-          </p:txBody>
-        </p:sp>
-        <p:cxnSp>
-          <p:nvCxnSpPr>
-            <p:cNvPr id="59" name="Straight Arrow Connector 58"/>
-            <p:cNvCxnSpPr>
-              <a:stCxn id="55" idx="3"/>
-              <a:endCxn id="54" idx="1"/>
-            </p:cNvCxnSpPr>
-            <p:nvPr/>
-          </p:nvCxnSpPr>
-          <p:spPr>
-            <a:xfrm>
-              <a:off x="5508104" y="5988537"/>
-              <a:ext cx="594094" cy="2494"/>
-            </a:xfrm>
-            <a:prstGeom prst="straightConnector1">
-              <a:avLst/>
-            </a:prstGeom>
-            <a:ln w="12700">
-              <a:solidFill>
-                <a:schemeClr val="tx1"/>
-              </a:solidFill>
-              <a:tailEnd type="triangle"/>
-            </a:ln>
-          </p:spPr>
-          <p:style>
-            <a:lnRef idx="1">
-              <a:schemeClr val="accent1"/>
-            </a:lnRef>
-            <a:fillRef idx="0">
-              <a:schemeClr val="accent1"/>
-            </a:fillRef>
-            <a:effectRef idx="0">
-              <a:schemeClr val="accent1"/>
-            </a:effectRef>
-            <a:fontRef idx="minor">
-              <a:schemeClr val="tx1"/>
-            </a:fontRef>
-          </p:style>
-        </p:cxnSp>
-        <p:sp>
-          <p:nvSpPr>
-            <p:cNvPr id="63" name="TextBox 62"/>
-            <p:cNvSpPr txBox="1"/>
-            <p:nvPr/>
-          </p:nvSpPr>
-          <p:spPr>
-            <a:xfrm>
-              <a:off x="5670150" y="5432561"/>
-              <a:ext cx="1658201" cy="307777"/>
-            </a:xfrm>
-            <a:prstGeom prst="rect">
-              <a:avLst/>
-            </a:prstGeom>
-            <a:noFill/>
-          </p:spPr>
-          <p:txBody>
-            <a:bodyPr wrap="none" rtlCol="0">
-              <a:spAutoFit/>
-            </a:bodyPr>
-            <a:lstStyle/>
-            <a:p>
-              <a:pPr algn="ctr"/>
-              <a:r>
-                <a:rPr lang="en-US" sz="1400" i="1" dirty="0" smtClean="0"/>
-                <a:t>sample-system1.</a:t>
-              </a:r>
-              <a:r>
-                <a:rPr lang="en-US" sz="1400" i="1" dirty="0"/>
-                <a:t>t</a:t>
-              </a:r>
-              <a:r>
-                <a:rPr lang="en-US" sz="1400" i="1" dirty="0" smtClean="0"/>
-                <a:t>bf</a:t>
-              </a:r>
-              <a:endParaRPr lang="en-US" sz="1400" i="1" dirty="0"/>
-            </a:p>
-          </p:txBody>
-        </p:sp>
-        <p:sp>
-          <p:nvSpPr>
-            <p:cNvPr id="72" name="Rounded Rectangle 71"/>
-            <p:cNvSpPr/>
-            <p:nvPr/>
-          </p:nvSpPr>
-          <p:spPr>
-            <a:xfrm>
-              <a:off x="3959932" y="3032956"/>
-              <a:ext cx="1226137" cy="506206"/>
-            </a:xfrm>
-            <a:prstGeom prst="roundRect">
-              <a:avLst/>
-            </a:prstGeom>
-            <a:noFill/>
-            <a:ln>
-              <a:solidFill>
-                <a:schemeClr val="tx1"/>
-              </a:solidFill>
-            </a:ln>
-          </p:spPr>
-          <p:style>
-            <a:lnRef idx="2">
-              <a:schemeClr val="accent1">
-                <a:shade val="50000"/>
-              </a:schemeClr>
-            </a:lnRef>
-            <a:fillRef idx="1">
-              <a:schemeClr val="accent1"/>
-            </a:fillRef>
-            <a:effectRef idx="0">
-              <a:schemeClr val="accent1"/>
-            </a:effectRef>
-            <a:fontRef idx="minor">
-              <a:schemeClr val="lt1"/>
-            </a:fontRef>
-          </p:style>
-          <p:txBody>
-            <a:bodyPr rtlCol="0" anchor="ctr"/>
-            <a:lstStyle/>
-            <a:p>
-              <a:pPr algn="ctr"/>
-              <a:r>
-                <a:rPr lang="en-US" dirty="0" smtClean="0">
-                  <a:solidFill>
-                    <a:schemeClr val="tx1"/>
-                  </a:solidFill>
-                </a:rPr>
-                <a:t>Converter</a:t>
-              </a:r>
-              <a:endParaRPr lang="en-US" dirty="0">
-                <a:solidFill>
-                  <a:schemeClr val="tx1"/>
-                </a:solidFill>
-              </a:endParaRPr>
-            </a:p>
-          </p:txBody>
-        </p:sp>
-        <p:cxnSp>
-          <p:nvCxnSpPr>
-            <p:cNvPr id="111" name="Elbow Connector 110"/>
-            <p:cNvCxnSpPr>
-              <a:stCxn id="41" idx="3"/>
-              <a:endCxn id="39" idx="0"/>
-            </p:cNvCxnSpPr>
-            <p:nvPr/>
-          </p:nvCxnSpPr>
-          <p:spPr>
-            <a:xfrm>
-              <a:off x="6785776" y="3286872"/>
-              <a:ext cx="488033" cy="1101573"/>
-            </a:xfrm>
-            <a:prstGeom prst="bentConnector2">
-              <a:avLst/>
-            </a:prstGeom>
-            <a:ln w="12700">
-              <a:solidFill>
-                <a:schemeClr val="tx1"/>
-              </a:solidFill>
-              <a:tailEnd type="triangle"/>
-            </a:ln>
-          </p:spPr>
-          <p:style>
-            <a:lnRef idx="1">
-              <a:schemeClr val="accent1"/>
-            </a:lnRef>
-            <a:fillRef idx="0">
-              <a:schemeClr val="accent1"/>
-            </a:fillRef>
-            <a:effectRef idx="0">
-              <a:schemeClr val="accent1"/>
-            </a:effectRef>
-            <a:fontRef idx="minor">
-              <a:schemeClr val="tx1"/>
-            </a:fontRef>
-          </p:style>
-        </p:cxnSp>
-        <p:sp>
-          <p:nvSpPr>
-            <p:cNvPr id="47" name="TextBox 46"/>
-            <p:cNvSpPr txBox="1"/>
-            <p:nvPr/>
-          </p:nvSpPr>
-          <p:spPr>
-            <a:xfrm>
-              <a:off x="2771800" y="2780928"/>
-              <a:ext cx="1034257" cy="307777"/>
-            </a:xfrm>
-            <a:prstGeom prst="rect">
-              <a:avLst/>
-            </a:prstGeom>
-            <a:noFill/>
-          </p:spPr>
-          <p:txBody>
-            <a:bodyPr wrap="none" rtlCol="0">
-              <a:spAutoFit/>
-            </a:bodyPr>
-            <a:lstStyle/>
-            <a:p>
-              <a:pPr algn="ctr"/>
-              <a:r>
-                <a:rPr lang="en-US" sz="1400" i="1" dirty="0" err="1" smtClean="0"/>
-                <a:t>sample.ann</a:t>
-              </a:r>
-              <a:endParaRPr lang="en-US" sz="1400" i="1" dirty="0"/>
-            </a:p>
-          </p:txBody>
-        </p:sp>
-        <p:cxnSp>
-          <p:nvCxnSpPr>
-            <p:cNvPr id="50" name="Elbow Connector 49"/>
-            <p:cNvCxnSpPr>
-              <a:stCxn id="23" idx="2"/>
-              <a:endCxn id="55" idx="1"/>
-            </p:cNvCxnSpPr>
-            <p:nvPr/>
-          </p:nvCxnSpPr>
-          <p:spPr>
-            <a:xfrm rot="16200000" flipH="1">
-              <a:off x="422345" y="5151250"/>
-              <a:ext cx="1113554" cy="561020"/>
-            </a:xfrm>
-            <a:prstGeom prst="bentConnector2">
-              <a:avLst/>
-            </a:prstGeom>
-            <a:ln w="12700">
-              <a:solidFill>
-                <a:schemeClr val="tx1"/>
-              </a:solidFill>
-              <a:tailEnd type="triangle"/>
-            </a:ln>
-          </p:spPr>
-          <p:style>
-            <a:lnRef idx="1">
-              <a:schemeClr val="accent1"/>
-            </a:lnRef>
-            <a:fillRef idx="0">
-              <a:schemeClr val="accent1"/>
-            </a:fillRef>
-            <a:effectRef idx="0">
-              <a:schemeClr val="accent1"/>
-            </a:effectRef>
-            <a:fontRef idx="minor">
-              <a:schemeClr val="tx1"/>
-            </a:fontRef>
-          </p:style>
-        </p:cxnSp>
-        <p:sp>
-          <p:nvSpPr>
-            <p:cNvPr id="55" name="Rounded Rectangle 54"/>
-            <p:cNvSpPr/>
-            <p:nvPr/>
-          </p:nvSpPr>
-          <p:spPr>
-            <a:xfrm>
-              <a:off x="1259632" y="5697252"/>
-              <a:ext cx="4248472" cy="582569"/>
-            </a:xfrm>
-            <a:prstGeom prst="roundRect">
-              <a:avLst/>
-            </a:prstGeom>
-            <a:solidFill>
-              <a:schemeClr val="accent4">
-                <a:lumMod val="40000"/>
-                <a:lumOff val="60000"/>
-              </a:schemeClr>
-            </a:solidFill>
-            <a:ln>
-              <a:solidFill>
-                <a:schemeClr val="tx1"/>
-              </a:solidFill>
-            </a:ln>
-          </p:spPr>
-          <p:style>
-            <a:lnRef idx="2">
-              <a:schemeClr val="accent1">
-                <a:shade val="50000"/>
-              </a:schemeClr>
-            </a:lnRef>
-            <a:fillRef idx="1">
-              <a:schemeClr val="accent1"/>
-            </a:fillRef>
-            <a:effectRef idx="0">
-              <a:schemeClr val="accent1"/>
-            </a:effectRef>
-            <a:fontRef idx="minor">
-              <a:schemeClr val="lt1"/>
-            </a:fontRef>
-          </p:style>
-          <p:txBody>
-            <a:bodyPr rtlCol="0" anchor="ctr"/>
-            <a:lstStyle/>
-            <a:p>
-              <a:pPr algn="ctr"/>
-              <a:r>
-                <a:rPr lang="en-US" dirty="0">
-                  <a:solidFill>
-                    <a:schemeClr val="tx1"/>
-                  </a:solidFill>
-                </a:rPr>
-                <a:t>Event extraction system</a:t>
-              </a:r>
-            </a:p>
-          </p:txBody>
-        </p:sp>
-        <p:cxnSp>
-          <p:nvCxnSpPr>
-            <p:cNvPr id="64" name="Elbow Connector 63"/>
-            <p:cNvCxnSpPr>
-              <a:stCxn id="54" idx="3"/>
-              <a:endCxn id="39" idx="2"/>
-            </p:cNvCxnSpPr>
-            <p:nvPr/>
-          </p:nvCxnSpPr>
-          <p:spPr>
-            <a:xfrm flipV="1">
-              <a:off x="6864198" y="4894651"/>
-              <a:ext cx="409611" cy="1096380"/>
-            </a:xfrm>
-            <a:prstGeom prst="bentConnector2">
-              <a:avLst/>
-            </a:prstGeom>
-            <a:ln w="12700">
-              <a:solidFill>
-                <a:schemeClr val="tx1"/>
-              </a:solidFill>
-              <a:tailEnd type="triangle"/>
-            </a:ln>
-          </p:spPr>
-          <p:style>
-            <a:lnRef idx="1">
-              <a:schemeClr val="accent1"/>
-            </a:lnRef>
-            <a:fillRef idx="0">
-              <a:schemeClr val="accent1"/>
-            </a:fillRef>
-            <a:effectRef idx="0">
-              <a:schemeClr val="accent1"/>
-            </a:effectRef>
-            <a:fontRef idx="minor">
-              <a:schemeClr val="tx1"/>
-            </a:fontRef>
-          </p:style>
-        </p:cxnSp>
-        <p:sp>
-          <p:nvSpPr>
-            <p:cNvPr id="35" name="Flowchart: Document 34"/>
-            <p:cNvSpPr/>
-            <p:nvPr/>
-          </p:nvSpPr>
-          <p:spPr>
-            <a:xfrm>
-              <a:off x="3014938" y="4437112"/>
-              <a:ext cx="762000" cy="468868"/>
-            </a:xfrm>
-            <a:prstGeom prst="flowChartDocument">
-              <a:avLst/>
-            </a:prstGeom>
-            <a:solidFill>
-              <a:schemeClr val="accent3">
-                <a:lumMod val="40000"/>
-                <a:lumOff val="60000"/>
-              </a:schemeClr>
-            </a:solidFill>
-            <a:ln>
-              <a:solidFill>
-                <a:schemeClr val="tx1"/>
-              </a:solidFill>
-            </a:ln>
-          </p:spPr>
-          <p:style>
-            <a:lnRef idx="2">
-              <a:schemeClr val="accent1">
-                <a:shade val="50000"/>
-              </a:schemeClr>
-            </a:lnRef>
-            <a:fillRef idx="1">
-              <a:schemeClr val="accent1"/>
-            </a:fillRef>
-            <a:effectRef idx="0">
-              <a:schemeClr val="accent1"/>
-            </a:effectRef>
-            <a:fontRef idx="minor">
-              <a:schemeClr val="lt1"/>
-            </a:fontRef>
-          </p:style>
-          <p:txBody>
-            <a:bodyPr rtlCol="0" anchor="ctr"/>
-            <a:lstStyle/>
-            <a:p>
-              <a:pPr algn="ctr"/>
-              <a:endParaRPr lang="en-US" dirty="0"/>
-            </a:p>
-          </p:txBody>
-        </p:sp>
-        <p:cxnSp>
-          <p:nvCxnSpPr>
-            <p:cNvPr id="36" name="Straight Arrow Connector 35"/>
-            <p:cNvCxnSpPr>
-              <a:stCxn id="38" idx="3"/>
-              <a:endCxn id="35" idx="1"/>
-            </p:cNvCxnSpPr>
-            <p:nvPr/>
-          </p:nvCxnSpPr>
-          <p:spPr>
-            <a:xfrm>
-              <a:off x="2717821" y="4668816"/>
-              <a:ext cx="297117" cy="2730"/>
-            </a:xfrm>
-            <a:prstGeom prst="straightConnector1">
-              <a:avLst/>
-            </a:prstGeom>
-            <a:ln w="12700">
-              <a:solidFill>
-                <a:schemeClr val="tx1"/>
-              </a:solidFill>
-              <a:tailEnd type="triangle"/>
-            </a:ln>
-          </p:spPr>
-          <p:style>
-            <a:lnRef idx="1">
-              <a:schemeClr val="accent1"/>
-            </a:lnRef>
-            <a:fillRef idx="0">
-              <a:schemeClr val="accent1"/>
-            </a:fillRef>
-            <a:effectRef idx="0">
-              <a:schemeClr val="accent1"/>
-            </a:effectRef>
-            <a:fontRef idx="minor">
-              <a:schemeClr val="tx1"/>
-            </a:fontRef>
-          </p:style>
-        </p:cxnSp>
-        <p:cxnSp>
-          <p:nvCxnSpPr>
-            <p:cNvPr id="37" name="Straight Arrow Connector 36"/>
-            <p:cNvCxnSpPr>
-              <a:stCxn id="23" idx="3"/>
-              <a:endCxn id="38" idx="1"/>
-            </p:cNvCxnSpPr>
-            <p:nvPr/>
-          </p:nvCxnSpPr>
-          <p:spPr>
-            <a:xfrm flipV="1">
-              <a:off x="1079612" y="4668816"/>
-              <a:ext cx="486082" cy="2730"/>
-            </a:xfrm>
-            <a:prstGeom prst="straightConnector1">
-              <a:avLst/>
-            </a:prstGeom>
-            <a:ln w="12700">
-              <a:solidFill>
-                <a:schemeClr val="tx1"/>
-              </a:solidFill>
-              <a:tailEnd type="triangle"/>
-            </a:ln>
-          </p:spPr>
-          <p:style>
-            <a:lnRef idx="1">
-              <a:schemeClr val="accent1"/>
-            </a:lnRef>
-            <a:fillRef idx="0">
-              <a:schemeClr val="accent1"/>
-            </a:fillRef>
-            <a:effectRef idx="0">
-              <a:schemeClr val="accent1"/>
-            </a:effectRef>
-            <a:fontRef idx="minor">
-              <a:schemeClr val="tx1"/>
-            </a:fontRef>
-          </p:style>
-        </p:cxnSp>
-        <p:sp>
-          <p:nvSpPr>
-            <p:cNvPr id="38" name="Rounded Rectangle 37"/>
-            <p:cNvSpPr/>
-            <p:nvPr/>
-          </p:nvSpPr>
-          <p:spPr>
-            <a:xfrm>
-              <a:off x="1565694" y="4365104"/>
-              <a:ext cx="1152127" cy="607423"/>
-            </a:xfrm>
-            <a:prstGeom prst="roundRect">
-              <a:avLst/>
-            </a:prstGeom>
-            <a:solidFill>
-              <a:schemeClr val="accent3">
-                <a:lumMod val="40000"/>
-                <a:lumOff val="60000"/>
-              </a:schemeClr>
-            </a:solidFill>
-            <a:ln>
-              <a:solidFill>
-                <a:schemeClr val="tx1"/>
-              </a:solidFill>
-            </a:ln>
-          </p:spPr>
-          <p:style>
-            <a:lnRef idx="2">
-              <a:schemeClr val="accent1">
-                <a:shade val="50000"/>
-              </a:schemeClr>
-            </a:lnRef>
-            <a:fillRef idx="1">
-              <a:schemeClr val="accent1"/>
-            </a:fillRef>
-            <a:effectRef idx="0">
-              <a:schemeClr val="accent1"/>
-            </a:effectRef>
-            <a:fontRef idx="minor">
-              <a:schemeClr val="lt1"/>
-            </a:fontRef>
-          </p:style>
-          <p:txBody>
-            <a:bodyPr rtlCol="0" anchor="ctr"/>
-            <a:lstStyle/>
-            <a:p>
-              <a:pPr algn="ctr"/>
-              <a:r>
-                <a:rPr lang="en-US" dirty="0" err="1">
-                  <a:solidFill>
-                    <a:schemeClr val="tx1"/>
-                  </a:solidFill>
-                </a:rPr>
-                <a:t>T</a:t>
-              </a:r>
-              <a:r>
-                <a:rPr lang="en-US" dirty="0" err="1" smtClean="0">
-                  <a:solidFill>
-                    <a:schemeClr val="tx1"/>
-                  </a:solidFill>
-                </a:rPr>
-                <a:t>okenizer</a:t>
-              </a:r>
-              <a:endParaRPr lang="en-US" dirty="0">
-                <a:solidFill>
-                  <a:schemeClr val="tx1"/>
-                </a:solidFill>
-              </a:endParaRPr>
-            </a:p>
-          </p:txBody>
-        </p:sp>
-        <p:sp>
-          <p:nvSpPr>
-            <p:cNvPr id="39" name="Rounded Rectangle 38"/>
-            <p:cNvSpPr/>
-            <p:nvPr/>
-          </p:nvSpPr>
-          <p:spPr>
-            <a:xfrm>
-              <a:off x="6660740" y="4388445"/>
-              <a:ext cx="1226137" cy="506206"/>
-            </a:xfrm>
-            <a:prstGeom prst="roundRect">
-              <a:avLst/>
-            </a:prstGeom>
-            <a:noFill/>
-            <a:ln>
-              <a:solidFill>
-                <a:schemeClr val="tx1"/>
-              </a:solidFill>
-            </a:ln>
-          </p:spPr>
-          <p:style>
-            <a:lnRef idx="2">
-              <a:schemeClr val="accent1">
-                <a:shade val="50000"/>
-              </a:schemeClr>
-            </a:lnRef>
-            <a:fillRef idx="1">
-              <a:schemeClr val="accent1"/>
-            </a:fillRef>
-            <a:effectRef idx="0">
-              <a:schemeClr val="accent1"/>
-            </a:effectRef>
-            <a:fontRef idx="minor">
-              <a:schemeClr val="lt1"/>
-            </a:fontRef>
-          </p:style>
-          <p:txBody>
-            <a:bodyPr rtlCol="0" anchor="ctr"/>
-            <a:lstStyle/>
-            <a:p>
-              <a:pPr algn="ctr"/>
-              <a:r>
-                <a:rPr lang="en-US" dirty="0">
-                  <a:solidFill>
-                    <a:schemeClr val="tx1"/>
-                  </a:solidFill>
-                </a:rPr>
-                <a:t>Evaluator</a:t>
-              </a:r>
-            </a:p>
-          </p:txBody>
-        </p:sp>
-        <p:sp>
-          <p:nvSpPr>
-            <p:cNvPr id="44" name="Flowchart: Process 43"/>
-            <p:cNvSpPr/>
-            <p:nvPr/>
-          </p:nvSpPr>
-          <p:spPr>
-            <a:xfrm>
-              <a:off x="8136396" y="4387446"/>
-              <a:ext cx="913901" cy="507205"/>
-            </a:xfrm>
-            <a:prstGeom prst="flowChartProcess">
-              <a:avLst/>
-            </a:prstGeom>
-            <a:noFill/>
-            <a:ln>
-              <a:solidFill>
-                <a:schemeClr val="tx1"/>
-              </a:solidFill>
-            </a:ln>
-          </p:spPr>
-          <p:style>
-            <a:lnRef idx="2">
-              <a:schemeClr val="accent1">
-                <a:shade val="50000"/>
-              </a:schemeClr>
-            </a:lnRef>
-            <a:fillRef idx="1">
-              <a:schemeClr val="accent1"/>
-            </a:fillRef>
-            <a:effectRef idx="0">
-              <a:schemeClr val="accent1"/>
-            </a:effectRef>
-            <a:fontRef idx="minor">
-              <a:schemeClr val="lt1"/>
-            </a:fontRef>
-          </p:style>
-          <p:txBody>
-            <a:bodyPr rtlCol="0" anchor="ctr"/>
-            <a:lstStyle/>
-            <a:p>
-              <a:pPr algn="ctr"/>
-              <a:r>
-                <a:rPr lang="en-US" dirty="0" smtClean="0">
-                  <a:solidFill>
-                    <a:schemeClr val="tx1"/>
-                  </a:solidFill>
-                </a:rPr>
-                <a:t>Results</a:t>
-              </a:r>
-              <a:endParaRPr lang="en-US" dirty="0">
-                <a:solidFill>
-                  <a:schemeClr val="tx1"/>
-                </a:solidFill>
-              </a:endParaRPr>
-            </a:p>
-          </p:txBody>
-        </p:sp>
-        <p:cxnSp>
-          <p:nvCxnSpPr>
-            <p:cNvPr id="45" name="Straight Arrow Connector 44"/>
-            <p:cNvCxnSpPr>
-              <a:stCxn id="39" idx="3"/>
-              <a:endCxn id="44" idx="1"/>
-            </p:cNvCxnSpPr>
-            <p:nvPr/>
-          </p:nvCxnSpPr>
-          <p:spPr>
-            <a:xfrm flipV="1">
-              <a:off x="7886877" y="4641049"/>
-              <a:ext cx="249519" cy="499"/>
-            </a:xfrm>
-            <a:prstGeom prst="straightConnector1">
-              <a:avLst/>
-            </a:prstGeom>
-            <a:ln w="12700">
-              <a:solidFill>
-                <a:schemeClr val="tx1"/>
-              </a:solidFill>
-              <a:tailEnd type="triangle"/>
-            </a:ln>
-          </p:spPr>
-          <p:style>
-            <a:lnRef idx="1">
-              <a:schemeClr val="accent1"/>
-            </a:lnRef>
-            <a:fillRef idx="0">
-              <a:schemeClr val="accent1"/>
-            </a:fillRef>
-            <a:effectRef idx="0">
-              <a:schemeClr val="accent1"/>
-            </a:effectRef>
-            <a:fontRef idx="minor">
-              <a:schemeClr val="tx1"/>
-            </a:fontRef>
-          </p:style>
-        </p:cxnSp>
-        <p:sp>
-          <p:nvSpPr>
-            <p:cNvPr id="46" name="TextBox 45"/>
-            <p:cNvSpPr txBox="1"/>
-            <p:nvPr/>
-          </p:nvSpPr>
-          <p:spPr>
-            <a:xfrm>
-              <a:off x="3005853" y="4152585"/>
-              <a:ext cx="987130" cy="307777"/>
-            </a:xfrm>
-            <a:prstGeom prst="rect">
-              <a:avLst/>
-            </a:prstGeom>
-            <a:noFill/>
-          </p:spPr>
-          <p:txBody>
-            <a:bodyPr wrap="none" rtlCol="0">
-              <a:spAutoFit/>
-            </a:bodyPr>
-            <a:lstStyle/>
-            <a:p>
-              <a:pPr algn="ctr"/>
-              <a:r>
-                <a:rPr lang="en-US" sz="1400" i="1" dirty="0" err="1" smtClean="0"/>
-                <a:t>sample.tkn</a:t>
-              </a:r>
-              <a:endParaRPr lang="en-US" sz="1400" i="1" dirty="0"/>
-            </a:p>
-          </p:txBody>
-        </p:sp>
-        <p:sp>
-          <p:nvSpPr>
-            <p:cNvPr id="51" name="TextBox 50"/>
-            <p:cNvSpPr txBox="1"/>
-            <p:nvPr/>
-          </p:nvSpPr>
-          <p:spPr>
-            <a:xfrm>
-              <a:off x="2969849" y="4856406"/>
-              <a:ext cx="1055931" cy="338554"/>
-            </a:xfrm>
-            <a:prstGeom prst="rect">
-              <a:avLst/>
-            </a:prstGeom>
-            <a:noFill/>
-          </p:spPr>
-          <p:txBody>
-            <a:bodyPr wrap="none" rtlCol="0">
-              <a:spAutoFit/>
-            </a:bodyPr>
-            <a:lstStyle/>
-            <a:p>
-              <a:pPr algn="ctr"/>
-              <a:r>
-                <a:rPr lang="en-US" sz="1600" dirty="0" smtClean="0"/>
-                <a:t>Token files</a:t>
-              </a:r>
-              <a:endParaRPr lang="en-US" sz="1600" dirty="0"/>
-            </a:p>
-          </p:txBody>
-        </p:sp>
-        <p:sp>
-          <p:nvSpPr>
-            <p:cNvPr id="53" name="Rounded Rectangle 52"/>
-            <p:cNvSpPr/>
-            <p:nvPr/>
-          </p:nvSpPr>
-          <p:spPr>
-            <a:xfrm>
-              <a:off x="1871700" y="3033769"/>
-              <a:ext cx="708001" cy="506206"/>
-            </a:xfrm>
-            <a:prstGeom prst="roundRect">
-              <a:avLst/>
-            </a:prstGeom>
-            <a:noFill/>
-            <a:ln>
-              <a:solidFill>
-                <a:schemeClr val="tx1"/>
-              </a:solidFill>
-            </a:ln>
-          </p:spPr>
-          <p:style>
-            <a:lnRef idx="2">
-              <a:schemeClr val="accent1">
-                <a:shade val="50000"/>
-              </a:schemeClr>
-            </a:lnRef>
-            <a:fillRef idx="1">
-              <a:schemeClr val="accent1"/>
-            </a:fillRef>
-            <a:effectRef idx="0">
-              <a:schemeClr val="accent1"/>
-            </a:effectRef>
-            <a:fontRef idx="minor">
-              <a:schemeClr val="lt1"/>
-            </a:fontRef>
-          </p:style>
-          <p:txBody>
-            <a:bodyPr rtlCol="0" anchor="ctr"/>
-            <a:lstStyle/>
-            <a:p>
-              <a:pPr algn="ctr"/>
-              <a:r>
-                <a:rPr lang="en-US" dirty="0" smtClean="0">
-                  <a:solidFill>
-                    <a:schemeClr val="tx1"/>
-                  </a:solidFill>
-                </a:rPr>
-                <a:t>brat</a:t>
-              </a:r>
-              <a:endParaRPr lang="en-US" dirty="0">
-                <a:solidFill>
-                  <a:schemeClr val="tx1"/>
-                </a:solidFill>
-              </a:endParaRPr>
-            </a:p>
-          </p:txBody>
-        </p:sp>
-        <p:cxnSp>
-          <p:nvCxnSpPr>
-            <p:cNvPr id="123" name="Elbow Connector 122"/>
-            <p:cNvCxnSpPr>
-              <a:stCxn id="23" idx="0"/>
-              <a:endCxn id="53" idx="1"/>
-            </p:cNvCxnSpPr>
-            <p:nvPr/>
-          </p:nvCxnSpPr>
-          <p:spPr>
-            <a:xfrm rot="5400000" flipH="1" flipV="1">
-              <a:off x="710036" y="3275448"/>
-              <a:ext cx="1150240" cy="1173088"/>
-            </a:xfrm>
-            <a:prstGeom prst="bentConnector2">
-              <a:avLst/>
-            </a:prstGeom>
-            <a:ln w="12700">
-              <a:solidFill>
-                <a:schemeClr val="tx1"/>
-              </a:solidFill>
-              <a:tailEnd type="triangle"/>
-            </a:ln>
-          </p:spPr>
-          <p:style>
-            <a:lnRef idx="1">
-              <a:schemeClr val="accent1"/>
-            </a:lnRef>
-            <a:fillRef idx="0">
-              <a:schemeClr val="accent1"/>
-            </a:fillRef>
-            <a:effectRef idx="0">
-              <a:schemeClr val="accent1"/>
-            </a:effectRef>
-            <a:fontRef idx="minor">
-              <a:schemeClr val="tx1"/>
-            </a:fontRef>
-          </p:style>
-        </p:cxnSp>
-        <p:sp>
-          <p:nvSpPr>
-            <p:cNvPr id="68" name="Rounded Rectangle 67"/>
-            <p:cNvSpPr/>
-            <p:nvPr/>
-          </p:nvSpPr>
-          <p:spPr>
-            <a:xfrm>
-              <a:off x="1223628" y="2348880"/>
-              <a:ext cx="4356484" cy="1728192"/>
-            </a:xfrm>
-            <a:prstGeom prst="roundRect">
-              <a:avLst>
-                <a:gd name="adj" fmla="val 11193"/>
-              </a:avLst>
-            </a:prstGeom>
-            <a:noFill/>
-            <a:ln>
-              <a:solidFill>
-                <a:schemeClr val="tx1"/>
-              </a:solidFill>
-            </a:ln>
-          </p:spPr>
-          <p:style>
-            <a:lnRef idx="2">
-              <a:schemeClr val="accent1">
-                <a:shade val="50000"/>
-              </a:schemeClr>
-            </a:lnRef>
-            <a:fillRef idx="1">
-              <a:schemeClr val="accent1"/>
-            </a:fillRef>
-            <a:effectRef idx="0">
-              <a:schemeClr val="accent1"/>
-            </a:effectRef>
-            <a:fontRef idx="minor">
-              <a:schemeClr val="lt1"/>
-            </a:fontRef>
-          </p:style>
-          <p:txBody>
-            <a:bodyPr rtlCol="0" anchor="ctr"/>
-            <a:lstStyle/>
-            <a:p>
-              <a:pPr algn="ctr"/>
-              <a:endParaRPr lang="en-US" dirty="0">
-                <a:solidFill>
-                  <a:schemeClr val="tx1"/>
-                </a:solidFill>
-              </a:endParaRPr>
-            </a:p>
-          </p:txBody>
-        </p:sp>
-        <p:sp>
-          <p:nvSpPr>
-            <p:cNvPr id="61" name="TextBox 60"/>
-            <p:cNvSpPr txBox="1"/>
-            <p:nvPr/>
-          </p:nvSpPr>
-          <p:spPr>
-            <a:xfrm>
-              <a:off x="2915816" y="2384884"/>
-              <a:ext cx="2584399" cy="369332"/>
+              <a:off x="2246539" y="2348880"/>
+              <a:ext cx="3297569" cy="369332"/>
             </a:xfrm>
             <a:prstGeom prst="rect">
               <a:avLst/>
@@ -7011,127 +7161,16 @@
             <a:p>
               <a:r>
                 <a:rPr lang="en-US" dirty="0" smtClean="0"/>
-                <a:t>Human extraction system </a:t>
+                <a:t>Human </a:t>
+              </a:r>
+              <a:r>
+                <a:rPr lang="en-US" dirty="0" smtClean="0"/>
+                <a:t>event mention detection </a:t>
               </a:r>
               <a:endParaRPr lang="en-US" dirty="0"/>
             </a:p>
           </p:txBody>
         </p:sp>
-        <p:cxnSp>
-          <p:nvCxnSpPr>
-            <p:cNvPr id="76" name="Elbow Connector 75"/>
-            <p:cNvCxnSpPr>
-              <a:stCxn id="35" idx="3"/>
-            </p:cNvCxnSpPr>
-            <p:nvPr/>
-          </p:nvCxnSpPr>
-          <p:spPr>
-            <a:xfrm>
-              <a:off x="3776938" y="4671546"/>
-              <a:ext cx="795062" cy="1025706"/>
-            </a:xfrm>
-            <a:prstGeom prst="bentConnector2">
-              <a:avLst/>
-            </a:prstGeom>
-            <a:ln w="12700">
-              <a:solidFill>
-                <a:schemeClr val="tx1"/>
-              </a:solidFill>
-              <a:tailEnd type="triangle"/>
-            </a:ln>
-          </p:spPr>
-          <p:style>
-            <a:lnRef idx="1">
-              <a:schemeClr val="accent1"/>
-            </a:lnRef>
-            <a:fillRef idx="0">
-              <a:schemeClr val="accent1"/>
-            </a:fillRef>
-            <a:effectRef idx="0">
-              <a:schemeClr val="accent1"/>
-            </a:effectRef>
-            <a:fontRef idx="minor">
-              <a:schemeClr val="tx1"/>
-            </a:fontRef>
-          </p:style>
-        </p:cxnSp>
-        <p:cxnSp>
-          <p:nvCxnSpPr>
-            <p:cNvPr id="86" name="Elbow Connector 85"/>
-            <p:cNvCxnSpPr>
-              <a:stCxn id="35" idx="3"/>
-              <a:endCxn id="72" idx="2"/>
-            </p:cNvCxnSpPr>
-            <p:nvPr/>
-          </p:nvCxnSpPr>
-          <p:spPr>
-            <a:xfrm flipV="1">
-              <a:off x="3776938" y="3539162"/>
-              <a:ext cx="796063" cy="1132384"/>
-            </a:xfrm>
-            <a:prstGeom prst="bentConnector2">
-              <a:avLst/>
-            </a:prstGeom>
-            <a:ln w="12700">
-              <a:solidFill>
-                <a:schemeClr val="tx1"/>
-              </a:solidFill>
-              <a:tailEnd type="triangle"/>
-            </a:ln>
-          </p:spPr>
-          <p:style>
-            <a:lnRef idx="1">
-              <a:schemeClr val="accent1"/>
-            </a:lnRef>
-            <a:fillRef idx="0">
-              <a:schemeClr val="accent1"/>
-            </a:fillRef>
-            <a:effectRef idx="0">
-              <a:schemeClr val="accent1"/>
-            </a:effectRef>
-            <a:fontRef idx="minor">
-              <a:schemeClr val="tx1"/>
-            </a:fontRef>
-          </p:style>
-        </p:cxnSp>
-        <p:cxnSp>
-          <p:nvCxnSpPr>
-            <p:cNvPr id="52" name="Straight Arrow Connector 51"/>
-            <p:cNvCxnSpPr>
-              <a:endCxn id="38" idx="0"/>
-            </p:cNvCxnSpPr>
-            <p:nvPr/>
-          </p:nvCxnSpPr>
-          <p:spPr>
-            <a:xfrm flipH="1">
-              <a:off x="2141758" y="3492297"/>
-              <a:ext cx="774058" cy="872807"/>
-            </a:xfrm>
-            <a:prstGeom prst="straightConnector1">
-              <a:avLst/>
-            </a:prstGeom>
-            <a:ln w="12700">
-              <a:solidFill>
-                <a:schemeClr val="tx1"/>
-              </a:solidFill>
-              <a:tailEnd type="triangle"/>
-            </a:ln>
-          </p:spPr>
-          <p:style>
-            <a:lnRef idx="1">
-              <a:schemeClr val="accent1"/>
-            </a:lnRef>
-            <a:fillRef idx="0">
-              <a:schemeClr val="accent1"/>
-            </a:fillRef>
-            <a:effectRef idx="0">
-              <a:schemeClr val="accent1"/>
-            </a:effectRef>
-            <a:fontRef idx="minor">
-              <a:schemeClr val="tx1"/>
-            </a:fontRef>
-          </p:style>
-        </p:cxnSp>
       </p:grpSp>
     </p:spTree>
     <p:extLst>

</xml_diff>

<commit_message>
Updated the pre-tokenization section.
</commit_message>
<xml_diff>
--- a/doc/evm-eval-work-flow.pptx
+++ b/doc/evm-eval-work-flow.pptx
@@ -5433,7 +5433,7 @@
       </p:sp>
       <p:grpSp>
         <p:nvGrpSpPr>
-          <p:cNvPr id="70" name="Group 69"/>
+          <p:cNvPr id="7" name="Group 6"/>
           <p:cNvGrpSpPr/>
           <p:nvPr/>
         </p:nvGrpSpPr>
@@ -6231,7 +6231,7 @@
           <p:spPr>
             <a:xfrm>
               <a:off x="6791054" y="3477113"/>
-              <a:ext cx="482755" cy="911332"/>
+              <a:ext cx="482755" cy="1137869"/>
             </a:xfrm>
             <a:prstGeom prst="bentConnector2">
               <a:avLst/>
@@ -6413,8 +6413,8 @@
           </p:nvCxnSpPr>
           <p:spPr>
             <a:xfrm flipV="1">
-              <a:off x="6774160" y="4894651"/>
-              <a:ext cx="499649" cy="1096380"/>
+              <a:off x="6774160" y="5121188"/>
+              <a:ext cx="499649" cy="869843"/>
             </a:xfrm>
             <a:prstGeom prst="bentConnector2">
               <a:avLst/>
@@ -6649,7 +6649,7 @@
           </p:nvSpPr>
           <p:spPr>
             <a:xfrm>
-              <a:off x="6660740" y="4388445"/>
+              <a:off x="6660740" y="4614982"/>
               <a:ext cx="1226137" cy="506206"/>
             </a:xfrm>
             <a:prstGeom prst="roundRect">
@@ -6702,7 +6702,7 @@
           </p:nvSpPr>
           <p:spPr>
             <a:xfrm>
-              <a:off x="8136396" y="4387446"/>
+              <a:off x="8136396" y="4613983"/>
               <a:ext cx="913901" cy="507205"/>
             </a:xfrm>
             <a:prstGeom prst="flowChartProcess">
@@ -6763,7 +6763,7 @@
           </p:nvCxnSpPr>
           <p:spPr>
             <a:xfrm flipV="1">
-              <a:off x="7886877" y="4641049"/>
+              <a:off x="7886877" y="4867586"/>
               <a:ext cx="249519" cy="499"/>
             </a:xfrm>
             <a:prstGeom prst="straightConnector1">

</xml_diff>

<commit_message>
Updated Figure 1 to use tokenized text as a basic input of human annotators and systems.
</commit_message>
<xml_diff>
--- a/doc/evm-eval-work-flow.pptx
+++ b/doc/evm-eval-work-flow.pptx
@@ -5,16 +5,17 @@
     <p:sldMasterId id="2147483648" r:id="rId1"/>
   </p:sldMasterIdLst>
   <p:notesMasterIdLst>
-    <p:notesMasterId r:id="rId9"/>
+    <p:notesMasterId r:id="rId10"/>
   </p:notesMasterIdLst>
   <p:sldIdLst>
     <p:sldId id="263" r:id="rId2"/>
     <p:sldId id="264" r:id="rId3"/>
-    <p:sldId id="262" r:id="rId4"/>
-    <p:sldId id="259" r:id="rId5"/>
-    <p:sldId id="258" r:id="rId6"/>
-    <p:sldId id="260" r:id="rId7"/>
-    <p:sldId id="261" r:id="rId8"/>
+    <p:sldId id="265" r:id="rId4"/>
+    <p:sldId id="262" r:id="rId5"/>
+    <p:sldId id="259" r:id="rId6"/>
+    <p:sldId id="258" r:id="rId7"/>
+    <p:sldId id="260" r:id="rId8"/>
+    <p:sldId id="261" r:id="rId9"/>
   </p:sldIdLst>
   <p:sldSz cx="9144000" cy="6858000" type="screen4x3"/>
   <p:notesSz cx="6858000" cy="9144000"/>
@@ -199,7 +200,7 @@
             <a:fld id="{1D635E4C-BAB0-4BAB-AAF7-4D9825D68060}" type="datetimeFigureOut">
               <a:rPr lang="en-US" smtClean="0"/>
               <a:pPr/>
-              <a:t>9/28/14</a:t>
+              <a:t>9/28/2014</a:t>
             </a:fld>
             <a:endParaRPr lang="en-US"/>
           </a:p>
@@ -650,7 +651,7 @@
             <a:fld id="{3B56066F-CE6C-4B27-993A-2842BDE8189B}" type="datetime1">
               <a:rPr lang="en-US" smtClean="0"/>
               <a:pPr/>
-              <a:t>9/28/14</a:t>
+              <a:t>9/28/2014</a:t>
             </a:fld>
             <a:endParaRPr lang="en-US"/>
           </a:p>
@@ -817,7 +818,7 @@
             <a:fld id="{61174E08-E9E9-4260-BC0A-45316FB7E636}" type="datetime1">
               <a:rPr lang="en-US" smtClean="0"/>
               <a:pPr/>
-              <a:t>9/28/14</a:t>
+              <a:t>9/28/2014</a:t>
             </a:fld>
             <a:endParaRPr lang="en-US"/>
           </a:p>
@@ -994,7 +995,7 @@
             <a:fld id="{64C675E3-4156-4610-8C23-B8FBCA8F0F60}" type="datetime1">
               <a:rPr lang="en-US" smtClean="0"/>
               <a:pPr/>
-              <a:t>9/28/14</a:t>
+              <a:t>9/28/2014</a:t>
             </a:fld>
             <a:endParaRPr lang="en-US"/>
           </a:p>
@@ -1161,7 +1162,7 @@
             <a:fld id="{119C4F61-BDF2-4F97-8BCC-87B3B636DDF2}" type="datetime1">
               <a:rPr lang="en-US" smtClean="0"/>
               <a:pPr/>
-              <a:t>9/28/14</a:t>
+              <a:t>9/28/2014</a:t>
             </a:fld>
             <a:endParaRPr lang="en-US"/>
           </a:p>
@@ -1404,7 +1405,7 @@
             <a:fld id="{02F0C2A0-F4E4-41A2-82A2-5525FFA2797A}" type="datetime1">
               <a:rPr lang="en-US" smtClean="0"/>
               <a:pPr/>
-              <a:t>9/28/14</a:t>
+              <a:t>9/28/2014</a:t>
             </a:fld>
             <a:endParaRPr lang="en-US"/>
           </a:p>
@@ -1689,7 +1690,7 @@
             <a:fld id="{19C68C49-B72E-4B6B-B516-758D46CA9D72}" type="datetime1">
               <a:rPr lang="en-US" smtClean="0"/>
               <a:pPr/>
-              <a:t>9/28/14</a:t>
+              <a:t>9/28/2014</a:t>
             </a:fld>
             <a:endParaRPr lang="en-US"/>
           </a:p>
@@ -2108,7 +2109,7 @@
             <a:fld id="{1AC33444-61AF-4C04-94BE-279981869E66}" type="datetime1">
               <a:rPr lang="en-US" smtClean="0"/>
               <a:pPr/>
-              <a:t>9/28/14</a:t>
+              <a:t>9/28/2014</a:t>
             </a:fld>
             <a:endParaRPr lang="en-US"/>
           </a:p>
@@ -2223,7 +2224,7 @@
             <a:fld id="{680EC325-BE6D-4D10-BEAB-D93726F5911A}" type="datetime1">
               <a:rPr lang="en-US" smtClean="0"/>
               <a:pPr/>
-              <a:t>9/28/14</a:t>
+              <a:t>9/28/2014</a:t>
             </a:fld>
             <a:endParaRPr lang="en-US"/>
           </a:p>
@@ -2315,7 +2316,7 @@
             <a:fld id="{B1972600-64F6-4C1F-838C-01314CB42182}" type="datetime1">
               <a:rPr lang="en-US" smtClean="0"/>
               <a:pPr/>
-              <a:t>9/28/14</a:t>
+              <a:t>9/28/2014</a:t>
             </a:fld>
             <a:endParaRPr lang="en-US"/>
           </a:p>
@@ -2589,7 +2590,7 @@
             <a:fld id="{EAB60A1F-67E6-47A6-8991-02AEC54F3211}" type="datetime1">
               <a:rPr lang="en-US" smtClean="0"/>
               <a:pPr/>
-              <a:t>9/28/14</a:t>
+              <a:t>9/28/2014</a:t>
             </a:fld>
             <a:endParaRPr lang="en-US"/>
           </a:p>
@@ -2839,7 +2840,7 @@
             <a:fld id="{78DCC502-29AC-46C3-8325-CE3B184A6144}" type="datetime1">
               <a:rPr lang="en-US" smtClean="0"/>
               <a:pPr/>
-              <a:t>9/28/14</a:t>
+              <a:t>9/28/2014</a:t>
             </a:fld>
             <a:endParaRPr lang="en-US"/>
           </a:p>
@@ -3049,7 +3050,7 @@
             <a:fld id="{3DFC592B-B14E-40A5-81F6-981F0BC4FA39}" type="datetime1">
               <a:rPr lang="en-US" smtClean="0"/>
               <a:pPr/>
-              <a:t>9/28/14</a:t>
+              <a:t>9/28/2014</a:t>
             </a:fld>
             <a:endParaRPr lang="en-US"/>
           </a:p>
@@ -5899,13 +5900,8 @@
                       <a:pPr algn="ctr"/>
                       <a:r>
                         <a:rPr lang="en-US" sz="1600" dirty="0" smtClean="0"/>
-                        <a:t>Gold </a:t>
+                        <a:t>Gold standard</a:t>
                       </a:r>
-                      <a:r>
-                        <a:rPr lang="en-US" sz="1600" dirty="0" smtClean="0"/>
-                        <a:t>standard</a:t>
-                      </a:r>
-                      <a:endParaRPr lang="en-US" sz="1600" dirty="0" smtClean="0"/>
                     </a:p>
                   </p:txBody>
                 </p:sp>
@@ -6094,11 +6090,7 @@
                       <a:pPr algn="ctr"/>
                       <a:r>
                         <a:rPr lang="en-US" sz="1400" i="1" dirty="0" smtClean="0"/>
-                        <a:t>sample-system1</a:t>
-                      </a:r>
-                      <a:r>
-                        <a:rPr lang="en-US" sz="1400" i="1" dirty="0" smtClean="0"/>
-                        <a:t>.</a:t>
+                        <a:t>sample-system1.</a:t>
                       </a:r>
                       <a:r>
                         <a:rPr lang="en-US" sz="1400" i="1" dirty="0"/>
@@ -6541,15 +6533,7 @@
                             <a:schemeClr val="tx1"/>
                           </a:solidFill>
                         </a:rPr>
-                        <a:t>T</a:t>
-                      </a:r>
-                      <a:r>
-                        <a:rPr lang="en-US" dirty="0" err="1" smtClean="0">
-                          <a:solidFill>
-                            <a:schemeClr val="tx1"/>
-                          </a:solidFill>
-                        </a:rPr>
-                        <a:t>okenizer</a:t>
+                        <a:t>Tokenizer</a:t>
                       </a:r>
                       <a:r>
                         <a:rPr lang="en-US" dirty="0" smtClean="0">
@@ -7134,6 +7118,1887 @@
       </p:grpSpPr>
       <p:sp>
         <p:nvSpPr>
+          <p:cNvPr id="4" name="Slide Number Placeholder 3"/>
+          <p:cNvSpPr>
+            <a:spLocks noGrp="1"/>
+          </p:cNvSpPr>
+          <p:nvPr>
+            <p:ph type="sldNum" sz="quarter" idx="12"/>
+          </p:nvPr>
+        </p:nvSpPr>
+        <p:spPr/>
+        <p:txBody>
+          <a:bodyPr/>
+          <a:lstStyle/>
+          <a:p>
+            <a:fld id="{B6F15528-21DE-4FAA-801E-634DDDAF4B2B}" type="slidenum">
+              <a:rPr lang="en-US" smtClean="0"/>
+              <a:pPr/>
+              <a:t>3</a:t>
+            </a:fld>
+            <a:endParaRPr lang="en-US"/>
+          </a:p>
+        </p:txBody>
+      </p:sp>
+      <p:grpSp>
+        <p:nvGrpSpPr>
+          <p:cNvPr id="122" name="Group 121"/>
+          <p:cNvGrpSpPr/>
+          <p:nvPr/>
+        </p:nvGrpSpPr>
+        <p:grpSpPr>
+          <a:xfrm>
+            <a:off x="143508" y="653206"/>
+            <a:ext cx="8870785" cy="4792018"/>
+            <a:chOff x="143508" y="420923"/>
+            <a:chExt cx="8870785" cy="4792018"/>
+          </a:xfrm>
+        </p:grpSpPr>
+        <p:sp>
+          <p:nvSpPr>
+            <p:cNvPr id="6" name="Smiley Face 5"/>
+            <p:cNvSpPr/>
+            <p:nvPr/>
+          </p:nvSpPr>
+          <p:spPr>
+            <a:xfrm>
+              <a:off x="2487107" y="1103785"/>
+              <a:ext cx="381000" cy="381000"/>
+            </a:xfrm>
+            <a:prstGeom prst="smileyFace">
+              <a:avLst/>
+            </a:prstGeom>
+            <a:noFill/>
+            <a:ln>
+              <a:solidFill>
+                <a:schemeClr val="tx1"/>
+              </a:solidFill>
+            </a:ln>
+          </p:spPr>
+          <p:style>
+            <a:lnRef idx="2">
+              <a:schemeClr val="accent1">
+                <a:shade val="50000"/>
+              </a:schemeClr>
+            </a:lnRef>
+            <a:fillRef idx="1">
+              <a:schemeClr val="accent1"/>
+            </a:fillRef>
+            <a:effectRef idx="0">
+              <a:schemeClr val="accent1"/>
+            </a:effectRef>
+            <a:fontRef idx="minor">
+              <a:schemeClr val="lt1"/>
+            </a:fontRef>
+          </p:style>
+          <p:txBody>
+            <a:bodyPr rtlCol="0" anchor="ctr"/>
+            <a:lstStyle/>
+            <a:p>
+              <a:pPr algn="ctr"/>
+              <a:endParaRPr lang="en-US" sz="1400" dirty="0"/>
+            </a:p>
+          </p:txBody>
+        </p:sp>
+        <p:sp>
+          <p:nvSpPr>
+            <p:cNvPr id="7" name="TextBox 6"/>
+            <p:cNvSpPr txBox="1"/>
+            <p:nvPr/>
+          </p:nvSpPr>
+          <p:spPr>
+            <a:xfrm>
+              <a:off x="2699792" y="420923"/>
+              <a:ext cx="1584176" cy="307777"/>
+            </a:xfrm>
+            <a:prstGeom prst="rect">
+              <a:avLst/>
+            </a:prstGeom>
+            <a:noFill/>
+          </p:spPr>
+          <p:txBody>
+            <a:bodyPr wrap="square" rtlCol="0">
+              <a:spAutoFit/>
+            </a:bodyPr>
+            <a:lstStyle/>
+            <a:p>
+              <a:r>
+                <a:rPr lang="en-US" sz="1400" dirty="0" smtClean="0"/>
+                <a:t>Human annotators</a:t>
+              </a:r>
+              <a:endParaRPr lang="en-US" sz="1400" dirty="0"/>
+            </a:p>
+          </p:txBody>
+        </p:sp>
+        <p:sp>
+          <p:nvSpPr>
+            <p:cNvPr id="8" name="Flowchart: Document 7"/>
+            <p:cNvSpPr/>
+            <p:nvPr/>
+          </p:nvSpPr>
+          <p:spPr>
+            <a:xfrm>
+              <a:off x="3364969" y="1695191"/>
+              <a:ext cx="762000" cy="468868"/>
+            </a:xfrm>
+            <a:prstGeom prst="flowChartDocument">
+              <a:avLst/>
+            </a:prstGeom>
+            <a:solidFill>
+              <a:schemeClr val="accent3">
+                <a:lumMod val="40000"/>
+                <a:lumOff val="60000"/>
+              </a:schemeClr>
+            </a:solidFill>
+            <a:ln>
+              <a:solidFill>
+                <a:schemeClr val="tx1"/>
+              </a:solidFill>
+            </a:ln>
+          </p:spPr>
+          <p:style>
+            <a:lnRef idx="2">
+              <a:schemeClr val="accent1">
+                <a:shade val="50000"/>
+              </a:schemeClr>
+            </a:lnRef>
+            <a:fillRef idx="1">
+              <a:schemeClr val="accent1"/>
+            </a:fillRef>
+            <a:effectRef idx="0">
+              <a:schemeClr val="accent1"/>
+            </a:effectRef>
+            <a:fontRef idx="minor">
+              <a:schemeClr val="lt1"/>
+            </a:fontRef>
+          </p:style>
+          <p:txBody>
+            <a:bodyPr rtlCol="0" anchor="ctr"/>
+            <a:lstStyle/>
+            <a:p>
+              <a:pPr algn="ctr"/>
+              <a:endParaRPr lang="en-US" sz="1400" dirty="0"/>
+            </a:p>
+          </p:txBody>
+        </p:sp>
+        <p:sp>
+          <p:nvSpPr>
+            <p:cNvPr id="9" name="TextBox 8"/>
+            <p:cNvSpPr txBox="1"/>
+            <p:nvPr/>
+          </p:nvSpPr>
+          <p:spPr>
+            <a:xfrm>
+              <a:off x="3167844" y="1213592"/>
+              <a:ext cx="1483971" cy="523220"/>
+            </a:xfrm>
+            <a:prstGeom prst="rect">
+              <a:avLst/>
+            </a:prstGeom>
+            <a:noFill/>
+          </p:spPr>
+          <p:txBody>
+            <a:bodyPr wrap="square" rtlCol="0">
+              <a:spAutoFit/>
+            </a:bodyPr>
+            <a:lstStyle/>
+            <a:p>
+              <a:r>
+                <a:rPr lang="en-US" sz="1400" dirty="0" smtClean="0"/>
+                <a:t>Human annotation files</a:t>
+              </a:r>
+              <a:endParaRPr lang="en-US" sz="1400" dirty="0"/>
+            </a:p>
+          </p:txBody>
+        </p:sp>
+        <p:cxnSp>
+          <p:nvCxnSpPr>
+            <p:cNvPr id="10" name="Straight Arrow Connector 9"/>
+            <p:cNvCxnSpPr>
+              <a:stCxn id="6" idx="4"/>
+              <a:endCxn id="39" idx="0"/>
+            </p:cNvCxnSpPr>
+            <p:nvPr/>
+          </p:nvCxnSpPr>
+          <p:spPr>
+            <a:xfrm>
+              <a:off x="2677607" y="1484785"/>
+              <a:ext cx="0" cy="191867"/>
+            </a:xfrm>
+            <a:prstGeom prst="straightConnector1">
+              <a:avLst/>
+            </a:prstGeom>
+            <a:ln w="12700">
+              <a:solidFill>
+                <a:schemeClr val="tx1"/>
+              </a:solidFill>
+              <a:tailEnd type="triangle"/>
+            </a:ln>
+          </p:spPr>
+          <p:style>
+            <a:lnRef idx="1">
+              <a:schemeClr val="accent1"/>
+            </a:lnRef>
+            <a:fillRef idx="0">
+              <a:schemeClr val="accent1"/>
+            </a:fillRef>
+            <a:effectRef idx="0">
+              <a:schemeClr val="accent1"/>
+            </a:effectRef>
+            <a:fontRef idx="minor">
+              <a:schemeClr val="tx1"/>
+            </a:fontRef>
+          </p:style>
+        </p:cxnSp>
+        <p:cxnSp>
+          <p:nvCxnSpPr>
+            <p:cNvPr id="11" name="Straight Arrow Connector 10"/>
+            <p:cNvCxnSpPr>
+              <a:stCxn id="39" idx="3"/>
+              <a:endCxn id="8" idx="1"/>
+            </p:cNvCxnSpPr>
+            <p:nvPr/>
+          </p:nvCxnSpPr>
+          <p:spPr>
+            <a:xfrm flipV="1">
+              <a:off x="3031607" y="1929625"/>
+              <a:ext cx="333362" cy="130"/>
+            </a:xfrm>
+            <a:prstGeom prst="straightConnector1">
+              <a:avLst/>
+            </a:prstGeom>
+            <a:ln w="12700">
+              <a:solidFill>
+                <a:schemeClr val="tx1"/>
+              </a:solidFill>
+              <a:tailEnd type="triangle"/>
+            </a:ln>
+          </p:spPr>
+          <p:style>
+            <a:lnRef idx="1">
+              <a:schemeClr val="accent1"/>
+            </a:lnRef>
+            <a:fillRef idx="0">
+              <a:schemeClr val="accent1"/>
+            </a:fillRef>
+            <a:effectRef idx="0">
+              <a:schemeClr val="accent1"/>
+            </a:effectRef>
+            <a:fontRef idx="minor">
+              <a:schemeClr val="tx1"/>
+            </a:fontRef>
+          </p:style>
+        </p:cxnSp>
+        <p:sp>
+          <p:nvSpPr>
+            <p:cNvPr id="12" name="TextBox 11"/>
+            <p:cNvSpPr txBox="1"/>
+            <p:nvPr/>
+          </p:nvSpPr>
+          <p:spPr>
+            <a:xfrm>
+              <a:off x="143508" y="692696"/>
+              <a:ext cx="1137374" cy="307777"/>
+            </a:xfrm>
+            <a:prstGeom prst="rect">
+              <a:avLst/>
+            </a:prstGeom>
+            <a:noFill/>
+          </p:spPr>
+          <p:txBody>
+            <a:bodyPr wrap="square" rtlCol="0">
+              <a:spAutoFit/>
+            </a:bodyPr>
+            <a:lstStyle/>
+            <a:p>
+              <a:pPr algn="ctr"/>
+              <a:r>
+                <a:rPr lang="en-US" sz="1400" dirty="0" smtClean="0"/>
+                <a:t>Original text</a:t>
+              </a:r>
+              <a:endParaRPr lang="en-US" sz="1400" dirty="0"/>
+            </a:p>
+          </p:txBody>
+        </p:sp>
+        <p:sp>
+          <p:nvSpPr>
+            <p:cNvPr id="13" name="TextBox 12"/>
+            <p:cNvSpPr txBox="1"/>
+            <p:nvPr/>
+          </p:nvSpPr>
+          <p:spPr>
+            <a:xfrm>
+              <a:off x="755576" y="1376772"/>
+              <a:ext cx="952120" cy="307777"/>
+            </a:xfrm>
+            <a:prstGeom prst="rect">
+              <a:avLst/>
+            </a:prstGeom>
+            <a:noFill/>
+          </p:spPr>
+          <p:txBody>
+            <a:bodyPr wrap="none" rtlCol="0">
+              <a:spAutoFit/>
+            </a:bodyPr>
+            <a:lstStyle/>
+            <a:p>
+              <a:pPr algn="ctr"/>
+              <a:r>
+                <a:rPr lang="en-US" sz="1400" i="1" dirty="0" smtClean="0"/>
+                <a:t>sample.txt</a:t>
+              </a:r>
+              <a:endParaRPr lang="en-US" sz="1400" i="1" dirty="0"/>
+            </a:p>
+          </p:txBody>
+        </p:sp>
+        <p:sp>
+          <p:nvSpPr>
+            <p:cNvPr id="14" name="Flowchart: Document 13"/>
+            <p:cNvSpPr/>
+            <p:nvPr/>
+          </p:nvSpPr>
+          <p:spPr>
+            <a:xfrm>
+              <a:off x="348860" y="980728"/>
+              <a:ext cx="762000" cy="468868"/>
+            </a:xfrm>
+            <a:prstGeom prst="flowChartDocument">
+              <a:avLst/>
+            </a:prstGeom>
+            <a:solidFill>
+              <a:schemeClr val="bg1">
+                <a:lumMod val="75000"/>
+              </a:schemeClr>
+            </a:solidFill>
+            <a:ln>
+              <a:solidFill>
+                <a:schemeClr val="tx1"/>
+              </a:solidFill>
+            </a:ln>
+          </p:spPr>
+          <p:style>
+            <a:lnRef idx="2">
+              <a:schemeClr val="accent1">
+                <a:shade val="50000"/>
+              </a:schemeClr>
+            </a:lnRef>
+            <a:fillRef idx="1">
+              <a:schemeClr val="accent1"/>
+            </a:fillRef>
+            <a:effectRef idx="0">
+              <a:schemeClr val="accent1"/>
+            </a:effectRef>
+            <a:fontRef idx="minor">
+              <a:schemeClr val="lt1"/>
+            </a:fontRef>
+          </p:style>
+          <p:txBody>
+            <a:bodyPr rtlCol="0" anchor="ctr"/>
+            <a:lstStyle/>
+            <a:p>
+              <a:pPr algn="ctr"/>
+              <a:endParaRPr lang="en-US" sz="1400" dirty="0"/>
+            </a:p>
+          </p:txBody>
+        </p:sp>
+        <p:sp>
+          <p:nvSpPr>
+            <p:cNvPr id="15" name="Flowchart: Document 14"/>
+            <p:cNvSpPr/>
+            <p:nvPr/>
+          </p:nvSpPr>
+          <p:spPr>
+            <a:xfrm>
+              <a:off x="6189027" y="1694508"/>
+              <a:ext cx="762000" cy="468868"/>
+            </a:xfrm>
+            <a:prstGeom prst="flowChartDocument">
+              <a:avLst/>
+            </a:prstGeom>
+            <a:solidFill>
+              <a:schemeClr val="accent3">
+                <a:lumMod val="40000"/>
+                <a:lumOff val="60000"/>
+              </a:schemeClr>
+            </a:solidFill>
+            <a:ln>
+              <a:solidFill>
+                <a:schemeClr val="tx1"/>
+              </a:solidFill>
+            </a:ln>
+          </p:spPr>
+          <p:style>
+            <a:lnRef idx="2">
+              <a:schemeClr val="accent1">
+                <a:shade val="50000"/>
+              </a:schemeClr>
+            </a:lnRef>
+            <a:fillRef idx="1">
+              <a:schemeClr val="accent1"/>
+            </a:fillRef>
+            <a:effectRef idx="0">
+              <a:schemeClr val="accent1"/>
+            </a:effectRef>
+            <a:fontRef idx="minor">
+              <a:schemeClr val="lt1"/>
+            </a:fontRef>
+          </p:style>
+          <p:txBody>
+            <a:bodyPr rtlCol="0" anchor="ctr"/>
+            <a:lstStyle/>
+            <a:p>
+              <a:pPr algn="ctr"/>
+              <a:endParaRPr lang="en-US" sz="1400" dirty="0"/>
+            </a:p>
+          </p:txBody>
+        </p:sp>
+        <p:sp>
+          <p:nvSpPr>
+            <p:cNvPr id="16" name="TextBox 15"/>
+            <p:cNvSpPr txBox="1"/>
+            <p:nvPr/>
+          </p:nvSpPr>
+          <p:spPr>
+            <a:xfrm>
+              <a:off x="6073225" y="2138028"/>
+              <a:ext cx="959815" cy="307777"/>
+            </a:xfrm>
+            <a:prstGeom prst="rect">
+              <a:avLst/>
+            </a:prstGeom>
+            <a:noFill/>
+          </p:spPr>
+          <p:txBody>
+            <a:bodyPr wrap="none" rtlCol="0">
+              <a:spAutoFit/>
+            </a:bodyPr>
+            <a:lstStyle/>
+            <a:p>
+              <a:pPr algn="ctr"/>
+              <a:r>
+                <a:rPr lang="en-US" sz="1400" i="1" dirty="0" err="1"/>
+                <a:t>s</a:t>
+              </a:r>
+              <a:r>
+                <a:rPr lang="en-US" sz="1400" i="1" dirty="0" err="1" smtClean="0"/>
+                <a:t>ample.tbf</a:t>
+              </a:r>
+              <a:endParaRPr lang="en-US" sz="1400" i="1" dirty="0"/>
+            </a:p>
+          </p:txBody>
+        </p:sp>
+        <p:cxnSp>
+          <p:nvCxnSpPr>
+            <p:cNvPr id="17" name="Straight Arrow Connector 16"/>
+            <p:cNvCxnSpPr>
+              <a:stCxn id="8" idx="3"/>
+              <a:endCxn id="24" idx="1"/>
+            </p:cNvCxnSpPr>
+            <p:nvPr/>
+          </p:nvCxnSpPr>
+          <p:spPr>
+            <a:xfrm flipV="1">
+              <a:off x="4126969" y="1928942"/>
+              <a:ext cx="481035" cy="683"/>
+            </a:xfrm>
+            <a:prstGeom prst="straightConnector1">
+              <a:avLst/>
+            </a:prstGeom>
+            <a:ln w="12700">
+              <a:solidFill>
+                <a:schemeClr val="tx1"/>
+              </a:solidFill>
+              <a:tailEnd type="triangle"/>
+            </a:ln>
+          </p:spPr>
+          <p:style>
+            <a:lnRef idx="1">
+              <a:schemeClr val="accent1"/>
+            </a:lnRef>
+            <a:fillRef idx="0">
+              <a:schemeClr val="accent1"/>
+            </a:fillRef>
+            <a:effectRef idx="0">
+              <a:schemeClr val="accent1"/>
+            </a:effectRef>
+            <a:fontRef idx="minor">
+              <a:schemeClr val="tx1"/>
+            </a:fontRef>
+          </p:style>
+        </p:cxnSp>
+        <p:sp>
+          <p:nvSpPr>
+            <p:cNvPr id="18" name="TextBox 17"/>
+            <p:cNvSpPr txBox="1"/>
+            <p:nvPr/>
+          </p:nvSpPr>
+          <p:spPr>
+            <a:xfrm>
+              <a:off x="5913775" y="1177588"/>
+              <a:ext cx="1592551" cy="523220"/>
+            </a:xfrm>
+            <a:prstGeom prst="rect">
+              <a:avLst/>
+            </a:prstGeom>
+            <a:noFill/>
+          </p:spPr>
+          <p:txBody>
+            <a:bodyPr wrap="none" rtlCol="0">
+              <a:spAutoFit/>
+            </a:bodyPr>
+            <a:lstStyle/>
+            <a:p>
+              <a:r>
+                <a:rPr lang="en-US" sz="1400" dirty="0" smtClean="0"/>
+                <a:t>Gold standard</a:t>
+              </a:r>
+            </a:p>
+            <a:p>
+              <a:r>
+                <a:rPr lang="en-US" sz="1400" dirty="0" smtClean="0"/>
+                <a:t>event mention files</a:t>
+              </a:r>
+              <a:endParaRPr lang="en-US" sz="1400" dirty="0"/>
+            </a:p>
+          </p:txBody>
+        </p:sp>
+        <p:cxnSp>
+          <p:nvCxnSpPr>
+            <p:cNvPr id="19" name="Straight Arrow Connector 18"/>
+            <p:cNvCxnSpPr>
+              <a:stCxn id="24" idx="3"/>
+              <a:endCxn id="15" idx="1"/>
+            </p:cNvCxnSpPr>
+            <p:nvPr/>
+          </p:nvCxnSpPr>
+          <p:spPr>
+            <a:xfrm>
+              <a:off x="5632073" y="1928942"/>
+              <a:ext cx="556954" cy="0"/>
+            </a:xfrm>
+            <a:prstGeom prst="straightConnector1">
+              <a:avLst/>
+            </a:prstGeom>
+            <a:ln w="12700">
+              <a:solidFill>
+                <a:schemeClr val="tx1"/>
+              </a:solidFill>
+              <a:tailEnd type="triangle"/>
+            </a:ln>
+          </p:spPr>
+          <p:style>
+            <a:lnRef idx="1">
+              <a:schemeClr val="accent1"/>
+            </a:lnRef>
+            <a:fillRef idx="0">
+              <a:schemeClr val="accent1"/>
+            </a:fillRef>
+            <a:effectRef idx="0">
+              <a:schemeClr val="accent1"/>
+            </a:effectRef>
+            <a:fontRef idx="minor">
+              <a:schemeClr val="tx1"/>
+            </a:fontRef>
+          </p:style>
+        </p:cxnSp>
+        <p:sp>
+          <p:nvSpPr>
+            <p:cNvPr id="20" name="Flowchart: Document 19"/>
+            <p:cNvSpPr/>
+            <p:nvPr/>
+          </p:nvSpPr>
+          <p:spPr>
+            <a:xfrm>
+              <a:off x="6172133" y="4441289"/>
+              <a:ext cx="762000" cy="468868"/>
+            </a:xfrm>
+            <a:prstGeom prst="flowChartDocument">
+              <a:avLst/>
+            </a:prstGeom>
+            <a:solidFill>
+              <a:schemeClr val="accent4">
+                <a:lumMod val="40000"/>
+                <a:lumOff val="60000"/>
+              </a:schemeClr>
+            </a:solidFill>
+            <a:ln>
+              <a:solidFill>
+                <a:schemeClr val="tx1"/>
+              </a:solidFill>
+            </a:ln>
+          </p:spPr>
+          <p:style>
+            <a:lnRef idx="2">
+              <a:schemeClr val="accent1">
+                <a:shade val="50000"/>
+              </a:schemeClr>
+            </a:lnRef>
+            <a:fillRef idx="1">
+              <a:schemeClr val="accent1"/>
+            </a:fillRef>
+            <a:effectRef idx="0">
+              <a:schemeClr val="accent1"/>
+            </a:effectRef>
+            <a:fontRef idx="minor">
+              <a:schemeClr val="lt1"/>
+            </a:fontRef>
+          </p:style>
+          <p:txBody>
+            <a:bodyPr rtlCol="0" anchor="ctr"/>
+            <a:lstStyle/>
+            <a:p>
+              <a:pPr algn="ctr"/>
+              <a:endParaRPr lang="en-US" sz="1400" dirty="0"/>
+            </a:p>
+          </p:txBody>
+        </p:sp>
+        <p:sp>
+          <p:nvSpPr>
+            <p:cNvPr id="21" name="TextBox 20"/>
+            <p:cNvSpPr txBox="1"/>
+            <p:nvPr/>
+          </p:nvSpPr>
+          <p:spPr>
+            <a:xfrm>
+              <a:off x="5976156" y="3918069"/>
+              <a:ext cx="1156855" cy="523220"/>
+            </a:xfrm>
+            <a:prstGeom prst="rect">
+              <a:avLst/>
+            </a:prstGeom>
+            <a:noFill/>
+          </p:spPr>
+          <p:txBody>
+            <a:bodyPr wrap="none" rtlCol="0">
+              <a:spAutoFit/>
+            </a:bodyPr>
+            <a:lstStyle/>
+            <a:p>
+              <a:r>
+                <a:rPr lang="en-US" sz="1400" dirty="0" smtClean="0"/>
+                <a:t>System event</a:t>
+              </a:r>
+            </a:p>
+            <a:p>
+              <a:r>
+                <a:rPr lang="en-US" sz="1400" dirty="0" smtClean="0"/>
+                <a:t>mention files</a:t>
+              </a:r>
+              <a:endParaRPr lang="en-US" sz="1400" dirty="0"/>
+            </a:p>
+          </p:txBody>
+        </p:sp>
+        <p:cxnSp>
+          <p:nvCxnSpPr>
+            <p:cNvPr id="22" name="Straight Arrow Connector 21"/>
+            <p:cNvCxnSpPr>
+              <a:stCxn id="28" idx="3"/>
+              <a:endCxn id="20" idx="1"/>
+            </p:cNvCxnSpPr>
+            <p:nvPr/>
+          </p:nvCxnSpPr>
+          <p:spPr>
+            <a:xfrm>
+              <a:off x="5668077" y="4673229"/>
+              <a:ext cx="504056" cy="2494"/>
+            </a:xfrm>
+            <a:prstGeom prst="straightConnector1">
+              <a:avLst/>
+            </a:prstGeom>
+            <a:ln w="12700">
+              <a:solidFill>
+                <a:schemeClr val="tx1"/>
+              </a:solidFill>
+              <a:tailEnd type="triangle"/>
+            </a:ln>
+          </p:spPr>
+          <p:style>
+            <a:lnRef idx="1">
+              <a:schemeClr val="accent1"/>
+            </a:lnRef>
+            <a:fillRef idx="0">
+              <a:schemeClr val="accent1"/>
+            </a:fillRef>
+            <a:effectRef idx="0">
+              <a:schemeClr val="accent1"/>
+            </a:effectRef>
+            <a:fontRef idx="minor">
+              <a:schemeClr val="tx1"/>
+            </a:fontRef>
+          </p:style>
+        </p:cxnSp>
+        <p:sp>
+          <p:nvSpPr>
+            <p:cNvPr id="23" name="TextBox 22"/>
+            <p:cNvSpPr txBox="1"/>
+            <p:nvPr/>
+          </p:nvSpPr>
+          <p:spPr>
+            <a:xfrm>
+              <a:off x="5796136" y="4905164"/>
+              <a:ext cx="1658201" cy="307777"/>
+            </a:xfrm>
+            <a:prstGeom prst="rect">
+              <a:avLst/>
+            </a:prstGeom>
+            <a:noFill/>
+          </p:spPr>
+          <p:txBody>
+            <a:bodyPr wrap="none" rtlCol="0">
+              <a:spAutoFit/>
+            </a:bodyPr>
+            <a:lstStyle/>
+            <a:p>
+              <a:pPr algn="ctr"/>
+              <a:r>
+                <a:rPr lang="en-US" sz="1400" i="1" dirty="0" smtClean="0"/>
+                <a:t>sample-system1.</a:t>
+              </a:r>
+              <a:r>
+                <a:rPr lang="en-US" sz="1400" i="1" dirty="0"/>
+                <a:t>t</a:t>
+              </a:r>
+              <a:r>
+                <a:rPr lang="en-US" sz="1400" i="1" dirty="0" smtClean="0"/>
+                <a:t>bf</a:t>
+              </a:r>
+              <a:endParaRPr lang="en-US" sz="1400" i="1" dirty="0"/>
+            </a:p>
+          </p:txBody>
+        </p:sp>
+        <p:sp>
+          <p:nvSpPr>
+            <p:cNvPr id="24" name="Rounded Rectangle 23"/>
+            <p:cNvSpPr/>
+            <p:nvPr/>
+          </p:nvSpPr>
+          <p:spPr>
+            <a:xfrm>
+              <a:off x="4608004" y="1675839"/>
+              <a:ext cx="1024069" cy="506206"/>
+            </a:xfrm>
+            <a:prstGeom prst="roundRect">
+              <a:avLst/>
+            </a:prstGeom>
+            <a:noFill/>
+            <a:ln>
+              <a:solidFill>
+                <a:schemeClr val="tx1"/>
+              </a:solidFill>
+            </a:ln>
+          </p:spPr>
+          <p:style>
+            <a:lnRef idx="2">
+              <a:schemeClr val="accent1">
+                <a:shade val="50000"/>
+              </a:schemeClr>
+            </a:lnRef>
+            <a:fillRef idx="1">
+              <a:schemeClr val="accent1"/>
+            </a:fillRef>
+            <a:effectRef idx="0">
+              <a:schemeClr val="accent1"/>
+            </a:effectRef>
+            <a:fontRef idx="minor">
+              <a:schemeClr val="lt1"/>
+            </a:fontRef>
+          </p:style>
+          <p:txBody>
+            <a:bodyPr rtlCol="0" anchor="ctr"/>
+            <a:lstStyle/>
+            <a:p>
+              <a:pPr algn="ctr"/>
+              <a:r>
+                <a:rPr lang="en-US" sz="1400" dirty="0" smtClean="0">
+                  <a:solidFill>
+                    <a:schemeClr val="tx1"/>
+                  </a:solidFill>
+                </a:rPr>
+                <a:t>Converter</a:t>
+              </a:r>
+              <a:endParaRPr lang="en-US" sz="1400" dirty="0">
+                <a:solidFill>
+                  <a:schemeClr val="tx1"/>
+                </a:solidFill>
+              </a:endParaRPr>
+            </a:p>
+          </p:txBody>
+        </p:sp>
+        <p:cxnSp>
+          <p:nvCxnSpPr>
+            <p:cNvPr id="25" name="Elbow Connector 24"/>
+            <p:cNvCxnSpPr>
+              <a:stCxn id="15" idx="3"/>
+              <a:endCxn id="34" idx="0"/>
+            </p:cNvCxnSpPr>
+            <p:nvPr/>
+          </p:nvCxnSpPr>
+          <p:spPr>
+            <a:xfrm>
+              <a:off x="6951027" y="1928942"/>
+              <a:ext cx="447287" cy="1137869"/>
+            </a:xfrm>
+            <a:prstGeom prst="bentConnector2">
+              <a:avLst/>
+            </a:prstGeom>
+            <a:ln w="12700">
+              <a:solidFill>
+                <a:schemeClr val="tx1"/>
+              </a:solidFill>
+              <a:tailEnd type="triangle"/>
+            </a:ln>
+          </p:spPr>
+          <p:style>
+            <a:lnRef idx="1">
+              <a:schemeClr val="accent1"/>
+            </a:lnRef>
+            <a:fillRef idx="0">
+              <a:schemeClr val="accent1"/>
+            </a:fillRef>
+            <a:effectRef idx="0">
+              <a:schemeClr val="accent1"/>
+            </a:effectRef>
+            <a:fontRef idx="minor">
+              <a:schemeClr val="tx1"/>
+            </a:fontRef>
+          </p:style>
+        </p:cxnSp>
+        <p:sp>
+          <p:nvSpPr>
+            <p:cNvPr id="26" name="TextBox 25"/>
+            <p:cNvSpPr txBox="1"/>
+            <p:nvPr/>
+          </p:nvSpPr>
+          <p:spPr>
+            <a:xfrm>
+              <a:off x="3213707" y="2132856"/>
+              <a:ext cx="1034257" cy="307777"/>
+            </a:xfrm>
+            <a:prstGeom prst="rect">
+              <a:avLst/>
+            </a:prstGeom>
+            <a:noFill/>
+          </p:spPr>
+          <p:txBody>
+            <a:bodyPr wrap="none" rtlCol="0">
+              <a:spAutoFit/>
+            </a:bodyPr>
+            <a:lstStyle/>
+            <a:p>
+              <a:pPr algn="ctr"/>
+              <a:r>
+                <a:rPr lang="en-US" sz="1400" i="1" dirty="0" err="1" smtClean="0"/>
+                <a:t>sample.ann</a:t>
+              </a:r>
+              <a:endParaRPr lang="en-US" sz="1400" i="1" dirty="0"/>
+            </a:p>
+          </p:txBody>
+        </p:sp>
+        <p:cxnSp>
+          <p:nvCxnSpPr>
+            <p:cNvPr id="27" name="Elbow Connector 26"/>
+            <p:cNvCxnSpPr>
+              <a:stCxn id="33" idx="2"/>
+              <a:endCxn id="108" idx="1"/>
+            </p:cNvCxnSpPr>
+            <p:nvPr/>
+          </p:nvCxnSpPr>
+          <p:spPr>
+            <a:xfrm rot="16200000" flipH="1">
+              <a:off x="528527" y="2519188"/>
+              <a:ext cx="710497" cy="307831"/>
+            </a:xfrm>
+            <a:prstGeom prst="bentConnector2">
+              <a:avLst/>
+            </a:prstGeom>
+            <a:ln w="12700">
+              <a:solidFill>
+                <a:schemeClr val="tx1"/>
+              </a:solidFill>
+              <a:tailEnd type="triangle"/>
+            </a:ln>
+          </p:spPr>
+          <p:style>
+            <a:lnRef idx="1">
+              <a:schemeClr val="accent1"/>
+            </a:lnRef>
+            <a:fillRef idx="0">
+              <a:schemeClr val="accent1"/>
+            </a:fillRef>
+            <a:effectRef idx="0">
+              <a:schemeClr val="accent1"/>
+            </a:effectRef>
+            <a:fontRef idx="minor">
+              <a:schemeClr val="tx1"/>
+            </a:fontRef>
+          </p:style>
+        </p:cxnSp>
+        <p:sp>
+          <p:nvSpPr>
+            <p:cNvPr id="28" name="Rounded Rectangle 27"/>
+            <p:cNvSpPr/>
+            <p:nvPr/>
+          </p:nvSpPr>
+          <p:spPr>
+            <a:xfrm>
+              <a:off x="2094923" y="4381944"/>
+              <a:ext cx="3573154" cy="582569"/>
+            </a:xfrm>
+            <a:prstGeom prst="roundRect">
+              <a:avLst/>
+            </a:prstGeom>
+            <a:solidFill>
+              <a:schemeClr val="accent4">
+                <a:lumMod val="40000"/>
+                <a:lumOff val="60000"/>
+              </a:schemeClr>
+            </a:solidFill>
+            <a:ln>
+              <a:solidFill>
+                <a:schemeClr val="tx1"/>
+              </a:solidFill>
+            </a:ln>
+          </p:spPr>
+          <p:style>
+            <a:lnRef idx="2">
+              <a:schemeClr val="accent1">
+                <a:shade val="50000"/>
+              </a:schemeClr>
+            </a:lnRef>
+            <a:fillRef idx="1">
+              <a:schemeClr val="accent1"/>
+            </a:fillRef>
+            <a:effectRef idx="0">
+              <a:schemeClr val="accent1"/>
+            </a:effectRef>
+            <a:fontRef idx="minor">
+              <a:schemeClr val="lt1"/>
+            </a:fontRef>
+          </p:style>
+          <p:txBody>
+            <a:bodyPr rtlCol="0" anchor="ctr"/>
+            <a:lstStyle/>
+            <a:p>
+              <a:pPr algn="ctr"/>
+              <a:r>
+                <a:rPr lang="en-US" sz="1400" b="1" dirty="0">
+                  <a:solidFill>
+                    <a:schemeClr val="tx1"/>
+                  </a:solidFill>
+                </a:rPr>
+                <a:t>Event </a:t>
+              </a:r>
+              <a:r>
+                <a:rPr lang="en-US" sz="1400" b="1" dirty="0" smtClean="0">
+                  <a:solidFill>
+                    <a:schemeClr val="tx1"/>
+                  </a:solidFill>
+                </a:rPr>
+                <a:t>mention detection </a:t>
+              </a:r>
+              <a:r>
+                <a:rPr lang="en-US" sz="1400" b="1" dirty="0">
+                  <a:solidFill>
+                    <a:schemeClr val="tx1"/>
+                  </a:solidFill>
+                </a:rPr>
+                <a:t>system</a:t>
+              </a:r>
+            </a:p>
+          </p:txBody>
+        </p:sp>
+        <p:cxnSp>
+          <p:nvCxnSpPr>
+            <p:cNvPr id="29" name="Elbow Connector 28"/>
+            <p:cNvCxnSpPr>
+              <a:stCxn id="20" idx="3"/>
+              <a:endCxn id="34" idx="2"/>
+            </p:cNvCxnSpPr>
+            <p:nvPr/>
+          </p:nvCxnSpPr>
+          <p:spPr>
+            <a:xfrm flipV="1">
+              <a:off x="6934133" y="3573017"/>
+              <a:ext cx="464181" cy="1102706"/>
+            </a:xfrm>
+            <a:prstGeom prst="bentConnector2">
+              <a:avLst/>
+            </a:prstGeom>
+            <a:ln w="12700">
+              <a:solidFill>
+                <a:schemeClr val="tx1"/>
+              </a:solidFill>
+              <a:tailEnd type="triangle"/>
+            </a:ln>
+          </p:spPr>
+          <p:style>
+            <a:lnRef idx="1">
+              <a:schemeClr val="accent1"/>
+            </a:lnRef>
+            <a:fillRef idx="0">
+              <a:schemeClr val="accent1"/>
+            </a:fillRef>
+            <a:effectRef idx="0">
+              <a:schemeClr val="accent1"/>
+            </a:effectRef>
+            <a:fontRef idx="minor">
+              <a:schemeClr val="tx1"/>
+            </a:fontRef>
+          </p:style>
+        </p:cxnSp>
+        <p:cxnSp>
+          <p:nvCxnSpPr>
+            <p:cNvPr id="32" name="Straight Arrow Connector 31"/>
+            <p:cNvCxnSpPr>
+              <a:stCxn id="14" idx="2"/>
+              <a:endCxn id="33" idx="0"/>
+            </p:cNvCxnSpPr>
+            <p:nvPr/>
+          </p:nvCxnSpPr>
+          <p:spPr>
+            <a:xfrm>
+              <a:off x="729860" y="1418599"/>
+              <a:ext cx="0" cy="462229"/>
+            </a:xfrm>
+            <a:prstGeom prst="straightConnector1">
+              <a:avLst/>
+            </a:prstGeom>
+            <a:ln w="12700">
+              <a:solidFill>
+                <a:schemeClr val="tx1"/>
+              </a:solidFill>
+              <a:tailEnd type="triangle"/>
+            </a:ln>
+          </p:spPr>
+          <p:style>
+            <a:lnRef idx="1">
+              <a:schemeClr val="accent1"/>
+            </a:lnRef>
+            <a:fillRef idx="0">
+              <a:schemeClr val="accent1"/>
+            </a:fillRef>
+            <a:effectRef idx="0">
+              <a:schemeClr val="accent1"/>
+            </a:effectRef>
+            <a:fontRef idx="minor">
+              <a:schemeClr val="tx1"/>
+            </a:fontRef>
+          </p:style>
+        </p:cxnSp>
+        <p:sp>
+          <p:nvSpPr>
+            <p:cNvPr id="33" name="Rounded Rectangle 32"/>
+            <p:cNvSpPr/>
+            <p:nvPr/>
+          </p:nvSpPr>
+          <p:spPr>
+            <a:xfrm>
+              <a:off x="216697" y="1880828"/>
+              <a:ext cx="1026325" cy="437028"/>
+            </a:xfrm>
+            <a:prstGeom prst="roundRect">
+              <a:avLst/>
+            </a:prstGeom>
+            <a:solidFill>
+              <a:schemeClr val="accent3">
+                <a:lumMod val="40000"/>
+                <a:lumOff val="60000"/>
+              </a:schemeClr>
+            </a:solidFill>
+            <a:ln>
+              <a:solidFill>
+                <a:schemeClr val="tx1"/>
+              </a:solidFill>
+            </a:ln>
+          </p:spPr>
+          <p:style>
+            <a:lnRef idx="2">
+              <a:schemeClr val="accent1">
+                <a:shade val="50000"/>
+              </a:schemeClr>
+            </a:lnRef>
+            <a:fillRef idx="1">
+              <a:schemeClr val="accent1"/>
+            </a:fillRef>
+            <a:effectRef idx="0">
+              <a:schemeClr val="accent1"/>
+            </a:effectRef>
+            <a:fontRef idx="minor">
+              <a:schemeClr val="lt1"/>
+            </a:fontRef>
+          </p:style>
+          <p:txBody>
+            <a:bodyPr rtlCol="0" anchor="ctr"/>
+            <a:lstStyle/>
+            <a:p>
+              <a:pPr algn="ctr"/>
+              <a:r>
+                <a:rPr lang="en-US" sz="1400" dirty="0" err="1">
+                  <a:solidFill>
+                    <a:schemeClr val="tx1"/>
+                  </a:solidFill>
+                </a:rPr>
+                <a:t>T</a:t>
+              </a:r>
+              <a:r>
+                <a:rPr lang="en-US" sz="1400" dirty="0" err="1" smtClean="0">
+                  <a:solidFill>
+                    <a:schemeClr val="tx1"/>
+                  </a:solidFill>
+                </a:rPr>
+                <a:t>okenizer</a:t>
+              </a:r>
+              <a:endParaRPr lang="en-US" sz="1400" dirty="0">
+                <a:solidFill>
+                  <a:schemeClr val="tx1"/>
+                </a:solidFill>
+              </a:endParaRPr>
+            </a:p>
+          </p:txBody>
+        </p:sp>
+        <p:sp>
+          <p:nvSpPr>
+            <p:cNvPr id="34" name="Rounded Rectangle 33"/>
+            <p:cNvSpPr/>
+            <p:nvPr/>
+          </p:nvSpPr>
+          <p:spPr>
+            <a:xfrm>
+              <a:off x="6912260" y="3066811"/>
+              <a:ext cx="972108" cy="506206"/>
+            </a:xfrm>
+            <a:prstGeom prst="roundRect">
+              <a:avLst/>
+            </a:prstGeom>
+            <a:noFill/>
+            <a:ln>
+              <a:solidFill>
+                <a:schemeClr val="tx1"/>
+              </a:solidFill>
+            </a:ln>
+          </p:spPr>
+          <p:style>
+            <a:lnRef idx="2">
+              <a:schemeClr val="accent1">
+                <a:shade val="50000"/>
+              </a:schemeClr>
+            </a:lnRef>
+            <a:fillRef idx="1">
+              <a:schemeClr val="accent1"/>
+            </a:fillRef>
+            <a:effectRef idx="0">
+              <a:schemeClr val="accent1"/>
+            </a:effectRef>
+            <a:fontRef idx="minor">
+              <a:schemeClr val="lt1"/>
+            </a:fontRef>
+          </p:style>
+          <p:txBody>
+            <a:bodyPr rtlCol="0" anchor="ctr"/>
+            <a:lstStyle/>
+            <a:p>
+              <a:pPr algn="ctr"/>
+              <a:r>
+                <a:rPr lang="en-US" sz="1400" dirty="0">
+                  <a:solidFill>
+                    <a:schemeClr val="tx1"/>
+                  </a:solidFill>
+                </a:rPr>
+                <a:t>Evaluator</a:t>
+              </a:r>
+            </a:p>
+          </p:txBody>
+        </p:sp>
+        <p:sp>
+          <p:nvSpPr>
+            <p:cNvPr id="35" name="Flowchart: Process 34"/>
+            <p:cNvSpPr/>
+            <p:nvPr/>
+          </p:nvSpPr>
+          <p:spPr>
+            <a:xfrm>
+              <a:off x="8100392" y="3065812"/>
+              <a:ext cx="913901" cy="507205"/>
+            </a:xfrm>
+            <a:prstGeom prst="flowChartProcess">
+              <a:avLst/>
+            </a:prstGeom>
+            <a:noFill/>
+            <a:ln>
+              <a:solidFill>
+                <a:schemeClr val="tx1"/>
+              </a:solidFill>
+            </a:ln>
+          </p:spPr>
+          <p:style>
+            <a:lnRef idx="2">
+              <a:schemeClr val="accent1">
+                <a:shade val="50000"/>
+              </a:schemeClr>
+            </a:lnRef>
+            <a:fillRef idx="1">
+              <a:schemeClr val="accent1"/>
+            </a:fillRef>
+            <a:effectRef idx="0">
+              <a:schemeClr val="accent1"/>
+            </a:effectRef>
+            <a:fontRef idx="minor">
+              <a:schemeClr val="lt1"/>
+            </a:fontRef>
+          </p:style>
+          <p:txBody>
+            <a:bodyPr rtlCol="0" anchor="ctr"/>
+            <a:lstStyle/>
+            <a:p>
+              <a:pPr algn="ctr"/>
+              <a:r>
+                <a:rPr lang="en-US" sz="1400" dirty="0" smtClean="0">
+                  <a:solidFill>
+                    <a:schemeClr val="tx1"/>
+                  </a:solidFill>
+                </a:rPr>
+                <a:t>Results</a:t>
+              </a:r>
+              <a:endParaRPr lang="en-US" sz="1400" dirty="0">
+                <a:solidFill>
+                  <a:schemeClr val="tx1"/>
+                </a:solidFill>
+              </a:endParaRPr>
+            </a:p>
+          </p:txBody>
+        </p:sp>
+        <p:cxnSp>
+          <p:nvCxnSpPr>
+            <p:cNvPr id="36" name="Straight Arrow Connector 35"/>
+            <p:cNvCxnSpPr>
+              <a:stCxn id="34" idx="3"/>
+              <a:endCxn id="35" idx="1"/>
+            </p:cNvCxnSpPr>
+            <p:nvPr/>
+          </p:nvCxnSpPr>
+          <p:spPr>
+            <a:xfrm flipV="1">
+              <a:off x="7884368" y="3319415"/>
+              <a:ext cx="216024" cy="499"/>
+            </a:xfrm>
+            <a:prstGeom prst="straightConnector1">
+              <a:avLst/>
+            </a:prstGeom>
+            <a:ln w="12700">
+              <a:solidFill>
+                <a:schemeClr val="tx1"/>
+              </a:solidFill>
+              <a:tailEnd type="triangle"/>
+            </a:ln>
+          </p:spPr>
+          <p:style>
+            <a:lnRef idx="1">
+              <a:schemeClr val="accent1"/>
+            </a:lnRef>
+            <a:fillRef idx="0">
+              <a:schemeClr val="accent1"/>
+            </a:fillRef>
+            <a:effectRef idx="0">
+              <a:schemeClr val="accent1"/>
+            </a:effectRef>
+            <a:fontRef idx="minor">
+              <a:schemeClr val="tx1"/>
+            </a:fontRef>
+          </p:style>
+        </p:cxnSp>
+        <p:sp>
+          <p:nvSpPr>
+            <p:cNvPr id="37" name="TextBox 36"/>
+            <p:cNvSpPr txBox="1"/>
+            <p:nvPr/>
+          </p:nvSpPr>
+          <p:spPr>
+            <a:xfrm>
+              <a:off x="884570" y="3212976"/>
+              <a:ext cx="987130" cy="307777"/>
+            </a:xfrm>
+            <a:prstGeom prst="rect">
+              <a:avLst/>
+            </a:prstGeom>
+            <a:noFill/>
+          </p:spPr>
+          <p:txBody>
+            <a:bodyPr wrap="none" rtlCol="0">
+              <a:spAutoFit/>
+            </a:bodyPr>
+            <a:lstStyle/>
+            <a:p>
+              <a:pPr algn="ctr"/>
+              <a:r>
+                <a:rPr lang="en-US" sz="1400" i="1" dirty="0" err="1" smtClean="0"/>
+                <a:t>sample.tkn</a:t>
+              </a:r>
+              <a:endParaRPr lang="en-US" sz="1400" i="1" dirty="0"/>
+            </a:p>
+          </p:txBody>
+        </p:sp>
+        <p:sp>
+          <p:nvSpPr>
+            <p:cNvPr id="39" name="Rounded Rectangle 38"/>
+            <p:cNvSpPr/>
+            <p:nvPr/>
+          </p:nvSpPr>
+          <p:spPr>
+            <a:xfrm>
+              <a:off x="2323606" y="1676652"/>
+              <a:ext cx="708001" cy="506206"/>
+            </a:xfrm>
+            <a:prstGeom prst="roundRect">
+              <a:avLst/>
+            </a:prstGeom>
+            <a:noFill/>
+            <a:ln>
+              <a:solidFill>
+                <a:schemeClr val="tx1"/>
+              </a:solidFill>
+            </a:ln>
+          </p:spPr>
+          <p:style>
+            <a:lnRef idx="2">
+              <a:schemeClr val="accent1">
+                <a:shade val="50000"/>
+              </a:schemeClr>
+            </a:lnRef>
+            <a:fillRef idx="1">
+              <a:schemeClr val="accent1"/>
+            </a:fillRef>
+            <a:effectRef idx="0">
+              <a:schemeClr val="accent1"/>
+            </a:effectRef>
+            <a:fontRef idx="minor">
+              <a:schemeClr val="lt1"/>
+            </a:fontRef>
+          </p:style>
+          <p:txBody>
+            <a:bodyPr rtlCol="0" anchor="ctr"/>
+            <a:lstStyle/>
+            <a:p>
+              <a:pPr algn="ctr"/>
+              <a:r>
+                <a:rPr lang="en-US" sz="1400" dirty="0" smtClean="0">
+                  <a:solidFill>
+                    <a:schemeClr val="tx1"/>
+                  </a:solidFill>
+                </a:rPr>
+                <a:t>brat</a:t>
+              </a:r>
+              <a:endParaRPr lang="en-US" sz="1400" dirty="0">
+                <a:solidFill>
+                  <a:schemeClr val="tx1"/>
+                </a:solidFill>
+              </a:endParaRPr>
+            </a:p>
+          </p:txBody>
+        </p:sp>
+        <p:sp>
+          <p:nvSpPr>
+            <p:cNvPr id="41" name="Rounded Rectangle 40"/>
+            <p:cNvSpPr/>
+            <p:nvPr/>
+          </p:nvSpPr>
+          <p:spPr>
+            <a:xfrm>
+              <a:off x="2094923" y="822195"/>
+              <a:ext cx="3737217" cy="1814718"/>
+            </a:xfrm>
+            <a:prstGeom prst="roundRect">
+              <a:avLst>
+                <a:gd name="adj" fmla="val 8587"/>
+              </a:avLst>
+            </a:prstGeom>
+            <a:noFill/>
+            <a:ln>
+              <a:solidFill>
+                <a:schemeClr val="tx1"/>
+              </a:solidFill>
+            </a:ln>
+          </p:spPr>
+          <p:style>
+            <a:lnRef idx="2">
+              <a:schemeClr val="accent1">
+                <a:shade val="50000"/>
+              </a:schemeClr>
+            </a:lnRef>
+            <a:fillRef idx="1">
+              <a:schemeClr val="accent1"/>
+            </a:fillRef>
+            <a:effectRef idx="0">
+              <a:schemeClr val="accent1"/>
+            </a:effectRef>
+            <a:fontRef idx="minor">
+              <a:schemeClr val="lt1"/>
+            </a:fontRef>
+          </p:style>
+          <p:txBody>
+            <a:bodyPr rtlCol="0" anchor="ctr"/>
+            <a:lstStyle/>
+            <a:p>
+              <a:pPr algn="ctr"/>
+              <a:endParaRPr lang="en-US" sz="1400" dirty="0">
+                <a:solidFill>
+                  <a:schemeClr val="tx1"/>
+                </a:solidFill>
+              </a:endParaRPr>
+            </a:p>
+          </p:txBody>
+        </p:sp>
+        <p:cxnSp>
+          <p:nvCxnSpPr>
+            <p:cNvPr id="42" name="Elbow Connector 41"/>
+            <p:cNvCxnSpPr>
+              <a:stCxn id="108" idx="3"/>
+            </p:cNvCxnSpPr>
+            <p:nvPr/>
+          </p:nvCxnSpPr>
+          <p:spPr>
+            <a:xfrm>
+              <a:off x="1799691" y="3028353"/>
+              <a:ext cx="877915" cy="1317587"/>
+            </a:xfrm>
+            <a:prstGeom prst="bentConnector2">
+              <a:avLst/>
+            </a:prstGeom>
+            <a:ln w="12700">
+              <a:solidFill>
+                <a:schemeClr val="tx1"/>
+              </a:solidFill>
+              <a:tailEnd type="triangle"/>
+            </a:ln>
+          </p:spPr>
+          <p:style>
+            <a:lnRef idx="1">
+              <a:schemeClr val="accent1"/>
+            </a:lnRef>
+            <a:fillRef idx="0">
+              <a:schemeClr val="accent1"/>
+            </a:fillRef>
+            <a:effectRef idx="0">
+              <a:schemeClr val="accent1"/>
+            </a:effectRef>
+            <a:fontRef idx="minor">
+              <a:schemeClr val="tx1"/>
+            </a:fontRef>
+          </p:style>
+        </p:cxnSp>
+        <p:cxnSp>
+          <p:nvCxnSpPr>
+            <p:cNvPr id="43" name="Elbow Connector 42"/>
+            <p:cNvCxnSpPr>
+              <a:stCxn id="108" idx="3"/>
+              <a:endCxn id="39" idx="2"/>
+            </p:cNvCxnSpPr>
+            <p:nvPr/>
+          </p:nvCxnSpPr>
+          <p:spPr>
+            <a:xfrm flipV="1">
+              <a:off x="1799691" y="2182858"/>
+              <a:ext cx="877916" cy="845495"/>
+            </a:xfrm>
+            <a:prstGeom prst="bentConnector2">
+              <a:avLst/>
+            </a:prstGeom>
+            <a:ln w="12700">
+              <a:solidFill>
+                <a:schemeClr val="tx1"/>
+              </a:solidFill>
+              <a:tailEnd type="triangle"/>
+            </a:ln>
+          </p:spPr>
+          <p:style>
+            <a:lnRef idx="1">
+              <a:schemeClr val="accent1"/>
+            </a:lnRef>
+            <a:fillRef idx="0">
+              <a:schemeClr val="accent1"/>
+            </a:fillRef>
+            <a:effectRef idx="0">
+              <a:schemeClr val="accent1"/>
+            </a:effectRef>
+            <a:fontRef idx="minor">
+              <a:schemeClr val="tx1"/>
+            </a:fontRef>
+          </p:style>
+        </p:cxnSp>
+        <p:sp>
+          <p:nvSpPr>
+            <p:cNvPr id="45" name="TextBox 44"/>
+            <p:cNvSpPr txBox="1"/>
+            <p:nvPr/>
+          </p:nvSpPr>
+          <p:spPr>
+            <a:xfrm>
+              <a:off x="3094189" y="836712"/>
+              <a:ext cx="2612401" cy="307777"/>
+            </a:xfrm>
+            <a:prstGeom prst="rect">
+              <a:avLst/>
+            </a:prstGeom>
+            <a:noFill/>
+          </p:spPr>
+          <p:txBody>
+            <a:bodyPr wrap="square" rtlCol="0">
+              <a:spAutoFit/>
+            </a:bodyPr>
+            <a:lstStyle/>
+            <a:p>
+              <a:r>
+                <a:rPr lang="en-US" sz="1400" b="1" dirty="0" smtClean="0"/>
+                <a:t>Human event mention detection </a:t>
+              </a:r>
+              <a:endParaRPr lang="en-US" sz="1400" b="1" dirty="0"/>
+            </a:p>
+          </p:txBody>
+        </p:sp>
+        <p:cxnSp>
+          <p:nvCxnSpPr>
+            <p:cNvPr id="84" name="Straight Connector 83"/>
+            <p:cNvCxnSpPr>
+              <a:endCxn id="6" idx="0"/>
+            </p:cNvCxnSpPr>
+            <p:nvPr/>
+          </p:nvCxnSpPr>
+          <p:spPr>
+            <a:xfrm flipH="1">
+              <a:off x="2677607" y="676437"/>
+              <a:ext cx="274213" cy="427348"/>
+            </a:xfrm>
+            <a:prstGeom prst="line">
+              <a:avLst/>
+            </a:prstGeom>
+            <a:ln>
+              <a:solidFill>
+                <a:schemeClr val="tx1"/>
+              </a:solidFill>
+            </a:ln>
+          </p:spPr>
+          <p:style>
+            <a:lnRef idx="1">
+              <a:schemeClr val="accent1"/>
+            </a:lnRef>
+            <a:fillRef idx="0">
+              <a:schemeClr val="accent1"/>
+            </a:fillRef>
+            <a:effectRef idx="0">
+              <a:schemeClr val="accent1"/>
+            </a:effectRef>
+            <a:fontRef idx="minor">
+              <a:schemeClr val="tx1"/>
+            </a:fontRef>
+          </p:style>
+        </p:cxnSp>
+        <p:cxnSp>
+          <p:nvCxnSpPr>
+            <p:cNvPr id="95" name="Elbow Connector 94"/>
+            <p:cNvCxnSpPr>
+              <a:stCxn id="33" idx="2"/>
+              <a:endCxn id="114" idx="1"/>
+            </p:cNvCxnSpPr>
+            <p:nvPr/>
+          </p:nvCxnSpPr>
+          <p:spPr>
+            <a:xfrm rot="16200000" flipH="1">
+              <a:off x="21791" y="3025924"/>
+              <a:ext cx="1723969" cy="307831"/>
+            </a:xfrm>
+            <a:prstGeom prst="bentConnector2">
+              <a:avLst/>
+            </a:prstGeom>
+            <a:ln w="12700">
+              <a:solidFill>
+                <a:schemeClr val="tx1"/>
+              </a:solidFill>
+              <a:tailEnd type="triangle"/>
+            </a:ln>
+          </p:spPr>
+          <p:style>
+            <a:lnRef idx="1">
+              <a:schemeClr val="accent1"/>
+            </a:lnRef>
+            <a:fillRef idx="0">
+              <a:schemeClr val="accent1"/>
+            </a:fillRef>
+            <a:effectRef idx="0">
+              <a:schemeClr val="accent1"/>
+            </a:effectRef>
+            <a:fontRef idx="minor">
+              <a:schemeClr val="tx1"/>
+            </a:fontRef>
+          </p:style>
+        </p:cxnSp>
+        <p:sp>
+          <p:nvSpPr>
+            <p:cNvPr id="104" name="TextBox 103"/>
+            <p:cNvSpPr txBox="1"/>
+            <p:nvPr/>
+          </p:nvSpPr>
+          <p:spPr>
+            <a:xfrm>
+              <a:off x="763131" y="2509155"/>
+              <a:ext cx="1324593" cy="307777"/>
+            </a:xfrm>
+            <a:prstGeom prst="rect">
+              <a:avLst/>
+            </a:prstGeom>
+            <a:noFill/>
+          </p:spPr>
+          <p:txBody>
+            <a:bodyPr wrap="square" rtlCol="0">
+              <a:spAutoFit/>
+            </a:bodyPr>
+            <a:lstStyle/>
+            <a:p>
+              <a:pPr algn="ctr"/>
+              <a:r>
+                <a:rPr lang="en-US" sz="1400" dirty="0" smtClean="0"/>
+                <a:t>Tokenized text</a:t>
+              </a:r>
+              <a:endParaRPr lang="en-US" sz="1400" dirty="0"/>
+            </a:p>
+          </p:txBody>
+        </p:sp>
+        <p:sp>
+          <p:nvSpPr>
+            <p:cNvPr id="108" name="Flowchart: Document 107"/>
+            <p:cNvSpPr/>
+            <p:nvPr/>
+          </p:nvSpPr>
+          <p:spPr>
+            <a:xfrm>
+              <a:off x="1037691" y="2793919"/>
+              <a:ext cx="762000" cy="468868"/>
+            </a:xfrm>
+            <a:prstGeom prst="flowChartDocument">
+              <a:avLst/>
+            </a:prstGeom>
+            <a:solidFill>
+              <a:schemeClr val="accent3">
+                <a:lumMod val="40000"/>
+                <a:lumOff val="60000"/>
+              </a:schemeClr>
+            </a:solidFill>
+            <a:ln>
+              <a:solidFill>
+                <a:schemeClr val="tx1"/>
+              </a:solidFill>
+            </a:ln>
+          </p:spPr>
+          <p:style>
+            <a:lnRef idx="2">
+              <a:schemeClr val="accent1">
+                <a:shade val="50000"/>
+              </a:schemeClr>
+            </a:lnRef>
+            <a:fillRef idx="1">
+              <a:schemeClr val="accent1"/>
+            </a:fillRef>
+            <a:effectRef idx="0">
+              <a:schemeClr val="accent1"/>
+            </a:effectRef>
+            <a:fontRef idx="minor">
+              <a:schemeClr val="lt1"/>
+            </a:fontRef>
+          </p:style>
+          <p:txBody>
+            <a:bodyPr rtlCol="0" anchor="ctr"/>
+            <a:lstStyle/>
+            <a:p>
+              <a:pPr algn="ctr"/>
+              <a:endParaRPr lang="en-US" sz="1400" dirty="0"/>
+            </a:p>
+          </p:txBody>
+        </p:sp>
+        <p:sp>
+          <p:nvSpPr>
+            <p:cNvPr id="114" name="Flowchart: Document 113"/>
+            <p:cNvSpPr/>
+            <p:nvPr/>
+          </p:nvSpPr>
+          <p:spPr>
+            <a:xfrm>
+              <a:off x="1037691" y="3807391"/>
+              <a:ext cx="762000" cy="468868"/>
+            </a:xfrm>
+            <a:prstGeom prst="flowChartDocument">
+              <a:avLst/>
+            </a:prstGeom>
+            <a:solidFill>
+              <a:schemeClr val="accent3">
+                <a:lumMod val="40000"/>
+                <a:lumOff val="60000"/>
+              </a:schemeClr>
+            </a:solidFill>
+            <a:ln>
+              <a:solidFill>
+                <a:schemeClr val="tx1"/>
+              </a:solidFill>
+            </a:ln>
+          </p:spPr>
+          <p:style>
+            <a:lnRef idx="2">
+              <a:schemeClr val="accent1">
+                <a:shade val="50000"/>
+              </a:schemeClr>
+            </a:lnRef>
+            <a:fillRef idx="1">
+              <a:schemeClr val="accent1"/>
+            </a:fillRef>
+            <a:effectRef idx="0">
+              <a:schemeClr val="accent1"/>
+            </a:effectRef>
+            <a:fontRef idx="minor">
+              <a:schemeClr val="lt1"/>
+            </a:fontRef>
+          </p:style>
+          <p:txBody>
+            <a:bodyPr rtlCol="0" anchor="ctr"/>
+            <a:lstStyle/>
+            <a:p>
+              <a:pPr algn="ctr"/>
+              <a:endParaRPr lang="en-US" sz="1400" dirty="0"/>
+            </a:p>
+          </p:txBody>
+        </p:sp>
+        <p:sp>
+          <p:nvSpPr>
+            <p:cNvPr id="117" name="TextBox 116"/>
+            <p:cNvSpPr txBox="1"/>
+            <p:nvPr/>
+          </p:nvSpPr>
+          <p:spPr>
+            <a:xfrm>
+              <a:off x="683568" y="3517267"/>
+              <a:ext cx="1728192" cy="307777"/>
+            </a:xfrm>
+            <a:prstGeom prst="rect">
+              <a:avLst/>
+            </a:prstGeom>
+            <a:noFill/>
+          </p:spPr>
+          <p:txBody>
+            <a:bodyPr wrap="square" rtlCol="0">
+              <a:spAutoFit/>
+            </a:bodyPr>
+            <a:lstStyle/>
+            <a:p>
+              <a:pPr algn="ctr"/>
+              <a:r>
+                <a:rPr lang="en-US" sz="1400" dirty="0" smtClean="0"/>
+                <a:t>Token mapping table</a:t>
+              </a:r>
+              <a:endParaRPr lang="en-US" sz="1400" dirty="0"/>
+            </a:p>
+          </p:txBody>
+        </p:sp>
+        <p:sp>
+          <p:nvSpPr>
+            <p:cNvPr id="118" name="TextBox 117"/>
+            <p:cNvSpPr txBox="1"/>
+            <p:nvPr/>
+          </p:nvSpPr>
+          <p:spPr>
+            <a:xfrm>
+              <a:off x="880177" y="4221088"/>
+              <a:ext cx="995915" cy="307777"/>
+            </a:xfrm>
+            <a:prstGeom prst="rect">
+              <a:avLst/>
+            </a:prstGeom>
+            <a:noFill/>
+          </p:spPr>
+          <p:txBody>
+            <a:bodyPr wrap="none" rtlCol="0">
+              <a:spAutoFit/>
+            </a:bodyPr>
+            <a:lstStyle/>
+            <a:p>
+              <a:pPr algn="ctr"/>
+              <a:r>
+                <a:rPr lang="en-US" sz="1400" i="1" dirty="0" err="1" smtClean="0"/>
+                <a:t>sample.tab</a:t>
+              </a:r>
+              <a:endParaRPr lang="en-US" sz="1400" i="1" dirty="0"/>
+            </a:p>
+          </p:txBody>
+        </p:sp>
+        <p:cxnSp>
+          <p:nvCxnSpPr>
+            <p:cNvPr id="119" name="Elbow Connector 118"/>
+            <p:cNvCxnSpPr>
+              <a:stCxn id="114" idx="3"/>
+              <a:endCxn id="34" idx="1"/>
+            </p:cNvCxnSpPr>
+            <p:nvPr/>
+          </p:nvCxnSpPr>
+          <p:spPr>
+            <a:xfrm flipV="1">
+              <a:off x="1799691" y="3319914"/>
+              <a:ext cx="5112569" cy="721911"/>
+            </a:xfrm>
+            <a:prstGeom prst="bentConnector3">
+              <a:avLst>
+                <a:gd name="adj1" fmla="val 50000"/>
+              </a:avLst>
+            </a:prstGeom>
+            <a:ln w="12700">
+              <a:solidFill>
+                <a:schemeClr val="tx1"/>
+              </a:solidFill>
+              <a:tailEnd type="triangle"/>
+            </a:ln>
+          </p:spPr>
+          <p:style>
+            <a:lnRef idx="1">
+              <a:schemeClr val="accent1"/>
+            </a:lnRef>
+            <a:fillRef idx="0">
+              <a:schemeClr val="accent1"/>
+            </a:fillRef>
+            <a:effectRef idx="0">
+              <a:schemeClr val="accent1"/>
+            </a:effectRef>
+            <a:fontRef idx="minor">
+              <a:schemeClr val="tx1"/>
+            </a:fontRef>
+          </p:style>
+        </p:cxnSp>
+      </p:grpSp>
+    </p:spTree>
+    <p:extLst>
+      <p:ext uri="{BB962C8B-B14F-4D97-AF65-F5344CB8AC3E}">
+        <p14:creationId xmlns:p14="http://schemas.microsoft.com/office/powerpoint/2010/main" val="2179742051"/>
+      </p:ext>
+    </p:extLst>
+  </p:cSld>
+  <p:clrMapOvr>
+    <a:masterClrMapping/>
+  </p:clrMapOvr>
+</p:sld>
+</file>
+
+<file path=ppt/slides/slide4.xml><?xml version="1.0" encoding="utf-8"?>
+<p:sld xmlns:a="http://schemas.openxmlformats.org/drawingml/2006/main" xmlns:r="http://schemas.openxmlformats.org/officeDocument/2006/relationships" xmlns:p="http://schemas.openxmlformats.org/presentationml/2006/main">
+  <p:cSld>
+    <p:spTree>
+      <p:nvGrpSpPr>
+        <p:cNvPr id="1" name=""/>
+        <p:cNvGrpSpPr/>
+        <p:nvPr/>
+      </p:nvGrpSpPr>
+      <p:grpSpPr>
+        <a:xfrm>
+          <a:off x="0" y="0"/>
+          <a:ext cx="0" cy="0"/>
+          <a:chOff x="0" y="0"/>
+          <a:chExt cx="0" cy="0"/>
+        </a:xfrm>
+      </p:grpSpPr>
+      <p:sp>
+        <p:nvSpPr>
           <p:cNvPr id="2" name="Title 1"/>
           <p:cNvSpPr>
             <a:spLocks noGrp="1"/>
@@ -7346,7 +9211,7 @@
             <a:fld id="{B6F15528-21DE-4FAA-801E-634DDDAF4B2B}" type="slidenum">
               <a:rPr lang="en-US" smtClean="0"/>
               <a:pPr/>
-              <a:t>3</a:t>
+              <a:t>4</a:t>
             </a:fld>
             <a:endParaRPr lang="en-US" dirty="0"/>
           </a:p>
@@ -9083,7 +10948,7 @@
 </p:sld>
 </file>
 
-<file path=ppt/slides/slide4.xml><?xml version="1.0" encoding="utf-8"?>
+<file path=ppt/slides/slide5.xml><?xml version="1.0" encoding="utf-8"?>
 <p:sld xmlns:a="http://schemas.openxmlformats.org/drawingml/2006/main" xmlns:r="http://schemas.openxmlformats.org/officeDocument/2006/relationships" xmlns:p="http://schemas.openxmlformats.org/presentationml/2006/main" show="0">
   <p:cSld>
     <p:spTree>
@@ -9216,7 +11081,7 @@
             <a:fld id="{B6F15528-21DE-4FAA-801E-634DDDAF4B2B}" type="slidenum">
               <a:rPr lang="en-US" smtClean="0"/>
               <a:pPr/>
-              <a:t>4</a:t>
+              <a:t>5</a:t>
             </a:fld>
             <a:endParaRPr lang="en-US" dirty="0"/>
           </a:p>
@@ -10787,18 +12652,18 @@
   <p:clrMapOvr>
     <a:masterClrMapping/>
   </p:clrMapOvr>
-  <mc:AlternateContent xmlns:mc="http://schemas.openxmlformats.org/markup-compatibility/2006">
-    <mc:Choice xmlns:p14="http://schemas.microsoft.com/office/powerpoint/2010/main" Requires="p14">
+  <mc:AlternateContent xmlns:mc="http://schemas.openxmlformats.org/markup-compatibility/2006" xmlns:p14="http://schemas.microsoft.com/office/powerpoint/2010/main">
+    <mc:Choice Requires="p14">
       <p:transition spd="slow" p14:dur="2000"/>
     </mc:Choice>
-    <mc:Fallback>
+    <mc:Fallback xmlns="">
       <p:transition xmlns:p14="http://schemas.microsoft.com/office/powerpoint/2010/main" spd="slow"/>
     </mc:Fallback>
   </mc:AlternateContent>
 </p:sld>
 </file>
 
-<file path=ppt/slides/slide5.xml><?xml version="1.0" encoding="utf-8"?>
+<file path=ppt/slides/slide6.xml><?xml version="1.0" encoding="utf-8"?>
 <p:sld xmlns:a="http://schemas.openxmlformats.org/drawingml/2006/main" xmlns:r="http://schemas.openxmlformats.org/officeDocument/2006/relationships" xmlns:p="http://schemas.openxmlformats.org/presentationml/2006/main" show="0">
   <p:cSld>
     <p:spTree>
@@ -12126,7 +13991,7 @@
             <a:fld id="{B6F15528-21DE-4FAA-801E-634DDDAF4B2B}" type="slidenum">
               <a:rPr lang="en-US" smtClean="0"/>
               <a:pPr/>
-              <a:t>5</a:t>
+              <a:t>6</a:t>
             </a:fld>
             <a:endParaRPr lang="en-US" dirty="0"/>
           </a:p>
@@ -12529,18 +14394,18 @@
   <p:clrMapOvr>
     <a:masterClrMapping/>
   </p:clrMapOvr>
-  <mc:AlternateContent xmlns:mc="http://schemas.openxmlformats.org/markup-compatibility/2006">
-    <mc:Choice xmlns:p14="http://schemas.microsoft.com/office/powerpoint/2010/main" Requires="p14">
+  <mc:AlternateContent xmlns:mc="http://schemas.openxmlformats.org/markup-compatibility/2006" xmlns:p14="http://schemas.microsoft.com/office/powerpoint/2010/main">
+    <mc:Choice Requires="p14">
       <p:transition spd="slow" p14:dur="2000"/>
     </mc:Choice>
-    <mc:Fallback>
+    <mc:Fallback xmlns="">
       <p:transition xmlns:p14="http://schemas.microsoft.com/office/powerpoint/2010/main" spd="slow"/>
     </mc:Fallback>
   </mc:AlternateContent>
 </p:sld>
 </file>
 
-<file path=ppt/slides/slide6.xml><?xml version="1.0" encoding="utf-8"?>
+<file path=ppt/slides/slide7.xml><?xml version="1.0" encoding="utf-8"?>
 <p:sld xmlns:a="http://schemas.openxmlformats.org/drawingml/2006/main" xmlns:r="http://schemas.openxmlformats.org/officeDocument/2006/relationships" xmlns:p="http://schemas.openxmlformats.org/presentationml/2006/main">
   <p:cSld>
     <p:spTree>
@@ -12646,7 +14511,7 @@
             <a:fld id="{B6F15528-21DE-4FAA-801E-634DDDAF4B2B}" type="slidenum">
               <a:rPr lang="en-US" smtClean="0"/>
               <a:pPr/>
-              <a:t>6</a:t>
+              <a:t>7</a:t>
             </a:fld>
             <a:endParaRPr lang="en-US"/>
           </a:p>
@@ -12810,7 +14675,7 @@
 </p:sld>
 </file>
 
-<file path=ppt/slides/slide7.xml><?xml version="1.0" encoding="utf-8"?>
+<file path=ppt/slides/slide8.xml><?xml version="1.0" encoding="utf-8"?>
 <p:sld xmlns:a="http://schemas.openxmlformats.org/drawingml/2006/main" xmlns:r="http://schemas.openxmlformats.org/officeDocument/2006/relationships" xmlns:p="http://schemas.openxmlformats.org/presentationml/2006/main">
   <p:cSld>
     <p:spTree>
@@ -12927,7 +14792,7 @@
             <a:fld id="{B6F15528-21DE-4FAA-801E-634DDDAF4B2B}" type="slidenum">
               <a:rPr lang="en-US" smtClean="0"/>
               <a:pPr/>
-              <a:t>7</a:t>
+              <a:t>8</a:t>
             </a:fld>
             <a:endParaRPr lang="en-US"/>
           </a:p>

</xml_diff>

<commit_message>
Revised the figure and the first paragraph to briefly clarify the input of human annotators and a system.
</commit_message>
<xml_diff>
--- a/doc/evm-eval-work-flow.pptx
+++ b/doc/evm-eval-work-flow.pptx
@@ -7142,16 +7142,16 @@
       </p:sp>
       <p:grpSp>
         <p:nvGrpSpPr>
-          <p:cNvPr id="122" name="Group 121"/>
+          <p:cNvPr id="87" name="Group 86"/>
           <p:cNvGrpSpPr/>
           <p:nvPr/>
         </p:nvGrpSpPr>
         <p:grpSpPr>
           <a:xfrm>
             <a:off x="143508" y="653206"/>
-            <a:ext cx="8870785" cy="4792018"/>
-            <a:chOff x="143508" y="420923"/>
-            <a:chExt cx="8870785" cy="4792018"/>
+            <a:ext cx="8712968" cy="4574722"/>
+            <a:chOff x="143508" y="653206"/>
+            <a:chExt cx="8712968" cy="4574722"/>
           </a:xfrm>
         </p:grpSpPr>
         <p:sp>
@@ -7162,7 +7162,7 @@
           </p:nvSpPr>
           <p:spPr>
             <a:xfrm>
-              <a:off x="2487107" y="1103785"/>
+              <a:off x="2487107" y="1336068"/>
               <a:ext cx="381000" cy="381000"/>
             </a:xfrm>
             <a:prstGeom prst="smileyFace">
@@ -7208,7 +7208,7 @@
           </p:nvSpPr>
           <p:spPr>
             <a:xfrm>
-              <a:off x="2699792" y="420923"/>
+              <a:off x="2699792" y="653206"/>
               <a:ext cx="1584176" cy="307777"/>
             </a:xfrm>
             <a:prstGeom prst="rect">
@@ -7238,7 +7238,7 @@
           </p:nvSpPr>
           <p:spPr>
             <a:xfrm>
-              <a:off x="3364969" y="1695191"/>
+              <a:off x="3364969" y="1927474"/>
               <a:ext cx="762000" cy="468868"/>
             </a:xfrm>
             <a:prstGeom prst="flowChartDocument">
@@ -7289,7 +7289,7 @@
           </p:nvSpPr>
           <p:spPr>
             <a:xfrm>
-              <a:off x="3167844" y="1213592"/>
+              <a:off x="3167844" y="1445875"/>
               <a:ext cx="1483971" cy="523220"/>
             </a:xfrm>
             <a:prstGeom prst="rect">
@@ -7322,7 +7322,7 @@
           </p:nvCxnSpPr>
           <p:spPr>
             <a:xfrm>
-              <a:off x="2677607" y="1484785"/>
+              <a:off x="2677607" y="1717068"/>
               <a:ext cx="0" cy="191867"/>
             </a:xfrm>
             <a:prstGeom prst="straightConnector1">
@@ -7361,7 +7361,7 @@
           </p:nvCxnSpPr>
           <p:spPr>
             <a:xfrm flipV="1">
-              <a:off x="3031607" y="1929625"/>
+              <a:off x="3031607" y="2161908"/>
               <a:ext cx="333362" cy="130"/>
             </a:xfrm>
             <a:prstGeom prst="straightConnector1">
@@ -7397,7 +7397,7 @@
           </p:nvSpPr>
           <p:spPr>
             <a:xfrm>
-              <a:off x="143508" y="692696"/>
+              <a:off x="143508" y="672951"/>
               <a:ext cx="1137374" cy="307777"/>
             </a:xfrm>
             <a:prstGeom prst="rect">
@@ -7428,7 +7428,7 @@
           </p:nvSpPr>
           <p:spPr>
             <a:xfrm>
-              <a:off x="755576" y="1376772"/>
+              <a:off x="755576" y="1357027"/>
               <a:ext cx="952120" cy="307777"/>
             </a:xfrm>
             <a:prstGeom prst="rect">
@@ -7459,7 +7459,7 @@
           </p:nvSpPr>
           <p:spPr>
             <a:xfrm>
-              <a:off x="348860" y="980728"/>
+              <a:off x="348860" y="960983"/>
               <a:ext cx="762000" cy="468868"/>
             </a:xfrm>
             <a:prstGeom prst="flowChartDocument">
@@ -7509,7 +7509,7 @@
           </p:nvSpPr>
           <p:spPr>
             <a:xfrm>
-              <a:off x="6189027" y="1694508"/>
+              <a:off x="6189027" y="1926791"/>
               <a:ext cx="762000" cy="468868"/>
             </a:xfrm>
             <a:prstGeom prst="flowChartDocument">
@@ -7560,7 +7560,7 @@
           </p:nvSpPr>
           <p:spPr>
             <a:xfrm>
-              <a:off x="6073225" y="2138028"/>
+              <a:off x="6073225" y="2370311"/>
               <a:ext cx="959815" cy="307777"/>
             </a:xfrm>
             <a:prstGeom prst="rect">
@@ -7598,7 +7598,7 @@
           </p:nvCxnSpPr>
           <p:spPr>
             <a:xfrm flipV="1">
-              <a:off x="4126969" y="1928942"/>
+              <a:off x="4126969" y="2161225"/>
               <a:ext cx="481035" cy="683"/>
             </a:xfrm>
             <a:prstGeom prst="straightConnector1">
@@ -7634,7 +7634,7 @@
           </p:nvSpPr>
           <p:spPr>
             <a:xfrm>
-              <a:off x="5913775" y="1177588"/>
+              <a:off x="5913775" y="1409871"/>
               <a:ext cx="1592551" cy="523220"/>
             </a:xfrm>
             <a:prstGeom prst="rect">
@@ -7673,7 +7673,7 @@
           </p:nvCxnSpPr>
           <p:spPr>
             <a:xfrm>
-              <a:off x="5632073" y="1928942"/>
+              <a:off x="5632073" y="2161225"/>
               <a:ext cx="556954" cy="0"/>
             </a:xfrm>
             <a:prstGeom prst="straightConnector1">
@@ -7709,7 +7709,7 @@
           </p:nvSpPr>
           <p:spPr>
             <a:xfrm>
-              <a:off x="6172133" y="4441289"/>
+              <a:off x="6172133" y="4456276"/>
               <a:ext cx="762000" cy="468868"/>
             </a:xfrm>
             <a:prstGeom prst="flowChartDocument">
@@ -7760,7 +7760,7 @@
           </p:nvSpPr>
           <p:spPr>
             <a:xfrm>
-              <a:off x="5976156" y="3918069"/>
+              <a:off x="5976156" y="3933056"/>
               <a:ext cx="1156855" cy="523220"/>
             </a:xfrm>
             <a:prstGeom prst="rect">
@@ -7799,7 +7799,7 @@
           </p:nvCxnSpPr>
           <p:spPr>
             <a:xfrm>
-              <a:off x="5668077" y="4673229"/>
+              <a:off x="5668077" y="4688216"/>
               <a:ext cx="504056" cy="2494"/>
             </a:xfrm>
             <a:prstGeom prst="straightConnector1">
@@ -7835,7 +7835,7 @@
           </p:nvSpPr>
           <p:spPr>
             <a:xfrm>
-              <a:off x="5796136" y="4905164"/>
+              <a:off x="5796136" y="4920151"/>
               <a:ext cx="1658201" cy="307777"/>
             </a:xfrm>
             <a:prstGeom prst="rect">
@@ -7874,7 +7874,7 @@
           </p:nvSpPr>
           <p:spPr>
             <a:xfrm>
-              <a:off x="4608004" y="1675839"/>
+              <a:off x="4608004" y="1908122"/>
               <a:ext cx="1024069" cy="506206"/>
             </a:xfrm>
             <a:prstGeom prst="roundRect">
@@ -7935,8 +7935,8 @@
           </p:nvCxnSpPr>
           <p:spPr>
             <a:xfrm>
-              <a:off x="6951027" y="1928942"/>
-              <a:ext cx="447287" cy="1137869"/>
+              <a:off x="6951027" y="2161225"/>
+              <a:ext cx="447287" cy="980742"/>
             </a:xfrm>
             <a:prstGeom prst="bentConnector2">
               <a:avLst/>
@@ -7971,7 +7971,7 @@
           </p:nvSpPr>
           <p:spPr>
             <a:xfrm>
-              <a:off x="3213707" y="2132856"/>
+              <a:off x="3213707" y="2365139"/>
               <a:ext cx="1034257" cy="307777"/>
             </a:xfrm>
             <a:prstGeom prst="rect">
@@ -8005,8 +8005,8 @@
           </p:nvCxnSpPr>
           <p:spPr>
             <a:xfrm rot="16200000" flipH="1">
-              <a:off x="528527" y="2519188"/>
-              <a:ext cx="710497" cy="307831"/>
+              <a:off x="552168" y="2454563"/>
+              <a:ext cx="663214" cy="307831"/>
             </a:xfrm>
             <a:prstGeom prst="bentConnector2">
               <a:avLst/>
@@ -8041,7 +8041,7 @@
           </p:nvSpPr>
           <p:spPr>
             <a:xfrm>
-              <a:off x="2094923" y="4381944"/>
+              <a:off x="2094923" y="4396931"/>
               <a:ext cx="3573154" cy="582569"/>
             </a:xfrm>
             <a:prstGeom prst="roundRect">
@@ -8118,8 +8118,8 @@
           </p:nvCxnSpPr>
           <p:spPr>
             <a:xfrm flipV="1">
-              <a:off x="6934133" y="3573017"/>
-              <a:ext cx="464181" cy="1102706"/>
+              <a:off x="6934133" y="3648173"/>
+              <a:ext cx="464181" cy="1042537"/>
             </a:xfrm>
             <a:prstGeom prst="bentConnector2">
               <a:avLst/>
@@ -8157,8 +8157,8 @@
           </p:nvCxnSpPr>
           <p:spPr>
             <a:xfrm>
-              <a:off x="729860" y="1418599"/>
-              <a:ext cx="0" cy="462229"/>
+              <a:off x="729860" y="1398854"/>
+              <a:ext cx="0" cy="440990"/>
             </a:xfrm>
             <a:prstGeom prst="straightConnector1">
               <a:avLst/>
@@ -8193,7 +8193,7 @@
           </p:nvSpPr>
           <p:spPr>
             <a:xfrm>
-              <a:off x="216697" y="1880828"/>
+              <a:off x="216697" y="1839844"/>
               <a:ext cx="1026325" cy="437028"/>
             </a:xfrm>
             <a:prstGeom prst="roundRect">
@@ -8264,7 +8264,7 @@
           </p:nvSpPr>
           <p:spPr>
             <a:xfrm>
-              <a:off x="6912260" y="3066811"/>
+              <a:off x="6912260" y="3141967"/>
               <a:ext cx="972108" cy="506206"/>
             </a:xfrm>
             <a:prstGeom prst="roundRect">
@@ -8317,8 +8317,8 @@
           </p:nvSpPr>
           <p:spPr>
             <a:xfrm>
-              <a:off x="8100392" y="3065812"/>
-              <a:ext cx="913901" cy="507205"/>
+              <a:off x="8100393" y="3140968"/>
+              <a:ext cx="756083" cy="507205"/>
             </a:xfrm>
             <a:prstGeom prst="flowChartProcess">
               <a:avLst/>
@@ -8378,8 +8378,8 @@
           </p:nvCxnSpPr>
           <p:spPr>
             <a:xfrm flipV="1">
-              <a:off x="7884368" y="3319415"/>
-              <a:ext cx="216024" cy="499"/>
+              <a:off x="7884368" y="3394571"/>
+              <a:ext cx="216025" cy="499"/>
             </a:xfrm>
             <a:prstGeom prst="straightConnector1">
               <a:avLst/>
@@ -8414,7 +8414,7 @@
           </p:nvSpPr>
           <p:spPr>
             <a:xfrm>
-              <a:off x="884570" y="3212976"/>
+              <a:off x="884570" y="3124709"/>
               <a:ext cx="987130" cy="307777"/>
             </a:xfrm>
             <a:prstGeom prst="rect">
@@ -8445,7 +8445,7 @@
           </p:nvSpPr>
           <p:spPr>
             <a:xfrm>
-              <a:off x="2323606" y="1676652"/>
+              <a:off x="2323606" y="1908935"/>
               <a:ext cx="708001" cy="506206"/>
             </a:xfrm>
             <a:prstGeom prst="roundRect">
@@ -8503,8 +8503,8 @@
           </p:nvSpPr>
           <p:spPr>
             <a:xfrm>
-              <a:off x="2094923" y="822195"/>
-              <a:ext cx="3737217" cy="1814718"/>
+              <a:off x="2094923" y="1054477"/>
+              <a:ext cx="3737217" cy="1674187"/>
             </a:xfrm>
             <a:prstGeom prst="roundRect">
               <a:avLst>
@@ -8557,8 +8557,8 @@
           </p:nvCxnSpPr>
           <p:spPr>
             <a:xfrm>
-              <a:off x="1799691" y="3028353"/>
-              <a:ext cx="877915" cy="1317587"/>
+              <a:off x="1799691" y="2940086"/>
+              <a:ext cx="877915" cy="1456845"/>
             </a:xfrm>
             <a:prstGeom prst="bentConnector2">
               <a:avLst/>
@@ -8596,8 +8596,8 @@
           </p:nvCxnSpPr>
           <p:spPr>
             <a:xfrm flipV="1">
-              <a:off x="1799691" y="2182858"/>
-              <a:ext cx="877916" cy="845495"/>
+              <a:off x="1799691" y="2415141"/>
+              <a:ext cx="877916" cy="524945"/>
             </a:xfrm>
             <a:prstGeom prst="bentConnector2">
               <a:avLst/>
@@ -8632,7 +8632,7 @@
           </p:nvSpPr>
           <p:spPr>
             <a:xfrm>
-              <a:off x="3094189" y="836712"/>
+              <a:off x="3094189" y="1068995"/>
               <a:ext cx="2612401" cy="307777"/>
             </a:xfrm>
             <a:prstGeom prst="rect">
@@ -8664,7 +8664,7 @@
           </p:nvCxnSpPr>
           <p:spPr>
             <a:xfrm flipH="1">
-              <a:off x="2677607" y="676437"/>
+              <a:off x="2677607" y="908720"/>
               <a:ext cx="274213" cy="427348"/>
             </a:xfrm>
             <a:prstGeom prst="line">
@@ -8702,8 +8702,8 @@
           </p:nvCxnSpPr>
           <p:spPr>
             <a:xfrm rot="16200000" flipH="1">
-              <a:off x="21791" y="3025924"/>
-              <a:ext cx="1723969" cy="307831"/>
+              <a:off x="27430" y="2979301"/>
+              <a:ext cx="1712690" cy="307831"/>
             </a:xfrm>
             <a:prstGeom prst="bentConnector2">
               <a:avLst/>
@@ -8738,7 +8738,7 @@
           </p:nvSpPr>
           <p:spPr>
             <a:xfrm>
-              <a:off x="763131" y="2509155"/>
+              <a:off x="763131" y="2420888"/>
               <a:ext cx="1324593" cy="307777"/>
             </a:xfrm>
             <a:prstGeom prst="rect">
@@ -8769,7 +8769,7 @@
           </p:nvSpPr>
           <p:spPr>
             <a:xfrm>
-              <a:off x="1037691" y="2793919"/>
+              <a:off x="1037691" y="2705652"/>
               <a:ext cx="762000" cy="468868"/>
             </a:xfrm>
             <a:prstGeom prst="flowChartDocument">
@@ -8820,7 +8820,7 @@
           </p:nvSpPr>
           <p:spPr>
             <a:xfrm>
-              <a:off x="1037691" y="3807391"/>
+              <a:off x="1037691" y="3755128"/>
               <a:ext cx="762000" cy="468868"/>
             </a:xfrm>
             <a:prstGeom prst="flowChartDocument">
@@ -8871,7 +8871,7 @@
           </p:nvSpPr>
           <p:spPr>
             <a:xfrm>
-              <a:off x="683568" y="3517267"/>
+              <a:off x="683568" y="3465004"/>
               <a:ext cx="1728192" cy="307777"/>
             </a:xfrm>
             <a:prstGeom prst="rect">
@@ -8902,7 +8902,7 @@
           </p:nvSpPr>
           <p:spPr>
             <a:xfrm>
-              <a:off x="880177" y="4221088"/>
+              <a:off x="880177" y="4168825"/>
               <a:ext cx="995915" cy="307777"/>
             </a:xfrm>
             <a:prstGeom prst="rect">
@@ -8936,12 +8936,91 @@
           </p:nvCxnSpPr>
           <p:spPr>
             <a:xfrm flipV="1">
-              <a:off x="1799691" y="3319914"/>
-              <a:ext cx="5112569" cy="721911"/>
+              <a:off x="1799691" y="3395070"/>
+              <a:ext cx="5112569" cy="594492"/>
             </a:xfrm>
             <a:prstGeom prst="bentConnector3">
               <a:avLst>
-                <a:gd name="adj1" fmla="val 50000"/>
+                <a:gd name="adj1" fmla="val 64895"/>
+              </a:avLst>
+            </a:prstGeom>
+            <a:ln w="12700">
+              <a:solidFill>
+                <a:schemeClr val="tx1"/>
+              </a:solidFill>
+              <a:tailEnd type="triangle"/>
+            </a:ln>
+          </p:spPr>
+          <p:style>
+            <a:lnRef idx="1">
+              <a:schemeClr val="accent1"/>
+            </a:lnRef>
+            <a:fillRef idx="0">
+              <a:schemeClr val="accent1"/>
+            </a:fillRef>
+            <a:effectRef idx="0">
+              <a:schemeClr val="accent1"/>
+            </a:effectRef>
+            <a:fontRef idx="minor">
+              <a:schemeClr val="tx1"/>
+            </a:fontRef>
+          </p:style>
+        </p:cxnSp>
+        <p:cxnSp>
+          <p:nvCxnSpPr>
+            <p:cNvPr id="70" name="Elbow Connector 69"/>
+            <p:cNvCxnSpPr>
+              <a:stCxn id="114" idx="3"/>
+              <a:endCxn id="24" idx="2"/>
+            </p:cNvCxnSpPr>
+            <p:nvPr/>
+          </p:nvCxnSpPr>
+          <p:spPr>
+            <a:xfrm flipV="1">
+              <a:off x="1799691" y="2414328"/>
+              <a:ext cx="3320348" cy="1575234"/>
+            </a:xfrm>
+            <a:prstGeom prst="bentConnector2">
+              <a:avLst/>
+            </a:prstGeom>
+            <a:ln w="12700">
+              <a:solidFill>
+                <a:schemeClr val="tx1"/>
+              </a:solidFill>
+              <a:tailEnd type="triangle"/>
+            </a:ln>
+          </p:spPr>
+          <p:style>
+            <a:lnRef idx="1">
+              <a:schemeClr val="accent1"/>
+            </a:lnRef>
+            <a:fillRef idx="0">
+              <a:schemeClr val="accent1"/>
+            </a:fillRef>
+            <a:effectRef idx="0">
+              <a:schemeClr val="accent1"/>
+            </a:effectRef>
+            <a:fontRef idx="minor">
+              <a:schemeClr val="tx1"/>
+            </a:fontRef>
+          </p:style>
+        </p:cxnSp>
+        <p:cxnSp>
+          <p:nvCxnSpPr>
+            <p:cNvPr id="78" name="Elbow Connector 77"/>
+            <p:cNvCxnSpPr>
+              <a:stCxn id="114" idx="3"/>
+            </p:cNvCxnSpPr>
+            <p:nvPr/>
+          </p:nvCxnSpPr>
+          <p:spPr>
+            <a:xfrm>
+              <a:off x="1799691" y="3989562"/>
+              <a:ext cx="3320348" cy="404309"/>
+            </a:xfrm>
+            <a:prstGeom prst="bentConnector3">
+              <a:avLst>
+                <a:gd name="adj1" fmla="val 100058"/>
               </a:avLst>
             </a:prstGeom>
             <a:ln w="12700">

</xml_diff>